<commit_message>
improve Figure 14 theoretical storage
</commit_message>
<xml_diff>
--- a/Figures/Chapter_14/drawings/Fig14.X_storage_theory.pptx
+++ b/Figures/Chapter_14/drawings/Fig14.X_storage_theory.pptx
@@ -6,7 +6,7 @@
     <p:sldMasterId id="2147483660" r:id="rId2"/>
   </p:sldMasterIdLst>
   <p:sldIdLst>
-    <p:sldId id="833" r:id="rId3"/>
+    <p:sldId id="834" r:id="rId3"/>
   </p:sldIdLst>
   <p:sldSz cx="12192000" cy="6858000"/>
   <p:notesSz cx="6858000" cy="9144000"/>
@@ -262,7 +262,7 @@
           <a:p>
             <a:fld id="{8B1A925D-6802-4F82-B3A4-43BDB522D203}" type="datetimeFigureOut">
               <a:rPr lang="en-GB" smtClean="0"/>
-              <a:t>12/05/2022</a:t>
+              <a:t>07/03/2023</a:t>
             </a:fld>
             <a:endParaRPr lang="en-GB"/>
           </a:p>
@@ -462,7 +462,7 @@
           <a:p>
             <a:fld id="{8B1A925D-6802-4F82-B3A4-43BDB522D203}" type="datetimeFigureOut">
               <a:rPr lang="en-GB" smtClean="0"/>
-              <a:t>12/05/2022</a:t>
+              <a:t>07/03/2023</a:t>
             </a:fld>
             <a:endParaRPr lang="en-GB"/>
           </a:p>
@@ -672,7 +672,7 @@
           <a:p>
             <a:fld id="{8B1A925D-6802-4F82-B3A4-43BDB522D203}" type="datetimeFigureOut">
               <a:rPr lang="en-GB" smtClean="0"/>
-              <a:t>12/05/2022</a:t>
+              <a:t>07/03/2023</a:t>
             </a:fld>
             <a:endParaRPr lang="en-GB"/>
           </a:p>
@@ -1127,7 +1127,7 @@
             <a:fld id="{78417F83-4CBA-48F2-BAD0-783AE3701E32}" type="datetimeFigureOut">
               <a:rPr lang="en-GB" smtClean="0"/>
               <a:pPr/>
-              <a:t>12/05/2022</a:t>
+              <a:t>07/03/2023</a:t>
             </a:fld>
             <a:r>
               <a:rPr lang="en-GB" dirty="0"/>
@@ -1585,7 +1585,7 @@
             <a:fld id="{78417F83-4CBA-48F2-BAD0-783AE3701E32}" type="datetimeFigureOut">
               <a:rPr lang="en-GB" smtClean="0"/>
               <a:pPr/>
-              <a:t>12/05/2022</a:t>
+              <a:t>07/03/2023</a:t>
             </a:fld>
             <a:r>
               <a:rPr lang="en-GB" dirty="0"/>
@@ -2249,7 +2249,7 @@
             <a:fld id="{78417F83-4CBA-48F2-BAD0-783AE3701E32}" type="datetimeFigureOut">
               <a:rPr lang="en-GB" smtClean="0"/>
               <a:pPr/>
-              <a:t>12/05/2022</a:t>
+              <a:t>07/03/2023</a:t>
             </a:fld>
             <a:r>
               <a:rPr lang="en-GB" dirty="0"/>
@@ -2595,7 +2595,7 @@
             <a:fld id="{78417F83-4CBA-48F2-BAD0-783AE3701E32}" type="datetimeFigureOut">
               <a:rPr lang="en-GB" smtClean="0"/>
               <a:pPr/>
-              <a:t>12/05/2022</a:t>
+              <a:t>07/03/2023</a:t>
             </a:fld>
             <a:r>
               <a:rPr lang="en-GB" dirty="0"/>
@@ -2973,7 +2973,7 @@
             <a:fld id="{78417F83-4CBA-48F2-BAD0-783AE3701E32}" type="datetimeFigureOut">
               <a:rPr lang="en-GB" smtClean="0"/>
               <a:pPr/>
-              <a:t>12/05/2022</a:t>
+              <a:t>07/03/2023</a:t>
             </a:fld>
             <a:r>
               <a:rPr lang="en-GB" dirty="0"/>
@@ -3400,7 +3400,7 @@
             <a:fld id="{78417F83-4CBA-48F2-BAD0-783AE3701E32}" type="datetimeFigureOut">
               <a:rPr lang="en-GB" smtClean="0"/>
               <a:pPr/>
-              <a:t>12/05/2022</a:t>
+              <a:t>07/03/2023</a:t>
             </a:fld>
             <a:r>
               <a:rPr lang="en-GB" dirty="0"/>
@@ -3840,7 +3840,7 @@
             <a:fld id="{78417F83-4CBA-48F2-BAD0-783AE3701E32}" type="datetimeFigureOut">
               <a:rPr lang="en-GB" smtClean="0"/>
               <a:pPr/>
-              <a:t>12/05/2022</a:t>
+              <a:t>07/03/2023</a:t>
             </a:fld>
             <a:r>
               <a:rPr lang="en-GB" dirty="0"/>
@@ -4008,7 +4008,7 @@
             <a:fld id="{78417F83-4CBA-48F2-BAD0-783AE3701E32}" type="datetimeFigureOut">
               <a:rPr lang="en-GB" smtClean="0"/>
               <a:pPr/>
-              <a:t>12/05/2022</a:t>
+              <a:t>07/03/2023</a:t>
             </a:fld>
             <a:r>
               <a:rPr lang="en-GB" dirty="0"/>
@@ -4176,7 +4176,7 @@
           <a:p>
             <a:fld id="{8B1A925D-6802-4F82-B3A4-43BDB522D203}" type="datetimeFigureOut">
               <a:rPr lang="en-GB" smtClean="0"/>
-              <a:t>12/05/2022</a:t>
+              <a:t>07/03/2023</a:t>
             </a:fld>
             <a:endParaRPr lang="en-GB"/>
           </a:p>
@@ -4389,7 +4389,7 @@
             <a:fld id="{78417F83-4CBA-48F2-BAD0-783AE3701E32}" type="datetimeFigureOut">
               <a:rPr lang="en-GB" smtClean="0"/>
               <a:pPr/>
-              <a:t>12/05/2022</a:t>
+              <a:t>07/03/2023</a:t>
             </a:fld>
             <a:r>
               <a:rPr lang="en-GB" dirty="0"/>
@@ -4620,7 +4620,7 @@
             <a:fld id="{78417F83-4CBA-48F2-BAD0-783AE3701E32}" type="datetimeFigureOut">
               <a:rPr lang="en-GB" smtClean="0"/>
               <a:pPr/>
-              <a:t>12/05/2022</a:t>
+              <a:t>07/03/2023</a:t>
             </a:fld>
             <a:r>
               <a:rPr lang="en-GB" dirty="0"/>
@@ -4861,7 +4861,7 @@
             <a:fld id="{78417F83-4CBA-48F2-BAD0-783AE3701E32}" type="datetimeFigureOut">
               <a:rPr lang="en-GB" smtClean="0"/>
               <a:pPr/>
-              <a:t>12/05/2022</a:t>
+              <a:t>07/03/2023</a:t>
             </a:fld>
             <a:r>
               <a:rPr lang="en-GB" dirty="0"/>
@@ -5031,7 +5031,7 @@
             <a:fld id="{78417F83-4CBA-48F2-BAD0-783AE3701E32}" type="datetimeFigureOut">
               <a:rPr lang="en-GB" smtClean="0"/>
               <a:pPr/>
-              <a:t>12/05/2022</a:t>
+              <a:t>07/03/2023</a:t>
             </a:fld>
             <a:r>
               <a:rPr lang="en-GB" dirty="0"/>
@@ -5205,7 +5205,7 @@
             <a:fld id="{78417F83-4CBA-48F2-BAD0-783AE3701E32}" type="datetimeFigureOut">
               <a:rPr lang="en-GB" smtClean="0"/>
               <a:pPr/>
-              <a:t>12/05/2022</a:t>
+              <a:t>07/03/2023</a:t>
             </a:fld>
             <a:r>
               <a:rPr lang="en-GB" dirty="0"/>
@@ -5542,7 +5542,7 @@
             <a:fld id="{78417F83-4CBA-48F2-BAD0-783AE3701E32}" type="datetimeFigureOut">
               <a:rPr lang="en-GB" smtClean="0"/>
               <a:pPr/>
-              <a:t>12/05/2022</a:t>
+              <a:t>07/03/2023</a:t>
             </a:fld>
             <a:r>
               <a:rPr lang="en-GB" dirty="0"/>
@@ -5713,7 +5713,7 @@
             <a:fld id="{78417F83-4CBA-48F2-BAD0-783AE3701E32}" type="datetimeFigureOut">
               <a:rPr lang="en-GB" smtClean="0"/>
               <a:pPr/>
-              <a:t>12/05/2022</a:t>
+              <a:t>07/03/2023</a:t>
             </a:fld>
             <a:r>
               <a:rPr lang="en-GB" dirty="0"/>
@@ -5909,7 +5909,7 @@
             <a:fld id="{78417F83-4CBA-48F2-BAD0-783AE3701E32}" type="datetimeFigureOut">
               <a:rPr lang="en-GB" smtClean="0"/>
               <a:pPr/>
-              <a:t>12/05/2022</a:t>
+              <a:t>07/03/2023</a:t>
             </a:fld>
             <a:r>
               <a:rPr lang="en-GB" dirty="0"/>
@@ -6083,7 +6083,7 @@
             <a:fld id="{78417F83-4CBA-48F2-BAD0-783AE3701E32}" type="datetimeFigureOut">
               <a:rPr lang="en-GB" smtClean="0"/>
               <a:pPr/>
-              <a:t>12/05/2022</a:t>
+              <a:t>07/03/2023</a:t>
             </a:fld>
             <a:r>
               <a:rPr lang="en-GB" dirty="0"/>
@@ -6242,7 +6242,7 @@
             <a:fld id="{78417F83-4CBA-48F2-BAD0-783AE3701E32}" type="datetimeFigureOut">
               <a:rPr lang="en-GB" smtClean="0"/>
               <a:pPr/>
-              <a:t>12/05/2022</a:t>
+              <a:t>07/03/2023</a:t>
             </a:fld>
             <a:r>
               <a:rPr lang="en-GB" dirty="0"/>
@@ -6526,7 +6526,7 @@
           <a:p>
             <a:fld id="{8B1A925D-6802-4F82-B3A4-43BDB522D203}" type="datetimeFigureOut">
               <a:rPr lang="en-GB" smtClean="0"/>
-              <a:t>12/05/2022</a:t>
+              <a:t>07/03/2023</a:t>
             </a:fld>
             <a:endParaRPr lang="en-GB"/>
           </a:p>
@@ -7407,7 +7407,7 @@
             <a:fld id="{78417F83-4CBA-48F2-BAD0-783AE3701E32}" type="datetimeFigureOut">
               <a:rPr lang="en-GB" smtClean="0"/>
               <a:pPr/>
-              <a:t>12/05/2022</a:t>
+              <a:t>07/03/2023</a:t>
             </a:fld>
             <a:r>
               <a:rPr lang="en-GB" dirty="0"/>
@@ -7682,7 +7682,7 @@
             <a:fld id="{78417F83-4CBA-48F2-BAD0-783AE3701E32}" type="datetimeFigureOut">
               <a:rPr lang="en-GB" smtClean="0"/>
               <a:pPr/>
-              <a:t>12/05/2022</a:t>
+              <a:t>07/03/2023</a:t>
             </a:fld>
             <a:r>
               <a:rPr lang="en-GB" dirty="0"/>
@@ -8887,7 +8887,7 @@
           <a:p>
             <a:fld id="{8B1A925D-6802-4F82-B3A4-43BDB522D203}" type="datetimeFigureOut">
               <a:rPr lang="en-GB" smtClean="0"/>
-              <a:t>12/05/2022</a:t>
+              <a:t>07/03/2023</a:t>
             </a:fld>
             <a:endParaRPr lang="en-GB"/>
           </a:p>
@@ -9302,7 +9302,7 @@
           <a:p>
             <a:fld id="{8B1A925D-6802-4F82-B3A4-43BDB522D203}" type="datetimeFigureOut">
               <a:rPr lang="en-GB" smtClean="0"/>
-              <a:t>12/05/2022</a:t>
+              <a:t>07/03/2023</a:t>
             </a:fld>
             <a:endParaRPr lang="en-GB"/>
           </a:p>
@@ -9444,7 +9444,7 @@
           <a:p>
             <a:fld id="{8B1A925D-6802-4F82-B3A4-43BDB522D203}" type="datetimeFigureOut">
               <a:rPr lang="en-GB" smtClean="0"/>
-              <a:t>12/05/2022</a:t>
+              <a:t>07/03/2023</a:t>
             </a:fld>
             <a:endParaRPr lang="en-GB"/>
           </a:p>
@@ -9557,7 +9557,7 @@
           <a:p>
             <a:fld id="{8B1A925D-6802-4F82-B3A4-43BDB522D203}" type="datetimeFigureOut">
               <a:rPr lang="en-GB" smtClean="0"/>
-              <a:t>12/05/2022</a:t>
+              <a:t>07/03/2023</a:t>
             </a:fld>
             <a:endParaRPr lang="en-GB"/>
           </a:p>
@@ -9870,7 +9870,7 @@
           <a:p>
             <a:fld id="{8B1A925D-6802-4F82-B3A4-43BDB522D203}" type="datetimeFigureOut">
               <a:rPr lang="en-GB" smtClean="0"/>
-              <a:t>12/05/2022</a:t>
+              <a:t>07/03/2023</a:t>
             </a:fld>
             <a:endParaRPr lang="en-GB"/>
           </a:p>
@@ -10159,7 +10159,7 @@
           <a:p>
             <a:fld id="{8B1A925D-6802-4F82-B3A4-43BDB522D203}" type="datetimeFigureOut">
               <a:rPr lang="en-GB" smtClean="0"/>
-              <a:t>12/05/2022</a:t>
+              <a:t>07/03/2023</a:t>
             </a:fld>
             <a:endParaRPr lang="en-GB"/>
           </a:p>
@@ -10402,7 +10402,7 @@
           <a:p>
             <a:fld id="{8B1A925D-6802-4F82-B3A4-43BDB522D203}" type="datetimeFigureOut">
               <a:rPr lang="en-GB" smtClean="0"/>
-              <a:t>12/05/2022</a:t>
+              <a:t>07/03/2023</a:t>
             </a:fld>
             <a:endParaRPr lang="en-GB"/>
           </a:p>
@@ -11168,7 +11168,7 @@
             <a:fld id="{78417F83-4CBA-48F2-BAD0-783AE3701E32}" type="datetimeFigureOut">
               <a:rPr lang="en-GB" smtClean="0"/>
               <a:pPr/>
-              <a:t>12/05/2022</a:t>
+              <a:t>07/03/2023</a:t>
             </a:fld>
             <a:r>
               <a:rPr lang="en-GB"/>
@@ -12099,10 +12099,10 @@
         </p:nvGrpSpPr>
         <p:grpSpPr>
           <a:xfrm>
-            <a:off x="57953" y="2268049"/>
-            <a:ext cx="7410953" cy="3654243"/>
-            <a:chOff x="125517" y="1985899"/>
-            <a:chExt cx="9401774" cy="5331533"/>
+            <a:off x="42564" y="2045229"/>
+            <a:ext cx="7426342" cy="3877063"/>
+            <a:chOff x="105994" y="1660805"/>
+            <a:chExt cx="9421297" cy="5656627"/>
           </a:xfrm>
         </p:grpSpPr>
         <p:sp>
@@ -12119,8 +12119,8 @@
           </p:nvSpPr>
           <p:spPr>
             <a:xfrm rot="16200000">
-              <a:off x="-328779" y="2477412"/>
-              <a:ext cx="1260002" cy="351410"/>
+              <a:off x="-453136" y="2333531"/>
+              <a:ext cx="1508715" cy="390456"/>
             </a:xfrm>
             <a:prstGeom prst="rect">
               <a:avLst/>
@@ -12134,11 +12134,12 @@
             <a:lstStyle/>
             <a:p>
               <a:r>
-                <a:rPr lang="en-GB" sz="1200" dirty="0">
+                <a:rPr lang="en-GB" sz="1400" dirty="0">
                   <a:solidFill>
                     <a:prstClr val="black"/>
                   </a:solidFill>
-                  <a:latin typeface="Calibri" panose="020F0502020204030204"/>
+                  <a:latin typeface="Arial" panose="020B0604020202020204" pitchFamily="34" charset="0"/>
+                  <a:cs typeface="Arial" panose="020B0604020202020204" pitchFamily="34" charset="0"/>
                 </a:rPr>
                 <a:t>charging</a:t>
               </a:r>
@@ -12893,8 +12894,8 @@
           </p:nvSpPr>
           <p:spPr>
             <a:xfrm rot="16200000">
-              <a:off x="-419503" y="3675810"/>
-              <a:ext cx="1451226" cy="351410"/>
+              <a:off x="-610332" y="3674088"/>
+              <a:ext cx="1824726" cy="390456"/>
             </a:xfrm>
             <a:prstGeom prst="rect">
               <a:avLst/>
@@ -12908,11 +12909,12 @@
             <a:lstStyle/>
             <a:p>
               <a:r>
-                <a:rPr lang="en-GB" sz="1200" dirty="0">
+                <a:rPr lang="en-GB" sz="1400" dirty="0">
                   <a:solidFill>
                     <a:prstClr val="black"/>
                   </a:solidFill>
-                  <a:latin typeface="Calibri" panose="020F0502020204030204"/>
+                  <a:latin typeface="Arial" panose="020B0604020202020204" pitchFamily="34" charset="0"/>
+                  <a:cs typeface="Arial" panose="020B0604020202020204" pitchFamily="34" charset="0"/>
                 </a:rPr>
                 <a:t>discharging</a:t>
               </a:r>
@@ -12934,7 +12936,7 @@
           <p:spPr>
             <a:xfrm>
               <a:off x="7212637" y="2239120"/>
-              <a:ext cx="1001736" cy="965822"/>
+              <a:ext cx="1594247" cy="976674"/>
             </a:xfrm>
             <a:prstGeom prst="rect">
               <a:avLst/>
@@ -12953,13 +12955,14 @@
                 </a:lnSpc>
               </a:pPr>
               <a:r>
-                <a:rPr lang="en-GB" sz="1200" dirty="0">
+                <a:rPr lang="en-GB" sz="1600" dirty="0">
                   <a:solidFill>
                     <a:prstClr val="white">
                       <a:lumMod val="50000"/>
                     </a:prstClr>
                   </a:solidFill>
-                  <a:latin typeface="Calibri" panose="020F0502020204030204"/>
+                  <a:latin typeface="Arial" panose="020B0604020202020204" pitchFamily="34" charset="0"/>
+                  <a:cs typeface="Arial" panose="020B0604020202020204" pitchFamily="34" charset="0"/>
                 </a:rPr>
                 <a:t>storage power capacity</a:t>
               </a:r>
@@ -13017,8 +13020,8 @@
           </p:nvSpPr>
           <p:spPr>
             <a:xfrm>
-              <a:off x="2675656" y="1985899"/>
-              <a:ext cx="2720262" cy="404141"/>
+              <a:off x="2675656" y="1660805"/>
+              <a:ext cx="3683209" cy="493950"/>
             </a:xfrm>
             <a:prstGeom prst="rect">
               <a:avLst/>
@@ -13032,11 +13035,12 @@
             <a:lstStyle/>
             <a:p>
               <a:r>
-                <a:rPr lang="en-GB" sz="1200" b="1" dirty="0">
+                <a:rPr lang="en-GB" sz="1600" b="1" dirty="0">
                   <a:solidFill>
                     <a:prstClr val="black"/>
                   </a:solidFill>
-                  <a:latin typeface="Calibri" panose="020F0502020204030204"/>
+                  <a:latin typeface="Arial" panose="020B0604020202020204" pitchFamily="34" charset="0"/>
+                  <a:cs typeface="Arial" panose="020B0604020202020204" pitchFamily="34" charset="0"/>
                 </a:rPr>
                 <a:t>Storage power (mismatch)</a:t>
               </a:r>
@@ -13058,7 +13062,7 @@
           <p:spPr>
             <a:xfrm>
               <a:off x="7656541" y="3263080"/>
-              <a:ext cx="369332" cy="449046"/>
+              <a:ext cx="369332" cy="493950"/>
             </a:xfrm>
             <a:prstGeom prst="rect">
               <a:avLst/>
@@ -13072,11 +13076,12 @@
             <a:lstStyle/>
             <a:p>
               <a:r>
-                <a:rPr lang="en-GB" sz="1400" dirty="0">
+                <a:rPr lang="en-GB" sz="1600" dirty="0">
                   <a:solidFill>
                     <a:prstClr val="black"/>
                   </a:solidFill>
-                  <a:latin typeface="Calibri" panose="020F0502020204030204"/>
+                  <a:latin typeface="Arial" panose="020B0604020202020204" pitchFamily="34" charset="0"/>
+                  <a:cs typeface="Arial" panose="020B0604020202020204" pitchFamily="34" charset="0"/>
                 </a:rPr>
                 <a:t>t</a:t>
               </a:r>
@@ -13097,8 +13102,8 @@
           </p:nvSpPr>
           <p:spPr>
             <a:xfrm rot="16200000">
-              <a:off x="-328100" y="5469416"/>
-              <a:ext cx="1272817" cy="351410"/>
+              <a:off x="-438127" y="5347277"/>
+              <a:ext cx="1508718" cy="390456"/>
             </a:xfrm>
             <a:prstGeom prst="rect">
               <a:avLst/>
@@ -13112,11 +13117,12 @@
             <a:lstStyle/>
             <a:p>
               <a:r>
-                <a:rPr lang="en-GB" sz="1200" dirty="0">
+                <a:rPr lang="en-GB" sz="1400" dirty="0">
                   <a:solidFill>
                     <a:prstClr val="black"/>
                   </a:solidFill>
-                  <a:latin typeface="Calibri" panose="020F0502020204030204"/>
+                  <a:latin typeface="Arial" panose="020B0604020202020204" pitchFamily="34" charset="0"/>
+                  <a:cs typeface="Arial" panose="020B0604020202020204" pitchFamily="34" charset="0"/>
                 </a:rPr>
                 <a:t>filling level</a:t>
               </a:r>
@@ -13393,8 +13399,8 @@
           </p:nvSpPr>
           <p:spPr>
             <a:xfrm>
-              <a:off x="7231144" y="5246764"/>
-              <a:ext cx="1001736" cy="965822"/>
+              <a:off x="7257221" y="5016277"/>
+              <a:ext cx="1712898" cy="1212423"/>
             </a:xfrm>
             <a:prstGeom prst="rect">
               <a:avLst/>
@@ -13408,13 +13414,14 @@
             <a:lstStyle/>
             <a:p>
               <a:r>
-                <a:rPr lang="en-GB" sz="1200" dirty="0">
+                <a:rPr lang="en-GB" sz="1600" dirty="0">
                   <a:solidFill>
                     <a:prstClr val="white">
                       <a:lumMod val="50000"/>
                     </a:prstClr>
                   </a:solidFill>
-                  <a:latin typeface="Calibri" panose="020F0502020204030204"/>
+                  <a:latin typeface="Arial" panose="020B0604020202020204" pitchFamily="34" charset="0"/>
+                  <a:cs typeface="Arial" panose="020B0604020202020204" pitchFamily="34" charset="0"/>
                 </a:rPr>
                 <a:t>storage energy capacity</a:t>
               </a:r>
@@ -14265,8 +14272,8 @@
           </p:nvSpPr>
           <p:spPr>
             <a:xfrm>
-              <a:off x="780405" y="6312181"/>
-              <a:ext cx="575783" cy="404514"/>
+              <a:off x="697981" y="6403508"/>
+              <a:ext cx="821829" cy="415367"/>
             </a:xfrm>
             <a:prstGeom prst="rect">
               <a:avLst/>
@@ -14285,13 +14292,14 @@
                 </a:lnSpc>
               </a:pPr>
               <a:r>
-                <a:rPr lang="en-GB" sz="1200" dirty="0">
+                <a:rPr lang="en-GB" sz="1600" dirty="0">
                   <a:solidFill>
                     <a:prstClr val="white">
                       <a:lumMod val="50000"/>
                     </a:prstClr>
                   </a:solidFill>
-                  <a:latin typeface="Calibri" panose="020F0502020204030204"/>
+                  <a:latin typeface="Arial" panose="020B0604020202020204" pitchFamily="34" charset="0"/>
+                  <a:cs typeface="Arial" panose="020B0604020202020204" pitchFamily="34" charset="0"/>
                 </a:rPr>
                 <a:t>T/2</a:t>
               </a:r>
@@ -14313,7 +14321,7 @@
           <p:spPr>
             <a:xfrm>
               <a:off x="7656823" y="6209896"/>
-              <a:ext cx="369332" cy="449046"/>
+              <a:ext cx="369332" cy="493950"/>
             </a:xfrm>
             <a:prstGeom prst="rect">
               <a:avLst/>
@@ -14327,11 +14335,12 @@
             <a:lstStyle/>
             <a:p>
               <a:r>
-                <a:rPr lang="en-GB" sz="1400" dirty="0">
+                <a:rPr lang="en-GB" sz="1600" dirty="0">
                   <a:solidFill>
                     <a:prstClr val="black"/>
                   </a:solidFill>
-                  <a:latin typeface="Calibri" panose="020F0502020204030204"/>
+                  <a:latin typeface="Arial" panose="020B0604020202020204" pitchFamily="34" charset="0"/>
+                  <a:cs typeface="Arial" panose="020B0604020202020204" pitchFamily="34" charset="0"/>
                 </a:rPr>
                 <a:t>t</a:t>
               </a:r>
@@ -14372,8 +14381,8 @@
             <a:effectLst/>
           </p:spPr>
         </p:cxnSp>
-        <mc:AlternateContent xmlns:mc="http://schemas.openxmlformats.org/markup-compatibility/2006" xmlns:a14="http://schemas.microsoft.com/office/drawing/2010/main">
-          <mc:Choice Requires="a14">
+        <mc:AlternateContent xmlns:mc="http://schemas.openxmlformats.org/markup-compatibility/2006">
+          <mc:Choice xmlns:a14="http://schemas.microsoft.com/office/drawing/2010/main" Requires="a14">
             <p:sp>
               <p:nvSpPr>
                 <p:cNvPr id="78" name="TextBox 77">
@@ -14388,8 +14397,8 @@
               </p:nvSpPr>
               <p:spPr>
                 <a:xfrm>
-                  <a:off x="1261153" y="2375015"/>
-                  <a:ext cx="1661888" cy="415366"/>
+                  <a:off x="757085" y="2021895"/>
+                  <a:ext cx="2288256" cy="415367"/>
                 </a:xfrm>
                 <a:prstGeom prst="rect">
                   <a:avLst/>
@@ -14413,22 +14422,50 @@
                         <m:jc m:val="centerGroup"/>
                       </m:oMathParaPr>
                       <m:oMath xmlns:m="http://schemas.openxmlformats.org/officeDocument/2006/math">
+                        <m:sSub>
+                          <m:sSubPr>
+                            <m:ctrlPr>
+                              <a:rPr lang="el-GR" sz="1600" i="1" dirty="0" smtClean="0">
+                                <a:solidFill>
+                                  <a:srgbClr val="C00000"/>
+                                </a:solidFill>
+                                <a:latin typeface="Cambria Math" panose="02040503050406030204" pitchFamily="18" charset="0"/>
+                                <a:ea typeface="Calibri" panose="020F0502020204030204" pitchFamily="34" charset="0"/>
+                                <a:cs typeface="Times New Roman" panose="02020603050405020304" pitchFamily="18" charset="0"/>
+                              </a:rPr>
+                            </m:ctrlPr>
+                          </m:sSubPr>
+                          <m:e>
+                            <m:r>
+                              <m:rPr>
+                                <m:nor/>
+                              </m:rPr>
+                              <a:rPr lang="el-GR" sz="1600" dirty="0">
+                                <a:solidFill>
+                                  <a:srgbClr val="C00000"/>
+                                </a:solidFill>
+                                <a:ea typeface="Calibri" panose="020F0502020204030204" pitchFamily="34" charset="0"/>
+                                <a:cs typeface="Times New Roman" panose="02020603050405020304" pitchFamily="18" charset="0"/>
+                              </a:rPr>
+                              <m:t>Δ</m:t>
+                            </m:r>
+                          </m:e>
+                          <m:sub>
+                            <m:r>
+                              <a:rPr lang="en-GB" sz="1600" b="0" i="1" dirty="0" smtClean="0">
+                                <a:solidFill>
+                                  <a:srgbClr val="C00000"/>
+                                </a:solidFill>
+                                <a:latin typeface="Cambria Math" panose="02040503050406030204" pitchFamily="18" charset="0"/>
+                                <a:ea typeface="Calibri" panose="020F0502020204030204" pitchFamily="34" charset="0"/>
+                                <a:cs typeface="Times New Roman" panose="02020603050405020304" pitchFamily="18" charset="0"/>
+                              </a:rPr>
+                              <m:t>𝑡</m:t>
+                            </m:r>
+                          </m:sub>
+                        </m:sSub>
                         <m:r>
-                          <m:rPr>
-                            <m:nor/>
-                          </m:rPr>
-                          <a:rPr lang="el-GR" sz="1200" dirty="0">
-                            <a:solidFill>
-                              <a:srgbClr val="C00000"/>
-                            </a:solidFill>
-                            <a:latin typeface="Calibri" panose="020F0502020204030204"/>
-                            <a:ea typeface="Calibri" panose="020F0502020204030204" pitchFamily="34" charset="0"/>
-                            <a:cs typeface="Times New Roman" panose="02020603050405020304" pitchFamily="18" charset="0"/>
-                          </a:rPr>
-                          <m:t>Δ</m:t>
-                        </m:r>
-                        <m:r>
-                          <a:rPr lang="en-US" sz="1200" i="1">
+                          <a:rPr lang="en-US" sz="1600" i="1">
                             <a:solidFill>
                               <a:srgbClr val="C00000"/>
                             </a:solidFill>
@@ -14439,7 +14476,7 @@
                           <m:t>=</m:t>
                         </m:r>
                         <m:r>
-                          <a:rPr lang="en-GB" sz="1200" i="1">
+                          <a:rPr lang="en-GB" sz="1600" i="1">
                             <a:solidFill>
                               <a:srgbClr val="C00000"/>
                             </a:solidFill>
@@ -14450,7 +14487,7 @@
                           <m:t>𝐵</m:t>
                         </m:r>
                         <m:r>
-                          <a:rPr lang="en-GB" sz="1200" i="1">
+                          <a:rPr lang="en-GB" sz="1600" i="1">
                             <a:solidFill>
                               <a:srgbClr val="C00000"/>
                             </a:solidFill>
@@ -14461,7 +14498,7 @@
                           <m:t>·</m:t>
                         </m:r>
                         <m:r>
-                          <a:rPr lang="en-GB" sz="1200" i="1">
+                          <a:rPr lang="en-GB" sz="1600" i="1">
                             <a:solidFill>
                               <a:srgbClr val="C00000"/>
                             </a:solidFill>
@@ -14472,7 +14509,7 @@
                           <m:t>𝑠𝑖𝑛</m:t>
                         </m:r>
                         <m:r>
-                          <a:rPr lang="en-GB" sz="1200" i="1">
+                          <a:rPr lang="en-GB" sz="1600" i="1">
                             <a:solidFill>
                               <a:srgbClr val="C00000"/>
                             </a:solidFill>
@@ -14485,7 +14522,7 @@
                         <m:f>
                           <m:fPr>
                             <m:ctrlPr>
-                              <a:rPr lang="en-GB" sz="1200" i="1">
+                              <a:rPr lang="en-GB" sz="1600" i="1">
                                 <a:solidFill>
                                   <a:srgbClr val="C00000"/>
                                 </a:solidFill>
@@ -14496,7 +14533,7 @@
                           </m:fPr>
                           <m:num>
                             <m:r>
-                              <a:rPr lang="en-GB" sz="1200" i="1">
+                              <a:rPr lang="en-GB" sz="1600" i="1">
                                 <a:solidFill>
                                   <a:srgbClr val="C00000"/>
                                 </a:solidFill>
@@ -14509,7 +14546,7 @@
                               <m:rPr>
                                 <m:sty m:val="p"/>
                               </m:rPr>
-                              <a:rPr lang="el-GR" sz="1200" i="1">
+                              <a:rPr lang="el-GR" sz="1600" i="1">
                                 <a:solidFill>
                                   <a:srgbClr val="C00000"/>
                                 </a:solidFill>
@@ -14521,7 +14558,7 @@
                           </m:num>
                           <m:den>
                             <m:r>
-                              <a:rPr lang="en-GB" sz="1200" i="1">
+                              <a:rPr lang="en-GB" sz="1600" i="1">
                                 <a:solidFill>
                                   <a:srgbClr val="C00000"/>
                                 </a:solidFill>
@@ -14533,7 +14570,7 @@
                           </m:den>
                         </m:f>
                         <m:r>
-                          <a:rPr lang="en-GB" sz="1200" i="1">
+                          <a:rPr lang="en-GB" sz="1600" i="1">
                             <a:solidFill>
                               <a:srgbClr val="C00000"/>
                             </a:solidFill>
@@ -14544,7 +14581,7 @@
                           <m:t>𝑡</m:t>
                         </m:r>
                         <m:r>
-                          <a:rPr lang="en-GB" sz="1200" i="1">
+                          <a:rPr lang="en-GB" sz="1600" i="1">
                             <a:solidFill>
                               <a:srgbClr val="C00000"/>
                             </a:solidFill>
@@ -14557,7 +14594,7 @@
                       </m:oMath>
                     </m:oMathPara>
                   </a14:m>
-                  <a:endParaRPr lang="en-GB" sz="1200" dirty="0">
+                  <a:endParaRPr lang="en-GB" sz="1600" dirty="0">
                     <a:solidFill>
                       <a:srgbClr val="C00000"/>
                     </a:solidFill>
@@ -14567,7 +14604,7 @@
               </p:txBody>
             </p:sp>
           </mc:Choice>
-          <mc:Fallback xmlns="">
+          <mc:Fallback>
             <p:sp>
               <p:nvSpPr>
                 <p:cNvPr id="78" name="TextBox 77">
@@ -14584,8 +14621,8 @@
               </p:nvSpPr>
               <p:spPr>
                 <a:xfrm>
-                  <a:off x="1261153" y="2375015"/>
-                  <a:ext cx="1661888" cy="415366"/>
+                  <a:off x="757085" y="2021895"/>
+                  <a:ext cx="2288256" cy="415367"/>
                 </a:xfrm>
                 <a:prstGeom prst="rect">
                   <a:avLst/>
@@ -14593,7 +14630,7 @@
                 <a:blipFill>
                   <a:blip r:embed="rId2"/>
                   <a:stretch>
-                    <a:fillRect t="-28261" b="-17391"/>
+                    <a:fillRect t="-53191" b="-29787"/>
                   </a:stretch>
                 </a:blipFill>
               </p:spPr>
@@ -14623,14 +14660,13 @@
             </p:cNvPr>
             <p:cNvCxnSpPr>
               <a:cxnSpLocks/>
-              <a:stCxn id="48" idx="8"/>
             </p:cNvCxnSpPr>
             <p:nvPr/>
           </p:nvCxnSpPr>
           <p:spPr>
             <a:xfrm flipV="1">
-              <a:off x="1431151" y="2738450"/>
-              <a:ext cx="159860" cy="229049"/>
+              <a:off x="1231148" y="2339751"/>
+              <a:ext cx="159860" cy="229050"/>
             </a:xfrm>
             <a:prstGeom prst="line">
               <a:avLst/>
@@ -14661,8 +14697,8 @@
           </p:nvSpPr>
           <p:spPr>
             <a:xfrm>
-              <a:off x="2702542" y="4829906"/>
-              <a:ext cx="2192825" cy="404141"/>
+              <a:off x="2981003" y="4815792"/>
+              <a:ext cx="3435275" cy="493950"/>
             </a:xfrm>
             <a:prstGeom prst="rect">
               <a:avLst/>
@@ -14676,11 +14712,12 @@
             <a:lstStyle/>
             <a:p>
               <a:r>
-                <a:rPr lang="en-GB" sz="1200" b="1" dirty="0">
+                <a:rPr lang="en-GB" sz="1600" b="1" dirty="0">
                   <a:solidFill>
                     <a:prstClr val="black"/>
                   </a:solidFill>
-                  <a:latin typeface="Calibri" panose="020F0502020204030204"/>
+                  <a:latin typeface="Arial" panose="020B0604020202020204" pitchFamily="34" charset="0"/>
+                  <a:cs typeface="Arial" panose="020B0604020202020204" pitchFamily="34" charset="0"/>
                 </a:rPr>
                 <a:t>Storage energy level</a:t>
               </a:r>
@@ -14703,13 +14740,13 @@
         <p:grpSpPr>
           <a:xfrm>
             <a:off x="270706" y="20763"/>
-            <a:ext cx="6302803" cy="2146897"/>
+            <a:ext cx="6549046" cy="2177674"/>
             <a:chOff x="611083" y="3581950"/>
-            <a:chExt cx="8149112" cy="2925974"/>
+            <a:chExt cx="8467488" cy="2967919"/>
           </a:xfrm>
         </p:grpSpPr>
-        <mc:AlternateContent xmlns:mc="http://schemas.openxmlformats.org/markup-compatibility/2006" xmlns:a14="http://schemas.microsoft.com/office/drawing/2010/main">
-          <mc:Choice Requires="a14">
+        <mc:AlternateContent xmlns:mc="http://schemas.openxmlformats.org/markup-compatibility/2006">
+          <mc:Choice xmlns:a14="http://schemas.microsoft.com/office/drawing/2010/main" Requires="a14">
             <p:sp>
               <p:nvSpPr>
                 <p:cNvPr id="83" name="TextBox 82">
@@ -14724,7 +14761,7 @@
               </p:nvSpPr>
               <p:spPr>
                 <a:xfrm>
-                  <a:off x="5303811" y="3753578"/>
+                  <a:off x="5622187" y="3753932"/>
                   <a:ext cx="3456384" cy="388004"/>
                 </a:xfrm>
                 <a:prstGeom prst="rect">
@@ -14755,59 +14792,63 @@
                         <m:jc m:val="centerGroup"/>
                       </m:oMathParaPr>
                       <m:oMath xmlns:m="http://schemas.openxmlformats.org/officeDocument/2006/math">
-                        <m:sSup>
-                          <m:sSupPr>
+                        <m:sSubSup>
+                          <m:sSubSupPr>
                             <m:ctrlPr>
-                              <a:rPr lang="en-US" sz="1200" i="1">
+                              <a:rPr lang="en-GB" sz="1600" i="1" smtClean="0">
                                 <a:solidFill>
-                                  <a:srgbClr val="002546">
-                                    <a:lumMod val="50000"/>
-                                    <a:lumOff val="50000"/>
-                                  </a:srgbClr>
+                                  <a:srgbClr val="64A4D9"/>
                                 </a:solidFill>
                                 <a:latin typeface="Cambria Math" panose="02040503050406030204" pitchFamily="18" charset="0"/>
+                                <a:ea typeface="Calibri" panose="020F0502020204030204" pitchFamily="34" charset="0"/>
                                 <a:cs typeface="Times New Roman" panose="02020603050405020304" pitchFamily="18" charset="0"/>
                               </a:rPr>
                             </m:ctrlPr>
-                          </m:sSupPr>
+                          </m:sSubSupPr>
                           <m:e>
                             <m:r>
-                              <a:rPr lang="en-GB" sz="1200" i="1">
+                              <a:rPr lang="en-GB" sz="1600" b="0" i="1" smtClean="0">
                                 <a:solidFill>
-                                  <a:srgbClr val="002546">
-                                    <a:lumMod val="50000"/>
-                                    <a:lumOff val="50000"/>
-                                  </a:srgbClr>
+                                  <a:srgbClr val="64A4D9"/>
                                 </a:solidFill>
                                 <a:latin typeface="Cambria Math" panose="02040503050406030204" pitchFamily="18" charset="0"/>
+                                <a:ea typeface="Calibri" panose="020F0502020204030204" pitchFamily="34" charset="0"/>
                                 <a:cs typeface="Times New Roman" panose="02020603050405020304" pitchFamily="18" charset="0"/>
                               </a:rPr>
                               <m:t>𝐺</m:t>
                             </m:r>
                           </m:e>
+                          <m:sub>
+                            <m:r>
+                              <a:rPr lang="en-GB" sz="1600" b="0" i="1" smtClean="0">
+                                <a:solidFill>
+                                  <a:srgbClr val="64A4D9"/>
+                                </a:solidFill>
+                                <a:latin typeface="Cambria Math" panose="02040503050406030204" pitchFamily="18" charset="0"/>
+                                <a:ea typeface="Calibri" panose="020F0502020204030204" pitchFamily="34" charset="0"/>
+                                <a:cs typeface="Times New Roman" panose="02020603050405020304" pitchFamily="18" charset="0"/>
+                              </a:rPr>
+                              <m:t>𝑡</m:t>
+                            </m:r>
+                          </m:sub>
                           <m:sup>
                             <m:r>
-                              <a:rPr lang="en-GB" sz="1200" i="1">
+                              <a:rPr lang="en-GB" sz="1600" b="0" i="1" smtClean="0">
                                 <a:solidFill>
-                                  <a:srgbClr val="002546">
-                                    <a:lumMod val="50000"/>
-                                    <a:lumOff val="50000"/>
-                                  </a:srgbClr>
+                                  <a:srgbClr val="64A4D9"/>
                                 </a:solidFill>
                                 <a:latin typeface="Cambria Math" panose="02040503050406030204" pitchFamily="18" charset="0"/>
+                                <a:ea typeface="Calibri" panose="020F0502020204030204" pitchFamily="34" charset="0"/>
                                 <a:cs typeface="Times New Roman" panose="02020603050405020304" pitchFamily="18" charset="0"/>
                               </a:rPr>
                               <m:t>𝑅</m:t>
                             </m:r>
                           </m:sup>
-                        </m:sSup>
+                        </m:sSubSup>
                         <m:r>
-                          <a:rPr lang="en-GB" sz="1200" i="1">
+                          <a:rPr lang="en-GB" sz="1600" i="1">
                             <a:solidFill>
-                              <a:srgbClr val="002546">
-                                <a:lumMod val="50000"/>
-                                <a:lumOff val="50000"/>
-                              </a:srgbClr>
+                              <a:srgbClr val="64A4D9"/>
                             </a:solidFill>
                             <a:latin typeface="Cambria Math" panose="02040503050406030204" pitchFamily="18" charset="0"/>
                             <a:ea typeface="Calibri" panose="020F0502020204030204" pitchFamily="34" charset="0"/>
@@ -14816,12 +14857,9 @@
                           <m:t>=</m:t>
                         </m:r>
                         <m:r>
-                          <a:rPr lang="en-GB" sz="1200" i="1">
+                          <a:rPr lang="en-GB" sz="1600" i="1">
                             <a:solidFill>
-                              <a:srgbClr val="002546">
-                                <a:lumMod val="50000"/>
-                                <a:lumOff val="50000"/>
-                              </a:srgbClr>
+                              <a:srgbClr val="64A4D9"/>
                             </a:solidFill>
                             <a:latin typeface="Cambria Math" panose="02040503050406030204" pitchFamily="18" charset="0"/>
                             <a:ea typeface="Calibri" panose="020F0502020204030204" pitchFamily="34" charset="0"/>
@@ -14830,12 +14868,9 @@
                           <m:t>𝐴</m:t>
                         </m:r>
                         <m:r>
-                          <a:rPr lang="en-GB" sz="1200" i="1">
+                          <a:rPr lang="en-GB" sz="1600" i="1">
                             <a:solidFill>
-                              <a:srgbClr val="002546">
-                                <a:lumMod val="50000"/>
-                                <a:lumOff val="50000"/>
-                              </a:srgbClr>
+                              <a:srgbClr val="64A4D9"/>
                             </a:solidFill>
                             <a:latin typeface="Cambria Math" panose="02040503050406030204" pitchFamily="18" charset="0"/>
                             <a:ea typeface="Calibri" panose="020F0502020204030204" pitchFamily="34" charset="0"/>
@@ -14844,12 +14879,9 @@
                           <m:t>+</m:t>
                         </m:r>
                         <m:r>
-                          <a:rPr lang="en-GB" sz="1200" i="1">
+                          <a:rPr lang="en-GB" sz="1600" i="1">
                             <a:solidFill>
-                              <a:srgbClr val="002546">
-                                <a:lumMod val="50000"/>
-                                <a:lumOff val="50000"/>
-                              </a:srgbClr>
+                              <a:srgbClr val="64A4D9"/>
                             </a:solidFill>
                             <a:latin typeface="Cambria Math" panose="02040503050406030204" pitchFamily="18" charset="0"/>
                             <a:ea typeface="Calibri" panose="020F0502020204030204" pitchFamily="34" charset="0"/>
@@ -14858,12 +14890,9 @@
                           <m:t>𝐵</m:t>
                         </m:r>
                         <m:r>
-                          <a:rPr lang="en-GB" sz="1200" i="1">
+                          <a:rPr lang="en-GB" sz="1600" i="1">
                             <a:solidFill>
-                              <a:srgbClr val="002546">
-                                <a:lumMod val="50000"/>
-                                <a:lumOff val="50000"/>
-                              </a:srgbClr>
+                              <a:srgbClr val="64A4D9"/>
                             </a:solidFill>
                             <a:latin typeface="Cambria Math" panose="02040503050406030204" pitchFamily="18" charset="0"/>
                             <a:ea typeface="Calibri" panose="020F0502020204030204" pitchFamily="34" charset="0"/>
@@ -14872,12 +14901,9 @@
                           <m:t>· </m:t>
                         </m:r>
                         <m:r>
-                          <a:rPr lang="en-GB" sz="1200" i="1">
+                          <a:rPr lang="en-GB" sz="1600" i="1">
                             <a:solidFill>
-                              <a:srgbClr val="002546">
-                                <a:lumMod val="50000"/>
-                                <a:lumOff val="50000"/>
-                              </a:srgbClr>
+                              <a:srgbClr val="64A4D9"/>
                             </a:solidFill>
                             <a:latin typeface="Cambria Math" panose="02040503050406030204" pitchFamily="18" charset="0"/>
                             <a:ea typeface="Calibri" panose="020F0502020204030204" pitchFamily="34" charset="0"/>
@@ -14886,12 +14912,9 @@
                           <m:t>𝑠𝑖𝑛</m:t>
                         </m:r>
                         <m:r>
-                          <a:rPr lang="en-GB" sz="1200" i="1">
+                          <a:rPr lang="en-GB" sz="1600" i="1">
                             <a:solidFill>
-                              <a:srgbClr val="002546">
-                                <a:lumMod val="50000"/>
-                                <a:lumOff val="50000"/>
-                              </a:srgbClr>
+                              <a:srgbClr val="64A4D9"/>
                             </a:solidFill>
                             <a:latin typeface="Cambria Math" panose="02040503050406030204" pitchFamily="18" charset="0"/>
                             <a:ea typeface="Calibri" panose="020F0502020204030204" pitchFamily="34" charset="0"/>
@@ -14902,12 +14925,9 @@
                         <m:f>
                           <m:fPr>
                             <m:ctrlPr>
-                              <a:rPr lang="en-GB" sz="1200" i="1">
+                              <a:rPr lang="en-GB" sz="1600" i="1">
                                 <a:solidFill>
-                                  <a:srgbClr val="002546">
-                                    <a:lumMod val="50000"/>
-                                    <a:lumOff val="50000"/>
-                                  </a:srgbClr>
+                                  <a:srgbClr val="64A4D9"/>
                                 </a:solidFill>
                                 <a:latin typeface="Cambria Math" panose="02040503050406030204" pitchFamily="18" charset="0"/>
                                 <a:cs typeface="Times New Roman" panose="02020603050405020304" pitchFamily="18" charset="0"/>
@@ -14916,12 +14936,9 @@
                           </m:fPr>
                           <m:num>
                             <m:r>
-                              <a:rPr lang="en-GB" sz="1200" i="1">
+                              <a:rPr lang="en-GB" sz="1600" i="1">
                                 <a:solidFill>
-                                  <a:srgbClr val="002546">
-                                    <a:lumMod val="50000"/>
-                                    <a:lumOff val="50000"/>
-                                  </a:srgbClr>
+                                  <a:srgbClr val="64A4D9"/>
                                 </a:solidFill>
                                 <a:latin typeface="Cambria Math" panose="02040503050406030204" pitchFamily="18" charset="0"/>
                                 <a:cs typeface="Times New Roman" panose="02020603050405020304" pitchFamily="18" charset="0"/>
@@ -14932,12 +14949,9 @@
                               <m:rPr>
                                 <m:sty m:val="p"/>
                               </m:rPr>
-                              <a:rPr lang="el-GR" sz="1200" i="1">
+                              <a:rPr lang="el-GR" sz="1600" i="1">
                                 <a:solidFill>
-                                  <a:srgbClr val="002546">
-                                    <a:lumMod val="50000"/>
-                                    <a:lumOff val="50000"/>
-                                  </a:srgbClr>
+                                  <a:srgbClr val="64A4D9"/>
                                 </a:solidFill>
                                 <a:latin typeface="Cambria Math" panose="02040503050406030204" pitchFamily="18" charset="0"/>
                                 <a:cs typeface="Times New Roman" panose="02020603050405020304" pitchFamily="18" charset="0"/>
@@ -14947,12 +14961,9 @@
                           </m:num>
                           <m:den>
                             <m:r>
-                              <a:rPr lang="en-GB" sz="1200" i="1">
+                              <a:rPr lang="en-GB" sz="1600" i="1">
                                 <a:solidFill>
-                                  <a:srgbClr val="002546">
-                                    <a:lumMod val="50000"/>
-                                    <a:lumOff val="50000"/>
-                                  </a:srgbClr>
+                                  <a:srgbClr val="64A4D9"/>
                                 </a:solidFill>
                                 <a:latin typeface="Cambria Math" panose="02040503050406030204" pitchFamily="18" charset="0"/>
                                 <a:cs typeface="Times New Roman" panose="02020603050405020304" pitchFamily="18" charset="0"/>
@@ -14962,12 +14973,9 @@
                           </m:den>
                         </m:f>
                         <m:r>
-                          <a:rPr lang="en-GB" sz="1200" i="1">
+                          <a:rPr lang="en-GB" sz="1600" i="1">
                             <a:solidFill>
-                              <a:srgbClr val="002546">
-                                <a:lumMod val="50000"/>
-                                <a:lumOff val="50000"/>
-                              </a:srgbClr>
+                              <a:srgbClr val="64A4D9"/>
                             </a:solidFill>
                             <a:latin typeface="Cambria Math" panose="02040503050406030204" pitchFamily="18" charset="0"/>
                             <a:ea typeface="Calibri" panose="020F0502020204030204" pitchFamily="34" charset="0"/>
@@ -14976,12 +14984,9 @@
                           <m:t>𝑡</m:t>
                         </m:r>
                         <m:r>
-                          <a:rPr lang="en-GB" sz="1200" i="1">
+                          <a:rPr lang="en-GB" sz="1600" i="1">
                             <a:solidFill>
-                              <a:srgbClr val="002546">
-                                <a:lumMod val="50000"/>
-                                <a:lumOff val="50000"/>
-                              </a:srgbClr>
+                              <a:srgbClr val="64A4D9"/>
                             </a:solidFill>
                             <a:latin typeface="Cambria Math" panose="02040503050406030204" pitchFamily="18" charset="0"/>
                             <a:ea typeface="Calibri" panose="020F0502020204030204" pitchFamily="34" charset="0"/>
@@ -14992,26 +14997,24 @@
                       </m:oMath>
                     </m:oMathPara>
                   </a14:m>
-                  <a:endParaRPr lang="en-GB" sz="1200" dirty="0">
+                  <a:endParaRPr lang="en-GB" sz="1600" dirty="0">
                     <a:solidFill>
-                      <a:srgbClr val="002546">
-                        <a:lumMod val="50000"/>
-                        <a:lumOff val="50000"/>
-                      </a:srgbClr>
+                      <a:srgbClr val="64A4D9"/>
                     </a:solidFill>
-                    <a:latin typeface="AU Passata" pitchFamily="34" charset="0"/>
+                    <a:latin typeface="Arial" panose="020B0604020202020204" pitchFamily="34" charset="0"/>
+                    <a:cs typeface="Arial" panose="020B0604020202020204" pitchFamily="34" charset="0"/>
                   </a:endParaRPr>
                 </a:p>
               </p:txBody>
             </p:sp>
           </mc:Choice>
-          <mc:Fallback xmlns="">
+          <mc:Fallback>
             <p:sp>
               <p:nvSpPr>
-                <p:cNvPr id="24" name="TextBox 23">
+                <p:cNvPr id="83" name="TextBox 82">
                   <a:extLst>
                     <a:ext uri="{FF2B5EF4-FFF2-40B4-BE49-F238E27FC236}">
-                      <a16:creationId xmlns:a16="http://schemas.microsoft.com/office/drawing/2014/main" id="{69943D84-8C6D-478D-9A97-39BC01FEAF87}"/>
+                      <a16:creationId xmlns:a16="http://schemas.microsoft.com/office/drawing/2014/main" id="{7BD44142-0022-47AF-B29F-356ED42CB1D9}"/>
                     </a:ext>
                   </a:extLst>
                 </p:cNvPr>
@@ -15022,7 +15025,7 @@
               </p:nvSpPr>
               <p:spPr>
                 <a:xfrm>
-                  <a:off x="5303811" y="3753578"/>
+                  <a:off x="5622187" y="3753932"/>
                   <a:ext cx="3456384" cy="388004"/>
                 </a:xfrm>
                 <a:prstGeom prst="rect">
@@ -15031,7 +15034,7 @@
                 <a:blipFill>
                   <a:blip r:embed="rId3"/>
                   <a:stretch>
-                    <a:fillRect t="-25532" b="-17021"/>
+                    <a:fillRect t="-53191" b="-29787"/>
                   </a:stretch>
                 </a:blipFill>
               </p:spPr>
@@ -15249,7 +15252,7 @@
             <a:noFill/>
             <a:ln w="38100" cap="flat" cmpd="sng" algn="ctr">
               <a:solidFill>
-                <a:srgbClr val="00B0F0"/>
+                <a:srgbClr val="64A4D9"/>
               </a:solidFill>
               <a:prstDash val="solid"/>
               <a:miter lim="800000"/>
@@ -15471,7 +15474,7 @@
             <a:noFill/>
             <a:ln w="38100" cap="flat" cmpd="sng" algn="ctr">
               <a:solidFill>
-                <a:srgbClr val="00B0F0"/>
+                <a:srgbClr val="64A4D9"/>
               </a:solidFill>
               <a:prstDash val="solid"/>
               <a:miter lim="800000"/>
@@ -15693,7 +15696,7 @@
             <a:noFill/>
             <a:ln w="38100" cap="flat" cmpd="sng" algn="ctr">
               <a:solidFill>
-                <a:srgbClr val="00B0F0"/>
+                <a:srgbClr val="64A4D9"/>
               </a:solidFill>
               <a:prstDash val="solid"/>
               <a:miter lim="800000"/>
@@ -15799,7 +15802,7 @@
           <p:spPr>
             <a:xfrm>
               <a:off x="7817145" y="6088459"/>
-              <a:ext cx="369332" cy="419465"/>
+              <a:ext cx="369332" cy="461410"/>
             </a:xfrm>
             <a:prstGeom prst="rect">
               <a:avLst/>
@@ -15813,11 +15816,12 @@
             <a:lstStyle/>
             <a:p>
               <a:r>
-                <a:rPr lang="en-GB" sz="1400" dirty="0">
+                <a:rPr lang="en-GB" sz="1600" dirty="0">
                   <a:solidFill>
                     <a:prstClr val="black"/>
                   </a:solidFill>
-                  <a:latin typeface="Calibri" panose="020F0502020204030204"/>
+                  <a:latin typeface="Arial" panose="020B0604020202020204" pitchFamily="34" charset="0"/>
+                  <a:cs typeface="Arial" panose="020B0604020202020204" pitchFamily="34" charset="0"/>
                 </a:rPr>
                 <a:t>t</a:t>
               </a:r>
@@ -15849,7 +15853,7 @@
             <a:noFill/>
             <a:ln w="25400" cap="flat" cmpd="sng" algn="ctr">
               <a:solidFill>
-                <a:srgbClr val="00B0F0"/>
+                <a:srgbClr val="64A4D9"/>
               </a:solidFill>
               <a:prstDash val="solid"/>
               <a:miter lim="800000"/>
@@ -15883,7 +15887,7 @@
             <a:noFill/>
             <a:ln w="38100" cap="flat" cmpd="sng" algn="ctr">
               <a:solidFill>
-                <a:srgbClr val="FF9933"/>
+                <a:srgbClr val="F18B45"/>
               </a:solidFill>
               <a:prstDash val="solid"/>
               <a:miter lim="800000"/>
@@ -15892,8 +15896,8 @@
             <a:effectLst/>
           </p:spPr>
         </p:cxnSp>
-        <mc:AlternateContent xmlns:mc="http://schemas.openxmlformats.org/markup-compatibility/2006" xmlns:a14="http://schemas.microsoft.com/office/drawing/2010/main">
-          <mc:Choice Requires="a14">
+        <mc:AlternateContent xmlns:mc="http://schemas.openxmlformats.org/markup-compatibility/2006">
+          <mc:Choice xmlns:a14="http://schemas.microsoft.com/office/drawing/2010/main" Requires="a14">
             <p:sp>
               <p:nvSpPr>
                 <p:cNvPr id="102" name="TextBox 101">
@@ -15908,8 +15912,8 @@
               </p:nvSpPr>
               <p:spPr>
                 <a:xfrm>
-                  <a:off x="7511099" y="4468569"/>
-                  <a:ext cx="981423" cy="388004"/>
+                  <a:off x="7487223" y="4381236"/>
+                  <a:ext cx="1311168" cy="388004"/>
                 </a:xfrm>
                 <a:prstGeom prst="rect">
                   <a:avLst/>
@@ -15939,20 +15943,47 @@
                         <m:jc m:val="left"/>
                       </m:oMathParaPr>
                       <m:oMath xmlns:m="http://schemas.openxmlformats.org/officeDocument/2006/math">
+                        <m:sSub>
+                          <m:sSubPr>
+                            <m:ctrlPr>
+                              <a:rPr lang="en-GB" sz="1600" i="1" smtClean="0">
+                                <a:solidFill>
+                                  <a:srgbClr val="F18B45"/>
+                                </a:solidFill>
+                                <a:latin typeface="Cambria Math" panose="02040503050406030204" pitchFamily="18" charset="0"/>
+                                <a:cs typeface="Times New Roman" panose="02020603050405020304" pitchFamily="18" charset="0"/>
+                              </a:rPr>
+                            </m:ctrlPr>
+                          </m:sSubPr>
+                          <m:e>
+                            <m:r>
+                              <a:rPr lang="en-GB" sz="1600" b="0" i="1" smtClean="0">
+                                <a:solidFill>
+                                  <a:srgbClr val="F18B45"/>
+                                </a:solidFill>
+                                <a:latin typeface="Cambria Math" panose="02040503050406030204" pitchFamily="18" charset="0"/>
+                                <a:cs typeface="Times New Roman" panose="02020603050405020304" pitchFamily="18" charset="0"/>
+                              </a:rPr>
+                              <m:t>𝐷</m:t>
+                            </m:r>
+                          </m:e>
+                          <m:sub>
+                            <m:r>
+                              <a:rPr lang="en-GB" sz="1600" b="0" i="1" smtClean="0">
+                                <a:solidFill>
+                                  <a:srgbClr val="F18B45"/>
+                                </a:solidFill>
+                                <a:latin typeface="Cambria Math" panose="02040503050406030204" pitchFamily="18" charset="0"/>
+                                <a:cs typeface="Times New Roman" panose="02020603050405020304" pitchFamily="18" charset="0"/>
+                              </a:rPr>
+                              <m:t>𝑡</m:t>
+                            </m:r>
+                          </m:sub>
+                        </m:sSub>
                         <m:r>
-                          <a:rPr lang="en-GB" sz="1200" i="1">
+                          <a:rPr lang="en-GB" sz="1600" i="1">
                             <a:solidFill>
-                              <a:srgbClr val="FF9933"/>
-                            </a:solidFill>
-                            <a:latin typeface="Cambria Math" panose="02040503050406030204" pitchFamily="18" charset="0"/>
-                            <a:cs typeface="Times New Roman" panose="02020603050405020304" pitchFamily="18" charset="0"/>
-                          </a:rPr>
-                          <m:t>𝐷</m:t>
-                        </m:r>
-                        <m:r>
-                          <a:rPr lang="en-GB" sz="1200" i="1">
-                            <a:solidFill>
-                              <a:srgbClr val="FF9933"/>
+                              <a:srgbClr val="F18B45"/>
                             </a:solidFill>
                             <a:latin typeface="Cambria Math" panose="02040503050406030204" pitchFamily="18" charset="0"/>
                             <a:cs typeface="Times New Roman" panose="02020603050405020304" pitchFamily="18" charset="0"/>
@@ -15960,9 +15991,9 @@
                           <m:t>=</m:t>
                         </m:r>
                         <m:r>
-                          <a:rPr lang="en-GB" sz="1200" i="1">
+                          <a:rPr lang="en-GB" sz="1600" i="1">
                             <a:solidFill>
-                              <a:srgbClr val="FF9933"/>
+                              <a:srgbClr val="F18B45"/>
                             </a:solidFill>
                             <a:latin typeface="Cambria Math" panose="02040503050406030204" pitchFamily="18" charset="0"/>
                             <a:cs typeface="Times New Roman" panose="02020603050405020304" pitchFamily="18" charset="0"/>
@@ -15972,9 +16003,9 @@
                       </m:oMath>
                     </m:oMathPara>
                   </a14:m>
-                  <a:endParaRPr lang="en-GB" sz="1200" dirty="0">
+                  <a:endParaRPr lang="en-GB" sz="1600" dirty="0">
                     <a:solidFill>
-                      <a:srgbClr val="FF9933"/>
+                      <a:srgbClr val="F18B45"/>
                     </a:solidFill>
                     <a:latin typeface="AU Passata" pitchFamily="34" charset="0"/>
                   </a:endParaRPr>
@@ -15982,13 +16013,13 @@
               </p:txBody>
             </p:sp>
           </mc:Choice>
-          <mc:Fallback xmlns="">
+          <mc:Fallback>
             <p:sp>
               <p:nvSpPr>
-                <p:cNvPr id="38" name="TextBox 37">
+                <p:cNvPr id="102" name="TextBox 101">
                   <a:extLst>
                     <a:ext uri="{FF2B5EF4-FFF2-40B4-BE49-F238E27FC236}">
-                      <a16:creationId xmlns:a16="http://schemas.microsoft.com/office/drawing/2014/main" id="{BBF9C440-65AF-4EE3-9A8C-07B6793D84F2}"/>
+                      <a16:creationId xmlns:a16="http://schemas.microsoft.com/office/drawing/2014/main" id="{341C268C-AC77-4AC8-ACA1-027AABC41A5D}"/>
                     </a:ext>
                   </a:extLst>
                 </p:cNvPr>
@@ -15999,8 +16030,8 @@
               </p:nvSpPr>
               <p:spPr>
                 <a:xfrm>
-                  <a:off x="7511099" y="4468569"/>
-                  <a:ext cx="981423" cy="388004"/>
+                  <a:off x="7487223" y="4381236"/>
+                  <a:ext cx="1311168" cy="388004"/>
                 </a:xfrm>
                 <a:prstGeom prst="rect">
                   <a:avLst/>
@@ -16052,7 +16083,7 @@
             <a:noFill/>
             <a:ln w="25400" cap="flat" cmpd="sng" algn="ctr">
               <a:solidFill>
-                <a:srgbClr val="FF9933"/>
+                <a:srgbClr val="F18B45"/>
               </a:solidFill>
               <a:prstDash val="solid"/>
               <a:miter lim="800000"/>
@@ -16062,10 +16093,127 @@
           </p:spPr>
         </p:cxnSp>
       </p:grpSp>
+      <p:sp>
+        <p:nvSpPr>
+          <p:cNvPr id="2" name="TextBox 1">
+            <a:extLst>
+              <a:ext uri="{FF2B5EF4-FFF2-40B4-BE49-F238E27FC236}">
+                <a16:creationId xmlns:a16="http://schemas.microsoft.com/office/drawing/2014/main" id="{5FD8008B-AE0C-E248-159E-5FC82B9E5DDB}"/>
+              </a:ext>
+            </a:extLst>
+          </p:cNvPr>
+          <p:cNvSpPr txBox="1"/>
+          <p:nvPr/>
+        </p:nvSpPr>
+        <p:spPr>
+          <a:xfrm>
+            <a:off x="254387" y="6151"/>
+            <a:ext cx="404109" cy="338554"/>
+          </a:xfrm>
+          <a:prstGeom prst="rect">
+            <a:avLst/>
+          </a:prstGeom>
+          <a:noFill/>
+        </p:spPr>
+        <p:txBody>
+          <a:bodyPr wrap="square" rtlCol="0" anchor="ctr" anchorCtr="0">
+            <a:spAutoFit/>
+          </a:bodyPr>
+          <a:lstStyle/>
+          <a:p>
+            <a:pPr algn="ctr"/>
+            <a:r>
+              <a:rPr lang="en-GB" sz="1600" dirty="0">
+                <a:latin typeface="Arial" panose="020B0604020202020204" pitchFamily="34" charset="0"/>
+                <a:cs typeface="Arial" panose="020B0604020202020204" pitchFamily="34" charset="0"/>
+              </a:rPr>
+              <a:t>a)</a:t>
+            </a:r>
+          </a:p>
+        </p:txBody>
+      </p:sp>
+      <p:sp>
+        <p:nvSpPr>
+          <p:cNvPr id="4" name="TextBox 3">
+            <a:extLst>
+              <a:ext uri="{FF2B5EF4-FFF2-40B4-BE49-F238E27FC236}">
+                <a16:creationId xmlns:a16="http://schemas.microsoft.com/office/drawing/2014/main" id="{E68F4756-5A4C-846F-FDBC-208599D6651E}"/>
+              </a:ext>
+            </a:extLst>
+          </p:cNvPr>
+          <p:cNvSpPr txBox="1"/>
+          <p:nvPr/>
+        </p:nvSpPr>
+        <p:spPr>
+          <a:xfrm>
+            <a:off x="303630" y="4140535"/>
+            <a:ext cx="404109" cy="338554"/>
+          </a:xfrm>
+          <a:prstGeom prst="rect">
+            <a:avLst/>
+          </a:prstGeom>
+          <a:noFill/>
+        </p:spPr>
+        <p:txBody>
+          <a:bodyPr wrap="square" rtlCol="0" anchor="ctr" anchorCtr="0">
+            <a:spAutoFit/>
+          </a:bodyPr>
+          <a:lstStyle/>
+          <a:p>
+            <a:pPr algn="ctr"/>
+            <a:r>
+              <a:rPr lang="en-GB" sz="1600" dirty="0">
+                <a:latin typeface="Arial" panose="020B0604020202020204" pitchFamily="34" charset="0"/>
+                <a:cs typeface="Arial" panose="020B0604020202020204" pitchFamily="34" charset="0"/>
+              </a:rPr>
+              <a:t>c)</a:t>
+            </a:r>
+          </a:p>
+        </p:txBody>
+      </p:sp>
+      <p:sp>
+        <p:nvSpPr>
+          <p:cNvPr id="5" name="TextBox 4">
+            <a:extLst>
+              <a:ext uri="{FF2B5EF4-FFF2-40B4-BE49-F238E27FC236}">
+                <a16:creationId xmlns:a16="http://schemas.microsoft.com/office/drawing/2014/main" id="{B7F939E6-3F23-CA9E-2E4D-73564EFCE2C5}"/>
+              </a:ext>
+            </a:extLst>
+          </p:cNvPr>
+          <p:cNvSpPr txBox="1"/>
+          <p:nvPr/>
+        </p:nvSpPr>
+        <p:spPr>
+          <a:xfrm>
+            <a:off x="282612" y="2038209"/>
+            <a:ext cx="404109" cy="338554"/>
+          </a:xfrm>
+          <a:prstGeom prst="rect">
+            <a:avLst/>
+          </a:prstGeom>
+          <a:noFill/>
+        </p:spPr>
+        <p:txBody>
+          <a:bodyPr wrap="square" rtlCol="0" anchor="ctr" anchorCtr="0">
+            <a:spAutoFit/>
+          </a:bodyPr>
+          <a:lstStyle/>
+          <a:p>
+            <a:pPr algn="ctr"/>
+            <a:r>
+              <a:rPr lang="en-GB" sz="1600" dirty="0">
+                <a:latin typeface="Arial" panose="020B0604020202020204" pitchFamily="34" charset="0"/>
+                <a:cs typeface="Arial" panose="020B0604020202020204" pitchFamily="34" charset="0"/>
+              </a:rPr>
+              <a:t>b)</a:t>
+            </a:r>
+          </a:p>
+        </p:txBody>
+      </p:sp>
     </p:spTree>
     <p:extLst>
       <p:ext uri="{BB962C8B-B14F-4D97-AF65-F5344CB8AC3E}">
-        <p14:creationId xmlns:p14="http://schemas.microsoft.com/office/powerpoint/2010/main" val="2623005898"/>
+        <p14:creationId xmlns:p14="http://schemas.microsoft.com/office/powerpoint/2010/main" val="1277219038"/>
       </p:ext>
     </p:extLst>
   </p:cSld>

</xml_diff>

<commit_message>
Figures chapter 14 including population density, pv penetration, correlation length
</commit_message>
<xml_diff>
--- a/Figures/Chapter_14/drawings/Fig14.X_storage_theory.pptx
+++ b/Figures/Chapter_14/drawings/Fig14.X_storage_theory.pptx
@@ -262,7 +262,7 @@
           <a:p>
             <a:fld id="{8B1A925D-6802-4F82-B3A4-43BDB522D203}" type="datetimeFigureOut">
               <a:rPr lang="en-GB" smtClean="0"/>
-              <a:t>07/03/2023</a:t>
+              <a:t>12/03/2023</a:t>
             </a:fld>
             <a:endParaRPr lang="en-GB"/>
           </a:p>
@@ -462,7 +462,7 @@
           <a:p>
             <a:fld id="{8B1A925D-6802-4F82-B3A4-43BDB522D203}" type="datetimeFigureOut">
               <a:rPr lang="en-GB" smtClean="0"/>
-              <a:t>07/03/2023</a:t>
+              <a:t>12/03/2023</a:t>
             </a:fld>
             <a:endParaRPr lang="en-GB"/>
           </a:p>
@@ -672,7 +672,7 @@
           <a:p>
             <a:fld id="{8B1A925D-6802-4F82-B3A4-43BDB522D203}" type="datetimeFigureOut">
               <a:rPr lang="en-GB" smtClean="0"/>
-              <a:t>07/03/2023</a:t>
+              <a:t>12/03/2023</a:t>
             </a:fld>
             <a:endParaRPr lang="en-GB"/>
           </a:p>
@@ -1127,7 +1127,7 @@
             <a:fld id="{78417F83-4CBA-48F2-BAD0-783AE3701E32}" type="datetimeFigureOut">
               <a:rPr lang="en-GB" smtClean="0"/>
               <a:pPr/>
-              <a:t>07/03/2023</a:t>
+              <a:t>12/03/2023</a:t>
             </a:fld>
             <a:r>
               <a:rPr lang="en-GB" dirty="0"/>
@@ -1585,7 +1585,7 @@
             <a:fld id="{78417F83-4CBA-48F2-BAD0-783AE3701E32}" type="datetimeFigureOut">
               <a:rPr lang="en-GB" smtClean="0"/>
               <a:pPr/>
-              <a:t>07/03/2023</a:t>
+              <a:t>12/03/2023</a:t>
             </a:fld>
             <a:r>
               <a:rPr lang="en-GB" dirty="0"/>
@@ -2249,7 +2249,7 @@
             <a:fld id="{78417F83-4CBA-48F2-BAD0-783AE3701E32}" type="datetimeFigureOut">
               <a:rPr lang="en-GB" smtClean="0"/>
               <a:pPr/>
-              <a:t>07/03/2023</a:t>
+              <a:t>12/03/2023</a:t>
             </a:fld>
             <a:r>
               <a:rPr lang="en-GB" dirty="0"/>
@@ -2595,7 +2595,7 @@
             <a:fld id="{78417F83-4CBA-48F2-BAD0-783AE3701E32}" type="datetimeFigureOut">
               <a:rPr lang="en-GB" smtClean="0"/>
               <a:pPr/>
-              <a:t>07/03/2023</a:t>
+              <a:t>12/03/2023</a:t>
             </a:fld>
             <a:r>
               <a:rPr lang="en-GB" dirty="0"/>
@@ -2973,7 +2973,7 @@
             <a:fld id="{78417F83-4CBA-48F2-BAD0-783AE3701E32}" type="datetimeFigureOut">
               <a:rPr lang="en-GB" smtClean="0"/>
               <a:pPr/>
-              <a:t>07/03/2023</a:t>
+              <a:t>12/03/2023</a:t>
             </a:fld>
             <a:r>
               <a:rPr lang="en-GB" dirty="0"/>
@@ -3400,7 +3400,7 @@
             <a:fld id="{78417F83-4CBA-48F2-BAD0-783AE3701E32}" type="datetimeFigureOut">
               <a:rPr lang="en-GB" smtClean="0"/>
               <a:pPr/>
-              <a:t>07/03/2023</a:t>
+              <a:t>12/03/2023</a:t>
             </a:fld>
             <a:r>
               <a:rPr lang="en-GB" dirty="0"/>
@@ -3840,7 +3840,7 @@
             <a:fld id="{78417F83-4CBA-48F2-BAD0-783AE3701E32}" type="datetimeFigureOut">
               <a:rPr lang="en-GB" smtClean="0"/>
               <a:pPr/>
-              <a:t>07/03/2023</a:t>
+              <a:t>12/03/2023</a:t>
             </a:fld>
             <a:r>
               <a:rPr lang="en-GB" dirty="0"/>
@@ -4008,7 +4008,7 @@
             <a:fld id="{78417F83-4CBA-48F2-BAD0-783AE3701E32}" type="datetimeFigureOut">
               <a:rPr lang="en-GB" smtClean="0"/>
               <a:pPr/>
-              <a:t>07/03/2023</a:t>
+              <a:t>12/03/2023</a:t>
             </a:fld>
             <a:r>
               <a:rPr lang="en-GB" dirty="0"/>
@@ -4176,7 +4176,7 @@
           <a:p>
             <a:fld id="{8B1A925D-6802-4F82-B3A4-43BDB522D203}" type="datetimeFigureOut">
               <a:rPr lang="en-GB" smtClean="0"/>
-              <a:t>07/03/2023</a:t>
+              <a:t>12/03/2023</a:t>
             </a:fld>
             <a:endParaRPr lang="en-GB"/>
           </a:p>
@@ -4389,7 +4389,7 @@
             <a:fld id="{78417F83-4CBA-48F2-BAD0-783AE3701E32}" type="datetimeFigureOut">
               <a:rPr lang="en-GB" smtClean="0"/>
               <a:pPr/>
-              <a:t>07/03/2023</a:t>
+              <a:t>12/03/2023</a:t>
             </a:fld>
             <a:r>
               <a:rPr lang="en-GB" dirty="0"/>
@@ -4620,7 +4620,7 @@
             <a:fld id="{78417F83-4CBA-48F2-BAD0-783AE3701E32}" type="datetimeFigureOut">
               <a:rPr lang="en-GB" smtClean="0"/>
               <a:pPr/>
-              <a:t>07/03/2023</a:t>
+              <a:t>12/03/2023</a:t>
             </a:fld>
             <a:r>
               <a:rPr lang="en-GB" dirty="0"/>
@@ -4861,7 +4861,7 @@
             <a:fld id="{78417F83-4CBA-48F2-BAD0-783AE3701E32}" type="datetimeFigureOut">
               <a:rPr lang="en-GB" smtClean="0"/>
               <a:pPr/>
-              <a:t>07/03/2023</a:t>
+              <a:t>12/03/2023</a:t>
             </a:fld>
             <a:r>
               <a:rPr lang="en-GB" dirty="0"/>
@@ -5031,7 +5031,7 @@
             <a:fld id="{78417F83-4CBA-48F2-BAD0-783AE3701E32}" type="datetimeFigureOut">
               <a:rPr lang="en-GB" smtClean="0"/>
               <a:pPr/>
-              <a:t>07/03/2023</a:t>
+              <a:t>12/03/2023</a:t>
             </a:fld>
             <a:r>
               <a:rPr lang="en-GB" dirty="0"/>
@@ -5205,7 +5205,7 @@
             <a:fld id="{78417F83-4CBA-48F2-BAD0-783AE3701E32}" type="datetimeFigureOut">
               <a:rPr lang="en-GB" smtClean="0"/>
               <a:pPr/>
-              <a:t>07/03/2023</a:t>
+              <a:t>12/03/2023</a:t>
             </a:fld>
             <a:r>
               <a:rPr lang="en-GB" dirty="0"/>
@@ -5542,7 +5542,7 @@
             <a:fld id="{78417F83-4CBA-48F2-BAD0-783AE3701E32}" type="datetimeFigureOut">
               <a:rPr lang="en-GB" smtClean="0"/>
               <a:pPr/>
-              <a:t>07/03/2023</a:t>
+              <a:t>12/03/2023</a:t>
             </a:fld>
             <a:r>
               <a:rPr lang="en-GB" dirty="0"/>
@@ -5713,7 +5713,7 @@
             <a:fld id="{78417F83-4CBA-48F2-BAD0-783AE3701E32}" type="datetimeFigureOut">
               <a:rPr lang="en-GB" smtClean="0"/>
               <a:pPr/>
-              <a:t>07/03/2023</a:t>
+              <a:t>12/03/2023</a:t>
             </a:fld>
             <a:r>
               <a:rPr lang="en-GB" dirty="0"/>
@@ -5909,7 +5909,7 @@
             <a:fld id="{78417F83-4CBA-48F2-BAD0-783AE3701E32}" type="datetimeFigureOut">
               <a:rPr lang="en-GB" smtClean="0"/>
               <a:pPr/>
-              <a:t>07/03/2023</a:t>
+              <a:t>12/03/2023</a:t>
             </a:fld>
             <a:r>
               <a:rPr lang="en-GB" dirty="0"/>
@@ -6083,7 +6083,7 @@
             <a:fld id="{78417F83-4CBA-48F2-BAD0-783AE3701E32}" type="datetimeFigureOut">
               <a:rPr lang="en-GB" smtClean="0"/>
               <a:pPr/>
-              <a:t>07/03/2023</a:t>
+              <a:t>12/03/2023</a:t>
             </a:fld>
             <a:r>
               <a:rPr lang="en-GB" dirty="0"/>
@@ -6242,7 +6242,7 @@
             <a:fld id="{78417F83-4CBA-48F2-BAD0-783AE3701E32}" type="datetimeFigureOut">
               <a:rPr lang="en-GB" smtClean="0"/>
               <a:pPr/>
-              <a:t>07/03/2023</a:t>
+              <a:t>12/03/2023</a:t>
             </a:fld>
             <a:r>
               <a:rPr lang="en-GB" dirty="0"/>
@@ -6526,7 +6526,7 @@
           <a:p>
             <a:fld id="{8B1A925D-6802-4F82-B3A4-43BDB522D203}" type="datetimeFigureOut">
               <a:rPr lang="en-GB" smtClean="0"/>
-              <a:t>07/03/2023</a:t>
+              <a:t>12/03/2023</a:t>
             </a:fld>
             <a:endParaRPr lang="en-GB"/>
           </a:p>
@@ -7407,7 +7407,7 @@
             <a:fld id="{78417F83-4CBA-48F2-BAD0-783AE3701E32}" type="datetimeFigureOut">
               <a:rPr lang="en-GB" smtClean="0"/>
               <a:pPr/>
-              <a:t>07/03/2023</a:t>
+              <a:t>12/03/2023</a:t>
             </a:fld>
             <a:r>
               <a:rPr lang="en-GB" dirty="0"/>
@@ -7682,7 +7682,7 @@
             <a:fld id="{78417F83-4CBA-48F2-BAD0-783AE3701E32}" type="datetimeFigureOut">
               <a:rPr lang="en-GB" smtClean="0"/>
               <a:pPr/>
-              <a:t>07/03/2023</a:t>
+              <a:t>12/03/2023</a:t>
             </a:fld>
             <a:r>
               <a:rPr lang="en-GB" dirty="0"/>
@@ -8887,7 +8887,7 @@
           <a:p>
             <a:fld id="{8B1A925D-6802-4F82-B3A4-43BDB522D203}" type="datetimeFigureOut">
               <a:rPr lang="en-GB" smtClean="0"/>
-              <a:t>07/03/2023</a:t>
+              <a:t>12/03/2023</a:t>
             </a:fld>
             <a:endParaRPr lang="en-GB"/>
           </a:p>
@@ -9302,7 +9302,7 @@
           <a:p>
             <a:fld id="{8B1A925D-6802-4F82-B3A4-43BDB522D203}" type="datetimeFigureOut">
               <a:rPr lang="en-GB" smtClean="0"/>
-              <a:t>07/03/2023</a:t>
+              <a:t>12/03/2023</a:t>
             </a:fld>
             <a:endParaRPr lang="en-GB"/>
           </a:p>
@@ -9444,7 +9444,7 @@
           <a:p>
             <a:fld id="{8B1A925D-6802-4F82-B3A4-43BDB522D203}" type="datetimeFigureOut">
               <a:rPr lang="en-GB" smtClean="0"/>
-              <a:t>07/03/2023</a:t>
+              <a:t>12/03/2023</a:t>
             </a:fld>
             <a:endParaRPr lang="en-GB"/>
           </a:p>
@@ -9557,7 +9557,7 @@
           <a:p>
             <a:fld id="{8B1A925D-6802-4F82-B3A4-43BDB522D203}" type="datetimeFigureOut">
               <a:rPr lang="en-GB" smtClean="0"/>
-              <a:t>07/03/2023</a:t>
+              <a:t>12/03/2023</a:t>
             </a:fld>
             <a:endParaRPr lang="en-GB"/>
           </a:p>
@@ -9870,7 +9870,7 @@
           <a:p>
             <a:fld id="{8B1A925D-6802-4F82-B3A4-43BDB522D203}" type="datetimeFigureOut">
               <a:rPr lang="en-GB" smtClean="0"/>
-              <a:t>07/03/2023</a:t>
+              <a:t>12/03/2023</a:t>
             </a:fld>
             <a:endParaRPr lang="en-GB"/>
           </a:p>
@@ -10159,7 +10159,7 @@
           <a:p>
             <a:fld id="{8B1A925D-6802-4F82-B3A4-43BDB522D203}" type="datetimeFigureOut">
               <a:rPr lang="en-GB" smtClean="0"/>
-              <a:t>07/03/2023</a:t>
+              <a:t>12/03/2023</a:t>
             </a:fld>
             <a:endParaRPr lang="en-GB"/>
           </a:p>
@@ -10402,7 +10402,7 @@
           <a:p>
             <a:fld id="{8B1A925D-6802-4F82-B3A4-43BDB522D203}" type="datetimeFigureOut">
               <a:rPr lang="en-GB" smtClean="0"/>
-              <a:t>07/03/2023</a:t>
+              <a:t>12/03/2023</a:t>
             </a:fld>
             <a:endParaRPr lang="en-GB"/>
           </a:p>
@@ -11168,7 +11168,7 @@
             <a:fld id="{78417F83-4CBA-48F2-BAD0-783AE3701E32}" type="datetimeFigureOut">
               <a:rPr lang="en-GB" smtClean="0"/>
               <a:pPr/>
-              <a:t>07/03/2023</a:t>
+              <a:t>12/03/2023</a:t>
             </a:fld>
             <a:r>
               <a:rPr lang="en-GB"/>
@@ -14381,8 +14381,8 @@
             <a:effectLst/>
           </p:spPr>
         </p:cxnSp>
-        <mc:AlternateContent xmlns:mc="http://schemas.openxmlformats.org/markup-compatibility/2006">
-          <mc:Choice xmlns:a14="http://schemas.microsoft.com/office/drawing/2010/main" Requires="a14">
+        <mc:AlternateContent xmlns:mc="http://schemas.openxmlformats.org/markup-compatibility/2006" xmlns:a14="http://schemas.microsoft.com/office/drawing/2010/main">
+          <mc:Choice Requires="a14">
             <p:sp>
               <p:nvSpPr>
                 <p:cNvPr id="78" name="TextBox 77">
@@ -14604,7 +14604,7 @@
               </p:txBody>
             </p:sp>
           </mc:Choice>
-          <mc:Fallback>
+          <mc:Fallback xmlns="">
             <p:sp>
               <p:nvSpPr>
                 <p:cNvPr id="78" name="TextBox 77">
@@ -14815,7 +14815,7 @@
                                 <a:ea typeface="Calibri" panose="020F0502020204030204" pitchFamily="34" charset="0"/>
                                 <a:cs typeface="Times New Roman" panose="02020603050405020304" pitchFamily="18" charset="0"/>
                               </a:rPr>
-                              <m:t>𝐺</m:t>
+                              <m:t>𝑔</m:t>
                             </m:r>
                           </m:e>
                           <m:sub>
@@ -15964,7 +15964,7 @@
                                 <a:latin typeface="Cambria Math" panose="02040503050406030204" pitchFamily="18" charset="0"/>
                                 <a:cs typeface="Times New Roman" panose="02020603050405020304" pitchFamily="18" charset="0"/>
                               </a:rPr>
-                              <m:t>𝐷</m:t>
+                              <m:t>𝑑</m:t>
                             </m:r>
                           </m:e>
                           <m:sub>

</xml_diff>

<commit_message>
add figure problem ideal storage
</commit_message>
<xml_diff>
--- a/Figures/Chapter_14/drawings/Fig14.X_storage_theory.pptx
+++ b/Figures/Chapter_14/drawings/Fig14.X_storage_theory.pptx
@@ -7,6 +7,7 @@
   </p:sldMasterIdLst>
   <p:sldIdLst>
     <p:sldId id="834" r:id="rId3"/>
+    <p:sldId id="835" r:id="rId4"/>
   </p:sldIdLst>
   <p:sldSz cx="12192000" cy="6858000"/>
   <p:notesSz cx="6858000" cy="9144000"/>
@@ -262,7 +263,7 @@
           <a:p>
             <a:fld id="{8B1A925D-6802-4F82-B3A4-43BDB522D203}" type="datetimeFigureOut">
               <a:rPr lang="en-GB" smtClean="0"/>
-              <a:t>12/03/2023</a:t>
+              <a:t>20/03/2023</a:t>
             </a:fld>
             <a:endParaRPr lang="en-GB"/>
           </a:p>
@@ -462,7 +463,7 @@
           <a:p>
             <a:fld id="{8B1A925D-6802-4F82-B3A4-43BDB522D203}" type="datetimeFigureOut">
               <a:rPr lang="en-GB" smtClean="0"/>
-              <a:t>12/03/2023</a:t>
+              <a:t>20/03/2023</a:t>
             </a:fld>
             <a:endParaRPr lang="en-GB"/>
           </a:p>
@@ -672,7 +673,7 @@
           <a:p>
             <a:fld id="{8B1A925D-6802-4F82-B3A4-43BDB522D203}" type="datetimeFigureOut">
               <a:rPr lang="en-GB" smtClean="0"/>
-              <a:t>12/03/2023</a:t>
+              <a:t>20/03/2023</a:t>
             </a:fld>
             <a:endParaRPr lang="en-GB"/>
           </a:p>
@@ -1127,7 +1128,7 @@
             <a:fld id="{78417F83-4CBA-48F2-BAD0-783AE3701E32}" type="datetimeFigureOut">
               <a:rPr lang="en-GB" smtClean="0"/>
               <a:pPr/>
-              <a:t>12/03/2023</a:t>
+              <a:t>20/03/2023</a:t>
             </a:fld>
             <a:r>
               <a:rPr lang="en-GB" dirty="0"/>
@@ -1585,7 +1586,7 @@
             <a:fld id="{78417F83-4CBA-48F2-BAD0-783AE3701E32}" type="datetimeFigureOut">
               <a:rPr lang="en-GB" smtClean="0"/>
               <a:pPr/>
-              <a:t>12/03/2023</a:t>
+              <a:t>20/03/2023</a:t>
             </a:fld>
             <a:r>
               <a:rPr lang="en-GB" dirty="0"/>
@@ -2249,7 +2250,7 @@
             <a:fld id="{78417F83-4CBA-48F2-BAD0-783AE3701E32}" type="datetimeFigureOut">
               <a:rPr lang="en-GB" smtClean="0"/>
               <a:pPr/>
-              <a:t>12/03/2023</a:t>
+              <a:t>20/03/2023</a:t>
             </a:fld>
             <a:r>
               <a:rPr lang="en-GB" dirty="0"/>
@@ -2595,7 +2596,7 @@
             <a:fld id="{78417F83-4CBA-48F2-BAD0-783AE3701E32}" type="datetimeFigureOut">
               <a:rPr lang="en-GB" smtClean="0"/>
               <a:pPr/>
-              <a:t>12/03/2023</a:t>
+              <a:t>20/03/2023</a:t>
             </a:fld>
             <a:r>
               <a:rPr lang="en-GB" dirty="0"/>
@@ -2973,7 +2974,7 @@
             <a:fld id="{78417F83-4CBA-48F2-BAD0-783AE3701E32}" type="datetimeFigureOut">
               <a:rPr lang="en-GB" smtClean="0"/>
               <a:pPr/>
-              <a:t>12/03/2023</a:t>
+              <a:t>20/03/2023</a:t>
             </a:fld>
             <a:r>
               <a:rPr lang="en-GB" dirty="0"/>
@@ -3400,7 +3401,7 @@
             <a:fld id="{78417F83-4CBA-48F2-BAD0-783AE3701E32}" type="datetimeFigureOut">
               <a:rPr lang="en-GB" smtClean="0"/>
               <a:pPr/>
-              <a:t>12/03/2023</a:t>
+              <a:t>20/03/2023</a:t>
             </a:fld>
             <a:r>
               <a:rPr lang="en-GB" dirty="0"/>
@@ -3840,7 +3841,7 @@
             <a:fld id="{78417F83-4CBA-48F2-BAD0-783AE3701E32}" type="datetimeFigureOut">
               <a:rPr lang="en-GB" smtClean="0"/>
               <a:pPr/>
-              <a:t>12/03/2023</a:t>
+              <a:t>20/03/2023</a:t>
             </a:fld>
             <a:r>
               <a:rPr lang="en-GB" dirty="0"/>
@@ -4008,7 +4009,7 @@
             <a:fld id="{78417F83-4CBA-48F2-BAD0-783AE3701E32}" type="datetimeFigureOut">
               <a:rPr lang="en-GB" smtClean="0"/>
               <a:pPr/>
-              <a:t>12/03/2023</a:t>
+              <a:t>20/03/2023</a:t>
             </a:fld>
             <a:r>
               <a:rPr lang="en-GB" dirty="0"/>
@@ -4176,7 +4177,7 @@
           <a:p>
             <a:fld id="{8B1A925D-6802-4F82-B3A4-43BDB522D203}" type="datetimeFigureOut">
               <a:rPr lang="en-GB" smtClean="0"/>
-              <a:t>12/03/2023</a:t>
+              <a:t>20/03/2023</a:t>
             </a:fld>
             <a:endParaRPr lang="en-GB"/>
           </a:p>
@@ -4389,7 +4390,7 @@
             <a:fld id="{78417F83-4CBA-48F2-BAD0-783AE3701E32}" type="datetimeFigureOut">
               <a:rPr lang="en-GB" smtClean="0"/>
               <a:pPr/>
-              <a:t>12/03/2023</a:t>
+              <a:t>20/03/2023</a:t>
             </a:fld>
             <a:r>
               <a:rPr lang="en-GB" dirty="0"/>
@@ -4620,7 +4621,7 @@
             <a:fld id="{78417F83-4CBA-48F2-BAD0-783AE3701E32}" type="datetimeFigureOut">
               <a:rPr lang="en-GB" smtClean="0"/>
               <a:pPr/>
-              <a:t>12/03/2023</a:t>
+              <a:t>20/03/2023</a:t>
             </a:fld>
             <a:r>
               <a:rPr lang="en-GB" dirty="0"/>
@@ -4861,7 +4862,7 @@
             <a:fld id="{78417F83-4CBA-48F2-BAD0-783AE3701E32}" type="datetimeFigureOut">
               <a:rPr lang="en-GB" smtClean="0"/>
               <a:pPr/>
-              <a:t>12/03/2023</a:t>
+              <a:t>20/03/2023</a:t>
             </a:fld>
             <a:r>
               <a:rPr lang="en-GB" dirty="0"/>
@@ -5031,7 +5032,7 @@
             <a:fld id="{78417F83-4CBA-48F2-BAD0-783AE3701E32}" type="datetimeFigureOut">
               <a:rPr lang="en-GB" smtClean="0"/>
               <a:pPr/>
-              <a:t>12/03/2023</a:t>
+              <a:t>20/03/2023</a:t>
             </a:fld>
             <a:r>
               <a:rPr lang="en-GB" dirty="0"/>
@@ -5205,7 +5206,7 @@
             <a:fld id="{78417F83-4CBA-48F2-BAD0-783AE3701E32}" type="datetimeFigureOut">
               <a:rPr lang="en-GB" smtClean="0"/>
               <a:pPr/>
-              <a:t>12/03/2023</a:t>
+              <a:t>20/03/2023</a:t>
             </a:fld>
             <a:r>
               <a:rPr lang="en-GB" dirty="0"/>
@@ -5542,7 +5543,7 @@
             <a:fld id="{78417F83-4CBA-48F2-BAD0-783AE3701E32}" type="datetimeFigureOut">
               <a:rPr lang="en-GB" smtClean="0"/>
               <a:pPr/>
-              <a:t>12/03/2023</a:t>
+              <a:t>20/03/2023</a:t>
             </a:fld>
             <a:r>
               <a:rPr lang="en-GB" dirty="0"/>
@@ -5713,7 +5714,7 @@
             <a:fld id="{78417F83-4CBA-48F2-BAD0-783AE3701E32}" type="datetimeFigureOut">
               <a:rPr lang="en-GB" smtClean="0"/>
               <a:pPr/>
-              <a:t>12/03/2023</a:t>
+              <a:t>20/03/2023</a:t>
             </a:fld>
             <a:r>
               <a:rPr lang="en-GB" dirty="0"/>
@@ -5909,7 +5910,7 @@
             <a:fld id="{78417F83-4CBA-48F2-BAD0-783AE3701E32}" type="datetimeFigureOut">
               <a:rPr lang="en-GB" smtClean="0"/>
               <a:pPr/>
-              <a:t>12/03/2023</a:t>
+              <a:t>20/03/2023</a:t>
             </a:fld>
             <a:r>
               <a:rPr lang="en-GB" dirty="0"/>
@@ -6083,7 +6084,7 @@
             <a:fld id="{78417F83-4CBA-48F2-BAD0-783AE3701E32}" type="datetimeFigureOut">
               <a:rPr lang="en-GB" smtClean="0"/>
               <a:pPr/>
-              <a:t>12/03/2023</a:t>
+              <a:t>20/03/2023</a:t>
             </a:fld>
             <a:r>
               <a:rPr lang="en-GB" dirty="0"/>
@@ -6242,7 +6243,7 @@
             <a:fld id="{78417F83-4CBA-48F2-BAD0-783AE3701E32}" type="datetimeFigureOut">
               <a:rPr lang="en-GB" smtClean="0"/>
               <a:pPr/>
-              <a:t>12/03/2023</a:t>
+              <a:t>20/03/2023</a:t>
             </a:fld>
             <a:r>
               <a:rPr lang="en-GB" dirty="0"/>
@@ -6526,7 +6527,7 @@
           <a:p>
             <a:fld id="{8B1A925D-6802-4F82-B3A4-43BDB522D203}" type="datetimeFigureOut">
               <a:rPr lang="en-GB" smtClean="0"/>
-              <a:t>12/03/2023</a:t>
+              <a:t>20/03/2023</a:t>
             </a:fld>
             <a:endParaRPr lang="en-GB"/>
           </a:p>
@@ -7407,7 +7408,7 @@
             <a:fld id="{78417F83-4CBA-48F2-BAD0-783AE3701E32}" type="datetimeFigureOut">
               <a:rPr lang="en-GB" smtClean="0"/>
               <a:pPr/>
-              <a:t>12/03/2023</a:t>
+              <a:t>20/03/2023</a:t>
             </a:fld>
             <a:r>
               <a:rPr lang="en-GB" dirty="0"/>
@@ -7682,7 +7683,7 @@
             <a:fld id="{78417F83-4CBA-48F2-BAD0-783AE3701E32}" type="datetimeFigureOut">
               <a:rPr lang="en-GB" smtClean="0"/>
               <a:pPr/>
-              <a:t>12/03/2023</a:t>
+              <a:t>20/03/2023</a:t>
             </a:fld>
             <a:r>
               <a:rPr lang="en-GB" dirty="0"/>
@@ -8887,7 +8888,7 @@
           <a:p>
             <a:fld id="{8B1A925D-6802-4F82-B3A4-43BDB522D203}" type="datetimeFigureOut">
               <a:rPr lang="en-GB" smtClean="0"/>
-              <a:t>12/03/2023</a:t>
+              <a:t>20/03/2023</a:t>
             </a:fld>
             <a:endParaRPr lang="en-GB"/>
           </a:p>
@@ -9302,7 +9303,7 @@
           <a:p>
             <a:fld id="{8B1A925D-6802-4F82-B3A4-43BDB522D203}" type="datetimeFigureOut">
               <a:rPr lang="en-GB" smtClean="0"/>
-              <a:t>12/03/2023</a:t>
+              <a:t>20/03/2023</a:t>
             </a:fld>
             <a:endParaRPr lang="en-GB"/>
           </a:p>
@@ -9444,7 +9445,7 @@
           <a:p>
             <a:fld id="{8B1A925D-6802-4F82-B3A4-43BDB522D203}" type="datetimeFigureOut">
               <a:rPr lang="en-GB" smtClean="0"/>
-              <a:t>12/03/2023</a:t>
+              <a:t>20/03/2023</a:t>
             </a:fld>
             <a:endParaRPr lang="en-GB"/>
           </a:p>
@@ -9557,7 +9558,7 @@
           <a:p>
             <a:fld id="{8B1A925D-6802-4F82-B3A4-43BDB522D203}" type="datetimeFigureOut">
               <a:rPr lang="en-GB" smtClean="0"/>
-              <a:t>12/03/2023</a:t>
+              <a:t>20/03/2023</a:t>
             </a:fld>
             <a:endParaRPr lang="en-GB"/>
           </a:p>
@@ -9870,7 +9871,7 @@
           <a:p>
             <a:fld id="{8B1A925D-6802-4F82-B3A4-43BDB522D203}" type="datetimeFigureOut">
               <a:rPr lang="en-GB" smtClean="0"/>
-              <a:t>12/03/2023</a:t>
+              <a:t>20/03/2023</a:t>
             </a:fld>
             <a:endParaRPr lang="en-GB"/>
           </a:p>
@@ -10159,7 +10160,7 @@
           <a:p>
             <a:fld id="{8B1A925D-6802-4F82-B3A4-43BDB522D203}" type="datetimeFigureOut">
               <a:rPr lang="en-GB" smtClean="0"/>
-              <a:t>12/03/2023</a:t>
+              <a:t>20/03/2023</a:t>
             </a:fld>
             <a:endParaRPr lang="en-GB"/>
           </a:p>
@@ -10402,7 +10403,7 @@
           <a:p>
             <a:fld id="{8B1A925D-6802-4F82-B3A4-43BDB522D203}" type="datetimeFigureOut">
               <a:rPr lang="en-GB" smtClean="0"/>
-              <a:t>12/03/2023</a:t>
+              <a:t>20/03/2023</a:t>
             </a:fld>
             <a:endParaRPr lang="en-GB"/>
           </a:p>
@@ -11168,7 +11169,7 @@
             <a:fld id="{78417F83-4CBA-48F2-BAD0-783AE3701E32}" type="datetimeFigureOut">
               <a:rPr lang="en-GB" smtClean="0"/>
               <a:pPr/>
-              <a:t>12/03/2023</a:t>
+              <a:t>20/03/2023</a:t>
             </a:fld>
             <a:r>
               <a:rPr lang="en-GB"/>
@@ -14745,8 +14746,8 @@
             <a:chExt cx="8467488" cy="2967919"/>
           </a:xfrm>
         </p:grpSpPr>
-        <mc:AlternateContent xmlns:mc="http://schemas.openxmlformats.org/markup-compatibility/2006">
-          <mc:Choice xmlns:a14="http://schemas.microsoft.com/office/drawing/2010/main" Requires="a14">
+        <mc:AlternateContent xmlns:mc="http://schemas.openxmlformats.org/markup-compatibility/2006" xmlns:a14="http://schemas.microsoft.com/office/drawing/2010/main">
+          <mc:Choice Requires="a14">
             <p:sp>
               <p:nvSpPr>
                 <p:cNvPr id="83" name="TextBox 82">
@@ -15008,7 +15009,7 @@
               </p:txBody>
             </p:sp>
           </mc:Choice>
-          <mc:Fallback>
+          <mc:Fallback xmlns="">
             <p:sp>
               <p:nvSpPr>
                 <p:cNvPr id="83" name="TextBox 82">
@@ -15896,8 +15897,8 @@
             <a:effectLst/>
           </p:spPr>
         </p:cxnSp>
-        <mc:AlternateContent xmlns:mc="http://schemas.openxmlformats.org/markup-compatibility/2006">
-          <mc:Choice xmlns:a14="http://schemas.microsoft.com/office/drawing/2010/main" Requires="a14">
+        <mc:AlternateContent xmlns:mc="http://schemas.openxmlformats.org/markup-compatibility/2006" xmlns:a14="http://schemas.microsoft.com/office/drawing/2010/main">
+          <mc:Choice Requires="a14">
             <p:sp>
               <p:nvSpPr>
                 <p:cNvPr id="102" name="TextBox 101">
@@ -16013,7 +16014,7 @@
               </p:txBody>
             </p:sp>
           </mc:Choice>
-          <mc:Fallback>
+          <mc:Fallback xmlns="">
             <p:sp>
               <p:nvSpPr>
                 <p:cNvPr id="102" name="TextBox 101">
@@ -16214,6 +16215,3355 @@
     <p:extLst>
       <p:ext uri="{BB962C8B-B14F-4D97-AF65-F5344CB8AC3E}">
         <p14:creationId xmlns:p14="http://schemas.microsoft.com/office/powerpoint/2010/main" val="1277219038"/>
+      </p:ext>
+    </p:extLst>
+  </p:cSld>
+  <p:clrMapOvr>
+    <a:masterClrMapping/>
+  </p:clrMapOvr>
+  <p:timing>
+    <p:tnLst>
+      <p:par>
+        <p:cTn id="1" dur="indefinite" restart="never" nodeType="tmRoot">
+          <p:childTnLst>
+            <p:seq concurrent="1" nextAc="seek">
+              <p:cTn id="2" dur="indefinite" nodeType="mainSeq">
+                <p:childTnLst>
+                  <p:par>
+                    <p:cTn id="3" fill="hold">
+                      <p:stCondLst>
+                        <p:cond delay="indefinite"/>
+                      </p:stCondLst>
+                      <p:childTnLst>
+                        <p:par>
+                          <p:cTn id="4" fill="hold">
+                            <p:stCondLst>
+                              <p:cond delay="0"/>
+                            </p:stCondLst>
+                            <p:childTnLst>
+                              <p:par>
+                                <p:cTn id="5" presetID="1" presetClass="entr" presetSubtype="0" fill="hold" nodeType="clickEffect">
+                                  <p:stCondLst>
+                                    <p:cond delay="0"/>
+                                  </p:stCondLst>
+                                  <p:childTnLst>
+                                    <p:set>
+                                      <p:cBhvr>
+                                        <p:cTn id="6" dur="1" fill="hold">
+                                          <p:stCondLst>
+                                            <p:cond delay="0"/>
+                                          </p:stCondLst>
+                                        </p:cTn>
+                                        <p:tgtEl>
+                                          <p:spTgt spid="80"/>
+                                        </p:tgtEl>
+                                        <p:attrNameLst>
+                                          <p:attrName>style.visibility</p:attrName>
+                                        </p:attrNameLst>
+                                      </p:cBhvr>
+                                      <p:to>
+                                        <p:strVal val="visible"/>
+                                      </p:to>
+                                    </p:set>
+                                  </p:childTnLst>
+                                </p:cTn>
+                              </p:par>
+                            </p:childTnLst>
+                          </p:cTn>
+                        </p:par>
+                      </p:childTnLst>
+                    </p:cTn>
+                  </p:par>
+                </p:childTnLst>
+              </p:cTn>
+              <p:prevCondLst>
+                <p:cond evt="onPrev" delay="0">
+                  <p:tgtEl>
+                    <p:sldTgt/>
+                  </p:tgtEl>
+                </p:cond>
+              </p:prevCondLst>
+              <p:nextCondLst>
+                <p:cond evt="onNext" delay="0">
+                  <p:tgtEl>
+                    <p:sldTgt/>
+                  </p:tgtEl>
+                </p:cond>
+              </p:nextCondLst>
+            </p:seq>
+          </p:childTnLst>
+        </p:cTn>
+      </p:par>
+    </p:tnLst>
+  </p:timing>
+</p:sld>
+</file>
+
+<file path=ppt/slides/slide2.xml><?xml version="1.0" encoding="utf-8"?>
+<p:sld xmlns:a="http://schemas.openxmlformats.org/drawingml/2006/main" xmlns:r="http://schemas.openxmlformats.org/officeDocument/2006/relationships" xmlns:p="http://schemas.openxmlformats.org/presentationml/2006/main">
+  <p:cSld>
+    <p:spTree>
+      <p:nvGrpSpPr>
+        <p:cNvPr id="1" name=""/>
+        <p:cNvGrpSpPr/>
+        <p:nvPr/>
+      </p:nvGrpSpPr>
+      <p:grpSpPr>
+        <a:xfrm>
+          <a:off x="0" y="0"/>
+          <a:ext cx="0" cy="0"/>
+          <a:chOff x="0" y="0"/>
+          <a:chExt cx="0" cy="0"/>
+        </a:xfrm>
+      </p:grpSpPr>
+      <p:grpSp>
+        <p:nvGrpSpPr>
+          <p:cNvPr id="3" name="Group 2">
+            <a:extLst>
+              <a:ext uri="{FF2B5EF4-FFF2-40B4-BE49-F238E27FC236}">
+                <a16:creationId xmlns:a16="http://schemas.microsoft.com/office/drawing/2014/main" id="{F0840271-E362-489A-B331-D28E14D132B1}"/>
+              </a:ext>
+            </a:extLst>
+          </p:cNvPr>
+          <p:cNvGrpSpPr/>
+          <p:nvPr/>
+        </p:nvGrpSpPr>
+        <p:grpSpPr>
+          <a:xfrm>
+            <a:off x="14209" y="2036494"/>
+            <a:ext cx="7426342" cy="3877063"/>
+            <a:chOff x="105994" y="1660805"/>
+            <a:chExt cx="9421297" cy="5656627"/>
+          </a:xfrm>
+        </p:grpSpPr>
+        <p:sp>
+          <p:nvSpPr>
+            <p:cNvPr id="47" name="TextBox 46">
+              <a:extLst>
+                <a:ext uri="{FF2B5EF4-FFF2-40B4-BE49-F238E27FC236}">
+                  <a16:creationId xmlns:a16="http://schemas.microsoft.com/office/drawing/2014/main" id="{A50BDCC8-5D83-4BBE-8CB0-27300FBCCE00}"/>
+                </a:ext>
+              </a:extLst>
+            </p:cNvPr>
+            <p:cNvSpPr txBox="1"/>
+            <p:nvPr/>
+          </p:nvSpPr>
+          <p:spPr>
+            <a:xfrm rot="16200000">
+              <a:off x="-453136" y="2333531"/>
+              <a:ext cx="1508715" cy="390456"/>
+            </a:xfrm>
+            <a:prstGeom prst="rect">
+              <a:avLst/>
+            </a:prstGeom>
+            <a:noFill/>
+          </p:spPr>
+          <p:txBody>
+            <a:bodyPr wrap="square" rtlCol="0">
+              <a:spAutoFit/>
+            </a:bodyPr>
+            <a:lstStyle/>
+            <a:p>
+              <a:r>
+                <a:rPr lang="en-GB" sz="1400" dirty="0">
+                  <a:solidFill>
+                    <a:prstClr val="black"/>
+                  </a:solidFill>
+                  <a:latin typeface="Arial" panose="020B0604020202020204" pitchFamily="34" charset="0"/>
+                  <a:cs typeface="Arial" panose="020B0604020202020204" pitchFamily="34" charset="0"/>
+                </a:rPr>
+                <a:t>charging</a:t>
+              </a:r>
+            </a:p>
+          </p:txBody>
+        </p:sp>
+        <p:cxnSp>
+          <p:nvCxnSpPr>
+            <p:cNvPr id="51" name="Straight Connector 50">
+              <a:extLst>
+                <a:ext uri="{FF2B5EF4-FFF2-40B4-BE49-F238E27FC236}">
+                  <a16:creationId xmlns:a16="http://schemas.microsoft.com/office/drawing/2014/main" id="{A755A506-4E39-4FC6-B3DF-C85C3A201BAF}"/>
+                </a:ext>
+              </a:extLst>
+            </p:cNvPr>
+            <p:cNvCxnSpPr>
+              <a:cxnSpLocks/>
+            </p:cNvCxnSpPr>
+            <p:nvPr/>
+          </p:nvCxnSpPr>
+          <p:spPr>
+            <a:xfrm>
+              <a:off x="480141" y="2023117"/>
+              <a:ext cx="0" cy="2520000"/>
+            </a:xfrm>
+            <a:prstGeom prst="line">
+              <a:avLst/>
+            </a:prstGeom>
+            <a:noFill/>
+            <a:ln w="25400" cap="flat" cmpd="sng" algn="ctr">
+              <a:solidFill>
+                <a:sysClr val="windowText" lastClr="000000"/>
+              </a:solidFill>
+              <a:prstDash val="solid"/>
+              <a:miter lim="800000"/>
+              <a:headEnd type="arrow"/>
+            </a:ln>
+            <a:effectLst/>
+          </p:spPr>
+        </p:cxnSp>
+        <p:cxnSp>
+          <p:nvCxnSpPr>
+            <p:cNvPr id="52" name="Straight Connector 51">
+              <a:extLst>
+                <a:ext uri="{FF2B5EF4-FFF2-40B4-BE49-F238E27FC236}">
+                  <a16:creationId xmlns:a16="http://schemas.microsoft.com/office/drawing/2014/main" id="{2C940494-5F15-483C-B7B8-FDE56F1B2874}"/>
+                </a:ext>
+              </a:extLst>
+            </p:cNvPr>
+            <p:cNvCxnSpPr>
+              <a:cxnSpLocks/>
+            </p:cNvCxnSpPr>
+            <p:nvPr/>
+          </p:nvCxnSpPr>
+          <p:spPr>
+            <a:xfrm flipH="1">
+              <a:off x="465873" y="3301190"/>
+              <a:ext cx="7560000" cy="0"/>
+            </a:xfrm>
+            <a:prstGeom prst="line">
+              <a:avLst/>
+            </a:prstGeom>
+            <a:noFill/>
+            <a:ln w="25400" cap="flat" cmpd="sng" algn="ctr">
+              <a:solidFill>
+                <a:sysClr val="windowText" lastClr="000000"/>
+              </a:solidFill>
+              <a:prstDash val="solid"/>
+              <a:miter lim="800000"/>
+              <a:headEnd type="arrow"/>
+            </a:ln>
+            <a:effectLst/>
+          </p:spPr>
+        </p:cxnSp>
+        <p:sp>
+          <p:nvSpPr>
+            <p:cNvPr id="53" name="TextBox 52">
+              <a:extLst>
+                <a:ext uri="{FF2B5EF4-FFF2-40B4-BE49-F238E27FC236}">
+                  <a16:creationId xmlns:a16="http://schemas.microsoft.com/office/drawing/2014/main" id="{EC0EF2E5-E951-40F3-AA88-8131C21B3EC0}"/>
+                </a:ext>
+              </a:extLst>
+            </p:cNvPr>
+            <p:cNvSpPr txBox="1"/>
+            <p:nvPr/>
+          </p:nvSpPr>
+          <p:spPr>
+            <a:xfrm rot="16200000">
+              <a:off x="-610332" y="3674088"/>
+              <a:ext cx="1824726" cy="390456"/>
+            </a:xfrm>
+            <a:prstGeom prst="rect">
+              <a:avLst/>
+            </a:prstGeom>
+            <a:noFill/>
+          </p:spPr>
+          <p:txBody>
+            <a:bodyPr wrap="square" rtlCol="0">
+              <a:spAutoFit/>
+            </a:bodyPr>
+            <a:lstStyle/>
+            <a:p>
+              <a:r>
+                <a:rPr lang="en-GB" sz="1400" dirty="0">
+                  <a:solidFill>
+                    <a:prstClr val="black"/>
+                  </a:solidFill>
+                  <a:latin typeface="Arial" panose="020B0604020202020204" pitchFamily="34" charset="0"/>
+                  <a:cs typeface="Arial" panose="020B0604020202020204" pitchFamily="34" charset="0"/>
+                </a:rPr>
+                <a:t>discharging</a:t>
+              </a:r>
+            </a:p>
+          </p:txBody>
+        </p:sp>
+        <p:sp>
+          <p:nvSpPr>
+            <p:cNvPr id="54" name="TextBox 53">
+              <a:extLst>
+                <a:ext uri="{FF2B5EF4-FFF2-40B4-BE49-F238E27FC236}">
+                  <a16:creationId xmlns:a16="http://schemas.microsoft.com/office/drawing/2014/main" id="{289EAE22-01B9-489A-BEEC-DBA0B9E551E2}"/>
+                </a:ext>
+              </a:extLst>
+            </p:cNvPr>
+            <p:cNvSpPr txBox="1"/>
+            <p:nvPr/>
+          </p:nvSpPr>
+          <p:spPr>
+            <a:xfrm>
+              <a:off x="7212637" y="2239120"/>
+              <a:ext cx="1594247" cy="976674"/>
+            </a:xfrm>
+            <a:prstGeom prst="rect">
+              <a:avLst/>
+            </a:prstGeom>
+            <a:noFill/>
+          </p:spPr>
+          <p:txBody>
+            <a:bodyPr wrap="square" rtlCol="0">
+              <a:spAutoFit/>
+            </a:bodyPr>
+            <a:lstStyle/>
+            <a:p>
+              <a:pPr>
+                <a:lnSpc>
+                  <a:spcPts val="1500"/>
+                </a:lnSpc>
+              </a:pPr>
+              <a:r>
+                <a:rPr lang="en-GB" sz="1600" dirty="0">
+                  <a:solidFill>
+                    <a:prstClr val="white">
+                      <a:lumMod val="50000"/>
+                    </a:prstClr>
+                  </a:solidFill>
+                  <a:latin typeface="Arial" panose="020B0604020202020204" pitchFamily="34" charset="0"/>
+                  <a:cs typeface="Arial" panose="020B0604020202020204" pitchFamily="34" charset="0"/>
+                </a:rPr>
+                <a:t>storage power capacity</a:t>
+              </a:r>
+            </a:p>
+          </p:txBody>
+        </p:sp>
+        <p:cxnSp>
+          <p:nvCxnSpPr>
+            <p:cNvPr id="55" name="Straight Connector 54">
+              <a:extLst>
+                <a:ext uri="{FF2B5EF4-FFF2-40B4-BE49-F238E27FC236}">
+                  <a16:creationId xmlns:a16="http://schemas.microsoft.com/office/drawing/2014/main" id="{30574AFF-2E82-4E26-AC2D-3EE6C40FAB68}"/>
+                </a:ext>
+              </a:extLst>
+            </p:cNvPr>
+            <p:cNvCxnSpPr>
+              <a:cxnSpLocks/>
+            </p:cNvCxnSpPr>
+            <p:nvPr/>
+          </p:nvCxnSpPr>
+          <p:spPr>
+            <a:xfrm>
+              <a:off x="7212637" y="2353207"/>
+              <a:ext cx="0" cy="900000"/>
+            </a:xfrm>
+            <a:prstGeom prst="line">
+              <a:avLst/>
+            </a:prstGeom>
+            <a:noFill/>
+            <a:ln w="25400" cap="flat" cmpd="sng" algn="ctr">
+              <a:solidFill>
+                <a:sysClr val="window" lastClr="FFFFFF">
+                  <a:lumMod val="50000"/>
+                </a:sysClr>
+              </a:solidFill>
+              <a:prstDash val="solid"/>
+              <a:miter lim="800000"/>
+              <a:headEnd type="arrow"/>
+              <a:tailEnd type="arrow"/>
+            </a:ln>
+            <a:effectLst/>
+          </p:spPr>
+        </p:cxnSp>
+        <p:sp>
+          <p:nvSpPr>
+            <p:cNvPr id="56" name="TextBox 55">
+              <a:extLst>
+                <a:ext uri="{FF2B5EF4-FFF2-40B4-BE49-F238E27FC236}">
+                  <a16:creationId xmlns:a16="http://schemas.microsoft.com/office/drawing/2014/main" id="{A44B8145-FFDE-4B27-B540-6FF0CDC6EF4E}"/>
+                </a:ext>
+              </a:extLst>
+            </p:cNvPr>
+            <p:cNvSpPr txBox="1"/>
+            <p:nvPr/>
+          </p:nvSpPr>
+          <p:spPr>
+            <a:xfrm>
+              <a:off x="2675656" y="1660805"/>
+              <a:ext cx="3683209" cy="493950"/>
+            </a:xfrm>
+            <a:prstGeom prst="rect">
+              <a:avLst/>
+            </a:prstGeom>
+            <a:noFill/>
+          </p:spPr>
+          <p:txBody>
+            <a:bodyPr wrap="square" rtlCol="0">
+              <a:spAutoFit/>
+            </a:bodyPr>
+            <a:lstStyle/>
+            <a:p>
+              <a:r>
+                <a:rPr lang="en-GB" sz="1600" b="1" dirty="0">
+                  <a:solidFill>
+                    <a:prstClr val="black"/>
+                  </a:solidFill>
+                  <a:latin typeface="Arial" panose="020B0604020202020204" pitchFamily="34" charset="0"/>
+                  <a:cs typeface="Arial" panose="020B0604020202020204" pitchFamily="34" charset="0"/>
+                </a:rPr>
+                <a:t>Storage power (mismatch)</a:t>
+              </a:r>
+            </a:p>
+          </p:txBody>
+        </p:sp>
+        <p:sp>
+          <p:nvSpPr>
+            <p:cNvPr id="57" name="TextBox 56">
+              <a:extLst>
+                <a:ext uri="{FF2B5EF4-FFF2-40B4-BE49-F238E27FC236}">
+                  <a16:creationId xmlns:a16="http://schemas.microsoft.com/office/drawing/2014/main" id="{EAC63C96-DDF9-4702-B9A3-70284F4E620E}"/>
+                </a:ext>
+              </a:extLst>
+            </p:cNvPr>
+            <p:cNvSpPr txBox="1"/>
+            <p:nvPr/>
+          </p:nvSpPr>
+          <p:spPr>
+            <a:xfrm>
+              <a:off x="7656541" y="3263080"/>
+              <a:ext cx="369332" cy="493950"/>
+            </a:xfrm>
+            <a:prstGeom prst="rect">
+              <a:avLst/>
+            </a:prstGeom>
+            <a:noFill/>
+          </p:spPr>
+          <p:txBody>
+            <a:bodyPr wrap="square" rtlCol="0">
+              <a:spAutoFit/>
+            </a:bodyPr>
+            <a:lstStyle/>
+            <a:p>
+              <a:r>
+                <a:rPr lang="en-GB" sz="1600" dirty="0">
+                  <a:solidFill>
+                    <a:prstClr val="black"/>
+                  </a:solidFill>
+                  <a:latin typeface="Arial" panose="020B0604020202020204" pitchFamily="34" charset="0"/>
+                  <a:cs typeface="Arial" panose="020B0604020202020204" pitchFamily="34" charset="0"/>
+                </a:rPr>
+                <a:t>t</a:t>
+              </a:r>
+            </a:p>
+          </p:txBody>
+        </p:sp>
+        <p:sp>
+          <p:nvSpPr>
+            <p:cNvPr id="58" name="TextBox 57">
+              <a:extLst>
+                <a:ext uri="{FF2B5EF4-FFF2-40B4-BE49-F238E27FC236}">
+                  <a16:creationId xmlns:a16="http://schemas.microsoft.com/office/drawing/2014/main" id="{1A487635-473D-4892-A033-4896FE19A01E}"/>
+                </a:ext>
+              </a:extLst>
+            </p:cNvPr>
+            <p:cNvSpPr txBox="1"/>
+            <p:nvPr/>
+          </p:nvSpPr>
+          <p:spPr>
+            <a:xfrm rot="16200000">
+              <a:off x="-438127" y="5347277"/>
+              <a:ext cx="1508718" cy="390456"/>
+            </a:xfrm>
+            <a:prstGeom prst="rect">
+              <a:avLst/>
+            </a:prstGeom>
+            <a:noFill/>
+          </p:spPr>
+          <p:txBody>
+            <a:bodyPr wrap="square" rtlCol="0">
+              <a:spAutoFit/>
+            </a:bodyPr>
+            <a:lstStyle/>
+            <a:p>
+              <a:r>
+                <a:rPr lang="en-GB" sz="1400" dirty="0">
+                  <a:solidFill>
+                    <a:prstClr val="black"/>
+                  </a:solidFill>
+                  <a:latin typeface="Arial" panose="020B0604020202020204" pitchFamily="34" charset="0"/>
+                  <a:cs typeface="Arial" panose="020B0604020202020204" pitchFamily="34" charset="0"/>
+                </a:rPr>
+                <a:t>filling level</a:t>
+              </a:r>
+            </a:p>
+          </p:txBody>
+        </p:sp>
+        <p:cxnSp>
+          <p:nvCxnSpPr>
+            <p:cNvPr id="60" name="Straight Connector 59">
+              <a:extLst>
+                <a:ext uri="{FF2B5EF4-FFF2-40B4-BE49-F238E27FC236}">
+                  <a16:creationId xmlns:a16="http://schemas.microsoft.com/office/drawing/2014/main" id="{5456614E-F21C-4F9F-A1A1-85186DED03EB}"/>
+                </a:ext>
+              </a:extLst>
+            </p:cNvPr>
+            <p:cNvCxnSpPr>
+              <a:cxnSpLocks/>
+            </p:cNvCxnSpPr>
+            <p:nvPr/>
+          </p:nvCxnSpPr>
+          <p:spPr>
+            <a:xfrm>
+              <a:off x="473048" y="4950627"/>
+              <a:ext cx="0" cy="1260000"/>
+            </a:xfrm>
+            <a:prstGeom prst="line">
+              <a:avLst/>
+            </a:prstGeom>
+            <a:noFill/>
+            <a:ln w="25400" cap="flat" cmpd="sng" algn="ctr">
+              <a:solidFill>
+                <a:sysClr val="windowText" lastClr="000000"/>
+              </a:solidFill>
+              <a:prstDash val="solid"/>
+              <a:miter lim="800000"/>
+              <a:headEnd type="arrow"/>
+            </a:ln>
+            <a:effectLst/>
+          </p:spPr>
+        </p:cxnSp>
+        <p:sp>
+          <p:nvSpPr>
+            <p:cNvPr id="61" name="TextBox 60">
+              <a:extLst>
+                <a:ext uri="{FF2B5EF4-FFF2-40B4-BE49-F238E27FC236}">
+                  <a16:creationId xmlns:a16="http://schemas.microsoft.com/office/drawing/2014/main" id="{4F5EADA1-1A6F-485B-A16F-1A4399D7969A}"/>
+                </a:ext>
+              </a:extLst>
+            </p:cNvPr>
+            <p:cNvSpPr txBox="1"/>
+            <p:nvPr/>
+          </p:nvSpPr>
+          <p:spPr>
+            <a:xfrm>
+              <a:off x="7257221" y="5016277"/>
+              <a:ext cx="1712898" cy="1212423"/>
+            </a:xfrm>
+            <a:prstGeom prst="rect">
+              <a:avLst/>
+            </a:prstGeom>
+            <a:noFill/>
+          </p:spPr>
+          <p:txBody>
+            <a:bodyPr wrap="square" rtlCol="0">
+              <a:spAutoFit/>
+            </a:bodyPr>
+            <a:lstStyle/>
+            <a:p>
+              <a:r>
+                <a:rPr lang="en-GB" sz="1600" dirty="0">
+                  <a:solidFill>
+                    <a:prstClr val="white">
+                      <a:lumMod val="50000"/>
+                    </a:prstClr>
+                  </a:solidFill>
+                  <a:latin typeface="Arial" panose="020B0604020202020204" pitchFamily="34" charset="0"/>
+                  <a:cs typeface="Arial" panose="020B0604020202020204" pitchFamily="34" charset="0"/>
+                </a:rPr>
+                <a:t>storage energy capacity</a:t>
+              </a:r>
+            </a:p>
+          </p:txBody>
+        </p:sp>
+        <p:cxnSp>
+          <p:nvCxnSpPr>
+            <p:cNvPr id="62" name="Straight Connector 61">
+              <a:extLst>
+                <a:ext uri="{FF2B5EF4-FFF2-40B4-BE49-F238E27FC236}">
+                  <a16:creationId xmlns:a16="http://schemas.microsoft.com/office/drawing/2014/main" id="{D829283F-F61B-47E5-861D-E0A108AD2DD2}"/>
+                </a:ext>
+              </a:extLst>
+            </p:cNvPr>
+            <p:cNvCxnSpPr>
+              <a:cxnSpLocks/>
+            </p:cNvCxnSpPr>
+            <p:nvPr/>
+          </p:nvCxnSpPr>
+          <p:spPr>
+            <a:xfrm>
+              <a:off x="7200293" y="5345249"/>
+              <a:ext cx="0" cy="864000"/>
+            </a:xfrm>
+            <a:prstGeom prst="line">
+              <a:avLst/>
+            </a:prstGeom>
+            <a:noFill/>
+            <a:ln w="25400" cap="flat" cmpd="sng" algn="ctr">
+              <a:solidFill>
+                <a:sysClr val="window" lastClr="FFFFFF">
+                  <a:lumMod val="50000"/>
+                </a:sysClr>
+              </a:solidFill>
+              <a:prstDash val="solid"/>
+              <a:miter lim="800000"/>
+              <a:headEnd type="arrow"/>
+              <a:tailEnd type="arrow"/>
+            </a:ln>
+            <a:effectLst/>
+          </p:spPr>
+        </p:cxnSp>
+        <p:sp>
+          <p:nvSpPr>
+            <p:cNvPr id="64" name="TextBox 63">
+              <a:extLst>
+                <a:ext uri="{FF2B5EF4-FFF2-40B4-BE49-F238E27FC236}">
+                  <a16:creationId xmlns:a16="http://schemas.microsoft.com/office/drawing/2014/main" id="{9DDAA31C-DA32-4DCD-8172-0FCFDDA7E429}"/>
+                </a:ext>
+              </a:extLst>
+            </p:cNvPr>
+            <p:cNvSpPr txBox="1"/>
+            <p:nvPr/>
+          </p:nvSpPr>
+          <p:spPr>
+            <a:xfrm>
+              <a:off x="7649448" y="6190590"/>
+              <a:ext cx="369332" cy="538855"/>
+            </a:xfrm>
+            <a:prstGeom prst="rect">
+              <a:avLst/>
+            </a:prstGeom>
+            <a:noFill/>
+          </p:spPr>
+          <p:txBody>
+            <a:bodyPr wrap="square" rtlCol="0">
+              <a:spAutoFit/>
+            </a:bodyPr>
+            <a:lstStyle/>
+            <a:p>
+              <a:r>
+                <a:rPr lang="en-GB" dirty="0">
+                  <a:solidFill>
+                    <a:prstClr val="black"/>
+                  </a:solidFill>
+                  <a:latin typeface="Calibri" panose="020F0502020204030204"/>
+                </a:rPr>
+                <a:t>t</a:t>
+              </a:r>
+            </a:p>
+          </p:txBody>
+        </p:sp>
+        <p:cxnSp>
+          <p:nvCxnSpPr>
+            <p:cNvPr id="65" name="Straight Connector 64">
+              <a:extLst>
+                <a:ext uri="{FF2B5EF4-FFF2-40B4-BE49-F238E27FC236}">
+                  <a16:creationId xmlns:a16="http://schemas.microsoft.com/office/drawing/2014/main" id="{BF834811-5CCE-43C7-B24F-370072283EDC}"/>
+                </a:ext>
+              </a:extLst>
+            </p:cNvPr>
+            <p:cNvCxnSpPr>
+              <a:cxnSpLocks/>
+            </p:cNvCxnSpPr>
+            <p:nvPr/>
+          </p:nvCxnSpPr>
+          <p:spPr>
+            <a:xfrm>
+              <a:off x="2679586" y="3301190"/>
+              <a:ext cx="0" cy="2880000"/>
+            </a:xfrm>
+            <a:prstGeom prst="line">
+              <a:avLst/>
+            </a:prstGeom>
+            <a:noFill/>
+            <a:ln w="25400" cap="flat" cmpd="sng" algn="ctr">
+              <a:solidFill>
+                <a:sysClr val="window" lastClr="FFFFFF">
+                  <a:lumMod val="65000"/>
+                </a:sysClr>
+              </a:solidFill>
+              <a:prstDash val="dash"/>
+              <a:miter lim="800000"/>
+              <a:headEnd type="none"/>
+            </a:ln>
+            <a:effectLst/>
+          </p:spPr>
+        </p:cxnSp>
+        <p:cxnSp>
+          <p:nvCxnSpPr>
+            <p:cNvPr id="66" name="Straight Connector 65">
+              <a:extLst>
+                <a:ext uri="{FF2B5EF4-FFF2-40B4-BE49-F238E27FC236}">
+                  <a16:creationId xmlns:a16="http://schemas.microsoft.com/office/drawing/2014/main" id="{BE6B98AD-EC4D-4988-9B8A-1EC810DEF705}"/>
+                </a:ext>
+              </a:extLst>
+            </p:cNvPr>
+            <p:cNvCxnSpPr>
+              <a:cxnSpLocks/>
+            </p:cNvCxnSpPr>
+            <p:nvPr/>
+          </p:nvCxnSpPr>
+          <p:spPr>
+            <a:xfrm>
+              <a:off x="4703913" y="3301190"/>
+              <a:ext cx="0" cy="2880001"/>
+            </a:xfrm>
+            <a:prstGeom prst="line">
+              <a:avLst/>
+            </a:prstGeom>
+            <a:noFill/>
+            <a:ln w="25400" cap="flat" cmpd="sng" algn="ctr">
+              <a:solidFill>
+                <a:sysClr val="window" lastClr="FFFFFF">
+                  <a:lumMod val="65000"/>
+                </a:sysClr>
+              </a:solidFill>
+              <a:prstDash val="dash"/>
+              <a:miter lim="800000"/>
+              <a:headEnd type="none"/>
+            </a:ln>
+            <a:effectLst/>
+          </p:spPr>
+        </p:cxnSp>
+        <p:cxnSp>
+          <p:nvCxnSpPr>
+            <p:cNvPr id="67" name="Straight Connector 66">
+              <a:extLst>
+                <a:ext uri="{FF2B5EF4-FFF2-40B4-BE49-F238E27FC236}">
+                  <a16:creationId xmlns:a16="http://schemas.microsoft.com/office/drawing/2014/main" id="{E2BA5D61-6E1F-4139-9412-4F5115D7D011}"/>
+                </a:ext>
+              </a:extLst>
+            </p:cNvPr>
+            <p:cNvCxnSpPr>
+              <a:cxnSpLocks/>
+            </p:cNvCxnSpPr>
+            <p:nvPr/>
+          </p:nvCxnSpPr>
+          <p:spPr>
+            <a:xfrm>
+              <a:off x="1552124" y="3432181"/>
+              <a:ext cx="0" cy="2880000"/>
+            </a:xfrm>
+            <a:prstGeom prst="line">
+              <a:avLst/>
+            </a:prstGeom>
+            <a:noFill/>
+            <a:ln w="25400" cap="flat" cmpd="sng" algn="ctr">
+              <a:solidFill>
+                <a:sysClr val="window" lastClr="FFFFFF">
+                  <a:lumMod val="65000"/>
+                </a:sysClr>
+              </a:solidFill>
+              <a:prstDash val="dash"/>
+              <a:miter lim="800000"/>
+              <a:headEnd type="none"/>
+            </a:ln>
+            <a:effectLst/>
+          </p:spPr>
+        </p:cxnSp>
+        <p:cxnSp>
+          <p:nvCxnSpPr>
+            <p:cNvPr id="68" name="Straight Connector 67">
+              <a:extLst>
+                <a:ext uri="{FF2B5EF4-FFF2-40B4-BE49-F238E27FC236}">
+                  <a16:creationId xmlns:a16="http://schemas.microsoft.com/office/drawing/2014/main" id="{4F986413-5720-4307-B47D-F7C6142F77E2}"/>
+                </a:ext>
+              </a:extLst>
+            </p:cNvPr>
+            <p:cNvCxnSpPr>
+              <a:cxnSpLocks/>
+            </p:cNvCxnSpPr>
+            <p:nvPr/>
+          </p:nvCxnSpPr>
+          <p:spPr>
+            <a:xfrm>
+              <a:off x="3649064" y="3276774"/>
+              <a:ext cx="0" cy="2880001"/>
+            </a:xfrm>
+            <a:prstGeom prst="line">
+              <a:avLst/>
+            </a:prstGeom>
+            <a:noFill/>
+            <a:ln w="25400" cap="flat" cmpd="sng" algn="ctr">
+              <a:solidFill>
+                <a:sysClr val="window" lastClr="FFFFFF">
+                  <a:lumMod val="65000"/>
+                </a:sysClr>
+              </a:solidFill>
+              <a:prstDash val="dash"/>
+              <a:miter lim="800000"/>
+              <a:headEnd type="none"/>
+            </a:ln>
+            <a:effectLst/>
+          </p:spPr>
+        </p:cxnSp>
+        <p:cxnSp>
+          <p:nvCxnSpPr>
+            <p:cNvPr id="69" name="Straight Connector 68">
+              <a:extLst>
+                <a:ext uri="{FF2B5EF4-FFF2-40B4-BE49-F238E27FC236}">
+                  <a16:creationId xmlns:a16="http://schemas.microsoft.com/office/drawing/2014/main" id="{02A3691B-CD94-4438-A8C1-4BE2C658810A}"/>
+                </a:ext>
+              </a:extLst>
+            </p:cNvPr>
+            <p:cNvCxnSpPr>
+              <a:cxnSpLocks/>
+            </p:cNvCxnSpPr>
+            <p:nvPr/>
+          </p:nvCxnSpPr>
+          <p:spPr>
+            <a:xfrm>
+              <a:off x="5754391" y="3301190"/>
+              <a:ext cx="0" cy="2880001"/>
+            </a:xfrm>
+            <a:prstGeom prst="line">
+              <a:avLst/>
+            </a:prstGeom>
+            <a:noFill/>
+            <a:ln w="25400" cap="flat" cmpd="sng" algn="ctr">
+              <a:solidFill>
+                <a:sysClr val="window" lastClr="FFFFFF">
+                  <a:lumMod val="65000"/>
+                </a:sysClr>
+              </a:solidFill>
+              <a:prstDash val="dash"/>
+              <a:miter lim="800000"/>
+              <a:headEnd type="none"/>
+            </a:ln>
+            <a:effectLst/>
+          </p:spPr>
+        </p:cxnSp>
+        <p:sp>
+          <p:nvSpPr>
+            <p:cNvPr id="70" name="Rectangle 69">
+              <a:extLst>
+                <a:ext uri="{FF2B5EF4-FFF2-40B4-BE49-F238E27FC236}">
+                  <a16:creationId xmlns:a16="http://schemas.microsoft.com/office/drawing/2014/main" id="{C3F5C3D6-9580-4DA0-B47A-6CA759330491}"/>
+                </a:ext>
+              </a:extLst>
+            </p:cNvPr>
+            <p:cNvSpPr/>
+            <p:nvPr/>
+          </p:nvSpPr>
+          <p:spPr>
+            <a:xfrm>
+              <a:off x="2477387" y="6216485"/>
+              <a:ext cx="2636873" cy="1075306"/>
+            </a:xfrm>
+            <a:prstGeom prst="rect">
+              <a:avLst/>
+            </a:prstGeom>
+            <a:solidFill>
+              <a:sysClr val="window" lastClr="FFFFFF"/>
+            </a:solidFill>
+            <a:ln w="12700" cap="flat" cmpd="sng" algn="ctr">
+              <a:noFill/>
+              <a:prstDash val="solid"/>
+              <a:miter lim="800000"/>
+            </a:ln>
+            <a:effectLst/>
+          </p:spPr>
+          <p:txBody>
+            <a:bodyPr rtlCol="0" anchor="ctr"/>
+            <a:lstStyle/>
+            <a:p>
+              <a:pPr algn="ctr">
+                <a:defRPr/>
+              </a:pPr>
+              <a:endParaRPr lang="en-GB" kern="0">
+                <a:solidFill>
+                  <a:prstClr val="white"/>
+                </a:solidFill>
+                <a:latin typeface="Calibri" panose="020F0502020204030204"/>
+              </a:endParaRPr>
+            </a:p>
+          </p:txBody>
+        </p:sp>
+        <p:sp>
+          <p:nvSpPr>
+            <p:cNvPr id="73" name="Rectangle 72">
+              <a:extLst>
+                <a:ext uri="{FF2B5EF4-FFF2-40B4-BE49-F238E27FC236}">
+                  <a16:creationId xmlns:a16="http://schemas.microsoft.com/office/drawing/2014/main" id="{5875E058-74D9-44AB-9569-CCE63189752D}"/>
+                </a:ext>
+              </a:extLst>
+            </p:cNvPr>
+            <p:cNvSpPr/>
+            <p:nvPr/>
+          </p:nvSpPr>
+          <p:spPr>
+            <a:xfrm>
+              <a:off x="4518646" y="6242126"/>
+              <a:ext cx="5008645" cy="1075306"/>
+            </a:xfrm>
+            <a:prstGeom prst="rect">
+              <a:avLst/>
+            </a:prstGeom>
+            <a:solidFill>
+              <a:sysClr val="window" lastClr="FFFFFF"/>
+            </a:solidFill>
+            <a:ln w="12700" cap="flat" cmpd="sng" algn="ctr">
+              <a:noFill/>
+              <a:prstDash val="solid"/>
+              <a:miter lim="800000"/>
+            </a:ln>
+            <a:effectLst/>
+          </p:spPr>
+          <p:txBody>
+            <a:bodyPr rtlCol="0" anchor="ctr"/>
+            <a:lstStyle/>
+            <a:p>
+              <a:pPr algn="ctr">
+                <a:defRPr/>
+              </a:pPr>
+              <a:endParaRPr lang="en-GB" kern="0">
+                <a:solidFill>
+                  <a:prstClr val="white"/>
+                </a:solidFill>
+                <a:latin typeface="Calibri" panose="020F0502020204030204"/>
+              </a:endParaRPr>
+            </a:p>
+          </p:txBody>
+        </p:sp>
+        <p:cxnSp>
+          <p:nvCxnSpPr>
+            <p:cNvPr id="74" name="Straight Connector 73">
+              <a:extLst>
+                <a:ext uri="{FF2B5EF4-FFF2-40B4-BE49-F238E27FC236}">
+                  <a16:creationId xmlns:a16="http://schemas.microsoft.com/office/drawing/2014/main" id="{1F6F0A8F-5103-45BE-BE18-4CCB30E93579}"/>
+                </a:ext>
+              </a:extLst>
+            </p:cNvPr>
+            <p:cNvCxnSpPr>
+              <a:cxnSpLocks/>
+            </p:cNvCxnSpPr>
+            <p:nvPr/>
+          </p:nvCxnSpPr>
+          <p:spPr>
+            <a:xfrm flipH="1">
+              <a:off x="439809" y="6359834"/>
+              <a:ext cx="1080000" cy="0"/>
+            </a:xfrm>
+            <a:prstGeom prst="line">
+              <a:avLst/>
+            </a:prstGeom>
+            <a:noFill/>
+            <a:ln w="25400" cap="flat" cmpd="sng" algn="ctr">
+              <a:solidFill>
+                <a:sysClr val="window" lastClr="FFFFFF">
+                  <a:lumMod val="50000"/>
+                </a:sysClr>
+              </a:solidFill>
+              <a:prstDash val="solid"/>
+              <a:miter lim="800000"/>
+              <a:headEnd type="arrow"/>
+              <a:tailEnd type="arrow"/>
+            </a:ln>
+            <a:effectLst/>
+          </p:spPr>
+        </p:cxnSp>
+        <p:sp>
+          <p:nvSpPr>
+            <p:cNvPr id="75" name="TextBox 74">
+              <a:extLst>
+                <a:ext uri="{FF2B5EF4-FFF2-40B4-BE49-F238E27FC236}">
+                  <a16:creationId xmlns:a16="http://schemas.microsoft.com/office/drawing/2014/main" id="{5FFC45D9-9494-45EC-9E0F-1860095584F7}"/>
+                </a:ext>
+              </a:extLst>
+            </p:cNvPr>
+            <p:cNvSpPr txBox="1"/>
+            <p:nvPr/>
+          </p:nvSpPr>
+          <p:spPr>
+            <a:xfrm>
+              <a:off x="697981" y="6403508"/>
+              <a:ext cx="821829" cy="415367"/>
+            </a:xfrm>
+            <a:prstGeom prst="rect">
+              <a:avLst/>
+            </a:prstGeom>
+            <a:noFill/>
+          </p:spPr>
+          <p:txBody>
+            <a:bodyPr wrap="square" rtlCol="0">
+              <a:spAutoFit/>
+            </a:bodyPr>
+            <a:lstStyle/>
+            <a:p>
+              <a:pPr>
+                <a:lnSpc>
+                  <a:spcPts val="1500"/>
+                </a:lnSpc>
+              </a:pPr>
+              <a:r>
+                <a:rPr lang="en-GB" sz="1600" dirty="0">
+                  <a:solidFill>
+                    <a:prstClr val="white">
+                      <a:lumMod val="50000"/>
+                    </a:prstClr>
+                  </a:solidFill>
+                  <a:latin typeface="Arial" panose="020B0604020202020204" pitchFamily="34" charset="0"/>
+                  <a:cs typeface="Arial" panose="020B0604020202020204" pitchFamily="34" charset="0"/>
+                </a:rPr>
+                <a:t>T/2</a:t>
+              </a:r>
+            </a:p>
+          </p:txBody>
+        </p:sp>
+        <p:sp>
+          <p:nvSpPr>
+            <p:cNvPr id="76" name="TextBox 75">
+              <a:extLst>
+                <a:ext uri="{FF2B5EF4-FFF2-40B4-BE49-F238E27FC236}">
+                  <a16:creationId xmlns:a16="http://schemas.microsoft.com/office/drawing/2014/main" id="{12556A72-79F8-4278-892A-599439A84EBB}"/>
+                </a:ext>
+              </a:extLst>
+            </p:cNvPr>
+            <p:cNvSpPr txBox="1"/>
+            <p:nvPr/>
+          </p:nvSpPr>
+          <p:spPr>
+            <a:xfrm>
+              <a:off x="7656823" y="6209896"/>
+              <a:ext cx="369332" cy="493950"/>
+            </a:xfrm>
+            <a:prstGeom prst="rect">
+              <a:avLst/>
+            </a:prstGeom>
+            <a:noFill/>
+          </p:spPr>
+          <p:txBody>
+            <a:bodyPr wrap="square" rtlCol="0">
+              <a:spAutoFit/>
+            </a:bodyPr>
+            <a:lstStyle/>
+            <a:p>
+              <a:r>
+                <a:rPr lang="en-GB" sz="1600" dirty="0">
+                  <a:solidFill>
+                    <a:prstClr val="black"/>
+                  </a:solidFill>
+                  <a:latin typeface="Arial" panose="020B0604020202020204" pitchFamily="34" charset="0"/>
+                  <a:cs typeface="Arial" panose="020B0604020202020204" pitchFamily="34" charset="0"/>
+                </a:rPr>
+                <a:t>t</a:t>
+              </a:r>
+            </a:p>
+          </p:txBody>
+        </p:sp>
+        <p:cxnSp>
+          <p:nvCxnSpPr>
+            <p:cNvPr id="77" name="Straight Connector 76">
+              <a:extLst>
+                <a:ext uri="{FF2B5EF4-FFF2-40B4-BE49-F238E27FC236}">
+                  <a16:creationId xmlns:a16="http://schemas.microsoft.com/office/drawing/2014/main" id="{18871FF6-0BBD-4684-9C0B-0A26ECD6D0D2}"/>
+                </a:ext>
+              </a:extLst>
+            </p:cNvPr>
+            <p:cNvCxnSpPr>
+              <a:cxnSpLocks/>
+            </p:cNvCxnSpPr>
+            <p:nvPr/>
+          </p:nvCxnSpPr>
+          <p:spPr>
+            <a:xfrm flipH="1">
+              <a:off x="458780" y="6228700"/>
+              <a:ext cx="7560000" cy="0"/>
+            </a:xfrm>
+            <a:prstGeom prst="line">
+              <a:avLst/>
+            </a:prstGeom>
+            <a:noFill/>
+            <a:ln w="25400" cap="flat" cmpd="sng" algn="ctr">
+              <a:solidFill>
+                <a:sysClr val="windowText" lastClr="000000"/>
+              </a:solidFill>
+              <a:prstDash val="solid"/>
+              <a:miter lim="800000"/>
+              <a:headEnd type="arrow"/>
+            </a:ln>
+            <a:effectLst/>
+          </p:spPr>
+        </p:cxnSp>
+        <mc:AlternateContent xmlns:mc="http://schemas.openxmlformats.org/markup-compatibility/2006" xmlns:a14="http://schemas.microsoft.com/office/drawing/2010/main">
+          <mc:Choice Requires="a14">
+            <p:sp>
+              <p:nvSpPr>
+                <p:cNvPr id="78" name="TextBox 77">
+                  <a:extLst>
+                    <a:ext uri="{FF2B5EF4-FFF2-40B4-BE49-F238E27FC236}">
+                      <a16:creationId xmlns:a16="http://schemas.microsoft.com/office/drawing/2014/main" id="{9BB879D5-8A11-48D7-8860-257C914D40FD}"/>
+                    </a:ext>
+                  </a:extLst>
+                </p:cNvPr>
+                <p:cNvSpPr txBox="1"/>
+                <p:nvPr/>
+              </p:nvSpPr>
+              <p:spPr>
+                <a:xfrm>
+                  <a:off x="757087" y="2021895"/>
+                  <a:ext cx="1491828" cy="415367"/>
+                </a:xfrm>
+                <a:prstGeom prst="rect">
+                  <a:avLst/>
+                </a:prstGeom>
+                <a:noFill/>
+              </p:spPr>
+              <p:txBody>
+                <a:bodyPr wrap="square" rtlCol="0">
+                  <a:spAutoFit/>
+                </a:bodyPr>
+                <a:lstStyle/>
+                <a:p>
+                  <a:pPr>
+                    <a:lnSpc>
+                      <a:spcPts val="1500"/>
+                    </a:lnSpc>
+                  </a:pPr>
+                  <a14:m>
+                    <m:oMathPara xmlns:m="http://schemas.openxmlformats.org/officeDocument/2006/math">
+                      <m:oMathParaPr>
+                        <m:jc m:val="centerGroup"/>
+                      </m:oMathParaPr>
+                      <m:oMath xmlns:m="http://schemas.openxmlformats.org/officeDocument/2006/math">
+                        <m:sSub>
+                          <m:sSubPr>
+                            <m:ctrlPr>
+                              <a:rPr lang="el-GR" sz="1600" i="1" dirty="0" smtClean="0">
+                                <a:solidFill>
+                                  <a:srgbClr val="C00000"/>
+                                </a:solidFill>
+                                <a:latin typeface="Cambria Math" panose="02040503050406030204" pitchFamily="18" charset="0"/>
+                                <a:ea typeface="Calibri" panose="020F0502020204030204" pitchFamily="34" charset="0"/>
+                                <a:cs typeface="Times New Roman" panose="02020603050405020304" pitchFamily="18" charset="0"/>
+                              </a:rPr>
+                            </m:ctrlPr>
+                          </m:sSubPr>
+                          <m:e>
+                            <m:r>
+                              <m:rPr>
+                                <m:nor/>
+                              </m:rPr>
+                              <a:rPr lang="el-GR" sz="1600" dirty="0">
+                                <a:solidFill>
+                                  <a:srgbClr val="C00000"/>
+                                </a:solidFill>
+                                <a:ea typeface="Calibri" panose="020F0502020204030204" pitchFamily="34" charset="0"/>
+                                <a:cs typeface="Times New Roman" panose="02020603050405020304" pitchFamily="18" charset="0"/>
+                              </a:rPr>
+                              <m:t>Δ</m:t>
+                            </m:r>
+                          </m:e>
+                          <m:sub>
+                            <m:r>
+                              <a:rPr lang="en-GB" sz="1600" b="0" i="1" dirty="0" smtClean="0">
+                                <a:solidFill>
+                                  <a:srgbClr val="C00000"/>
+                                </a:solidFill>
+                                <a:latin typeface="Cambria Math" panose="02040503050406030204" pitchFamily="18" charset="0"/>
+                                <a:ea typeface="Calibri" panose="020F0502020204030204" pitchFamily="34" charset="0"/>
+                                <a:cs typeface="Times New Roman" panose="02020603050405020304" pitchFamily="18" charset="0"/>
+                              </a:rPr>
+                              <m:t>𝑡</m:t>
+                            </m:r>
+                          </m:sub>
+                        </m:sSub>
+                      </m:oMath>
+                    </m:oMathPara>
+                  </a14:m>
+                  <a:endParaRPr lang="en-GB" sz="1600" dirty="0">
+                    <a:solidFill>
+                      <a:srgbClr val="C00000"/>
+                    </a:solidFill>
+                    <a:latin typeface="Calibri" panose="020F0502020204030204"/>
+                  </a:endParaRPr>
+                </a:p>
+              </p:txBody>
+            </p:sp>
+          </mc:Choice>
+          <mc:Fallback xmlns="">
+            <p:sp>
+              <p:nvSpPr>
+                <p:cNvPr id="78" name="TextBox 77">
+                  <a:extLst>
+                    <a:ext uri="{FF2B5EF4-FFF2-40B4-BE49-F238E27FC236}">
+                      <a16:creationId xmlns:a16="http://schemas.microsoft.com/office/drawing/2014/main" id="{9BB879D5-8A11-48D7-8860-257C914D40FD}"/>
+                    </a:ext>
+                  </a:extLst>
+                </p:cNvPr>
+                <p:cNvSpPr txBox="1">
+                  <a:spLocks noRot="1" noChangeAspect="1" noMove="1" noResize="1" noEditPoints="1" noAdjustHandles="1" noChangeArrowheads="1" noChangeShapeType="1" noTextEdit="1"/>
+                </p:cNvSpPr>
+                <p:nvPr/>
+              </p:nvSpPr>
+              <p:spPr>
+                <a:xfrm>
+                  <a:off x="757087" y="2021895"/>
+                  <a:ext cx="1491828" cy="415367"/>
+                </a:xfrm>
+                <a:prstGeom prst="rect">
+                  <a:avLst/>
+                </a:prstGeom>
+                <a:blipFill>
+                  <a:blip r:embed="rId2"/>
+                  <a:stretch>
+                    <a:fillRect/>
+                  </a:stretch>
+                </a:blipFill>
+              </p:spPr>
+              <p:txBody>
+                <a:bodyPr/>
+                <a:lstStyle/>
+                <a:p>
+                  <a:r>
+                    <a:rPr lang="en-GB">
+                      <a:noFill/>
+                    </a:rPr>
+                    <a:t> </a:t>
+                  </a:r>
+                </a:p>
+              </p:txBody>
+            </p:sp>
+          </mc:Fallback>
+        </mc:AlternateContent>
+        <p:cxnSp>
+          <p:nvCxnSpPr>
+            <p:cNvPr id="79" name="Straight Connector 78">
+              <a:extLst>
+                <a:ext uri="{FF2B5EF4-FFF2-40B4-BE49-F238E27FC236}">
+                  <a16:creationId xmlns:a16="http://schemas.microsoft.com/office/drawing/2014/main" id="{AEAA097C-030A-4F71-BAC5-D7990393F1B9}"/>
+                </a:ext>
+              </a:extLst>
+            </p:cNvPr>
+            <p:cNvCxnSpPr>
+              <a:cxnSpLocks/>
+            </p:cNvCxnSpPr>
+            <p:nvPr/>
+          </p:nvCxnSpPr>
+          <p:spPr>
+            <a:xfrm flipV="1">
+              <a:off x="1231148" y="2339751"/>
+              <a:ext cx="159860" cy="229050"/>
+            </a:xfrm>
+            <a:prstGeom prst="line">
+              <a:avLst/>
+            </a:prstGeom>
+            <a:noFill/>
+            <a:ln w="25400" cap="flat" cmpd="sng" algn="ctr">
+              <a:solidFill>
+                <a:srgbClr val="C00000"/>
+              </a:solidFill>
+              <a:prstDash val="solid"/>
+              <a:miter lim="800000"/>
+              <a:headEnd type="none"/>
+            </a:ln>
+            <a:effectLst/>
+          </p:spPr>
+        </p:cxnSp>
+        <p:sp>
+          <p:nvSpPr>
+            <p:cNvPr id="63" name="TextBox 62">
+              <a:extLst>
+                <a:ext uri="{FF2B5EF4-FFF2-40B4-BE49-F238E27FC236}">
+                  <a16:creationId xmlns:a16="http://schemas.microsoft.com/office/drawing/2014/main" id="{0D2738DA-EAD9-4758-981B-7F3F6966C3FE}"/>
+                </a:ext>
+              </a:extLst>
+            </p:cNvPr>
+            <p:cNvSpPr txBox="1"/>
+            <p:nvPr/>
+          </p:nvSpPr>
+          <p:spPr>
+            <a:xfrm>
+              <a:off x="2799621" y="4350179"/>
+              <a:ext cx="3435275" cy="493950"/>
+            </a:xfrm>
+            <a:prstGeom prst="rect">
+              <a:avLst/>
+            </a:prstGeom>
+            <a:noFill/>
+          </p:spPr>
+          <p:txBody>
+            <a:bodyPr wrap="square" rtlCol="0">
+              <a:spAutoFit/>
+            </a:bodyPr>
+            <a:lstStyle/>
+            <a:p>
+              <a:r>
+                <a:rPr lang="en-GB" sz="1600" b="1" dirty="0">
+                  <a:solidFill>
+                    <a:prstClr val="black"/>
+                  </a:solidFill>
+                  <a:latin typeface="Arial" panose="020B0604020202020204" pitchFamily="34" charset="0"/>
+                  <a:cs typeface="Arial" panose="020B0604020202020204" pitchFamily="34" charset="0"/>
+                </a:rPr>
+                <a:t>Storage energy level</a:t>
+              </a:r>
+            </a:p>
+          </p:txBody>
+        </p:sp>
+      </p:grpSp>
+      <p:grpSp>
+        <p:nvGrpSpPr>
+          <p:cNvPr id="80" name="Group 79">
+            <a:extLst>
+              <a:ext uri="{FF2B5EF4-FFF2-40B4-BE49-F238E27FC236}">
+                <a16:creationId xmlns:a16="http://schemas.microsoft.com/office/drawing/2014/main" id="{EB248C3C-E5B8-4EDB-A1F1-B6A4EC491A93}"/>
+              </a:ext>
+            </a:extLst>
+          </p:cNvPr>
+          <p:cNvGrpSpPr/>
+          <p:nvPr/>
+        </p:nvGrpSpPr>
+        <p:grpSpPr>
+          <a:xfrm>
+            <a:off x="249943" y="19362"/>
+            <a:ext cx="6332345" cy="2018179"/>
+            <a:chOff x="611083" y="3581950"/>
+            <a:chExt cx="8187308" cy="2750545"/>
+          </a:xfrm>
+        </p:grpSpPr>
+        <mc:AlternateContent xmlns:mc="http://schemas.openxmlformats.org/markup-compatibility/2006" xmlns:a14="http://schemas.microsoft.com/office/drawing/2010/main">
+          <mc:Choice Requires="a14">
+            <p:sp>
+              <p:nvSpPr>
+                <p:cNvPr id="83" name="TextBox 82">
+                  <a:extLst>
+                    <a:ext uri="{FF2B5EF4-FFF2-40B4-BE49-F238E27FC236}">
+                      <a16:creationId xmlns:a16="http://schemas.microsoft.com/office/drawing/2014/main" id="{7BD44142-0022-47AF-B29F-356ED42CB1D9}"/>
+                    </a:ext>
+                  </a:extLst>
+                </p:cNvPr>
+                <p:cNvSpPr txBox="1"/>
+                <p:nvPr/>
+              </p:nvSpPr>
+              <p:spPr>
+                <a:xfrm>
+                  <a:off x="5627919" y="3756579"/>
+                  <a:ext cx="517382" cy="388004"/>
+                </a:xfrm>
+                <a:prstGeom prst="rect">
+                  <a:avLst/>
+                </a:prstGeom>
+                <a:noFill/>
+              </p:spPr>
+              <p:txBody>
+                <a:bodyPr wrap="square" rtlCol="0">
+                  <a:spAutoFit/>
+                </a:bodyPr>
+                <a:lstStyle/>
+                <a:p>
+                  <a:pPr fontAlgn="base">
+                    <a:lnSpc>
+                      <a:spcPts val="1500"/>
+                    </a:lnSpc>
+                    <a:spcBef>
+                      <a:spcPct val="0"/>
+                    </a:spcBef>
+                    <a:spcAft>
+                      <a:spcPct val="0"/>
+                    </a:spcAft>
+                  </a:pPr>
+                  <a14:m>
+                    <m:oMathPara xmlns:m="http://schemas.openxmlformats.org/officeDocument/2006/math">
+                      <m:oMathParaPr>
+                        <m:jc m:val="centerGroup"/>
+                      </m:oMathParaPr>
+                      <m:oMath xmlns:m="http://schemas.openxmlformats.org/officeDocument/2006/math">
+                        <m:sSubSup>
+                          <m:sSubSupPr>
+                            <m:ctrlPr>
+                              <a:rPr lang="en-GB" sz="1600" i="1" smtClean="0">
+                                <a:solidFill>
+                                  <a:schemeClr val="bg1">
+                                    <a:lumMod val="50000"/>
+                                  </a:schemeClr>
+                                </a:solidFill>
+                                <a:latin typeface="Cambria Math" panose="02040503050406030204" pitchFamily="18" charset="0"/>
+                                <a:ea typeface="Calibri" panose="020F0502020204030204" pitchFamily="34" charset="0"/>
+                                <a:cs typeface="Times New Roman" panose="02020603050405020304" pitchFamily="18" charset="0"/>
+                              </a:rPr>
+                            </m:ctrlPr>
+                          </m:sSubSupPr>
+                          <m:e>
+                            <m:r>
+                              <a:rPr lang="en-GB" sz="1600" b="0" i="1" smtClean="0">
+                                <a:solidFill>
+                                  <a:schemeClr val="bg1">
+                                    <a:lumMod val="50000"/>
+                                  </a:schemeClr>
+                                </a:solidFill>
+                                <a:latin typeface="Cambria Math" panose="02040503050406030204" pitchFamily="18" charset="0"/>
+                                <a:ea typeface="Calibri" panose="020F0502020204030204" pitchFamily="34" charset="0"/>
+                                <a:cs typeface="Times New Roman" panose="02020603050405020304" pitchFamily="18" charset="0"/>
+                              </a:rPr>
+                              <m:t>𝑔</m:t>
+                            </m:r>
+                          </m:e>
+                          <m:sub>
+                            <m:r>
+                              <a:rPr lang="en-GB" sz="1600" b="0" i="1" smtClean="0">
+                                <a:solidFill>
+                                  <a:schemeClr val="bg1">
+                                    <a:lumMod val="50000"/>
+                                  </a:schemeClr>
+                                </a:solidFill>
+                                <a:latin typeface="Cambria Math" panose="02040503050406030204" pitchFamily="18" charset="0"/>
+                                <a:ea typeface="Calibri" panose="020F0502020204030204" pitchFamily="34" charset="0"/>
+                                <a:cs typeface="Times New Roman" panose="02020603050405020304" pitchFamily="18" charset="0"/>
+                              </a:rPr>
+                              <m:t>𝑡</m:t>
+                            </m:r>
+                          </m:sub>
+                          <m:sup>
+                            <m:r>
+                              <a:rPr lang="en-GB" sz="1600" b="0" i="1" smtClean="0">
+                                <a:solidFill>
+                                  <a:schemeClr val="bg1">
+                                    <a:lumMod val="50000"/>
+                                  </a:schemeClr>
+                                </a:solidFill>
+                                <a:latin typeface="Cambria Math" panose="02040503050406030204" pitchFamily="18" charset="0"/>
+                                <a:ea typeface="Calibri" panose="020F0502020204030204" pitchFamily="34" charset="0"/>
+                                <a:cs typeface="Times New Roman" panose="02020603050405020304" pitchFamily="18" charset="0"/>
+                              </a:rPr>
+                              <m:t>𝑅</m:t>
+                            </m:r>
+                          </m:sup>
+                        </m:sSubSup>
+                      </m:oMath>
+                    </m:oMathPara>
+                  </a14:m>
+                  <a:endParaRPr lang="en-GB" sz="1600" dirty="0">
+                    <a:solidFill>
+                      <a:srgbClr val="64A4D9"/>
+                    </a:solidFill>
+                    <a:latin typeface="Arial" panose="020B0604020202020204" pitchFamily="34" charset="0"/>
+                    <a:cs typeface="Arial" panose="020B0604020202020204" pitchFamily="34" charset="0"/>
+                  </a:endParaRPr>
+                </a:p>
+              </p:txBody>
+            </p:sp>
+          </mc:Choice>
+          <mc:Fallback xmlns="">
+            <p:sp>
+              <p:nvSpPr>
+                <p:cNvPr id="83" name="TextBox 82">
+                  <a:extLst>
+                    <a:ext uri="{FF2B5EF4-FFF2-40B4-BE49-F238E27FC236}">
+                      <a16:creationId xmlns:a16="http://schemas.microsoft.com/office/drawing/2014/main" id="{7BD44142-0022-47AF-B29F-356ED42CB1D9}"/>
+                    </a:ext>
+                  </a:extLst>
+                </p:cNvPr>
+                <p:cNvSpPr txBox="1">
+                  <a:spLocks noRot="1" noChangeAspect="1" noMove="1" noResize="1" noEditPoints="1" noAdjustHandles="1" noChangeArrowheads="1" noChangeShapeType="1" noTextEdit="1"/>
+                </p:cNvSpPr>
+                <p:nvPr/>
+              </p:nvSpPr>
+              <p:spPr>
+                <a:xfrm>
+                  <a:off x="5627919" y="3756579"/>
+                  <a:ext cx="517382" cy="388004"/>
+                </a:xfrm>
+                <a:prstGeom prst="rect">
+                  <a:avLst/>
+                </a:prstGeom>
+                <a:blipFill>
+                  <a:blip r:embed="rId3"/>
+                  <a:stretch>
+                    <a:fillRect b="-8511"/>
+                  </a:stretch>
+                </a:blipFill>
+              </p:spPr>
+              <p:txBody>
+                <a:bodyPr/>
+                <a:lstStyle/>
+                <a:p>
+                  <a:r>
+                    <a:rPr lang="en-GB">
+                      <a:noFill/>
+                    </a:rPr>
+                    <a:t> </a:t>
+                  </a:r>
+                </a:p>
+              </p:txBody>
+            </p:sp>
+          </mc:Fallback>
+        </mc:AlternateContent>
+        <p:cxnSp>
+          <p:nvCxnSpPr>
+            <p:cNvPr id="90" name="Straight Connector 89">
+              <a:extLst>
+                <a:ext uri="{FF2B5EF4-FFF2-40B4-BE49-F238E27FC236}">
+                  <a16:creationId xmlns:a16="http://schemas.microsoft.com/office/drawing/2014/main" id="{7F18F408-765D-4CE6-B84D-9E25AAACC017}"/>
+                </a:ext>
+              </a:extLst>
+            </p:cNvPr>
+            <p:cNvCxnSpPr>
+              <a:cxnSpLocks/>
+            </p:cNvCxnSpPr>
+            <p:nvPr/>
+          </p:nvCxnSpPr>
+          <p:spPr>
+            <a:xfrm flipH="1">
+              <a:off x="611083" y="3581950"/>
+              <a:ext cx="15394" cy="2289135"/>
+            </a:xfrm>
+            <a:prstGeom prst="line">
+              <a:avLst/>
+            </a:prstGeom>
+            <a:noFill/>
+            <a:ln w="25400" cap="flat" cmpd="sng" algn="ctr">
+              <a:solidFill>
+                <a:sysClr val="windowText" lastClr="000000"/>
+              </a:solidFill>
+              <a:prstDash val="solid"/>
+              <a:miter lim="800000"/>
+              <a:headEnd type="arrow"/>
+            </a:ln>
+            <a:effectLst/>
+          </p:spPr>
+        </p:cxnSp>
+        <p:cxnSp>
+          <p:nvCxnSpPr>
+            <p:cNvPr id="91" name="Straight Connector 90">
+              <a:extLst>
+                <a:ext uri="{FF2B5EF4-FFF2-40B4-BE49-F238E27FC236}">
+                  <a16:creationId xmlns:a16="http://schemas.microsoft.com/office/drawing/2014/main" id="{94F0850D-B77B-4C4D-AC6A-9E82AAECEA11}"/>
+                </a:ext>
+              </a:extLst>
+            </p:cNvPr>
+            <p:cNvCxnSpPr>
+              <a:cxnSpLocks/>
+            </p:cNvCxnSpPr>
+            <p:nvPr/>
+          </p:nvCxnSpPr>
+          <p:spPr>
+            <a:xfrm flipH="1">
+              <a:off x="612209" y="5894986"/>
+              <a:ext cx="7680032" cy="0"/>
+            </a:xfrm>
+            <a:prstGeom prst="line">
+              <a:avLst/>
+            </a:prstGeom>
+            <a:noFill/>
+            <a:ln w="25400" cap="flat" cmpd="sng" algn="ctr">
+              <a:solidFill>
+                <a:sysClr val="windowText" lastClr="000000"/>
+              </a:solidFill>
+              <a:prstDash val="solid"/>
+              <a:miter lim="800000"/>
+              <a:headEnd type="arrow"/>
+            </a:ln>
+            <a:effectLst/>
+          </p:spPr>
+        </p:cxnSp>
+        <p:sp>
+          <p:nvSpPr>
+            <p:cNvPr id="92" name="TextBox 91">
+              <a:extLst>
+                <a:ext uri="{FF2B5EF4-FFF2-40B4-BE49-F238E27FC236}">
+                  <a16:creationId xmlns:a16="http://schemas.microsoft.com/office/drawing/2014/main" id="{1535928E-DC9E-4C58-8960-72CDD650E0BB}"/>
+                </a:ext>
+              </a:extLst>
+            </p:cNvPr>
+            <p:cNvSpPr txBox="1"/>
+            <p:nvPr/>
+          </p:nvSpPr>
+          <p:spPr>
+            <a:xfrm>
+              <a:off x="7817145" y="5871085"/>
+              <a:ext cx="369332" cy="461410"/>
+            </a:xfrm>
+            <a:prstGeom prst="rect">
+              <a:avLst/>
+            </a:prstGeom>
+            <a:noFill/>
+          </p:spPr>
+          <p:txBody>
+            <a:bodyPr wrap="square" rtlCol="0">
+              <a:spAutoFit/>
+            </a:bodyPr>
+            <a:lstStyle/>
+            <a:p>
+              <a:r>
+                <a:rPr lang="en-GB" sz="1600" dirty="0">
+                  <a:solidFill>
+                    <a:prstClr val="black"/>
+                  </a:solidFill>
+                  <a:latin typeface="Arial" panose="020B0604020202020204" pitchFamily="34" charset="0"/>
+                  <a:cs typeface="Arial" panose="020B0604020202020204" pitchFamily="34" charset="0"/>
+                </a:rPr>
+                <a:t>t</a:t>
+              </a:r>
+            </a:p>
+          </p:txBody>
+        </p:sp>
+        <p:cxnSp>
+          <p:nvCxnSpPr>
+            <p:cNvPr id="93" name="Straight Connector 92">
+              <a:extLst>
+                <a:ext uri="{FF2B5EF4-FFF2-40B4-BE49-F238E27FC236}">
+                  <a16:creationId xmlns:a16="http://schemas.microsoft.com/office/drawing/2014/main" id="{B8860289-6BB0-42E0-9474-3D9D64A9EEF3}"/>
+                </a:ext>
+              </a:extLst>
+            </p:cNvPr>
+            <p:cNvCxnSpPr>
+              <a:cxnSpLocks/>
+            </p:cNvCxnSpPr>
+            <p:nvPr/>
+          </p:nvCxnSpPr>
+          <p:spPr>
+            <a:xfrm flipV="1">
+              <a:off x="5491850" y="4136314"/>
+              <a:ext cx="159860" cy="229049"/>
+            </a:xfrm>
+            <a:prstGeom prst="line">
+              <a:avLst/>
+            </a:prstGeom>
+            <a:noFill/>
+            <a:ln w="25400" cap="flat" cmpd="sng" algn="ctr">
+              <a:solidFill>
+                <a:schemeClr val="bg1">
+                  <a:lumMod val="50000"/>
+                </a:schemeClr>
+              </a:solidFill>
+              <a:prstDash val="solid"/>
+              <a:miter lim="800000"/>
+              <a:headEnd type="none"/>
+            </a:ln>
+            <a:effectLst/>
+          </p:spPr>
+        </p:cxnSp>
+        <p:cxnSp>
+          <p:nvCxnSpPr>
+            <p:cNvPr id="101" name="Straight Connector 100">
+              <a:extLst>
+                <a:ext uri="{FF2B5EF4-FFF2-40B4-BE49-F238E27FC236}">
+                  <a16:creationId xmlns:a16="http://schemas.microsoft.com/office/drawing/2014/main" id="{C6FC08C0-29E2-483E-AEF5-13C768C4E90C}"/>
+                </a:ext>
+              </a:extLst>
+            </p:cNvPr>
+            <p:cNvCxnSpPr>
+              <a:cxnSpLocks/>
+            </p:cNvCxnSpPr>
+            <p:nvPr/>
+          </p:nvCxnSpPr>
+          <p:spPr>
+            <a:xfrm flipH="1">
+              <a:off x="611083" y="4972325"/>
+              <a:ext cx="7560000" cy="0"/>
+            </a:xfrm>
+            <a:prstGeom prst="line">
+              <a:avLst/>
+            </a:prstGeom>
+            <a:noFill/>
+            <a:ln w="38100" cap="flat" cmpd="sng" algn="ctr">
+              <a:solidFill>
+                <a:schemeClr val="tx1"/>
+              </a:solidFill>
+              <a:prstDash val="solid"/>
+              <a:miter lim="800000"/>
+              <a:headEnd type="none"/>
+            </a:ln>
+            <a:effectLst/>
+          </p:spPr>
+        </p:cxnSp>
+        <mc:AlternateContent xmlns:mc="http://schemas.openxmlformats.org/markup-compatibility/2006" xmlns:a14="http://schemas.microsoft.com/office/drawing/2010/main">
+          <mc:Choice Requires="a14">
+            <p:sp>
+              <p:nvSpPr>
+                <p:cNvPr id="102" name="TextBox 101">
+                  <a:extLst>
+                    <a:ext uri="{FF2B5EF4-FFF2-40B4-BE49-F238E27FC236}">
+                      <a16:creationId xmlns:a16="http://schemas.microsoft.com/office/drawing/2014/main" id="{341C268C-AC77-4AC8-ACA1-027AABC41A5D}"/>
+                    </a:ext>
+                  </a:extLst>
+                </p:cNvPr>
+                <p:cNvSpPr txBox="1"/>
+                <p:nvPr/>
+              </p:nvSpPr>
+              <p:spPr>
+                <a:xfrm>
+                  <a:off x="7487223" y="4381236"/>
+                  <a:ext cx="1311168" cy="388004"/>
+                </a:xfrm>
+                <a:prstGeom prst="rect">
+                  <a:avLst/>
+                </a:prstGeom>
+                <a:noFill/>
+              </p:spPr>
+              <p:txBody>
+                <a:bodyPr wrap="square" rtlCol="0">
+                  <a:spAutoFit/>
+                </a:bodyPr>
+                <a:lstStyle/>
+                <a:p>
+                  <a:pPr fontAlgn="base">
+                    <a:lnSpc>
+                      <a:spcPts val="1500"/>
+                    </a:lnSpc>
+                    <a:spcBef>
+                      <a:spcPct val="0"/>
+                    </a:spcBef>
+                    <a:spcAft>
+                      <a:spcPct val="0"/>
+                    </a:spcAft>
+                  </a:pPr>
+                  <a14:m>
+                    <m:oMathPara xmlns:m="http://schemas.openxmlformats.org/officeDocument/2006/math">
+                      <m:oMathParaPr>
+                        <m:jc m:val="left"/>
+                      </m:oMathParaPr>
+                      <m:oMath xmlns:m="http://schemas.openxmlformats.org/officeDocument/2006/math">
+                        <m:sSub>
+                          <m:sSubPr>
+                            <m:ctrlPr>
+                              <a:rPr lang="en-GB" sz="1600" i="1" smtClean="0">
+                                <a:solidFill>
+                                  <a:schemeClr val="bg1"/>
+                                </a:solidFill>
+                                <a:latin typeface="Cambria Math" panose="02040503050406030204" pitchFamily="18" charset="0"/>
+                                <a:cs typeface="Times New Roman" panose="02020603050405020304" pitchFamily="18" charset="0"/>
+                              </a:rPr>
+                            </m:ctrlPr>
+                          </m:sSubPr>
+                          <m:e>
+                            <m:r>
+                              <a:rPr lang="en-GB" sz="1600" b="0" i="1" smtClean="0">
+                                <a:solidFill>
+                                  <a:schemeClr val="bg1"/>
+                                </a:solidFill>
+                                <a:latin typeface="Cambria Math" panose="02040503050406030204" pitchFamily="18" charset="0"/>
+                                <a:cs typeface="Times New Roman" panose="02020603050405020304" pitchFamily="18" charset="0"/>
+                              </a:rPr>
+                              <m:t>𝑑</m:t>
+                            </m:r>
+                          </m:e>
+                          <m:sub>
+                            <m:r>
+                              <a:rPr lang="en-GB" sz="1600" b="0" i="1" smtClean="0">
+                                <a:solidFill>
+                                  <a:schemeClr val="bg1"/>
+                                </a:solidFill>
+                                <a:latin typeface="Cambria Math" panose="02040503050406030204" pitchFamily="18" charset="0"/>
+                                <a:cs typeface="Times New Roman" panose="02020603050405020304" pitchFamily="18" charset="0"/>
+                              </a:rPr>
+                              <m:t>𝑡</m:t>
+                            </m:r>
+                          </m:sub>
+                        </m:sSub>
+                        <m:r>
+                          <a:rPr lang="en-GB" sz="1600" i="1">
+                            <a:solidFill>
+                              <a:schemeClr val="bg1"/>
+                            </a:solidFill>
+                            <a:latin typeface="Cambria Math" panose="02040503050406030204" pitchFamily="18" charset="0"/>
+                            <a:cs typeface="Times New Roman" panose="02020603050405020304" pitchFamily="18" charset="0"/>
+                          </a:rPr>
+                          <m:t>=</m:t>
+                        </m:r>
+                        <m:r>
+                          <a:rPr lang="en-GB" sz="1600" i="1">
+                            <a:solidFill>
+                              <a:schemeClr val="bg1"/>
+                            </a:solidFill>
+                            <a:latin typeface="Cambria Math" panose="02040503050406030204" pitchFamily="18" charset="0"/>
+                            <a:cs typeface="Times New Roman" panose="02020603050405020304" pitchFamily="18" charset="0"/>
+                          </a:rPr>
+                          <m:t>𝐴</m:t>
+                        </m:r>
+                      </m:oMath>
+                    </m:oMathPara>
+                  </a14:m>
+                  <a:endParaRPr lang="en-GB" sz="1600" dirty="0">
+                    <a:solidFill>
+                      <a:srgbClr val="F18B45"/>
+                    </a:solidFill>
+                    <a:latin typeface="AU Passata" pitchFamily="34" charset="0"/>
+                  </a:endParaRPr>
+                </a:p>
+              </p:txBody>
+            </p:sp>
+          </mc:Choice>
+          <mc:Fallback xmlns="">
+            <p:sp>
+              <p:nvSpPr>
+                <p:cNvPr id="102" name="TextBox 101">
+                  <a:extLst>
+                    <a:ext uri="{FF2B5EF4-FFF2-40B4-BE49-F238E27FC236}">
+                      <a16:creationId xmlns:a16="http://schemas.microsoft.com/office/drawing/2014/main" id="{341C268C-AC77-4AC8-ACA1-027AABC41A5D}"/>
+                    </a:ext>
+                  </a:extLst>
+                </p:cNvPr>
+                <p:cNvSpPr txBox="1">
+                  <a:spLocks noRot="1" noChangeAspect="1" noMove="1" noResize="1" noEditPoints="1" noAdjustHandles="1" noChangeArrowheads="1" noChangeShapeType="1" noTextEdit="1"/>
+                </p:cNvSpPr>
+                <p:nvPr/>
+              </p:nvSpPr>
+              <p:spPr>
+                <a:xfrm>
+                  <a:off x="7487223" y="4381236"/>
+                  <a:ext cx="1311168" cy="388004"/>
+                </a:xfrm>
+                <a:prstGeom prst="rect">
+                  <a:avLst/>
+                </a:prstGeom>
+                <a:blipFill>
+                  <a:blip r:embed="rId4"/>
+                  <a:stretch>
+                    <a:fillRect/>
+                  </a:stretch>
+                </a:blipFill>
+              </p:spPr>
+              <p:txBody>
+                <a:bodyPr/>
+                <a:lstStyle/>
+                <a:p>
+                  <a:r>
+                    <a:rPr lang="en-GB">
+                      <a:noFill/>
+                    </a:rPr>
+                    <a:t> </a:t>
+                  </a:r>
+                </a:p>
+              </p:txBody>
+            </p:sp>
+          </mc:Fallback>
+        </mc:AlternateContent>
+        <p:cxnSp>
+          <p:nvCxnSpPr>
+            <p:cNvPr id="103" name="Straight Connector 102">
+              <a:extLst>
+                <a:ext uri="{FF2B5EF4-FFF2-40B4-BE49-F238E27FC236}">
+                  <a16:creationId xmlns:a16="http://schemas.microsoft.com/office/drawing/2014/main" id="{BFA6485E-EA6A-4E7C-872B-82D126F26AD1}"/>
+                </a:ext>
+              </a:extLst>
+            </p:cNvPr>
+            <p:cNvCxnSpPr>
+              <a:cxnSpLocks/>
+            </p:cNvCxnSpPr>
+            <p:nvPr/>
+          </p:nvCxnSpPr>
+          <p:spPr>
+            <a:xfrm flipV="1">
+              <a:off x="7692228" y="4753346"/>
+              <a:ext cx="159860" cy="229049"/>
+            </a:xfrm>
+            <a:prstGeom prst="line">
+              <a:avLst/>
+            </a:prstGeom>
+            <a:noFill/>
+            <a:ln w="25400" cap="flat" cmpd="sng" algn="ctr">
+              <a:solidFill>
+                <a:schemeClr val="tx1"/>
+              </a:solidFill>
+              <a:prstDash val="solid"/>
+              <a:miter lim="800000"/>
+              <a:headEnd type="none"/>
+            </a:ln>
+            <a:effectLst/>
+          </p:spPr>
+        </p:cxnSp>
+      </p:grpSp>
+      <p:grpSp>
+        <p:nvGrpSpPr>
+          <p:cNvPr id="18" name="Group 17">
+            <a:extLst>
+              <a:ext uri="{FF2B5EF4-FFF2-40B4-BE49-F238E27FC236}">
+                <a16:creationId xmlns:a16="http://schemas.microsoft.com/office/drawing/2014/main" id="{535EF4D2-0ABB-69F8-ED90-0380B115A42B}"/>
+              </a:ext>
+            </a:extLst>
+          </p:cNvPr>
+          <p:cNvGrpSpPr/>
+          <p:nvPr/>
+        </p:nvGrpSpPr>
+        <p:grpSpPr>
+          <a:xfrm>
+            <a:off x="282612" y="394504"/>
+            <a:ext cx="1629204" cy="1284623"/>
+            <a:chOff x="282612" y="394504"/>
+            <a:chExt cx="1629204" cy="1284623"/>
+          </a:xfrm>
+        </p:grpSpPr>
+        <p:cxnSp>
+          <p:nvCxnSpPr>
+            <p:cNvPr id="7" name="Straight Connector 6">
+              <a:extLst>
+                <a:ext uri="{FF2B5EF4-FFF2-40B4-BE49-F238E27FC236}">
+                  <a16:creationId xmlns:a16="http://schemas.microsoft.com/office/drawing/2014/main" id="{8C1CDA4B-57E7-9CF1-F2CB-B10D3B993C8A}"/>
+                </a:ext>
+              </a:extLst>
+            </p:cNvPr>
+            <p:cNvCxnSpPr>
+              <a:cxnSpLocks/>
+            </p:cNvCxnSpPr>
+            <p:nvPr/>
+          </p:nvCxnSpPr>
+          <p:spPr>
+            <a:xfrm flipV="1">
+              <a:off x="282612" y="394504"/>
+              <a:ext cx="390309" cy="646430"/>
+            </a:xfrm>
+            <a:prstGeom prst="line">
+              <a:avLst/>
+            </a:prstGeom>
+            <a:ln w="38100">
+              <a:solidFill>
+                <a:schemeClr val="bg1">
+                  <a:lumMod val="65000"/>
+                </a:schemeClr>
+              </a:solidFill>
+            </a:ln>
+          </p:spPr>
+          <p:style>
+            <a:lnRef idx="1">
+              <a:schemeClr val="accent1"/>
+            </a:lnRef>
+            <a:fillRef idx="0">
+              <a:schemeClr val="accent1"/>
+            </a:fillRef>
+            <a:effectRef idx="0">
+              <a:schemeClr val="accent1"/>
+            </a:effectRef>
+            <a:fontRef idx="minor">
+              <a:schemeClr val="tx1"/>
+            </a:fontRef>
+          </p:style>
+        </p:cxnSp>
+        <p:cxnSp>
+          <p:nvCxnSpPr>
+            <p:cNvPr id="9" name="Straight Connector 8">
+              <a:extLst>
+                <a:ext uri="{FF2B5EF4-FFF2-40B4-BE49-F238E27FC236}">
+                  <a16:creationId xmlns:a16="http://schemas.microsoft.com/office/drawing/2014/main" id="{1432A708-EFF5-DAAF-F7A4-A7E2A1E1D96B}"/>
+                </a:ext>
+              </a:extLst>
+            </p:cNvPr>
+            <p:cNvCxnSpPr>
+              <a:cxnSpLocks/>
+            </p:cNvCxnSpPr>
+            <p:nvPr/>
+          </p:nvCxnSpPr>
+          <p:spPr>
+            <a:xfrm flipH="1" flipV="1">
+              <a:off x="672921" y="394504"/>
+              <a:ext cx="837948" cy="1284623"/>
+            </a:xfrm>
+            <a:prstGeom prst="line">
+              <a:avLst/>
+            </a:prstGeom>
+            <a:ln w="38100">
+              <a:solidFill>
+                <a:schemeClr val="bg1">
+                  <a:lumMod val="65000"/>
+                </a:schemeClr>
+              </a:solidFill>
+            </a:ln>
+          </p:spPr>
+          <p:style>
+            <a:lnRef idx="1">
+              <a:schemeClr val="accent1"/>
+            </a:lnRef>
+            <a:fillRef idx="0">
+              <a:schemeClr val="accent1"/>
+            </a:fillRef>
+            <a:effectRef idx="0">
+              <a:schemeClr val="accent1"/>
+            </a:effectRef>
+            <a:fontRef idx="minor">
+              <a:schemeClr val="tx1"/>
+            </a:fontRef>
+          </p:style>
+        </p:cxnSp>
+        <p:cxnSp>
+          <p:nvCxnSpPr>
+            <p:cNvPr id="12" name="Straight Connector 11">
+              <a:extLst>
+                <a:ext uri="{FF2B5EF4-FFF2-40B4-BE49-F238E27FC236}">
+                  <a16:creationId xmlns:a16="http://schemas.microsoft.com/office/drawing/2014/main" id="{7A5EA00C-B830-DF49-40E0-86379D9BB666}"/>
+                </a:ext>
+              </a:extLst>
+            </p:cNvPr>
+            <p:cNvCxnSpPr>
+              <a:cxnSpLocks/>
+            </p:cNvCxnSpPr>
+            <p:nvPr/>
+          </p:nvCxnSpPr>
+          <p:spPr>
+            <a:xfrm flipV="1">
+              <a:off x="1510869" y="1048322"/>
+              <a:ext cx="400947" cy="630805"/>
+            </a:xfrm>
+            <a:prstGeom prst="line">
+              <a:avLst/>
+            </a:prstGeom>
+            <a:ln w="38100">
+              <a:solidFill>
+                <a:schemeClr val="bg1">
+                  <a:lumMod val="65000"/>
+                </a:schemeClr>
+              </a:solidFill>
+            </a:ln>
+          </p:spPr>
+          <p:style>
+            <a:lnRef idx="1">
+              <a:schemeClr val="accent1"/>
+            </a:lnRef>
+            <a:fillRef idx="0">
+              <a:schemeClr val="accent1"/>
+            </a:fillRef>
+            <a:effectRef idx="0">
+              <a:schemeClr val="accent1"/>
+            </a:effectRef>
+            <a:fontRef idx="minor">
+              <a:schemeClr val="tx1"/>
+            </a:fontRef>
+          </p:style>
+        </p:cxnSp>
+      </p:grpSp>
+      <p:grpSp>
+        <p:nvGrpSpPr>
+          <p:cNvPr id="19" name="Group 18">
+            <a:extLst>
+              <a:ext uri="{FF2B5EF4-FFF2-40B4-BE49-F238E27FC236}">
+                <a16:creationId xmlns:a16="http://schemas.microsoft.com/office/drawing/2014/main" id="{F0F98AE1-6182-4F64-6018-5BFA48461631}"/>
+              </a:ext>
+            </a:extLst>
+          </p:cNvPr>
+          <p:cNvGrpSpPr/>
+          <p:nvPr/>
+        </p:nvGrpSpPr>
+        <p:grpSpPr>
+          <a:xfrm>
+            <a:off x="1906529" y="414456"/>
+            <a:ext cx="1629204" cy="1284623"/>
+            <a:chOff x="282612" y="394504"/>
+            <a:chExt cx="1629204" cy="1284623"/>
+          </a:xfrm>
+        </p:grpSpPr>
+        <p:cxnSp>
+          <p:nvCxnSpPr>
+            <p:cNvPr id="20" name="Straight Connector 19">
+              <a:extLst>
+                <a:ext uri="{FF2B5EF4-FFF2-40B4-BE49-F238E27FC236}">
+                  <a16:creationId xmlns:a16="http://schemas.microsoft.com/office/drawing/2014/main" id="{3F7E7FCA-4045-30E9-9CD8-3E0933790CE6}"/>
+                </a:ext>
+              </a:extLst>
+            </p:cNvPr>
+            <p:cNvCxnSpPr>
+              <a:cxnSpLocks/>
+            </p:cNvCxnSpPr>
+            <p:nvPr/>
+          </p:nvCxnSpPr>
+          <p:spPr>
+            <a:xfrm flipV="1">
+              <a:off x="282612" y="394504"/>
+              <a:ext cx="390309" cy="646430"/>
+            </a:xfrm>
+            <a:prstGeom prst="line">
+              <a:avLst/>
+            </a:prstGeom>
+            <a:ln w="38100">
+              <a:solidFill>
+                <a:schemeClr val="bg1">
+                  <a:lumMod val="65000"/>
+                </a:schemeClr>
+              </a:solidFill>
+            </a:ln>
+          </p:spPr>
+          <p:style>
+            <a:lnRef idx="1">
+              <a:schemeClr val="accent1"/>
+            </a:lnRef>
+            <a:fillRef idx="0">
+              <a:schemeClr val="accent1"/>
+            </a:fillRef>
+            <a:effectRef idx="0">
+              <a:schemeClr val="accent1"/>
+            </a:effectRef>
+            <a:fontRef idx="minor">
+              <a:schemeClr val="tx1"/>
+            </a:fontRef>
+          </p:style>
+        </p:cxnSp>
+        <p:cxnSp>
+          <p:nvCxnSpPr>
+            <p:cNvPr id="21" name="Straight Connector 20">
+              <a:extLst>
+                <a:ext uri="{FF2B5EF4-FFF2-40B4-BE49-F238E27FC236}">
+                  <a16:creationId xmlns:a16="http://schemas.microsoft.com/office/drawing/2014/main" id="{AA893BA6-16D2-94F1-9C8F-66BF763F558C}"/>
+                </a:ext>
+              </a:extLst>
+            </p:cNvPr>
+            <p:cNvCxnSpPr>
+              <a:cxnSpLocks/>
+            </p:cNvCxnSpPr>
+            <p:nvPr/>
+          </p:nvCxnSpPr>
+          <p:spPr>
+            <a:xfrm flipH="1" flipV="1">
+              <a:off x="672921" y="394504"/>
+              <a:ext cx="837948" cy="1284623"/>
+            </a:xfrm>
+            <a:prstGeom prst="line">
+              <a:avLst/>
+            </a:prstGeom>
+            <a:ln w="38100">
+              <a:solidFill>
+                <a:schemeClr val="bg1">
+                  <a:lumMod val="65000"/>
+                </a:schemeClr>
+              </a:solidFill>
+            </a:ln>
+          </p:spPr>
+          <p:style>
+            <a:lnRef idx="1">
+              <a:schemeClr val="accent1"/>
+            </a:lnRef>
+            <a:fillRef idx="0">
+              <a:schemeClr val="accent1"/>
+            </a:fillRef>
+            <a:effectRef idx="0">
+              <a:schemeClr val="accent1"/>
+            </a:effectRef>
+            <a:fontRef idx="minor">
+              <a:schemeClr val="tx1"/>
+            </a:fontRef>
+          </p:style>
+        </p:cxnSp>
+        <p:cxnSp>
+          <p:nvCxnSpPr>
+            <p:cNvPr id="22" name="Straight Connector 21">
+              <a:extLst>
+                <a:ext uri="{FF2B5EF4-FFF2-40B4-BE49-F238E27FC236}">
+                  <a16:creationId xmlns:a16="http://schemas.microsoft.com/office/drawing/2014/main" id="{26896ED2-27D0-CFAE-46EA-4E9DDDE97668}"/>
+                </a:ext>
+              </a:extLst>
+            </p:cNvPr>
+            <p:cNvCxnSpPr>
+              <a:cxnSpLocks/>
+            </p:cNvCxnSpPr>
+            <p:nvPr/>
+          </p:nvCxnSpPr>
+          <p:spPr>
+            <a:xfrm flipV="1">
+              <a:off x="1510869" y="1048322"/>
+              <a:ext cx="400947" cy="630805"/>
+            </a:xfrm>
+            <a:prstGeom prst="line">
+              <a:avLst/>
+            </a:prstGeom>
+            <a:ln w="38100">
+              <a:solidFill>
+                <a:schemeClr val="bg1">
+                  <a:lumMod val="65000"/>
+                </a:schemeClr>
+              </a:solidFill>
+            </a:ln>
+          </p:spPr>
+          <p:style>
+            <a:lnRef idx="1">
+              <a:schemeClr val="accent1"/>
+            </a:lnRef>
+            <a:fillRef idx="0">
+              <a:schemeClr val="accent1"/>
+            </a:fillRef>
+            <a:effectRef idx="0">
+              <a:schemeClr val="accent1"/>
+            </a:effectRef>
+            <a:fontRef idx="minor">
+              <a:schemeClr val="tx1"/>
+            </a:fontRef>
+          </p:style>
+        </p:cxnSp>
+      </p:grpSp>
+      <p:grpSp>
+        <p:nvGrpSpPr>
+          <p:cNvPr id="23" name="Group 22">
+            <a:extLst>
+              <a:ext uri="{FF2B5EF4-FFF2-40B4-BE49-F238E27FC236}">
+                <a16:creationId xmlns:a16="http://schemas.microsoft.com/office/drawing/2014/main" id="{2220E6FD-5E3E-AC02-22FC-1ABB230C1B66}"/>
+              </a:ext>
+            </a:extLst>
+          </p:cNvPr>
+          <p:cNvGrpSpPr/>
+          <p:nvPr/>
+        </p:nvGrpSpPr>
+        <p:grpSpPr>
+          <a:xfrm>
+            <a:off x="3532226" y="426395"/>
+            <a:ext cx="1629204" cy="1284623"/>
+            <a:chOff x="282612" y="394504"/>
+            <a:chExt cx="1629204" cy="1284623"/>
+          </a:xfrm>
+        </p:grpSpPr>
+        <p:cxnSp>
+          <p:nvCxnSpPr>
+            <p:cNvPr id="24" name="Straight Connector 23">
+              <a:extLst>
+                <a:ext uri="{FF2B5EF4-FFF2-40B4-BE49-F238E27FC236}">
+                  <a16:creationId xmlns:a16="http://schemas.microsoft.com/office/drawing/2014/main" id="{C1E47CFD-2BC6-976C-D6E3-58E841F6F3EC}"/>
+                </a:ext>
+              </a:extLst>
+            </p:cNvPr>
+            <p:cNvCxnSpPr>
+              <a:cxnSpLocks/>
+            </p:cNvCxnSpPr>
+            <p:nvPr/>
+          </p:nvCxnSpPr>
+          <p:spPr>
+            <a:xfrm flipV="1">
+              <a:off x="282612" y="394504"/>
+              <a:ext cx="390309" cy="646430"/>
+            </a:xfrm>
+            <a:prstGeom prst="line">
+              <a:avLst/>
+            </a:prstGeom>
+            <a:ln w="38100">
+              <a:solidFill>
+                <a:schemeClr val="bg1">
+                  <a:lumMod val="65000"/>
+                </a:schemeClr>
+              </a:solidFill>
+            </a:ln>
+          </p:spPr>
+          <p:style>
+            <a:lnRef idx="1">
+              <a:schemeClr val="accent1"/>
+            </a:lnRef>
+            <a:fillRef idx="0">
+              <a:schemeClr val="accent1"/>
+            </a:fillRef>
+            <a:effectRef idx="0">
+              <a:schemeClr val="accent1"/>
+            </a:effectRef>
+            <a:fontRef idx="minor">
+              <a:schemeClr val="tx1"/>
+            </a:fontRef>
+          </p:style>
+        </p:cxnSp>
+        <p:cxnSp>
+          <p:nvCxnSpPr>
+            <p:cNvPr id="25" name="Straight Connector 24">
+              <a:extLst>
+                <a:ext uri="{FF2B5EF4-FFF2-40B4-BE49-F238E27FC236}">
+                  <a16:creationId xmlns:a16="http://schemas.microsoft.com/office/drawing/2014/main" id="{7D3B6459-25C7-BDE8-F222-CBDFACB529B6}"/>
+                </a:ext>
+              </a:extLst>
+            </p:cNvPr>
+            <p:cNvCxnSpPr>
+              <a:cxnSpLocks/>
+            </p:cNvCxnSpPr>
+            <p:nvPr/>
+          </p:nvCxnSpPr>
+          <p:spPr>
+            <a:xfrm flipH="1" flipV="1">
+              <a:off x="672921" y="394504"/>
+              <a:ext cx="837948" cy="1284623"/>
+            </a:xfrm>
+            <a:prstGeom prst="line">
+              <a:avLst/>
+            </a:prstGeom>
+            <a:ln w="38100">
+              <a:solidFill>
+                <a:schemeClr val="bg1">
+                  <a:lumMod val="65000"/>
+                </a:schemeClr>
+              </a:solidFill>
+            </a:ln>
+          </p:spPr>
+          <p:style>
+            <a:lnRef idx="1">
+              <a:schemeClr val="accent1"/>
+            </a:lnRef>
+            <a:fillRef idx="0">
+              <a:schemeClr val="accent1"/>
+            </a:fillRef>
+            <a:effectRef idx="0">
+              <a:schemeClr val="accent1"/>
+            </a:effectRef>
+            <a:fontRef idx="minor">
+              <a:schemeClr val="tx1"/>
+            </a:fontRef>
+          </p:style>
+        </p:cxnSp>
+        <p:cxnSp>
+          <p:nvCxnSpPr>
+            <p:cNvPr id="26" name="Straight Connector 25">
+              <a:extLst>
+                <a:ext uri="{FF2B5EF4-FFF2-40B4-BE49-F238E27FC236}">
+                  <a16:creationId xmlns:a16="http://schemas.microsoft.com/office/drawing/2014/main" id="{16CADFE3-FF4E-F964-4003-6809E27C5201}"/>
+                </a:ext>
+              </a:extLst>
+            </p:cNvPr>
+            <p:cNvCxnSpPr>
+              <a:cxnSpLocks/>
+            </p:cNvCxnSpPr>
+            <p:nvPr/>
+          </p:nvCxnSpPr>
+          <p:spPr>
+            <a:xfrm flipV="1">
+              <a:off x="1510869" y="1048322"/>
+              <a:ext cx="400947" cy="630805"/>
+            </a:xfrm>
+            <a:prstGeom prst="line">
+              <a:avLst/>
+            </a:prstGeom>
+            <a:ln w="38100">
+              <a:solidFill>
+                <a:schemeClr val="bg1">
+                  <a:lumMod val="65000"/>
+                </a:schemeClr>
+              </a:solidFill>
+            </a:ln>
+          </p:spPr>
+          <p:style>
+            <a:lnRef idx="1">
+              <a:schemeClr val="accent1"/>
+            </a:lnRef>
+            <a:fillRef idx="0">
+              <a:schemeClr val="accent1"/>
+            </a:fillRef>
+            <a:effectRef idx="0">
+              <a:schemeClr val="accent1"/>
+            </a:effectRef>
+            <a:fontRef idx="minor">
+              <a:schemeClr val="tx1"/>
+            </a:fontRef>
+          </p:style>
+        </p:cxnSp>
+      </p:grpSp>
+      <p:grpSp>
+        <p:nvGrpSpPr>
+          <p:cNvPr id="27" name="Group 26">
+            <a:extLst>
+              <a:ext uri="{FF2B5EF4-FFF2-40B4-BE49-F238E27FC236}">
+                <a16:creationId xmlns:a16="http://schemas.microsoft.com/office/drawing/2014/main" id="{9574AEEB-98E9-C196-8A5D-0F114D038C93}"/>
+              </a:ext>
+            </a:extLst>
+          </p:cNvPr>
+          <p:cNvGrpSpPr/>
+          <p:nvPr/>
+        </p:nvGrpSpPr>
+        <p:grpSpPr>
+          <a:xfrm>
+            <a:off x="364225" y="2510505"/>
+            <a:ext cx="1629204" cy="1284623"/>
+            <a:chOff x="282612" y="394504"/>
+            <a:chExt cx="1629204" cy="1284623"/>
+          </a:xfrm>
+        </p:grpSpPr>
+        <p:cxnSp>
+          <p:nvCxnSpPr>
+            <p:cNvPr id="28" name="Straight Connector 27">
+              <a:extLst>
+                <a:ext uri="{FF2B5EF4-FFF2-40B4-BE49-F238E27FC236}">
+                  <a16:creationId xmlns:a16="http://schemas.microsoft.com/office/drawing/2014/main" id="{B1720503-BA97-DA34-DA92-7217B19D2721}"/>
+                </a:ext>
+              </a:extLst>
+            </p:cNvPr>
+            <p:cNvCxnSpPr>
+              <a:cxnSpLocks/>
+            </p:cNvCxnSpPr>
+            <p:nvPr/>
+          </p:nvCxnSpPr>
+          <p:spPr>
+            <a:xfrm flipV="1">
+              <a:off x="282612" y="394504"/>
+              <a:ext cx="390309" cy="646430"/>
+            </a:xfrm>
+            <a:prstGeom prst="line">
+              <a:avLst/>
+            </a:prstGeom>
+            <a:ln w="38100">
+              <a:solidFill>
+                <a:srgbClr val="C00000"/>
+              </a:solidFill>
+            </a:ln>
+          </p:spPr>
+          <p:style>
+            <a:lnRef idx="1">
+              <a:schemeClr val="accent1"/>
+            </a:lnRef>
+            <a:fillRef idx="0">
+              <a:schemeClr val="accent1"/>
+            </a:fillRef>
+            <a:effectRef idx="0">
+              <a:schemeClr val="accent1"/>
+            </a:effectRef>
+            <a:fontRef idx="minor">
+              <a:schemeClr val="tx1"/>
+            </a:fontRef>
+          </p:style>
+        </p:cxnSp>
+        <p:cxnSp>
+          <p:nvCxnSpPr>
+            <p:cNvPr id="29" name="Straight Connector 28">
+              <a:extLst>
+                <a:ext uri="{FF2B5EF4-FFF2-40B4-BE49-F238E27FC236}">
+                  <a16:creationId xmlns:a16="http://schemas.microsoft.com/office/drawing/2014/main" id="{6AF120FB-350C-E134-2079-F2A2168916C2}"/>
+                </a:ext>
+              </a:extLst>
+            </p:cNvPr>
+            <p:cNvCxnSpPr>
+              <a:cxnSpLocks/>
+            </p:cNvCxnSpPr>
+            <p:nvPr/>
+          </p:nvCxnSpPr>
+          <p:spPr>
+            <a:xfrm flipH="1" flipV="1">
+              <a:off x="672921" y="394504"/>
+              <a:ext cx="837948" cy="1284623"/>
+            </a:xfrm>
+            <a:prstGeom prst="line">
+              <a:avLst/>
+            </a:prstGeom>
+            <a:ln w="38100">
+              <a:solidFill>
+                <a:srgbClr val="C00000"/>
+              </a:solidFill>
+            </a:ln>
+          </p:spPr>
+          <p:style>
+            <a:lnRef idx="1">
+              <a:schemeClr val="accent1"/>
+            </a:lnRef>
+            <a:fillRef idx="0">
+              <a:schemeClr val="accent1"/>
+            </a:fillRef>
+            <a:effectRef idx="0">
+              <a:schemeClr val="accent1"/>
+            </a:effectRef>
+            <a:fontRef idx="minor">
+              <a:schemeClr val="tx1"/>
+            </a:fontRef>
+          </p:style>
+        </p:cxnSp>
+        <p:cxnSp>
+          <p:nvCxnSpPr>
+            <p:cNvPr id="30" name="Straight Connector 29">
+              <a:extLst>
+                <a:ext uri="{FF2B5EF4-FFF2-40B4-BE49-F238E27FC236}">
+                  <a16:creationId xmlns:a16="http://schemas.microsoft.com/office/drawing/2014/main" id="{3900660C-289D-DFE3-26BE-C10883129533}"/>
+                </a:ext>
+              </a:extLst>
+            </p:cNvPr>
+            <p:cNvCxnSpPr>
+              <a:cxnSpLocks/>
+            </p:cNvCxnSpPr>
+            <p:nvPr/>
+          </p:nvCxnSpPr>
+          <p:spPr>
+            <a:xfrm flipV="1">
+              <a:off x="1510869" y="1048322"/>
+              <a:ext cx="400947" cy="630805"/>
+            </a:xfrm>
+            <a:prstGeom prst="line">
+              <a:avLst/>
+            </a:prstGeom>
+            <a:ln w="38100">
+              <a:solidFill>
+                <a:srgbClr val="C00000"/>
+              </a:solidFill>
+            </a:ln>
+          </p:spPr>
+          <p:style>
+            <a:lnRef idx="1">
+              <a:schemeClr val="accent1"/>
+            </a:lnRef>
+            <a:fillRef idx="0">
+              <a:schemeClr val="accent1"/>
+            </a:fillRef>
+            <a:effectRef idx="0">
+              <a:schemeClr val="accent1"/>
+            </a:effectRef>
+            <a:fontRef idx="minor">
+              <a:schemeClr val="tx1"/>
+            </a:fontRef>
+          </p:style>
+        </p:cxnSp>
+      </p:grpSp>
+      <p:grpSp>
+        <p:nvGrpSpPr>
+          <p:cNvPr id="31" name="Group 30">
+            <a:extLst>
+              <a:ext uri="{FF2B5EF4-FFF2-40B4-BE49-F238E27FC236}">
+                <a16:creationId xmlns:a16="http://schemas.microsoft.com/office/drawing/2014/main" id="{CAD2BEA3-93C8-14C1-3496-98FB9D037576}"/>
+              </a:ext>
+            </a:extLst>
+          </p:cNvPr>
+          <p:cNvGrpSpPr/>
+          <p:nvPr/>
+        </p:nvGrpSpPr>
+        <p:grpSpPr>
+          <a:xfrm>
+            <a:off x="1993696" y="2512117"/>
+            <a:ext cx="1629204" cy="1284623"/>
+            <a:chOff x="282612" y="394504"/>
+            <a:chExt cx="1629204" cy="1284623"/>
+          </a:xfrm>
+        </p:grpSpPr>
+        <p:cxnSp>
+          <p:nvCxnSpPr>
+            <p:cNvPr id="32" name="Straight Connector 31">
+              <a:extLst>
+                <a:ext uri="{FF2B5EF4-FFF2-40B4-BE49-F238E27FC236}">
+                  <a16:creationId xmlns:a16="http://schemas.microsoft.com/office/drawing/2014/main" id="{C1AE8D01-0F66-4287-67A4-609EECD3CA68}"/>
+                </a:ext>
+              </a:extLst>
+            </p:cNvPr>
+            <p:cNvCxnSpPr>
+              <a:cxnSpLocks/>
+            </p:cNvCxnSpPr>
+            <p:nvPr/>
+          </p:nvCxnSpPr>
+          <p:spPr>
+            <a:xfrm flipV="1">
+              <a:off x="282612" y="394504"/>
+              <a:ext cx="390309" cy="646430"/>
+            </a:xfrm>
+            <a:prstGeom prst="line">
+              <a:avLst/>
+            </a:prstGeom>
+            <a:ln w="38100">
+              <a:solidFill>
+                <a:srgbClr val="C00000"/>
+              </a:solidFill>
+            </a:ln>
+          </p:spPr>
+          <p:style>
+            <a:lnRef idx="1">
+              <a:schemeClr val="accent1"/>
+            </a:lnRef>
+            <a:fillRef idx="0">
+              <a:schemeClr val="accent1"/>
+            </a:fillRef>
+            <a:effectRef idx="0">
+              <a:schemeClr val="accent1"/>
+            </a:effectRef>
+            <a:fontRef idx="minor">
+              <a:schemeClr val="tx1"/>
+            </a:fontRef>
+          </p:style>
+        </p:cxnSp>
+        <p:cxnSp>
+          <p:nvCxnSpPr>
+            <p:cNvPr id="33" name="Straight Connector 32">
+              <a:extLst>
+                <a:ext uri="{FF2B5EF4-FFF2-40B4-BE49-F238E27FC236}">
+                  <a16:creationId xmlns:a16="http://schemas.microsoft.com/office/drawing/2014/main" id="{1FF4E87C-55F8-BAA8-3F65-1EF0588A8FB3}"/>
+                </a:ext>
+              </a:extLst>
+            </p:cNvPr>
+            <p:cNvCxnSpPr>
+              <a:cxnSpLocks/>
+            </p:cNvCxnSpPr>
+            <p:nvPr/>
+          </p:nvCxnSpPr>
+          <p:spPr>
+            <a:xfrm flipH="1" flipV="1">
+              <a:off x="672921" y="394504"/>
+              <a:ext cx="837948" cy="1284623"/>
+            </a:xfrm>
+            <a:prstGeom prst="line">
+              <a:avLst/>
+            </a:prstGeom>
+            <a:ln w="38100">
+              <a:solidFill>
+                <a:srgbClr val="C00000"/>
+              </a:solidFill>
+            </a:ln>
+          </p:spPr>
+          <p:style>
+            <a:lnRef idx="1">
+              <a:schemeClr val="accent1"/>
+            </a:lnRef>
+            <a:fillRef idx="0">
+              <a:schemeClr val="accent1"/>
+            </a:fillRef>
+            <a:effectRef idx="0">
+              <a:schemeClr val="accent1"/>
+            </a:effectRef>
+            <a:fontRef idx="minor">
+              <a:schemeClr val="tx1"/>
+            </a:fontRef>
+          </p:style>
+        </p:cxnSp>
+        <p:cxnSp>
+          <p:nvCxnSpPr>
+            <p:cNvPr id="34" name="Straight Connector 33">
+              <a:extLst>
+                <a:ext uri="{FF2B5EF4-FFF2-40B4-BE49-F238E27FC236}">
+                  <a16:creationId xmlns:a16="http://schemas.microsoft.com/office/drawing/2014/main" id="{0E5B8924-AC48-B7C6-4CE8-F0818A783B0D}"/>
+                </a:ext>
+              </a:extLst>
+            </p:cNvPr>
+            <p:cNvCxnSpPr>
+              <a:cxnSpLocks/>
+            </p:cNvCxnSpPr>
+            <p:nvPr/>
+          </p:nvCxnSpPr>
+          <p:spPr>
+            <a:xfrm flipV="1">
+              <a:off x="1510869" y="1048322"/>
+              <a:ext cx="400947" cy="630805"/>
+            </a:xfrm>
+            <a:prstGeom prst="line">
+              <a:avLst/>
+            </a:prstGeom>
+            <a:ln w="38100">
+              <a:solidFill>
+                <a:srgbClr val="C00000"/>
+              </a:solidFill>
+            </a:ln>
+          </p:spPr>
+          <p:style>
+            <a:lnRef idx="1">
+              <a:schemeClr val="accent1"/>
+            </a:lnRef>
+            <a:fillRef idx="0">
+              <a:schemeClr val="accent1"/>
+            </a:fillRef>
+            <a:effectRef idx="0">
+              <a:schemeClr val="accent1"/>
+            </a:effectRef>
+            <a:fontRef idx="minor">
+              <a:schemeClr val="tx1"/>
+            </a:fontRef>
+          </p:style>
+        </p:cxnSp>
+      </p:grpSp>
+      <p:grpSp>
+        <p:nvGrpSpPr>
+          <p:cNvPr id="35" name="Group 34">
+            <a:extLst>
+              <a:ext uri="{FF2B5EF4-FFF2-40B4-BE49-F238E27FC236}">
+                <a16:creationId xmlns:a16="http://schemas.microsoft.com/office/drawing/2014/main" id="{27FCC649-8FD5-174F-77ED-E96AA4514984}"/>
+              </a:ext>
+            </a:extLst>
+          </p:cNvPr>
+          <p:cNvGrpSpPr/>
+          <p:nvPr/>
+        </p:nvGrpSpPr>
+        <p:grpSpPr>
+          <a:xfrm>
+            <a:off x="3618564" y="2528509"/>
+            <a:ext cx="1629204" cy="1284623"/>
+            <a:chOff x="282612" y="394504"/>
+            <a:chExt cx="1629204" cy="1284623"/>
+          </a:xfrm>
+        </p:grpSpPr>
+        <p:cxnSp>
+          <p:nvCxnSpPr>
+            <p:cNvPr id="36" name="Straight Connector 35">
+              <a:extLst>
+                <a:ext uri="{FF2B5EF4-FFF2-40B4-BE49-F238E27FC236}">
+                  <a16:creationId xmlns:a16="http://schemas.microsoft.com/office/drawing/2014/main" id="{9A970E45-E021-09D7-FB8A-D7024407C2A3}"/>
+                </a:ext>
+              </a:extLst>
+            </p:cNvPr>
+            <p:cNvCxnSpPr>
+              <a:cxnSpLocks/>
+            </p:cNvCxnSpPr>
+            <p:nvPr/>
+          </p:nvCxnSpPr>
+          <p:spPr>
+            <a:xfrm flipV="1">
+              <a:off x="282612" y="394504"/>
+              <a:ext cx="390309" cy="646430"/>
+            </a:xfrm>
+            <a:prstGeom prst="line">
+              <a:avLst/>
+            </a:prstGeom>
+            <a:ln w="38100">
+              <a:solidFill>
+                <a:srgbClr val="C00000"/>
+              </a:solidFill>
+            </a:ln>
+          </p:spPr>
+          <p:style>
+            <a:lnRef idx="1">
+              <a:schemeClr val="accent1"/>
+            </a:lnRef>
+            <a:fillRef idx="0">
+              <a:schemeClr val="accent1"/>
+            </a:fillRef>
+            <a:effectRef idx="0">
+              <a:schemeClr val="accent1"/>
+            </a:effectRef>
+            <a:fontRef idx="minor">
+              <a:schemeClr val="tx1"/>
+            </a:fontRef>
+          </p:style>
+        </p:cxnSp>
+        <p:cxnSp>
+          <p:nvCxnSpPr>
+            <p:cNvPr id="37" name="Straight Connector 36">
+              <a:extLst>
+                <a:ext uri="{FF2B5EF4-FFF2-40B4-BE49-F238E27FC236}">
+                  <a16:creationId xmlns:a16="http://schemas.microsoft.com/office/drawing/2014/main" id="{7244E9F8-25EF-D2F7-3D5E-E06CF16186B2}"/>
+                </a:ext>
+              </a:extLst>
+            </p:cNvPr>
+            <p:cNvCxnSpPr>
+              <a:cxnSpLocks/>
+            </p:cNvCxnSpPr>
+            <p:nvPr/>
+          </p:nvCxnSpPr>
+          <p:spPr>
+            <a:xfrm flipH="1" flipV="1">
+              <a:off x="672921" y="394504"/>
+              <a:ext cx="837948" cy="1284623"/>
+            </a:xfrm>
+            <a:prstGeom prst="line">
+              <a:avLst/>
+            </a:prstGeom>
+            <a:ln w="38100">
+              <a:solidFill>
+                <a:srgbClr val="C00000"/>
+              </a:solidFill>
+            </a:ln>
+          </p:spPr>
+          <p:style>
+            <a:lnRef idx="1">
+              <a:schemeClr val="accent1"/>
+            </a:lnRef>
+            <a:fillRef idx="0">
+              <a:schemeClr val="accent1"/>
+            </a:fillRef>
+            <a:effectRef idx="0">
+              <a:schemeClr val="accent1"/>
+            </a:effectRef>
+            <a:fontRef idx="minor">
+              <a:schemeClr val="tx1"/>
+            </a:fontRef>
+          </p:style>
+        </p:cxnSp>
+        <p:cxnSp>
+          <p:nvCxnSpPr>
+            <p:cNvPr id="38" name="Straight Connector 37">
+              <a:extLst>
+                <a:ext uri="{FF2B5EF4-FFF2-40B4-BE49-F238E27FC236}">
+                  <a16:creationId xmlns:a16="http://schemas.microsoft.com/office/drawing/2014/main" id="{F1DFBEF7-670D-4D80-2B7A-10A5CB1D7E4D}"/>
+                </a:ext>
+              </a:extLst>
+            </p:cNvPr>
+            <p:cNvCxnSpPr>
+              <a:cxnSpLocks/>
+            </p:cNvCxnSpPr>
+            <p:nvPr/>
+          </p:nvCxnSpPr>
+          <p:spPr>
+            <a:xfrm flipV="1">
+              <a:off x="1510869" y="1048322"/>
+              <a:ext cx="400947" cy="630805"/>
+            </a:xfrm>
+            <a:prstGeom prst="line">
+              <a:avLst/>
+            </a:prstGeom>
+            <a:ln w="38100">
+              <a:solidFill>
+                <a:srgbClr val="C00000"/>
+              </a:solidFill>
+            </a:ln>
+          </p:spPr>
+          <p:style>
+            <a:lnRef idx="1">
+              <a:schemeClr val="accent1"/>
+            </a:lnRef>
+            <a:fillRef idx="0">
+              <a:schemeClr val="accent1"/>
+            </a:fillRef>
+            <a:effectRef idx="0">
+              <a:schemeClr val="accent1"/>
+            </a:effectRef>
+            <a:fontRef idx="minor">
+              <a:schemeClr val="tx1"/>
+            </a:fontRef>
+          </p:style>
+        </p:cxnSp>
+      </p:grpSp>
+      <mc:AlternateContent xmlns:mc="http://schemas.openxmlformats.org/markup-compatibility/2006" xmlns:a14="http://schemas.microsoft.com/office/drawing/2010/main">
+        <mc:Choice Requires="a14">
+          <p:sp>
+            <p:nvSpPr>
+              <p:cNvPr id="85" name="TextBox 84">
+                <a:extLst>
+                  <a:ext uri="{FF2B5EF4-FFF2-40B4-BE49-F238E27FC236}">
+                    <a16:creationId xmlns:a16="http://schemas.microsoft.com/office/drawing/2014/main" id="{F373FD9F-DB82-46E7-3374-75216E0D60E3}"/>
+                  </a:ext>
+                </a:extLst>
+              </p:cNvPr>
+              <p:cNvSpPr txBox="1"/>
+              <p:nvPr/>
+            </p:nvSpPr>
+            <p:spPr>
+              <a:xfrm>
+                <a:off x="5726744" y="631572"/>
+                <a:ext cx="1014102" cy="284693"/>
+              </a:xfrm>
+              <a:prstGeom prst="rect">
+                <a:avLst/>
+              </a:prstGeom>
+              <a:noFill/>
+            </p:spPr>
+            <p:txBody>
+              <a:bodyPr wrap="square" rtlCol="0">
+                <a:spAutoFit/>
+              </a:bodyPr>
+              <a:lstStyle/>
+              <a:p>
+                <a:pPr fontAlgn="base">
+                  <a:lnSpc>
+                    <a:spcPts val="1500"/>
+                  </a:lnSpc>
+                  <a:spcBef>
+                    <a:spcPct val="0"/>
+                  </a:spcBef>
+                  <a:spcAft>
+                    <a:spcPct val="0"/>
+                  </a:spcAft>
+                </a:pPr>
+                <a14:m>
+                  <m:oMathPara xmlns:m="http://schemas.openxmlformats.org/officeDocument/2006/math">
+                    <m:oMathParaPr>
+                      <m:jc m:val="left"/>
+                    </m:oMathParaPr>
+                    <m:oMath xmlns:m="http://schemas.openxmlformats.org/officeDocument/2006/math">
+                      <m:sSub>
+                        <m:sSubPr>
+                          <m:ctrlPr>
+                            <a:rPr lang="en-GB" sz="1600" i="1" smtClean="0">
+                              <a:solidFill>
+                                <a:schemeClr val="tx1"/>
+                              </a:solidFill>
+                              <a:latin typeface="Cambria Math" panose="02040503050406030204" pitchFamily="18" charset="0"/>
+                              <a:cs typeface="Times New Roman" panose="02020603050405020304" pitchFamily="18" charset="0"/>
+                            </a:rPr>
+                          </m:ctrlPr>
+                        </m:sSubPr>
+                        <m:e>
+                          <m:r>
+                            <a:rPr lang="en-GB" sz="1600" b="0" i="1" smtClean="0">
+                              <a:solidFill>
+                                <a:schemeClr val="tx1"/>
+                              </a:solidFill>
+                              <a:latin typeface="Cambria Math" panose="02040503050406030204" pitchFamily="18" charset="0"/>
+                              <a:cs typeface="Times New Roman" panose="02020603050405020304" pitchFamily="18" charset="0"/>
+                            </a:rPr>
+                            <m:t>𝑑</m:t>
+                          </m:r>
+                        </m:e>
+                        <m:sub>
+                          <m:r>
+                            <a:rPr lang="en-GB" sz="1600" b="0" i="1" smtClean="0">
+                              <a:solidFill>
+                                <a:schemeClr val="tx1"/>
+                              </a:solidFill>
+                              <a:latin typeface="Cambria Math" panose="02040503050406030204" pitchFamily="18" charset="0"/>
+                              <a:cs typeface="Times New Roman" panose="02020603050405020304" pitchFamily="18" charset="0"/>
+                            </a:rPr>
+                            <m:t>𝑡</m:t>
+                          </m:r>
+                        </m:sub>
+                      </m:sSub>
+                      <m:r>
+                        <a:rPr lang="en-GB" sz="1600" i="1">
+                          <a:solidFill>
+                            <a:schemeClr val="tx1"/>
+                          </a:solidFill>
+                          <a:latin typeface="Cambria Math" panose="02040503050406030204" pitchFamily="18" charset="0"/>
+                          <a:cs typeface="Times New Roman" panose="02020603050405020304" pitchFamily="18" charset="0"/>
+                        </a:rPr>
+                        <m:t>=</m:t>
+                      </m:r>
+                      <m:r>
+                        <a:rPr lang="en-GB" sz="1600" i="1">
+                          <a:solidFill>
+                            <a:schemeClr val="tx1"/>
+                          </a:solidFill>
+                          <a:latin typeface="Cambria Math" panose="02040503050406030204" pitchFamily="18" charset="0"/>
+                          <a:cs typeface="Times New Roman" panose="02020603050405020304" pitchFamily="18" charset="0"/>
+                        </a:rPr>
+                        <m:t>𝐴</m:t>
+                      </m:r>
+                    </m:oMath>
+                  </m:oMathPara>
+                </a14:m>
+                <a:endParaRPr lang="en-GB" sz="1600" dirty="0">
+                  <a:solidFill>
+                    <a:schemeClr val="tx1"/>
+                  </a:solidFill>
+                  <a:latin typeface="AU Passata" pitchFamily="34" charset="0"/>
+                </a:endParaRPr>
+              </a:p>
+            </p:txBody>
+          </p:sp>
+        </mc:Choice>
+        <mc:Fallback xmlns="">
+          <p:sp>
+            <p:nvSpPr>
+              <p:cNvPr id="85" name="TextBox 84">
+                <a:extLst>
+                  <a:ext uri="{FF2B5EF4-FFF2-40B4-BE49-F238E27FC236}">
+                    <a16:creationId xmlns:a16="http://schemas.microsoft.com/office/drawing/2014/main" id="{F373FD9F-DB82-46E7-3374-75216E0D60E3}"/>
+                  </a:ext>
+                </a:extLst>
+              </p:cNvPr>
+              <p:cNvSpPr txBox="1">
+                <a:spLocks noRot="1" noChangeAspect="1" noMove="1" noResize="1" noEditPoints="1" noAdjustHandles="1" noChangeArrowheads="1" noChangeShapeType="1" noTextEdit="1"/>
+              </p:cNvSpPr>
+              <p:nvPr/>
+            </p:nvSpPr>
+            <p:spPr>
+              <a:xfrm>
+                <a:off x="5726744" y="631572"/>
+                <a:ext cx="1014102" cy="284693"/>
+              </a:xfrm>
+              <a:prstGeom prst="rect">
+                <a:avLst/>
+              </a:prstGeom>
+              <a:blipFill>
+                <a:blip r:embed="rId5"/>
+                <a:stretch>
+                  <a:fillRect/>
+                </a:stretch>
+              </a:blipFill>
+            </p:spPr>
+            <p:txBody>
+              <a:bodyPr/>
+              <a:lstStyle/>
+              <a:p>
+                <a:r>
+                  <a:rPr lang="en-GB">
+                    <a:noFill/>
+                  </a:rPr>
+                  <a:t> </a:t>
+                </a:r>
+              </a:p>
+            </p:txBody>
+          </p:sp>
+        </mc:Fallback>
+      </mc:AlternateContent>
+      <p:sp>
+        <p:nvSpPr>
+          <p:cNvPr id="2" name="Freeform: Shape 1">
+            <a:extLst>
+              <a:ext uri="{FF2B5EF4-FFF2-40B4-BE49-F238E27FC236}">
+                <a16:creationId xmlns:a16="http://schemas.microsoft.com/office/drawing/2014/main" id="{F5A8C54E-DD49-5BFF-B102-9B9F3F7BC615}"/>
+              </a:ext>
+            </a:extLst>
+          </p:cNvPr>
+          <p:cNvSpPr/>
+          <p:nvPr/>
+        </p:nvSpPr>
+        <p:spPr>
+          <a:xfrm>
+            <a:off x="311888" y="4486883"/>
+            <a:ext cx="1672856" cy="673452"/>
+          </a:xfrm>
+          <a:custGeom>
+            <a:avLst/>
+            <a:gdLst>
+              <a:gd name="connsiteX0" fmla="*/ 0 w 1672856"/>
+              <a:gd name="connsiteY0" fmla="*/ 673452 h 673452"/>
+              <a:gd name="connsiteX1" fmla="*/ 311889 w 1672856"/>
+              <a:gd name="connsiteY1" fmla="*/ 616745 h 673452"/>
+              <a:gd name="connsiteX2" fmla="*/ 418214 w 1672856"/>
+              <a:gd name="connsiteY2" fmla="*/ 382829 h 673452"/>
+              <a:gd name="connsiteX3" fmla="*/ 545805 w 1672856"/>
+              <a:gd name="connsiteY3" fmla="*/ 113470 h 673452"/>
+              <a:gd name="connsiteX4" fmla="*/ 836428 w 1672856"/>
+              <a:gd name="connsiteY4" fmla="*/ 57 h 673452"/>
+              <a:gd name="connsiteX5" fmla="*/ 1190847 w 1672856"/>
+              <a:gd name="connsiteY5" fmla="*/ 106382 h 673452"/>
+              <a:gd name="connsiteX6" fmla="*/ 1360968 w 1672856"/>
+              <a:gd name="connsiteY6" fmla="*/ 545861 h 673452"/>
+              <a:gd name="connsiteX7" fmla="*/ 1672856 w 1672856"/>
+              <a:gd name="connsiteY7" fmla="*/ 659275 h 673452"/>
+            </a:gdLst>
+            <a:ahLst/>
+            <a:cxnLst>
+              <a:cxn ang="0">
+                <a:pos x="connsiteX0" y="connsiteY0"/>
+              </a:cxn>
+              <a:cxn ang="0">
+                <a:pos x="connsiteX1" y="connsiteY1"/>
+              </a:cxn>
+              <a:cxn ang="0">
+                <a:pos x="connsiteX2" y="connsiteY2"/>
+              </a:cxn>
+              <a:cxn ang="0">
+                <a:pos x="connsiteX3" y="connsiteY3"/>
+              </a:cxn>
+              <a:cxn ang="0">
+                <a:pos x="connsiteX4" y="connsiteY4"/>
+              </a:cxn>
+              <a:cxn ang="0">
+                <a:pos x="connsiteX5" y="connsiteY5"/>
+              </a:cxn>
+              <a:cxn ang="0">
+                <a:pos x="connsiteX6" y="connsiteY6"/>
+              </a:cxn>
+              <a:cxn ang="0">
+                <a:pos x="connsiteX7" y="connsiteY7"/>
+              </a:cxn>
+            </a:cxnLst>
+            <a:rect l="l" t="t" r="r" b="b"/>
+            <a:pathLst>
+              <a:path w="1672856" h="673452">
+                <a:moveTo>
+                  <a:pt x="0" y="673452"/>
+                </a:moveTo>
+                <a:cubicBezTo>
+                  <a:pt x="121093" y="669317"/>
+                  <a:pt x="242187" y="665182"/>
+                  <a:pt x="311889" y="616745"/>
+                </a:cubicBezTo>
+                <a:cubicBezTo>
+                  <a:pt x="381591" y="568308"/>
+                  <a:pt x="379228" y="466708"/>
+                  <a:pt x="418214" y="382829"/>
+                </a:cubicBezTo>
+                <a:cubicBezTo>
+                  <a:pt x="457200" y="298950"/>
+                  <a:pt x="476103" y="177265"/>
+                  <a:pt x="545805" y="113470"/>
+                </a:cubicBezTo>
+                <a:cubicBezTo>
+                  <a:pt x="615507" y="49675"/>
+                  <a:pt x="728921" y="1238"/>
+                  <a:pt x="836428" y="57"/>
+                </a:cubicBezTo>
+                <a:cubicBezTo>
+                  <a:pt x="943935" y="-1124"/>
+                  <a:pt x="1103424" y="15415"/>
+                  <a:pt x="1190847" y="106382"/>
+                </a:cubicBezTo>
+                <a:cubicBezTo>
+                  <a:pt x="1278270" y="197349"/>
+                  <a:pt x="1280633" y="453712"/>
+                  <a:pt x="1360968" y="545861"/>
+                </a:cubicBezTo>
+                <a:cubicBezTo>
+                  <a:pt x="1441303" y="638010"/>
+                  <a:pt x="1557079" y="648642"/>
+                  <a:pt x="1672856" y="659275"/>
+                </a:cubicBezTo>
+              </a:path>
+            </a:pathLst>
+          </a:custGeom>
+          <a:noFill/>
+          <a:ln w="38100">
+            <a:solidFill>
+              <a:srgbClr val="C00000"/>
+            </a:solidFill>
+          </a:ln>
+        </p:spPr>
+        <p:style>
+          <a:lnRef idx="2">
+            <a:schemeClr val="accent1">
+              <a:shade val="50000"/>
+            </a:schemeClr>
+          </a:lnRef>
+          <a:fillRef idx="1">
+            <a:schemeClr val="accent1"/>
+          </a:fillRef>
+          <a:effectRef idx="0">
+            <a:schemeClr val="accent1"/>
+          </a:effectRef>
+          <a:fontRef idx="minor">
+            <a:schemeClr val="lt1"/>
+          </a:fontRef>
+        </p:style>
+        <p:txBody>
+          <a:bodyPr rtlCol="0" anchor="ctr"/>
+          <a:lstStyle/>
+          <a:p>
+            <a:pPr algn="ctr"/>
+            <a:endParaRPr lang="en-GB"/>
+          </a:p>
+        </p:txBody>
+      </p:sp>
+      <p:sp>
+        <p:nvSpPr>
+          <p:cNvPr id="4" name="Freeform: Shape 3">
+            <a:extLst>
+              <a:ext uri="{FF2B5EF4-FFF2-40B4-BE49-F238E27FC236}">
+                <a16:creationId xmlns:a16="http://schemas.microsoft.com/office/drawing/2014/main" id="{92B22956-659F-BFC5-D43B-5EA119651D43}"/>
+              </a:ext>
+            </a:extLst>
+          </p:cNvPr>
+          <p:cNvSpPr/>
+          <p:nvPr/>
+        </p:nvSpPr>
+        <p:spPr>
+          <a:xfrm>
+            <a:off x="1987341" y="4482196"/>
+            <a:ext cx="1672856" cy="673452"/>
+          </a:xfrm>
+          <a:custGeom>
+            <a:avLst/>
+            <a:gdLst>
+              <a:gd name="connsiteX0" fmla="*/ 0 w 1672856"/>
+              <a:gd name="connsiteY0" fmla="*/ 673452 h 673452"/>
+              <a:gd name="connsiteX1" fmla="*/ 311889 w 1672856"/>
+              <a:gd name="connsiteY1" fmla="*/ 616745 h 673452"/>
+              <a:gd name="connsiteX2" fmla="*/ 418214 w 1672856"/>
+              <a:gd name="connsiteY2" fmla="*/ 382829 h 673452"/>
+              <a:gd name="connsiteX3" fmla="*/ 545805 w 1672856"/>
+              <a:gd name="connsiteY3" fmla="*/ 113470 h 673452"/>
+              <a:gd name="connsiteX4" fmla="*/ 836428 w 1672856"/>
+              <a:gd name="connsiteY4" fmla="*/ 57 h 673452"/>
+              <a:gd name="connsiteX5" fmla="*/ 1190847 w 1672856"/>
+              <a:gd name="connsiteY5" fmla="*/ 106382 h 673452"/>
+              <a:gd name="connsiteX6" fmla="*/ 1360968 w 1672856"/>
+              <a:gd name="connsiteY6" fmla="*/ 545861 h 673452"/>
+              <a:gd name="connsiteX7" fmla="*/ 1672856 w 1672856"/>
+              <a:gd name="connsiteY7" fmla="*/ 659275 h 673452"/>
+            </a:gdLst>
+            <a:ahLst/>
+            <a:cxnLst>
+              <a:cxn ang="0">
+                <a:pos x="connsiteX0" y="connsiteY0"/>
+              </a:cxn>
+              <a:cxn ang="0">
+                <a:pos x="connsiteX1" y="connsiteY1"/>
+              </a:cxn>
+              <a:cxn ang="0">
+                <a:pos x="connsiteX2" y="connsiteY2"/>
+              </a:cxn>
+              <a:cxn ang="0">
+                <a:pos x="connsiteX3" y="connsiteY3"/>
+              </a:cxn>
+              <a:cxn ang="0">
+                <a:pos x="connsiteX4" y="connsiteY4"/>
+              </a:cxn>
+              <a:cxn ang="0">
+                <a:pos x="connsiteX5" y="connsiteY5"/>
+              </a:cxn>
+              <a:cxn ang="0">
+                <a:pos x="connsiteX6" y="connsiteY6"/>
+              </a:cxn>
+              <a:cxn ang="0">
+                <a:pos x="connsiteX7" y="connsiteY7"/>
+              </a:cxn>
+            </a:cxnLst>
+            <a:rect l="l" t="t" r="r" b="b"/>
+            <a:pathLst>
+              <a:path w="1672856" h="673452">
+                <a:moveTo>
+                  <a:pt x="0" y="673452"/>
+                </a:moveTo>
+                <a:cubicBezTo>
+                  <a:pt x="121093" y="669317"/>
+                  <a:pt x="242187" y="665182"/>
+                  <a:pt x="311889" y="616745"/>
+                </a:cubicBezTo>
+                <a:cubicBezTo>
+                  <a:pt x="381591" y="568308"/>
+                  <a:pt x="379228" y="466708"/>
+                  <a:pt x="418214" y="382829"/>
+                </a:cubicBezTo>
+                <a:cubicBezTo>
+                  <a:pt x="457200" y="298950"/>
+                  <a:pt x="476103" y="177265"/>
+                  <a:pt x="545805" y="113470"/>
+                </a:cubicBezTo>
+                <a:cubicBezTo>
+                  <a:pt x="615507" y="49675"/>
+                  <a:pt x="728921" y="1238"/>
+                  <a:pt x="836428" y="57"/>
+                </a:cubicBezTo>
+                <a:cubicBezTo>
+                  <a:pt x="943935" y="-1124"/>
+                  <a:pt x="1103424" y="15415"/>
+                  <a:pt x="1190847" y="106382"/>
+                </a:cubicBezTo>
+                <a:cubicBezTo>
+                  <a:pt x="1278270" y="197349"/>
+                  <a:pt x="1280633" y="453712"/>
+                  <a:pt x="1360968" y="545861"/>
+                </a:cubicBezTo>
+                <a:cubicBezTo>
+                  <a:pt x="1441303" y="638010"/>
+                  <a:pt x="1557079" y="648642"/>
+                  <a:pt x="1672856" y="659275"/>
+                </a:cubicBezTo>
+              </a:path>
+            </a:pathLst>
+          </a:custGeom>
+          <a:noFill/>
+          <a:ln w="38100">
+            <a:solidFill>
+              <a:srgbClr val="C00000"/>
+            </a:solidFill>
+          </a:ln>
+        </p:spPr>
+        <p:style>
+          <a:lnRef idx="2">
+            <a:schemeClr val="accent1">
+              <a:shade val="50000"/>
+            </a:schemeClr>
+          </a:lnRef>
+          <a:fillRef idx="1">
+            <a:schemeClr val="accent1"/>
+          </a:fillRef>
+          <a:effectRef idx="0">
+            <a:schemeClr val="accent1"/>
+          </a:effectRef>
+          <a:fontRef idx="minor">
+            <a:schemeClr val="lt1"/>
+          </a:fontRef>
+        </p:style>
+        <p:txBody>
+          <a:bodyPr rtlCol="0" anchor="ctr"/>
+          <a:lstStyle/>
+          <a:p>
+            <a:pPr algn="ctr"/>
+            <a:endParaRPr lang="en-GB"/>
+          </a:p>
+        </p:txBody>
+      </p:sp>
+      <p:sp>
+        <p:nvSpPr>
+          <p:cNvPr id="5" name="Freeform: Shape 4">
+            <a:extLst>
+              <a:ext uri="{FF2B5EF4-FFF2-40B4-BE49-F238E27FC236}">
+                <a16:creationId xmlns:a16="http://schemas.microsoft.com/office/drawing/2014/main" id="{41A9E27C-758C-54EC-F8AB-06DD4BE5546D}"/>
+              </a:ext>
+            </a:extLst>
+          </p:cNvPr>
+          <p:cNvSpPr/>
+          <p:nvPr/>
+        </p:nvSpPr>
+        <p:spPr>
+          <a:xfrm>
+            <a:off x="3655253" y="4470880"/>
+            <a:ext cx="1672856" cy="673452"/>
+          </a:xfrm>
+          <a:custGeom>
+            <a:avLst/>
+            <a:gdLst>
+              <a:gd name="connsiteX0" fmla="*/ 0 w 1672856"/>
+              <a:gd name="connsiteY0" fmla="*/ 673452 h 673452"/>
+              <a:gd name="connsiteX1" fmla="*/ 311889 w 1672856"/>
+              <a:gd name="connsiteY1" fmla="*/ 616745 h 673452"/>
+              <a:gd name="connsiteX2" fmla="*/ 418214 w 1672856"/>
+              <a:gd name="connsiteY2" fmla="*/ 382829 h 673452"/>
+              <a:gd name="connsiteX3" fmla="*/ 545805 w 1672856"/>
+              <a:gd name="connsiteY3" fmla="*/ 113470 h 673452"/>
+              <a:gd name="connsiteX4" fmla="*/ 836428 w 1672856"/>
+              <a:gd name="connsiteY4" fmla="*/ 57 h 673452"/>
+              <a:gd name="connsiteX5" fmla="*/ 1190847 w 1672856"/>
+              <a:gd name="connsiteY5" fmla="*/ 106382 h 673452"/>
+              <a:gd name="connsiteX6" fmla="*/ 1360968 w 1672856"/>
+              <a:gd name="connsiteY6" fmla="*/ 545861 h 673452"/>
+              <a:gd name="connsiteX7" fmla="*/ 1672856 w 1672856"/>
+              <a:gd name="connsiteY7" fmla="*/ 659275 h 673452"/>
+            </a:gdLst>
+            <a:ahLst/>
+            <a:cxnLst>
+              <a:cxn ang="0">
+                <a:pos x="connsiteX0" y="connsiteY0"/>
+              </a:cxn>
+              <a:cxn ang="0">
+                <a:pos x="connsiteX1" y="connsiteY1"/>
+              </a:cxn>
+              <a:cxn ang="0">
+                <a:pos x="connsiteX2" y="connsiteY2"/>
+              </a:cxn>
+              <a:cxn ang="0">
+                <a:pos x="connsiteX3" y="connsiteY3"/>
+              </a:cxn>
+              <a:cxn ang="0">
+                <a:pos x="connsiteX4" y="connsiteY4"/>
+              </a:cxn>
+              <a:cxn ang="0">
+                <a:pos x="connsiteX5" y="connsiteY5"/>
+              </a:cxn>
+              <a:cxn ang="0">
+                <a:pos x="connsiteX6" y="connsiteY6"/>
+              </a:cxn>
+              <a:cxn ang="0">
+                <a:pos x="connsiteX7" y="connsiteY7"/>
+              </a:cxn>
+            </a:cxnLst>
+            <a:rect l="l" t="t" r="r" b="b"/>
+            <a:pathLst>
+              <a:path w="1672856" h="673452">
+                <a:moveTo>
+                  <a:pt x="0" y="673452"/>
+                </a:moveTo>
+                <a:cubicBezTo>
+                  <a:pt x="121093" y="669317"/>
+                  <a:pt x="242187" y="665182"/>
+                  <a:pt x="311889" y="616745"/>
+                </a:cubicBezTo>
+                <a:cubicBezTo>
+                  <a:pt x="381591" y="568308"/>
+                  <a:pt x="379228" y="466708"/>
+                  <a:pt x="418214" y="382829"/>
+                </a:cubicBezTo>
+                <a:cubicBezTo>
+                  <a:pt x="457200" y="298950"/>
+                  <a:pt x="476103" y="177265"/>
+                  <a:pt x="545805" y="113470"/>
+                </a:cubicBezTo>
+                <a:cubicBezTo>
+                  <a:pt x="615507" y="49675"/>
+                  <a:pt x="728921" y="1238"/>
+                  <a:pt x="836428" y="57"/>
+                </a:cubicBezTo>
+                <a:cubicBezTo>
+                  <a:pt x="943935" y="-1124"/>
+                  <a:pt x="1103424" y="15415"/>
+                  <a:pt x="1190847" y="106382"/>
+                </a:cubicBezTo>
+                <a:cubicBezTo>
+                  <a:pt x="1278270" y="197349"/>
+                  <a:pt x="1280633" y="453712"/>
+                  <a:pt x="1360968" y="545861"/>
+                </a:cubicBezTo>
+                <a:cubicBezTo>
+                  <a:pt x="1441303" y="638010"/>
+                  <a:pt x="1557079" y="648642"/>
+                  <a:pt x="1672856" y="659275"/>
+                </a:cubicBezTo>
+              </a:path>
+            </a:pathLst>
+          </a:custGeom>
+          <a:noFill/>
+          <a:ln w="38100">
+            <a:solidFill>
+              <a:srgbClr val="C00000"/>
+            </a:solidFill>
+          </a:ln>
+        </p:spPr>
+        <p:style>
+          <a:lnRef idx="2">
+            <a:schemeClr val="accent1">
+              <a:shade val="50000"/>
+            </a:schemeClr>
+          </a:lnRef>
+          <a:fillRef idx="1">
+            <a:schemeClr val="accent1"/>
+          </a:fillRef>
+          <a:effectRef idx="0">
+            <a:schemeClr val="accent1"/>
+          </a:effectRef>
+          <a:fontRef idx="minor">
+            <a:schemeClr val="lt1"/>
+          </a:fontRef>
+        </p:style>
+        <p:txBody>
+          <a:bodyPr rtlCol="0" anchor="ctr"/>
+          <a:lstStyle/>
+          <a:p>
+            <a:pPr algn="ctr"/>
+            <a:endParaRPr lang="en-GB"/>
+          </a:p>
+        </p:txBody>
+      </p:sp>
+    </p:spTree>
+    <p:extLst>
+      <p:ext uri="{BB962C8B-B14F-4D97-AF65-F5344CB8AC3E}">
+        <p14:creationId xmlns:p14="http://schemas.microsoft.com/office/powerpoint/2010/main" val="1229441184"/>
       </p:ext>
     </p:extLst>
   </p:cSld>

</xml_diff>

<commit_message>
update correlation and storage figures
</commit_message>
<xml_diff>
--- a/Figures/Chapter_14/drawings/Fig14.X_storage_theory.pptx
+++ b/Figures/Chapter_14/drawings/Fig14.X_storage_theory.pptx
@@ -263,7 +263,7 @@
           <a:p>
             <a:fld id="{8B1A925D-6802-4F82-B3A4-43BDB522D203}" type="datetimeFigureOut">
               <a:rPr lang="en-GB" smtClean="0"/>
-              <a:t>20/03/2023</a:t>
+              <a:t>05/04/2023</a:t>
             </a:fld>
             <a:endParaRPr lang="en-GB"/>
           </a:p>
@@ -463,7 +463,7 @@
           <a:p>
             <a:fld id="{8B1A925D-6802-4F82-B3A4-43BDB522D203}" type="datetimeFigureOut">
               <a:rPr lang="en-GB" smtClean="0"/>
-              <a:t>20/03/2023</a:t>
+              <a:t>05/04/2023</a:t>
             </a:fld>
             <a:endParaRPr lang="en-GB"/>
           </a:p>
@@ -673,7 +673,7 @@
           <a:p>
             <a:fld id="{8B1A925D-6802-4F82-B3A4-43BDB522D203}" type="datetimeFigureOut">
               <a:rPr lang="en-GB" smtClean="0"/>
-              <a:t>20/03/2023</a:t>
+              <a:t>05/04/2023</a:t>
             </a:fld>
             <a:endParaRPr lang="en-GB"/>
           </a:p>
@@ -1128,7 +1128,7 @@
             <a:fld id="{78417F83-4CBA-48F2-BAD0-783AE3701E32}" type="datetimeFigureOut">
               <a:rPr lang="en-GB" smtClean="0"/>
               <a:pPr/>
-              <a:t>20/03/2023</a:t>
+              <a:t>05/04/2023</a:t>
             </a:fld>
             <a:r>
               <a:rPr lang="en-GB" dirty="0"/>
@@ -1586,7 +1586,7 @@
             <a:fld id="{78417F83-4CBA-48F2-BAD0-783AE3701E32}" type="datetimeFigureOut">
               <a:rPr lang="en-GB" smtClean="0"/>
               <a:pPr/>
-              <a:t>20/03/2023</a:t>
+              <a:t>05/04/2023</a:t>
             </a:fld>
             <a:r>
               <a:rPr lang="en-GB" dirty="0"/>
@@ -2250,7 +2250,7 @@
             <a:fld id="{78417F83-4CBA-48F2-BAD0-783AE3701E32}" type="datetimeFigureOut">
               <a:rPr lang="en-GB" smtClean="0"/>
               <a:pPr/>
-              <a:t>20/03/2023</a:t>
+              <a:t>05/04/2023</a:t>
             </a:fld>
             <a:r>
               <a:rPr lang="en-GB" dirty="0"/>
@@ -2596,7 +2596,7 @@
             <a:fld id="{78417F83-4CBA-48F2-BAD0-783AE3701E32}" type="datetimeFigureOut">
               <a:rPr lang="en-GB" smtClean="0"/>
               <a:pPr/>
-              <a:t>20/03/2023</a:t>
+              <a:t>05/04/2023</a:t>
             </a:fld>
             <a:r>
               <a:rPr lang="en-GB" dirty="0"/>
@@ -2974,7 +2974,7 @@
             <a:fld id="{78417F83-4CBA-48F2-BAD0-783AE3701E32}" type="datetimeFigureOut">
               <a:rPr lang="en-GB" smtClean="0"/>
               <a:pPr/>
-              <a:t>20/03/2023</a:t>
+              <a:t>05/04/2023</a:t>
             </a:fld>
             <a:r>
               <a:rPr lang="en-GB" dirty="0"/>
@@ -3401,7 +3401,7 @@
             <a:fld id="{78417F83-4CBA-48F2-BAD0-783AE3701E32}" type="datetimeFigureOut">
               <a:rPr lang="en-GB" smtClean="0"/>
               <a:pPr/>
-              <a:t>20/03/2023</a:t>
+              <a:t>05/04/2023</a:t>
             </a:fld>
             <a:r>
               <a:rPr lang="en-GB" dirty="0"/>
@@ -3841,7 +3841,7 @@
             <a:fld id="{78417F83-4CBA-48F2-BAD0-783AE3701E32}" type="datetimeFigureOut">
               <a:rPr lang="en-GB" smtClean="0"/>
               <a:pPr/>
-              <a:t>20/03/2023</a:t>
+              <a:t>05/04/2023</a:t>
             </a:fld>
             <a:r>
               <a:rPr lang="en-GB" dirty="0"/>
@@ -4009,7 +4009,7 @@
             <a:fld id="{78417F83-4CBA-48F2-BAD0-783AE3701E32}" type="datetimeFigureOut">
               <a:rPr lang="en-GB" smtClean="0"/>
               <a:pPr/>
-              <a:t>20/03/2023</a:t>
+              <a:t>05/04/2023</a:t>
             </a:fld>
             <a:r>
               <a:rPr lang="en-GB" dirty="0"/>
@@ -4177,7 +4177,7 @@
           <a:p>
             <a:fld id="{8B1A925D-6802-4F82-B3A4-43BDB522D203}" type="datetimeFigureOut">
               <a:rPr lang="en-GB" smtClean="0"/>
-              <a:t>20/03/2023</a:t>
+              <a:t>05/04/2023</a:t>
             </a:fld>
             <a:endParaRPr lang="en-GB"/>
           </a:p>
@@ -4390,7 +4390,7 @@
             <a:fld id="{78417F83-4CBA-48F2-BAD0-783AE3701E32}" type="datetimeFigureOut">
               <a:rPr lang="en-GB" smtClean="0"/>
               <a:pPr/>
-              <a:t>20/03/2023</a:t>
+              <a:t>05/04/2023</a:t>
             </a:fld>
             <a:r>
               <a:rPr lang="en-GB" dirty="0"/>
@@ -4621,7 +4621,7 @@
             <a:fld id="{78417F83-4CBA-48F2-BAD0-783AE3701E32}" type="datetimeFigureOut">
               <a:rPr lang="en-GB" smtClean="0"/>
               <a:pPr/>
-              <a:t>20/03/2023</a:t>
+              <a:t>05/04/2023</a:t>
             </a:fld>
             <a:r>
               <a:rPr lang="en-GB" dirty="0"/>
@@ -4862,7 +4862,7 @@
             <a:fld id="{78417F83-4CBA-48F2-BAD0-783AE3701E32}" type="datetimeFigureOut">
               <a:rPr lang="en-GB" smtClean="0"/>
               <a:pPr/>
-              <a:t>20/03/2023</a:t>
+              <a:t>05/04/2023</a:t>
             </a:fld>
             <a:r>
               <a:rPr lang="en-GB" dirty="0"/>
@@ -5032,7 +5032,7 @@
             <a:fld id="{78417F83-4CBA-48F2-BAD0-783AE3701E32}" type="datetimeFigureOut">
               <a:rPr lang="en-GB" smtClean="0"/>
               <a:pPr/>
-              <a:t>20/03/2023</a:t>
+              <a:t>05/04/2023</a:t>
             </a:fld>
             <a:r>
               <a:rPr lang="en-GB" dirty="0"/>
@@ -5206,7 +5206,7 @@
             <a:fld id="{78417F83-4CBA-48F2-BAD0-783AE3701E32}" type="datetimeFigureOut">
               <a:rPr lang="en-GB" smtClean="0"/>
               <a:pPr/>
-              <a:t>20/03/2023</a:t>
+              <a:t>05/04/2023</a:t>
             </a:fld>
             <a:r>
               <a:rPr lang="en-GB" dirty="0"/>
@@ -5543,7 +5543,7 @@
             <a:fld id="{78417F83-4CBA-48F2-BAD0-783AE3701E32}" type="datetimeFigureOut">
               <a:rPr lang="en-GB" smtClean="0"/>
               <a:pPr/>
-              <a:t>20/03/2023</a:t>
+              <a:t>05/04/2023</a:t>
             </a:fld>
             <a:r>
               <a:rPr lang="en-GB" dirty="0"/>
@@ -5714,7 +5714,7 @@
             <a:fld id="{78417F83-4CBA-48F2-BAD0-783AE3701E32}" type="datetimeFigureOut">
               <a:rPr lang="en-GB" smtClean="0"/>
               <a:pPr/>
-              <a:t>20/03/2023</a:t>
+              <a:t>05/04/2023</a:t>
             </a:fld>
             <a:r>
               <a:rPr lang="en-GB" dirty="0"/>
@@ -5910,7 +5910,7 @@
             <a:fld id="{78417F83-4CBA-48F2-BAD0-783AE3701E32}" type="datetimeFigureOut">
               <a:rPr lang="en-GB" smtClean="0"/>
               <a:pPr/>
-              <a:t>20/03/2023</a:t>
+              <a:t>05/04/2023</a:t>
             </a:fld>
             <a:r>
               <a:rPr lang="en-GB" dirty="0"/>
@@ -6084,7 +6084,7 @@
             <a:fld id="{78417F83-4CBA-48F2-BAD0-783AE3701E32}" type="datetimeFigureOut">
               <a:rPr lang="en-GB" smtClean="0"/>
               <a:pPr/>
-              <a:t>20/03/2023</a:t>
+              <a:t>05/04/2023</a:t>
             </a:fld>
             <a:r>
               <a:rPr lang="en-GB" dirty="0"/>
@@ -6243,7 +6243,7 @@
             <a:fld id="{78417F83-4CBA-48F2-BAD0-783AE3701E32}" type="datetimeFigureOut">
               <a:rPr lang="en-GB" smtClean="0"/>
               <a:pPr/>
-              <a:t>20/03/2023</a:t>
+              <a:t>05/04/2023</a:t>
             </a:fld>
             <a:r>
               <a:rPr lang="en-GB" dirty="0"/>
@@ -6527,7 +6527,7 @@
           <a:p>
             <a:fld id="{8B1A925D-6802-4F82-B3A4-43BDB522D203}" type="datetimeFigureOut">
               <a:rPr lang="en-GB" smtClean="0"/>
-              <a:t>20/03/2023</a:t>
+              <a:t>05/04/2023</a:t>
             </a:fld>
             <a:endParaRPr lang="en-GB"/>
           </a:p>
@@ -7408,7 +7408,7 @@
             <a:fld id="{78417F83-4CBA-48F2-BAD0-783AE3701E32}" type="datetimeFigureOut">
               <a:rPr lang="en-GB" smtClean="0"/>
               <a:pPr/>
-              <a:t>20/03/2023</a:t>
+              <a:t>05/04/2023</a:t>
             </a:fld>
             <a:r>
               <a:rPr lang="en-GB" dirty="0"/>
@@ -7683,7 +7683,7 @@
             <a:fld id="{78417F83-4CBA-48F2-BAD0-783AE3701E32}" type="datetimeFigureOut">
               <a:rPr lang="en-GB" smtClean="0"/>
               <a:pPr/>
-              <a:t>20/03/2023</a:t>
+              <a:t>05/04/2023</a:t>
             </a:fld>
             <a:r>
               <a:rPr lang="en-GB" dirty="0"/>
@@ -8888,7 +8888,7 @@
           <a:p>
             <a:fld id="{8B1A925D-6802-4F82-B3A4-43BDB522D203}" type="datetimeFigureOut">
               <a:rPr lang="en-GB" smtClean="0"/>
-              <a:t>20/03/2023</a:t>
+              <a:t>05/04/2023</a:t>
             </a:fld>
             <a:endParaRPr lang="en-GB"/>
           </a:p>
@@ -9303,7 +9303,7 @@
           <a:p>
             <a:fld id="{8B1A925D-6802-4F82-B3A4-43BDB522D203}" type="datetimeFigureOut">
               <a:rPr lang="en-GB" smtClean="0"/>
-              <a:t>20/03/2023</a:t>
+              <a:t>05/04/2023</a:t>
             </a:fld>
             <a:endParaRPr lang="en-GB"/>
           </a:p>
@@ -9445,7 +9445,7 @@
           <a:p>
             <a:fld id="{8B1A925D-6802-4F82-B3A4-43BDB522D203}" type="datetimeFigureOut">
               <a:rPr lang="en-GB" smtClean="0"/>
-              <a:t>20/03/2023</a:t>
+              <a:t>05/04/2023</a:t>
             </a:fld>
             <a:endParaRPr lang="en-GB"/>
           </a:p>
@@ -9558,7 +9558,7 @@
           <a:p>
             <a:fld id="{8B1A925D-6802-4F82-B3A4-43BDB522D203}" type="datetimeFigureOut">
               <a:rPr lang="en-GB" smtClean="0"/>
-              <a:t>20/03/2023</a:t>
+              <a:t>05/04/2023</a:t>
             </a:fld>
             <a:endParaRPr lang="en-GB"/>
           </a:p>
@@ -9871,7 +9871,7 @@
           <a:p>
             <a:fld id="{8B1A925D-6802-4F82-B3A4-43BDB522D203}" type="datetimeFigureOut">
               <a:rPr lang="en-GB" smtClean="0"/>
-              <a:t>20/03/2023</a:t>
+              <a:t>05/04/2023</a:t>
             </a:fld>
             <a:endParaRPr lang="en-GB"/>
           </a:p>
@@ -10160,7 +10160,7 @@
           <a:p>
             <a:fld id="{8B1A925D-6802-4F82-B3A4-43BDB522D203}" type="datetimeFigureOut">
               <a:rPr lang="en-GB" smtClean="0"/>
-              <a:t>20/03/2023</a:t>
+              <a:t>05/04/2023</a:t>
             </a:fld>
             <a:endParaRPr lang="en-GB"/>
           </a:p>
@@ -10403,7 +10403,7 @@
           <a:p>
             <a:fld id="{8B1A925D-6802-4F82-B3A4-43BDB522D203}" type="datetimeFigureOut">
               <a:rPr lang="en-GB" smtClean="0"/>
-              <a:t>20/03/2023</a:t>
+              <a:t>05/04/2023</a:t>
             </a:fld>
             <a:endParaRPr lang="en-GB"/>
           </a:p>
@@ -11169,7 +11169,7 @@
             <a:fld id="{78417F83-4CBA-48F2-BAD0-783AE3701E32}" type="datetimeFigureOut">
               <a:rPr lang="en-GB" smtClean="0"/>
               <a:pPr/>
-              <a:t>20/03/2023</a:t>
+              <a:t>05/04/2023</a:t>
             </a:fld>
             <a:r>
               <a:rPr lang="en-GB"/>
@@ -12100,10 +12100,10 @@
         </p:nvGrpSpPr>
         <p:grpSpPr>
           <a:xfrm>
-            <a:off x="42564" y="2045229"/>
-            <a:ext cx="7426342" cy="3877063"/>
-            <a:chOff x="105994" y="1660805"/>
-            <a:chExt cx="9421297" cy="5656627"/>
+            <a:off x="36613" y="2045229"/>
+            <a:ext cx="7432293" cy="3877063"/>
+            <a:chOff x="98443" y="1660805"/>
+            <a:chExt cx="9428848" cy="5656627"/>
           </a:xfrm>
         </p:grpSpPr>
         <p:sp>
@@ -13103,8 +13103,8 @@
           </p:nvSpPr>
           <p:spPr>
             <a:xfrm rot="16200000">
-              <a:off x="-438127" y="5347277"/>
-              <a:ext cx="1508718" cy="390456"/>
+              <a:off x="-743334" y="5418199"/>
+              <a:ext cx="2074009" cy="390456"/>
             </a:xfrm>
             <a:prstGeom prst="rect">
               <a:avLst/>
@@ -13125,7 +13125,7 @@
                   <a:latin typeface="Arial" panose="020B0604020202020204" pitchFamily="34" charset="0"/>
                   <a:cs typeface="Arial" panose="020B0604020202020204" pitchFamily="34" charset="0"/>
                 </a:rPr>
-                <a:t>filling level</a:t>
+                <a:t>state of charge</a:t>
               </a:r>
             </a:p>
           </p:txBody>
@@ -16653,47 +16653,6 @@
             </a:p>
           </p:txBody>
         </p:sp>
-        <p:sp>
-          <p:nvSpPr>
-            <p:cNvPr id="58" name="TextBox 57">
-              <a:extLst>
-                <a:ext uri="{FF2B5EF4-FFF2-40B4-BE49-F238E27FC236}">
-                  <a16:creationId xmlns:a16="http://schemas.microsoft.com/office/drawing/2014/main" id="{1A487635-473D-4892-A033-4896FE19A01E}"/>
-                </a:ext>
-              </a:extLst>
-            </p:cNvPr>
-            <p:cNvSpPr txBox="1"/>
-            <p:nvPr/>
-          </p:nvSpPr>
-          <p:spPr>
-            <a:xfrm rot="16200000">
-              <a:off x="-438127" y="5347277"/>
-              <a:ext cx="1508718" cy="390456"/>
-            </a:xfrm>
-            <a:prstGeom prst="rect">
-              <a:avLst/>
-            </a:prstGeom>
-            <a:noFill/>
-          </p:spPr>
-          <p:txBody>
-            <a:bodyPr wrap="square" rtlCol="0">
-              <a:spAutoFit/>
-            </a:bodyPr>
-            <a:lstStyle/>
-            <a:p>
-              <a:r>
-                <a:rPr lang="en-GB" sz="1400" dirty="0">
-                  <a:solidFill>
-                    <a:prstClr val="black"/>
-                  </a:solidFill>
-                  <a:latin typeface="Arial" panose="020B0604020202020204" pitchFamily="34" charset="0"/>
-                  <a:cs typeface="Arial" panose="020B0604020202020204" pitchFamily="34" charset="0"/>
-                </a:rPr>
-                <a:t>filling level</a:t>
-              </a:r>
-            </a:p>
-          </p:txBody>
-        </p:sp>
         <p:cxnSp>
           <p:nvCxnSpPr>
             <p:cNvPr id="60" name="Straight Connector 59">
@@ -19560,6 +19519,47 @@
           </a:p>
         </p:txBody>
       </p:sp>
+      <p:sp>
+        <p:nvSpPr>
+          <p:cNvPr id="6" name="TextBox 5">
+            <a:extLst>
+              <a:ext uri="{FF2B5EF4-FFF2-40B4-BE49-F238E27FC236}">
+                <a16:creationId xmlns:a16="http://schemas.microsoft.com/office/drawing/2014/main" id="{B556CFA8-C550-3E80-AE0E-5BE6F918E630}"/>
+              </a:ext>
+            </a:extLst>
+          </p:cNvPr>
+          <p:cNvSpPr txBox="1"/>
+          <p:nvPr/>
+        </p:nvSpPr>
+        <p:spPr>
+          <a:xfrm rot="16200000">
+            <a:off x="-547159" y="4600475"/>
+            <a:ext cx="1421530" cy="307777"/>
+          </a:xfrm>
+          <a:prstGeom prst="rect">
+            <a:avLst/>
+          </a:prstGeom>
+          <a:noFill/>
+        </p:spPr>
+        <p:txBody>
+          <a:bodyPr wrap="square" rtlCol="0">
+            <a:spAutoFit/>
+          </a:bodyPr>
+          <a:lstStyle/>
+          <a:p>
+            <a:r>
+              <a:rPr lang="en-GB" sz="1400" dirty="0">
+                <a:solidFill>
+                  <a:prstClr val="black"/>
+                </a:solidFill>
+                <a:latin typeface="Arial" panose="020B0604020202020204" pitchFamily="34" charset="0"/>
+                <a:cs typeface="Arial" panose="020B0604020202020204" pitchFamily="34" charset="0"/>
+              </a:rPr>
+              <a:t>state of charge</a:t>
+            </a:r>
+          </a:p>
+        </p:txBody>
+      </p:sp>
     </p:spTree>
     <p:extLst>
       <p:ext uri="{BB962C8B-B14F-4D97-AF65-F5344CB8AC3E}">

</xml_diff>

<commit_message>
small updates figures chapter 14 (storage filling level sinusoidal)
</commit_message>
<xml_diff>
--- a/Figures/Chapter_14/drawings/Fig14.X_storage_theory.pptx
+++ b/Figures/Chapter_14/drawings/Fig14.X_storage_theory.pptx
@@ -263,7 +263,7 @@
           <a:p>
             <a:fld id="{8B1A925D-6802-4F82-B3A4-43BDB522D203}" type="datetimeFigureOut">
               <a:rPr lang="en-GB" smtClean="0"/>
-              <a:t>05/04/2023</a:t>
+              <a:t>02/06/2023</a:t>
             </a:fld>
             <a:endParaRPr lang="en-GB"/>
           </a:p>
@@ -463,7 +463,7 @@
           <a:p>
             <a:fld id="{8B1A925D-6802-4F82-B3A4-43BDB522D203}" type="datetimeFigureOut">
               <a:rPr lang="en-GB" smtClean="0"/>
-              <a:t>05/04/2023</a:t>
+              <a:t>02/06/2023</a:t>
             </a:fld>
             <a:endParaRPr lang="en-GB"/>
           </a:p>
@@ -673,7 +673,7 @@
           <a:p>
             <a:fld id="{8B1A925D-6802-4F82-B3A4-43BDB522D203}" type="datetimeFigureOut">
               <a:rPr lang="en-GB" smtClean="0"/>
-              <a:t>05/04/2023</a:t>
+              <a:t>02/06/2023</a:t>
             </a:fld>
             <a:endParaRPr lang="en-GB"/>
           </a:p>
@@ -1128,7 +1128,7 @@
             <a:fld id="{78417F83-4CBA-48F2-BAD0-783AE3701E32}" type="datetimeFigureOut">
               <a:rPr lang="en-GB" smtClean="0"/>
               <a:pPr/>
-              <a:t>05/04/2023</a:t>
+              <a:t>02/06/2023</a:t>
             </a:fld>
             <a:r>
               <a:rPr lang="en-GB" dirty="0"/>
@@ -1586,7 +1586,7 @@
             <a:fld id="{78417F83-4CBA-48F2-BAD0-783AE3701E32}" type="datetimeFigureOut">
               <a:rPr lang="en-GB" smtClean="0"/>
               <a:pPr/>
-              <a:t>05/04/2023</a:t>
+              <a:t>02/06/2023</a:t>
             </a:fld>
             <a:r>
               <a:rPr lang="en-GB" dirty="0"/>
@@ -2250,7 +2250,7 @@
             <a:fld id="{78417F83-4CBA-48F2-BAD0-783AE3701E32}" type="datetimeFigureOut">
               <a:rPr lang="en-GB" smtClean="0"/>
               <a:pPr/>
-              <a:t>05/04/2023</a:t>
+              <a:t>02/06/2023</a:t>
             </a:fld>
             <a:r>
               <a:rPr lang="en-GB" dirty="0"/>
@@ -2596,7 +2596,7 @@
             <a:fld id="{78417F83-4CBA-48F2-BAD0-783AE3701E32}" type="datetimeFigureOut">
               <a:rPr lang="en-GB" smtClean="0"/>
               <a:pPr/>
-              <a:t>05/04/2023</a:t>
+              <a:t>02/06/2023</a:t>
             </a:fld>
             <a:r>
               <a:rPr lang="en-GB" dirty="0"/>
@@ -2974,7 +2974,7 @@
             <a:fld id="{78417F83-4CBA-48F2-BAD0-783AE3701E32}" type="datetimeFigureOut">
               <a:rPr lang="en-GB" smtClean="0"/>
               <a:pPr/>
-              <a:t>05/04/2023</a:t>
+              <a:t>02/06/2023</a:t>
             </a:fld>
             <a:r>
               <a:rPr lang="en-GB" dirty="0"/>
@@ -3401,7 +3401,7 @@
             <a:fld id="{78417F83-4CBA-48F2-BAD0-783AE3701E32}" type="datetimeFigureOut">
               <a:rPr lang="en-GB" smtClean="0"/>
               <a:pPr/>
-              <a:t>05/04/2023</a:t>
+              <a:t>02/06/2023</a:t>
             </a:fld>
             <a:r>
               <a:rPr lang="en-GB" dirty="0"/>
@@ -3841,7 +3841,7 @@
             <a:fld id="{78417F83-4CBA-48F2-BAD0-783AE3701E32}" type="datetimeFigureOut">
               <a:rPr lang="en-GB" smtClean="0"/>
               <a:pPr/>
-              <a:t>05/04/2023</a:t>
+              <a:t>02/06/2023</a:t>
             </a:fld>
             <a:r>
               <a:rPr lang="en-GB" dirty="0"/>
@@ -4009,7 +4009,7 @@
             <a:fld id="{78417F83-4CBA-48F2-BAD0-783AE3701E32}" type="datetimeFigureOut">
               <a:rPr lang="en-GB" smtClean="0"/>
               <a:pPr/>
-              <a:t>05/04/2023</a:t>
+              <a:t>02/06/2023</a:t>
             </a:fld>
             <a:r>
               <a:rPr lang="en-GB" dirty="0"/>
@@ -4177,7 +4177,7 @@
           <a:p>
             <a:fld id="{8B1A925D-6802-4F82-B3A4-43BDB522D203}" type="datetimeFigureOut">
               <a:rPr lang="en-GB" smtClean="0"/>
-              <a:t>05/04/2023</a:t>
+              <a:t>02/06/2023</a:t>
             </a:fld>
             <a:endParaRPr lang="en-GB"/>
           </a:p>
@@ -4390,7 +4390,7 @@
             <a:fld id="{78417F83-4CBA-48F2-BAD0-783AE3701E32}" type="datetimeFigureOut">
               <a:rPr lang="en-GB" smtClean="0"/>
               <a:pPr/>
-              <a:t>05/04/2023</a:t>
+              <a:t>02/06/2023</a:t>
             </a:fld>
             <a:r>
               <a:rPr lang="en-GB" dirty="0"/>
@@ -4621,7 +4621,7 @@
             <a:fld id="{78417F83-4CBA-48F2-BAD0-783AE3701E32}" type="datetimeFigureOut">
               <a:rPr lang="en-GB" smtClean="0"/>
               <a:pPr/>
-              <a:t>05/04/2023</a:t>
+              <a:t>02/06/2023</a:t>
             </a:fld>
             <a:r>
               <a:rPr lang="en-GB" dirty="0"/>
@@ -4862,7 +4862,7 @@
             <a:fld id="{78417F83-4CBA-48F2-BAD0-783AE3701E32}" type="datetimeFigureOut">
               <a:rPr lang="en-GB" smtClean="0"/>
               <a:pPr/>
-              <a:t>05/04/2023</a:t>
+              <a:t>02/06/2023</a:t>
             </a:fld>
             <a:r>
               <a:rPr lang="en-GB" dirty="0"/>
@@ -5032,7 +5032,7 @@
             <a:fld id="{78417F83-4CBA-48F2-BAD0-783AE3701E32}" type="datetimeFigureOut">
               <a:rPr lang="en-GB" smtClean="0"/>
               <a:pPr/>
-              <a:t>05/04/2023</a:t>
+              <a:t>02/06/2023</a:t>
             </a:fld>
             <a:r>
               <a:rPr lang="en-GB" dirty="0"/>
@@ -5206,7 +5206,7 @@
             <a:fld id="{78417F83-4CBA-48F2-BAD0-783AE3701E32}" type="datetimeFigureOut">
               <a:rPr lang="en-GB" smtClean="0"/>
               <a:pPr/>
-              <a:t>05/04/2023</a:t>
+              <a:t>02/06/2023</a:t>
             </a:fld>
             <a:r>
               <a:rPr lang="en-GB" dirty="0"/>
@@ -5543,7 +5543,7 @@
             <a:fld id="{78417F83-4CBA-48F2-BAD0-783AE3701E32}" type="datetimeFigureOut">
               <a:rPr lang="en-GB" smtClean="0"/>
               <a:pPr/>
-              <a:t>05/04/2023</a:t>
+              <a:t>02/06/2023</a:t>
             </a:fld>
             <a:r>
               <a:rPr lang="en-GB" dirty="0"/>
@@ -5714,7 +5714,7 @@
             <a:fld id="{78417F83-4CBA-48F2-BAD0-783AE3701E32}" type="datetimeFigureOut">
               <a:rPr lang="en-GB" smtClean="0"/>
               <a:pPr/>
-              <a:t>05/04/2023</a:t>
+              <a:t>02/06/2023</a:t>
             </a:fld>
             <a:r>
               <a:rPr lang="en-GB" dirty="0"/>
@@ -5910,7 +5910,7 @@
             <a:fld id="{78417F83-4CBA-48F2-BAD0-783AE3701E32}" type="datetimeFigureOut">
               <a:rPr lang="en-GB" smtClean="0"/>
               <a:pPr/>
-              <a:t>05/04/2023</a:t>
+              <a:t>02/06/2023</a:t>
             </a:fld>
             <a:r>
               <a:rPr lang="en-GB" dirty="0"/>
@@ -6084,7 +6084,7 @@
             <a:fld id="{78417F83-4CBA-48F2-BAD0-783AE3701E32}" type="datetimeFigureOut">
               <a:rPr lang="en-GB" smtClean="0"/>
               <a:pPr/>
-              <a:t>05/04/2023</a:t>
+              <a:t>02/06/2023</a:t>
             </a:fld>
             <a:r>
               <a:rPr lang="en-GB" dirty="0"/>
@@ -6243,7 +6243,7 @@
             <a:fld id="{78417F83-4CBA-48F2-BAD0-783AE3701E32}" type="datetimeFigureOut">
               <a:rPr lang="en-GB" smtClean="0"/>
               <a:pPr/>
-              <a:t>05/04/2023</a:t>
+              <a:t>02/06/2023</a:t>
             </a:fld>
             <a:r>
               <a:rPr lang="en-GB" dirty="0"/>
@@ -6527,7 +6527,7 @@
           <a:p>
             <a:fld id="{8B1A925D-6802-4F82-B3A4-43BDB522D203}" type="datetimeFigureOut">
               <a:rPr lang="en-GB" smtClean="0"/>
-              <a:t>05/04/2023</a:t>
+              <a:t>02/06/2023</a:t>
             </a:fld>
             <a:endParaRPr lang="en-GB"/>
           </a:p>
@@ -7408,7 +7408,7 @@
             <a:fld id="{78417F83-4CBA-48F2-BAD0-783AE3701E32}" type="datetimeFigureOut">
               <a:rPr lang="en-GB" smtClean="0"/>
               <a:pPr/>
-              <a:t>05/04/2023</a:t>
+              <a:t>02/06/2023</a:t>
             </a:fld>
             <a:r>
               <a:rPr lang="en-GB" dirty="0"/>
@@ -7683,7 +7683,7 @@
             <a:fld id="{78417F83-4CBA-48F2-BAD0-783AE3701E32}" type="datetimeFigureOut">
               <a:rPr lang="en-GB" smtClean="0"/>
               <a:pPr/>
-              <a:t>05/04/2023</a:t>
+              <a:t>02/06/2023</a:t>
             </a:fld>
             <a:r>
               <a:rPr lang="en-GB" dirty="0"/>
@@ -8888,7 +8888,7 @@
           <a:p>
             <a:fld id="{8B1A925D-6802-4F82-B3A4-43BDB522D203}" type="datetimeFigureOut">
               <a:rPr lang="en-GB" smtClean="0"/>
-              <a:t>05/04/2023</a:t>
+              <a:t>02/06/2023</a:t>
             </a:fld>
             <a:endParaRPr lang="en-GB"/>
           </a:p>
@@ -9303,7 +9303,7 @@
           <a:p>
             <a:fld id="{8B1A925D-6802-4F82-B3A4-43BDB522D203}" type="datetimeFigureOut">
               <a:rPr lang="en-GB" smtClean="0"/>
-              <a:t>05/04/2023</a:t>
+              <a:t>02/06/2023</a:t>
             </a:fld>
             <a:endParaRPr lang="en-GB"/>
           </a:p>
@@ -9445,7 +9445,7 @@
           <a:p>
             <a:fld id="{8B1A925D-6802-4F82-B3A4-43BDB522D203}" type="datetimeFigureOut">
               <a:rPr lang="en-GB" smtClean="0"/>
-              <a:t>05/04/2023</a:t>
+              <a:t>02/06/2023</a:t>
             </a:fld>
             <a:endParaRPr lang="en-GB"/>
           </a:p>
@@ -9558,7 +9558,7 @@
           <a:p>
             <a:fld id="{8B1A925D-6802-4F82-B3A4-43BDB522D203}" type="datetimeFigureOut">
               <a:rPr lang="en-GB" smtClean="0"/>
-              <a:t>05/04/2023</a:t>
+              <a:t>02/06/2023</a:t>
             </a:fld>
             <a:endParaRPr lang="en-GB"/>
           </a:p>
@@ -9871,7 +9871,7 @@
           <a:p>
             <a:fld id="{8B1A925D-6802-4F82-B3A4-43BDB522D203}" type="datetimeFigureOut">
               <a:rPr lang="en-GB" smtClean="0"/>
-              <a:t>05/04/2023</a:t>
+              <a:t>02/06/2023</a:t>
             </a:fld>
             <a:endParaRPr lang="en-GB"/>
           </a:p>
@@ -10160,7 +10160,7 @@
           <a:p>
             <a:fld id="{8B1A925D-6802-4F82-B3A4-43BDB522D203}" type="datetimeFigureOut">
               <a:rPr lang="en-GB" smtClean="0"/>
-              <a:t>05/04/2023</a:t>
+              <a:t>02/06/2023</a:t>
             </a:fld>
             <a:endParaRPr lang="en-GB"/>
           </a:p>
@@ -10403,7 +10403,7 @@
           <a:p>
             <a:fld id="{8B1A925D-6802-4F82-B3A4-43BDB522D203}" type="datetimeFigureOut">
               <a:rPr lang="en-GB" smtClean="0"/>
-              <a:t>05/04/2023</a:t>
+              <a:t>02/06/2023</a:t>
             </a:fld>
             <a:endParaRPr lang="en-GB"/>
           </a:p>
@@ -11169,7 +11169,7 @@
             <a:fld id="{78417F83-4CBA-48F2-BAD0-783AE3701E32}" type="datetimeFigureOut">
               <a:rPr lang="en-GB" smtClean="0"/>
               <a:pPr/>
-              <a:t>05/04/2023</a:t>
+              <a:t>02/06/2023</a:t>
             </a:fld>
             <a:r>
               <a:rPr lang="en-GB"/>
@@ -12101,7 +12101,7 @@
         <p:grpSpPr>
           <a:xfrm>
             <a:off x="36613" y="2045229"/>
-            <a:ext cx="7432293" cy="3877063"/>
+            <a:ext cx="7432293" cy="3877064"/>
             <a:chOff x="98443" y="1660805"/>
             <a:chExt cx="9428848" cy="5656627"/>
           </a:xfrm>
@@ -13130,228 +13130,6 @@
             </a:p>
           </p:txBody>
         </p:sp>
-        <p:sp>
-          <p:nvSpPr>
-            <p:cNvPr id="59" name="Freeform: Shape 58">
-              <a:extLst>
-                <a:ext uri="{FF2B5EF4-FFF2-40B4-BE49-F238E27FC236}">
-                  <a16:creationId xmlns:a16="http://schemas.microsoft.com/office/drawing/2014/main" id="{B9F08C17-9EB8-4A72-A7E9-BCAC7746348D}"/>
-                </a:ext>
-              </a:extLst>
-            </p:cNvPr>
-            <p:cNvSpPr/>
-            <p:nvPr/>
-          </p:nvSpPr>
-          <p:spPr>
-            <a:xfrm>
-              <a:off x="457653" y="5386608"/>
-              <a:ext cx="4436007" cy="1763756"/>
-            </a:xfrm>
-            <a:custGeom>
-              <a:avLst/>
-              <a:gdLst>
-                <a:gd name="connsiteX0" fmla="*/ 0 w 2192826"/>
-                <a:gd name="connsiteY0" fmla="*/ 868094 h 1763756"/>
-                <a:gd name="connsiteX1" fmla="*/ 95340 w 2192826"/>
-                <a:gd name="connsiteY1" fmla="*/ 629743 h 1763756"/>
-                <a:gd name="connsiteX2" fmla="*/ 190680 w 2192826"/>
-                <a:gd name="connsiteY2" fmla="*/ 391392 h 1763756"/>
-                <a:gd name="connsiteX3" fmla="*/ 290354 w 2192826"/>
-                <a:gd name="connsiteY3" fmla="*/ 209379 h 1763756"/>
-                <a:gd name="connsiteX4" fmla="*/ 420364 w 2192826"/>
-                <a:gd name="connsiteY4" fmla="*/ 53368 h 1763756"/>
-                <a:gd name="connsiteX5" fmla="*/ 520038 w 2192826"/>
-                <a:gd name="connsiteY5" fmla="*/ 10031 h 1763756"/>
-                <a:gd name="connsiteX6" fmla="*/ 624045 w 2192826"/>
-                <a:gd name="connsiteY6" fmla="*/ 14365 h 1763756"/>
-                <a:gd name="connsiteX7" fmla="*/ 793058 w 2192826"/>
-                <a:gd name="connsiteY7" fmla="*/ 161709 h 1763756"/>
-                <a:gd name="connsiteX8" fmla="*/ 966404 w 2192826"/>
-                <a:gd name="connsiteY8" fmla="*/ 508401 h 1763756"/>
-                <a:gd name="connsiteX9" fmla="*/ 1100747 w 2192826"/>
-                <a:gd name="connsiteY9" fmla="*/ 876761 h 1763756"/>
-                <a:gd name="connsiteX10" fmla="*/ 1222089 w 2192826"/>
-                <a:gd name="connsiteY10" fmla="*/ 1249455 h 1763756"/>
-                <a:gd name="connsiteX11" fmla="*/ 1417103 w 2192826"/>
-                <a:gd name="connsiteY11" fmla="*/ 1617815 h 1763756"/>
-                <a:gd name="connsiteX12" fmla="*/ 1603450 w 2192826"/>
-                <a:gd name="connsiteY12" fmla="*/ 1760825 h 1763756"/>
-                <a:gd name="connsiteX13" fmla="*/ 1811465 w 2192826"/>
-                <a:gd name="connsiteY13" fmla="*/ 1695821 h 1763756"/>
-                <a:gd name="connsiteX14" fmla="*/ 1958809 w 2192826"/>
-                <a:gd name="connsiteY14" fmla="*/ 1483472 h 1763756"/>
-                <a:gd name="connsiteX15" fmla="*/ 2101820 w 2192826"/>
-                <a:gd name="connsiteY15" fmla="*/ 1145447 h 1763756"/>
-                <a:gd name="connsiteX16" fmla="*/ 2192826 w 2192826"/>
-                <a:gd name="connsiteY16" fmla="*/ 868094 h 1763756"/>
-              </a:gdLst>
-              <a:ahLst/>
-              <a:cxnLst>
-                <a:cxn ang="0">
-                  <a:pos x="connsiteX0" y="connsiteY0"/>
-                </a:cxn>
-                <a:cxn ang="0">
-                  <a:pos x="connsiteX1" y="connsiteY1"/>
-                </a:cxn>
-                <a:cxn ang="0">
-                  <a:pos x="connsiteX2" y="connsiteY2"/>
-                </a:cxn>
-                <a:cxn ang="0">
-                  <a:pos x="connsiteX3" y="connsiteY3"/>
-                </a:cxn>
-                <a:cxn ang="0">
-                  <a:pos x="connsiteX4" y="connsiteY4"/>
-                </a:cxn>
-                <a:cxn ang="0">
-                  <a:pos x="connsiteX5" y="connsiteY5"/>
-                </a:cxn>
-                <a:cxn ang="0">
-                  <a:pos x="connsiteX6" y="connsiteY6"/>
-                </a:cxn>
-                <a:cxn ang="0">
-                  <a:pos x="connsiteX7" y="connsiteY7"/>
-                </a:cxn>
-                <a:cxn ang="0">
-                  <a:pos x="connsiteX8" y="connsiteY8"/>
-                </a:cxn>
-                <a:cxn ang="0">
-                  <a:pos x="connsiteX9" y="connsiteY9"/>
-                </a:cxn>
-                <a:cxn ang="0">
-                  <a:pos x="connsiteX10" y="connsiteY10"/>
-                </a:cxn>
-                <a:cxn ang="0">
-                  <a:pos x="connsiteX11" y="connsiteY11"/>
-                </a:cxn>
-                <a:cxn ang="0">
-                  <a:pos x="connsiteX12" y="connsiteY12"/>
-                </a:cxn>
-                <a:cxn ang="0">
-                  <a:pos x="connsiteX13" y="connsiteY13"/>
-                </a:cxn>
-                <a:cxn ang="0">
-                  <a:pos x="connsiteX14" y="connsiteY14"/>
-                </a:cxn>
-                <a:cxn ang="0">
-                  <a:pos x="connsiteX15" y="connsiteY15"/>
-                </a:cxn>
-                <a:cxn ang="0">
-                  <a:pos x="connsiteX16" y="connsiteY16"/>
-                </a:cxn>
-              </a:cxnLst>
-              <a:rect l="l" t="t" r="r" b="b"/>
-              <a:pathLst>
-                <a:path w="2192826" h="1763756">
-                  <a:moveTo>
-                    <a:pt x="0" y="868094"/>
-                  </a:moveTo>
-                  <a:lnTo>
-                    <a:pt x="95340" y="629743"/>
-                  </a:lnTo>
-                  <a:cubicBezTo>
-                    <a:pt x="127120" y="550293"/>
-                    <a:pt x="158178" y="461453"/>
-                    <a:pt x="190680" y="391392"/>
-                  </a:cubicBezTo>
-                  <a:cubicBezTo>
-                    <a:pt x="223182" y="321331"/>
-                    <a:pt x="252073" y="265716"/>
-                    <a:pt x="290354" y="209379"/>
-                  </a:cubicBezTo>
-                  <a:cubicBezTo>
-                    <a:pt x="328635" y="153042"/>
-                    <a:pt x="382083" y="86593"/>
-                    <a:pt x="420364" y="53368"/>
-                  </a:cubicBezTo>
-                  <a:cubicBezTo>
-                    <a:pt x="458645" y="20143"/>
-                    <a:pt x="486091" y="16531"/>
-                    <a:pt x="520038" y="10031"/>
-                  </a:cubicBezTo>
-                  <a:cubicBezTo>
-                    <a:pt x="553985" y="3531"/>
-                    <a:pt x="578542" y="-10915"/>
-                    <a:pt x="624045" y="14365"/>
-                  </a:cubicBezTo>
-                  <a:cubicBezTo>
-                    <a:pt x="669548" y="39645"/>
-                    <a:pt x="735998" y="79370"/>
-                    <a:pt x="793058" y="161709"/>
-                  </a:cubicBezTo>
-                  <a:cubicBezTo>
-                    <a:pt x="850118" y="244048"/>
-                    <a:pt x="915123" y="389226"/>
-                    <a:pt x="966404" y="508401"/>
-                  </a:cubicBezTo>
-                  <a:cubicBezTo>
-                    <a:pt x="1017685" y="627576"/>
-                    <a:pt x="1058133" y="753252"/>
-                    <a:pt x="1100747" y="876761"/>
-                  </a:cubicBezTo>
-                  <a:cubicBezTo>
-                    <a:pt x="1143361" y="1000270"/>
-                    <a:pt x="1169363" y="1125946"/>
-                    <a:pt x="1222089" y="1249455"/>
-                  </a:cubicBezTo>
-                  <a:cubicBezTo>
-                    <a:pt x="1274815" y="1372964"/>
-                    <a:pt x="1353543" y="1532587"/>
-                    <a:pt x="1417103" y="1617815"/>
-                  </a:cubicBezTo>
-                  <a:cubicBezTo>
-                    <a:pt x="1480663" y="1703043"/>
-                    <a:pt x="1537723" y="1747824"/>
-                    <a:pt x="1603450" y="1760825"/>
-                  </a:cubicBezTo>
-                  <a:cubicBezTo>
-                    <a:pt x="1669177" y="1773826"/>
-                    <a:pt x="1752239" y="1742047"/>
-                    <a:pt x="1811465" y="1695821"/>
-                  </a:cubicBezTo>
-                  <a:cubicBezTo>
-                    <a:pt x="1870692" y="1649596"/>
-                    <a:pt x="1910417" y="1575201"/>
-                    <a:pt x="1958809" y="1483472"/>
-                  </a:cubicBezTo>
-                  <a:cubicBezTo>
-                    <a:pt x="2007202" y="1391743"/>
-                    <a:pt x="2062817" y="1248010"/>
-                    <a:pt x="2101820" y="1145447"/>
-                  </a:cubicBezTo>
-                  <a:cubicBezTo>
-                    <a:pt x="2140823" y="1042884"/>
-                    <a:pt x="2166824" y="955489"/>
-                    <a:pt x="2192826" y="868094"/>
-                  </a:cubicBezTo>
-                </a:path>
-              </a:pathLst>
-            </a:custGeom>
-            <a:noFill/>
-            <a:ln w="38100" cap="flat" cmpd="sng" algn="ctr">
-              <a:solidFill>
-                <a:srgbClr val="C00000"/>
-              </a:solidFill>
-              <a:prstDash val="solid"/>
-              <a:miter lim="800000"/>
-            </a:ln>
-            <a:effectLst/>
-          </p:spPr>
-          <p:txBody>
-            <a:bodyPr rtlCol="0" anchor="ctr"/>
-            <a:lstStyle/>
-            <a:p>
-              <a:pPr algn="ctr">
-                <a:defRPr/>
-              </a:pPr>
-              <a:endParaRPr lang="en-GB" kern="0">
-                <a:solidFill>
-                  <a:prstClr val="white"/>
-                </a:solidFill>
-                <a:latin typeface="Calibri" panose="020F0502020204030204"/>
-              </a:endParaRPr>
-            </a:p>
-          </p:txBody>
-        </p:sp>
         <p:cxnSp>
           <p:nvCxnSpPr>
             <p:cNvPr id="60" name="Straight Connector 59">
@@ -13711,450 +13489,6 @@
             </a:solidFill>
             <a:ln w="12700" cap="flat" cmpd="sng" algn="ctr">
               <a:noFill/>
-              <a:prstDash val="solid"/>
-              <a:miter lim="800000"/>
-            </a:ln>
-            <a:effectLst/>
-          </p:spPr>
-          <p:txBody>
-            <a:bodyPr rtlCol="0" anchor="ctr"/>
-            <a:lstStyle/>
-            <a:p>
-              <a:pPr algn="ctr">
-                <a:defRPr/>
-              </a:pPr>
-              <a:endParaRPr lang="en-GB" kern="0">
-                <a:solidFill>
-                  <a:prstClr val="white"/>
-                </a:solidFill>
-                <a:latin typeface="Calibri" panose="020F0502020204030204"/>
-              </a:endParaRPr>
-            </a:p>
-          </p:txBody>
-        </p:sp>
-        <p:sp>
-          <p:nvSpPr>
-            <p:cNvPr id="71" name="Freeform: Shape 70">
-              <a:extLst>
-                <a:ext uri="{FF2B5EF4-FFF2-40B4-BE49-F238E27FC236}">
-                  <a16:creationId xmlns:a16="http://schemas.microsoft.com/office/drawing/2014/main" id="{0FEB4748-ADDA-4F8D-BFBC-A72E638B0E11}"/>
-                </a:ext>
-              </a:extLst>
-            </p:cNvPr>
-            <p:cNvSpPr/>
-            <p:nvPr/>
-          </p:nvSpPr>
-          <p:spPr>
-            <a:xfrm>
-              <a:off x="4883368" y="5401114"/>
-              <a:ext cx="4436007" cy="1763756"/>
-            </a:xfrm>
-            <a:custGeom>
-              <a:avLst/>
-              <a:gdLst>
-                <a:gd name="connsiteX0" fmla="*/ 0 w 2192826"/>
-                <a:gd name="connsiteY0" fmla="*/ 868094 h 1763756"/>
-                <a:gd name="connsiteX1" fmla="*/ 95340 w 2192826"/>
-                <a:gd name="connsiteY1" fmla="*/ 629743 h 1763756"/>
-                <a:gd name="connsiteX2" fmla="*/ 190680 w 2192826"/>
-                <a:gd name="connsiteY2" fmla="*/ 391392 h 1763756"/>
-                <a:gd name="connsiteX3" fmla="*/ 290354 w 2192826"/>
-                <a:gd name="connsiteY3" fmla="*/ 209379 h 1763756"/>
-                <a:gd name="connsiteX4" fmla="*/ 420364 w 2192826"/>
-                <a:gd name="connsiteY4" fmla="*/ 53368 h 1763756"/>
-                <a:gd name="connsiteX5" fmla="*/ 520038 w 2192826"/>
-                <a:gd name="connsiteY5" fmla="*/ 10031 h 1763756"/>
-                <a:gd name="connsiteX6" fmla="*/ 624045 w 2192826"/>
-                <a:gd name="connsiteY6" fmla="*/ 14365 h 1763756"/>
-                <a:gd name="connsiteX7" fmla="*/ 793058 w 2192826"/>
-                <a:gd name="connsiteY7" fmla="*/ 161709 h 1763756"/>
-                <a:gd name="connsiteX8" fmla="*/ 966404 w 2192826"/>
-                <a:gd name="connsiteY8" fmla="*/ 508401 h 1763756"/>
-                <a:gd name="connsiteX9" fmla="*/ 1100747 w 2192826"/>
-                <a:gd name="connsiteY9" fmla="*/ 876761 h 1763756"/>
-                <a:gd name="connsiteX10" fmla="*/ 1222089 w 2192826"/>
-                <a:gd name="connsiteY10" fmla="*/ 1249455 h 1763756"/>
-                <a:gd name="connsiteX11" fmla="*/ 1417103 w 2192826"/>
-                <a:gd name="connsiteY11" fmla="*/ 1617815 h 1763756"/>
-                <a:gd name="connsiteX12" fmla="*/ 1603450 w 2192826"/>
-                <a:gd name="connsiteY12" fmla="*/ 1760825 h 1763756"/>
-                <a:gd name="connsiteX13" fmla="*/ 1811465 w 2192826"/>
-                <a:gd name="connsiteY13" fmla="*/ 1695821 h 1763756"/>
-                <a:gd name="connsiteX14" fmla="*/ 1958809 w 2192826"/>
-                <a:gd name="connsiteY14" fmla="*/ 1483472 h 1763756"/>
-                <a:gd name="connsiteX15" fmla="*/ 2101820 w 2192826"/>
-                <a:gd name="connsiteY15" fmla="*/ 1145447 h 1763756"/>
-                <a:gd name="connsiteX16" fmla="*/ 2192826 w 2192826"/>
-                <a:gd name="connsiteY16" fmla="*/ 868094 h 1763756"/>
-              </a:gdLst>
-              <a:ahLst/>
-              <a:cxnLst>
-                <a:cxn ang="0">
-                  <a:pos x="connsiteX0" y="connsiteY0"/>
-                </a:cxn>
-                <a:cxn ang="0">
-                  <a:pos x="connsiteX1" y="connsiteY1"/>
-                </a:cxn>
-                <a:cxn ang="0">
-                  <a:pos x="connsiteX2" y="connsiteY2"/>
-                </a:cxn>
-                <a:cxn ang="0">
-                  <a:pos x="connsiteX3" y="connsiteY3"/>
-                </a:cxn>
-                <a:cxn ang="0">
-                  <a:pos x="connsiteX4" y="connsiteY4"/>
-                </a:cxn>
-                <a:cxn ang="0">
-                  <a:pos x="connsiteX5" y="connsiteY5"/>
-                </a:cxn>
-                <a:cxn ang="0">
-                  <a:pos x="connsiteX6" y="connsiteY6"/>
-                </a:cxn>
-                <a:cxn ang="0">
-                  <a:pos x="connsiteX7" y="connsiteY7"/>
-                </a:cxn>
-                <a:cxn ang="0">
-                  <a:pos x="connsiteX8" y="connsiteY8"/>
-                </a:cxn>
-                <a:cxn ang="0">
-                  <a:pos x="connsiteX9" y="connsiteY9"/>
-                </a:cxn>
-                <a:cxn ang="0">
-                  <a:pos x="connsiteX10" y="connsiteY10"/>
-                </a:cxn>
-                <a:cxn ang="0">
-                  <a:pos x="connsiteX11" y="connsiteY11"/>
-                </a:cxn>
-                <a:cxn ang="0">
-                  <a:pos x="connsiteX12" y="connsiteY12"/>
-                </a:cxn>
-                <a:cxn ang="0">
-                  <a:pos x="connsiteX13" y="connsiteY13"/>
-                </a:cxn>
-                <a:cxn ang="0">
-                  <a:pos x="connsiteX14" y="connsiteY14"/>
-                </a:cxn>
-                <a:cxn ang="0">
-                  <a:pos x="connsiteX15" y="connsiteY15"/>
-                </a:cxn>
-                <a:cxn ang="0">
-                  <a:pos x="connsiteX16" y="connsiteY16"/>
-                </a:cxn>
-              </a:cxnLst>
-              <a:rect l="l" t="t" r="r" b="b"/>
-              <a:pathLst>
-                <a:path w="2192826" h="1763756">
-                  <a:moveTo>
-                    <a:pt x="0" y="868094"/>
-                  </a:moveTo>
-                  <a:lnTo>
-                    <a:pt x="95340" y="629743"/>
-                  </a:lnTo>
-                  <a:cubicBezTo>
-                    <a:pt x="127120" y="550293"/>
-                    <a:pt x="158178" y="461453"/>
-                    <a:pt x="190680" y="391392"/>
-                  </a:cubicBezTo>
-                  <a:cubicBezTo>
-                    <a:pt x="223182" y="321331"/>
-                    <a:pt x="252073" y="265716"/>
-                    <a:pt x="290354" y="209379"/>
-                  </a:cubicBezTo>
-                  <a:cubicBezTo>
-                    <a:pt x="328635" y="153042"/>
-                    <a:pt x="382083" y="86593"/>
-                    <a:pt x="420364" y="53368"/>
-                  </a:cubicBezTo>
-                  <a:cubicBezTo>
-                    <a:pt x="458645" y="20143"/>
-                    <a:pt x="486091" y="16531"/>
-                    <a:pt x="520038" y="10031"/>
-                  </a:cubicBezTo>
-                  <a:cubicBezTo>
-                    <a:pt x="553985" y="3531"/>
-                    <a:pt x="578542" y="-10915"/>
-                    <a:pt x="624045" y="14365"/>
-                  </a:cubicBezTo>
-                  <a:cubicBezTo>
-                    <a:pt x="669548" y="39645"/>
-                    <a:pt x="735998" y="79370"/>
-                    <a:pt x="793058" y="161709"/>
-                  </a:cubicBezTo>
-                  <a:cubicBezTo>
-                    <a:pt x="850118" y="244048"/>
-                    <a:pt x="915123" y="389226"/>
-                    <a:pt x="966404" y="508401"/>
-                  </a:cubicBezTo>
-                  <a:cubicBezTo>
-                    <a:pt x="1017685" y="627576"/>
-                    <a:pt x="1058133" y="753252"/>
-                    <a:pt x="1100747" y="876761"/>
-                  </a:cubicBezTo>
-                  <a:cubicBezTo>
-                    <a:pt x="1143361" y="1000270"/>
-                    <a:pt x="1169363" y="1125946"/>
-                    <a:pt x="1222089" y="1249455"/>
-                  </a:cubicBezTo>
-                  <a:cubicBezTo>
-                    <a:pt x="1274815" y="1372964"/>
-                    <a:pt x="1353543" y="1532587"/>
-                    <a:pt x="1417103" y="1617815"/>
-                  </a:cubicBezTo>
-                  <a:cubicBezTo>
-                    <a:pt x="1480663" y="1703043"/>
-                    <a:pt x="1537723" y="1747824"/>
-                    <a:pt x="1603450" y="1760825"/>
-                  </a:cubicBezTo>
-                  <a:cubicBezTo>
-                    <a:pt x="1669177" y="1773826"/>
-                    <a:pt x="1752239" y="1742047"/>
-                    <a:pt x="1811465" y="1695821"/>
-                  </a:cubicBezTo>
-                  <a:cubicBezTo>
-                    <a:pt x="1870692" y="1649596"/>
-                    <a:pt x="1910417" y="1575201"/>
-                    <a:pt x="1958809" y="1483472"/>
-                  </a:cubicBezTo>
-                  <a:cubicBezTo>
-                    <a:pt x="2007202" y="1391743"/>
-                    <a:pt x="2062817" y="1248010"/>
-                    <a:pt x="2101820" y="1145447"/>
-                  </a:cubicBezTo>
-                  <a:cubicBezTo>
-                    <a:pt x="2140823" y="1042884"/>
-                    <a:pt x="2166824" y="955489"/>
-                    <a:pt x="2192826" y="868094"/>
-                  </a:cubicBezTo>
-                </a:path>
-              </a:pathLst>
-            </a:custGeom>
-            <a:noFill/>
-            <a:ln w="38100" cap="flat" cmpd="sng" algn="ctr">
-              <a:solidFill>
-                <a:srgbClr val="C00000"/>
-              </a:solidFill>
-              <a:prstDash val="solid"/>
-              <a:miter lim="800000"/>
-            </a:ln>
-            <a:effectLst/>
-          </p:spPr>
-          <p:txBody>
-            <a:bodyPr rtlCol="0" anchor="ctr"/>
-            <a:lstStyle/>
-            <a:p>
-              <a:pPr algn="ctr">
-                <a:defRPr/>
-              </a:pPr>
-              <a:endParaRPr lang="en-GB" kern="0">
-                <a:solidFill>
-                  <a:prstClr val="white"/>
-                </a:solidFill>
-                <a:latin typeface="Calibri" panose="020F0502020204030204"/>
-              </a:endParaRPr>
-            </a:p>
-          </p:txBody>
-        </p:sp>
-        <p:sp>
-          <p:nvSpPr>
-            <p:cNvPr id="72" name="Freeform: Shape 71">
-              <a:extLst>
-                <a:ext uri="{FF2B5EF4-FFF2-40B4-BE49-F238E27FC236}">
-                  <a16:creationId xmlns:a16="http://schemas.microsoft.com/office/drawing/2014/main" id="{E162AB2E-B297-4096-8CEA-5F6383ED98E4}"/>
-                </a:ext>
-              </a:extLst>
-            </p:cNvPr>
-            <p:cNvSpPr/>
-            <p:nvPr/>
-          </p:nvSpPr>
-          <p:spPr>
-            <a:xfrm>
-              <a:off x="2664709" y="5348786"/>
-              <a:ext cx="4378616" cy="1763756"/>
-            </a:xfrm>
-            <a:custGeom>
-              <a:avLst/>
-              <a:gdLst>
-                <a:gd name="connsiteX0" fmla="*/ 0 w 2192826"/>
-                <a:gd name="connsiteY0" fmla="*/ 868094 h 1763756"/>
-                <a:gd name="connsiteX1" fmla="*/ 95340 w 2192826"/>
-                <a:gd name="connsiteY1" fmla="*/ 629743 h 1763756"/>
-                <a:gd name="connsiteX2" fmla="*/ 190680 w 2192826"/>
-                <a:gd name="connsiteY2" fmla="*/ 391392 h 1763756"/>
-                <a:gd name="connsiteX3" fmla="*/ 290354 w 2192826"/>
-                <a:gd name="connsiteY3" fmla="*/ 209379 h 1763756"/>
-                <a:gd name="connsiteX4" fmla="*/ 420364 w 2192826"/>
-                <a:gd name="connsiteY4" fmla="*/ 53368 h 1763756"/>
-                <a:gd name="connsiteX5" fmla="*/ 520038 w 2192826"/>
-                <a:gd name="connsiteY5" fmla="*/ 10031 h 1763756"/>
-                <a:gd name="connsiteX6" fmla="*/ 624045 w 2192826"/>
-                <a:gd name="connsiteY6" fmla="*/ 14365 h 1763756"/>
-                <a:gd name="connsiteX7" fmla="*/ 793058 w 2192826"/>
-                <a:gd name="connsiteY7" fmla="*/ 161709 h 1763756"/>
-                <a:gd name="connsiteX8" fmla="*/ 966404 w 2192826"/>
-                <a:gd name="connsiteY8" fmla="*/ 508401 h 1763756"/>
-                <a:gd name="connsiteX9" fmla="*/ 1100747 w 2192826"/>
-                <a:gd name="connsiteY9" fmla="*/ 876761 h 1763756"/>
-                <a:gd name="connsiteX10" fmla="*/ 1222089 w 2192826"/>
-                <a:gd name="connsiteY10" fmla="*/ 1249455 h 1763756"/>
-                <a:gd name="connsiteX11" fmla="*/ 1417103 w 2192826"/>
-                <a:gd name="connsiteY11" fmla="*/ 1617815 h 1763756"/>
-                <a:gd name="connsiteX12" fmla="*/ 1603450 w 2192826"/>
-                <a:gd name="connsiteY12" fmla="*/ 1760825 h 1763756"/>
-                <a:gd name="connsiteX13" fmla="*/ 1811465 w 2192826"/>
-                <a:gd name="connsiteY13" fmla="*/ 1695821 h 1763756"/>
-                <a:gd name="connsiteX14" fmla="*/ 1958809 w 2192826"/>
-                <a:gd name="connsiteY14" fmla="*/ 1483472 h 1763756"/>
-                <a:gd name="connsiteX15" fmla="*/ 2101820 w 2192826"/>
-                <a:gd name="connsiteY15" fmla="*/ 1145447 h 1763756"/>
-                <a:gd name="connsiteX16" fmla="*/ 2192826 w 2192826"/>
-                <a:gd name="connsiteY16" fmla="*/ 868094 h 1763756"/>
-              </a:gdLst>
-              <a:ahLst/>
-              <a:cxnLst>
-                <a:cxn ang="0">
-                  <a:pos x="connsiteX0" y="connsiteY0"/>
-                </a:cxn>
-                <a:cxn ang="0">
-                  <a:pos x="connsiteX1" y="connsiteY1"/>
-                </a:cxn>
-                <a:cxn ang="0">
-                  <a:pos x="connsiteX2" y="connsiteY2"/>
-                </a:cxn>
-                <a:cxn ang="0">
-                  <a:pos x="connsiteX3" y="connsiteY3"/>
-                </a:cxn>
-                <a:cxn ang="0">
-                  <a:pos x="connsiteX4" y="connsiteY4"/>
-                </a:cxn>
-                <a:cxn ang="0">
-                  <a:pos x="connsiteX5" y="connsiteY5"/>
-                </a:cxn>
-                <a:cxn ang="0">
-                  <a:pos x="connsiteX6" y="connsiteY6"/>
-                </a:cxn>
-                <a:cxn ang="0">
-                  <a:pos x="connsiteX7" y="connsiteY7"/>
-                </a:cxn>
-                <a:cxn ang="0">
-                  <a:pos x="connsiteX8" y="connsiteY8"/>
-                </a:cxn>
-                <a:cxn ang="0">
-                  <a:pos x="connsiteX9" y="connsiteY9"/>
-                </a:cxn>
-                <a:cxn ang="0">
-                  <a:pos x="connsiteX10" y="connsiteY10"/>
-                </a:cxn>
-                <a:cxn ang="0">
-                  <a:pos x="connsiteX11" y="connsiteY11"/>
-                </a:cxn>
-                <a:cxn ang="0">
-                  <a:pos x="connsiteX12" y="connsiteY12"/>
-                </a:cxn>
-                <a:cxn ang="0">
-                  <a:pos x="connsiteX13" y="connsiteY13"/>
-                </a:cxn>
-                <a:cxn ang="0">
-                  <a:pos x="connsiteX14" y="connsiteY14"/>
-                </a:cxn>
-                <a:cxn ang="0">
-                  <a:pos x="connsiteX15" y="connsiteY15"/>
-                </a:cxn>
-                <a:cxn ang="0">
-                  <a:pos x="connsiteX16" y="connsiteY16"/>
-                </a:cxn>
-              </a:cxnLst>
-              <a:rect l="l" t="t" r="r" b="b"/>
-              <a:pathLst>
-                <a:path w="2192826" h="1763756">
-                  <a:moveTo>
-                    <a:pt x="0" y="868094"/>
-                  </a:moveTo>
-                  <a:lnTo>
-                    <a:pt x="95340" y="629743"/>
-                  </a:lnTo>
-                  <a:cubicBezTo>
-                    <a:pt x="127120" y="550293"/>
-                    <a:pt x="158178" y="461453"/>
-                    <a:pt x="190680" y="391392"/>
-                  </a:cubicBezTo>
-                  <a:cubicBezTo>
-                    <a:pt x="223182" y="321331"/>
-                    <a:pt x="252073" y="265716"/>
-                    <a:pt x="290354" y="209379"/>
-                  </a:cubicBezTo>
-                  <a:cubicBezTo>
-                    <a:pt x="328635" y="153042"/>
-                    <a:pt x="382083" y="86593"/>
-                    <a:pt x="420364" y="53368"/>
-                  </a:cubicBezTo>
-                  <a:cubicBezTo>
-                    <a:pt x="458645" y="20143"/>
-                    <a:pt x="486091" y="16531"/>
-                    <a:pt x="520038" y="10031"/>
-                  </a:cubicBezTo>
-                  <a:cubicBezTo>
-                    <a:pt x="553985" y="3531"/>
-                    <a:pt x="578542" y="-10915"/>
-                    <a:pt x="624045" y="14365"/>
-                  </a:cubicBezTo>
-                  <a:cubicBezTo>
-                    <a:pt x="669548" y="39645"/>
-                    <a:pt x="735998" y="79370"/>
-                    <a:pt x="793058" y="161709"/>
-                  </a:cubicBezTo>
-                  <a:cubicBezTo>
-                    <a:pt x="850118" y="244048"/>
-                    <a:pt x="915123" y="389226"/>
-                    <a:pt x="966404" y="508401"/>
-                  </a:cubicBezTo>
-                  <a:cubicBezTo>
-                    <a:pt x="1017685" y="627576"/>
-                    <a:pt x="1058133" y="753252"/>
-                    <a:pt x="1100747" y="876761"/>
-                  </a:cubicBezTo>
-                  <a:cubicBezTo>
-                    <a:pt x="1143361" y="1000270"/>
-                    <a:pt x="1169363" y="1125946"/>
-                    <a:pt x="1222089" y="1249455"/>
-                  </a:cubicBezTo>
-                  <a:cubicBezTo>
-                    <a:pt x="1274815" y="1372964"/>
-                    <a:pt x="1353543" y="1532587"/>
-                    <a:pt x="1417103" y="1617815"/>
-                  </a:cubicBezTo>
-                  <a:cubicBezTo>
-                    <a:pt x="1480663" y="1703043"/>
-                    <a:pt x="1537723" y="1747824"/>
-                    <a:pt x="1603450" y="1760825"/>
-                  </a:cubicBezTo>
-                  <a:cubicBezTo>
-                    <a:pt x="1669177" y="1773826"/>
-                    <a:pt x="1752239" y="1742047"/>
-                    <a:pt x="1811465" y="1695821"/>
-                  </a:cubicBezTo>
-                  <a:cubicBezTo>
-                    <a:pt x="1870692" y="1649596"/>
-                    <a:pt x="1910417" y="1575201"/>
-                    <a:pt x="1958809" y="1483472"/>
-                  </a:cubicBezTo>
-                  <a:cubicBezTo>
-                    <a:pt x="2007202" y="1391743"/>
-                    <a:pt x="2062817" y="1248010"/>
-                    <a:pt x="2101820" y="1145447"/>
-                  </a:cubicBezTo>
-                  <a:cubicBezTo>
-                    <a:pt x="2140823" y="1042884"/>
-                    <a:pt x="2166824" y="955489"/>
-                    <a:pt x="2192826" y="868094"/>
-                  </a:cubicBezTo>
-                </a:path>
-              </a:pathLst>
-            </a:custGeom>
-            <a:noFill/>
-            <a:ln w="38100" cap="flat" cmpd="sng" algn="ctr">
-              <a:solidFill>
-                <a:srgbClr val="C00000"/>
-              </a:solidFill>
               <a:prstDash val="solid"/>
               <a:miter lim="800000"/>
             </a:ln>
@@ -16208,6 +15542,420 @@
               </a:rPr>
               <a:t>b)</a:t>
             </a:r>
+          </a:p>
+        </p:txBody>
+      </p:sp>
+      <p:sp>
+        <p:nvSpPr>
+          <p:cNvPr id="8" name="Freeform: Shape 7">
+            <a:extLst>
+              <a:ext uri="{FF2B5EF4-FFF2-40B4-BE49-F238E27FC236}">
+                <a16:creationId xmlns:a16="http://schemas.microsoft.com/office/drawing/2014/main" id="{E48479BD-2058-662D-CE69-C165EE378224}"/>
+              </a:ext>
+            </a:extLst>
+          </p:cNvPr>
+          <p:cNvSpPr/>
+          <p:nvPr/>
+        </p:nvSpPr>
+        <p:spPr>
+          <a:xfrm>
+            <a:off x="346841" y="4529959"/>
+            <a:ext cx="1723697" cy="651641"/>
+          </a:xfrm>
+          <a:custGeom>
+            <a:avLst/>
+            <a:gdLst>
+              <a:gd name="connsiteX0" fmla="*/ 0 w 1723697"/>
+              <a:gd name="connsiteY0" fmla="*/ 651641 h 651641"/>
+              <a:gd name="connsiteX1" fmla="*/ 231228 w 1723697"/>
+              <a:gd name="connsiteY1" fmla="*/ 557048 h 651641"/>
+              <a:gd name="connsiteX2" fmla="*/ 620110 w 1723697"/>
+              <a:gd name="connsiteY2" fmla="*/ 105103 h 651641"/>
+              <a:gd name="connsiteX3" fmla="*/ 840828 w 1723697"/>
+              <a:gd name="connsiteY3" fmla="*/ 0 h 651641"/>
+              <a:gd name="connsiteX4" fmla="*/ 1082566 w 1723697"/>
+              <a:gd name="connsiteY4" fmla="*/ 105103 h 651641"/>
+              <a:gd name="connsiteX5" fmla="*/ 1450428 w 1723697"/>
+              <a:gd name="connsiteY5" fmla="*/ 546538 h 651641"/>
+              <a:gd name="connsiteX6" fmla="*/ 1723697 w 1723697"/>
+              <a:gd name="connsiteY6" fmla="*/ 630620 h 651641"/>
+              <a:gd name="connsiteX7" fmla="*/ 1723697 w 1723697"/>
+              <a:gd name="connsiteY7" fmla="*/ 630620 h 651641"/>
+            </a:gdLst>
+            <a:ahLst/>
+            <a:cxnLst>
+              <a:cxn ang="0">
+                <a:pos x="connsiteX0" y="connsiteY0"/>
+              </a:cxn>
+              <a:cxn ang="0">
+                <a:pos x="connsiteX1" y="connsiteY1"/>
+              </a:cxn>
+              <a:cxn ang="0">
+                <a:pos x="connsiteX2" y="connsiteY2"/>
+              </a:cxn>
+              <a:cxn ang="0">
+                <a:pos x="connsiteX3" y="connsiteY3"/>
+              </a:cxn>
+              <a:cxn ang="0">
+                <a:pos x="connsiteX4" y="connsiteY4"/>
+              </a:cxn>
+              <a:cxn ang="0">
+                <a:pos x="connsiteX5" y="connsiteY5"/>
+              </a:cxn>
+              <a:cxn ang="0">
+                <a:pos x="connsiteX6" y="connsiteY6"/>
+              </a:cxn>
+              <a:cxn ang="0">
+                <a:pos x="connsiteX7" y="connsiteY7"/>
+              </a:cxn>
+            </a:cxnLst>
+            <a:rect l="l" t="t" r="r" b="b"/>
+            <a:pathLst>
+              <a:path w="1723697" h="651641">
+                <a:moveTo>
+                  <a:pt x="0" y="651641"/>
+                </a:moveTo>
+                <a:cubicBezTo>
+                  <a:pt x="63938" y="649889"/>
+                  <a:pt x="127876" y="648138"/>
+                  <a:pt x="231228" y="557048"/>
+                </a:cubicBezTo>
+                <a:cubicBezTo>
+                  <a:pt x="334580" y="465958"/>
+                  <a:pt x="518510" y="197944"/>
+                  <a:pt x="620110" y="105103"/>
+                </a:cubicBezTo>
+                <a:cubicBezTo>
+                  <a:pt x="721710" y="12262"/>
+                  <a:pt x="763752" y="0"/>
+                  <a:pt x="840828" y="0"/>
+                </a:cubicBezTo>
+                <a:cubicBezTo>
+                  <a:pt x="917904" y="0"/>
+                  <a:pt x="980966" y="14013"/>
+                  <a:pt x="1082566" y="105103"/>
+                </a:cubicBezTo>
+                <a:cubicBezTo>
+                  <a:pt x="1184166" y="196193"/>
+                  <a:pt x="1343573" y="458952"/>
+                  <a:pt x="1450428" y="546538"/>
+                </a:cubicBezTo>
+                <a:cubicBezTo>
+                  <a:pt x="1557283" y="634124"/>
+                  <a:pt x="1723697" y="630620"/>
+                  <a:pt x="1723697" y="630620"/>
+                </a:cubicBezTo>
+                <a:lnTo>
+                  <a:pt x="1723697" y="630620"/>
+                </a:lnTo>
+              </a:path>
+            </a:pathLst>
+          </a:custGeom>
+          <a:noFill/>
+          <a:ln w="38100">
+            <a:solidFill>
+              <a:srgbClr val="C00000"/>
+            </a:solidFill>
+          </a:ln>
+        </p:spPr>
+        <p:style>
+          <a:lnRef idx="2">
+            <a:schemeClr val="accent1">
+              <a:shade val="50000"/>
+            </a:schemeClr>
+          </a:lnRef>
+          <a:fillRef idx="1">
+            <a:schemeClr val="accent1"/>
+          </a:fillRef>
+          <a:effectRef idx="0">
+            <a:schemeClr val="accent1"/>
+          </a:effectRef>
+          <a:fontRef idx="minor">
+            <a:schemeClr val="lt1"/>
+          </a:fontRef>
+        </p:style>
+        <p:txBody>
+          <a:bodyPr rtlCol="0" anchor="ctr"/>
+          <a:lstStyle/>
+          <a:p>
+            <a:pPr algn="ctr"/>
+            <a:endParaRPr lang="en-GB"/>
+          </a:p>
+        </p:txBody>
+      </p:sp>
+      <p:sp>
+        <p:nvSpPr>
+          <p:cNvPr id="9" name="Freeform: Shape 8">
+            <a:extLst>
+              <a:ext uri="{FF2B5EF4-FFF2-40B4-BE49-F238E27FC236}">
+                <a16:creationId xmlns:a16="http://schemas.microsoft.com/office/drawing/2014/main" id="{A24CBADB-F464-F14F-778C-BD369F956E17}"/>
+              </a:ext>
+            </a:extLst>
+          </p:cNvPr>
+          <p:cNvSpPr/>
+          <p:nvPr/>
+        </p:nvSpPr>
+        <p:spPr>
+          <a:xfrm>
+            <a:off x="2076365" y="4504526"/>
+            <a:ext cx="1723697" cy="651641"/>
+          </a:xfrm>
+          <a:custGeom>
+            <a:avLst/>
+            <a:gdLst>
+              <a:gd name="connsiteX0" fmla="*/ 0 w 1723697"/>
+              <a:gd name="connsiteY0" fmla="*/ 651641 h 651641"/>
+              <a:gd name="connsiteX1" fmla="*/ 231228 w 1723697"/>
+              <a:gd name="connsiteY1" fmla="*/ 557048 h 651641"/>
+              <a:gd name="connsiteX2" fmla="*/ 620110 w 1723697"/>
+              <a:gd name="connsiteY2" fmla="*/ 105103 h 651641"/>
+              <a:gd name="connsiteX3" fmla="*/ 840828 w 1723697"/>
+              <a:gd name="connsiteY3" fmla="*/ 0 h 651641"/>
+              <a:gd name="connsiteX4" fmla="*/ 1082566 w 1723697"/>
+              <a:gd name="connsiteY4" fmla="*/ 105103 h 651641"/>
+              <a:gd name="connsiteX5" fmla="*/ 1450428 w 1723697"/>
+              <a:gd name="connsiteY5" fmla="*/ 546538 h 651641"/>
+              <a:gd name="connsiteX6" fmla="*/ 1723697 w 1723697"/>
+              <a:gd name="connsiteY6" fmla="*/ 630620 h 651641"/>
+              <a:gd name="connsiteX7" fmla="*/ 1723697 w 1723697"/>
+              <a:gd name="connsiteY7" fmla="*/ 630620 h 651641"/>
+            </a:gdLst>
+            <a:ahLst/>
+            <a:cxnLst>
+              <a:cxn ang="0">
+                <a:pos x="connsiteX0" y="connsiteY0"/>
+              </a:cxn>
+              <a:cxn ang="0">
+                <a:pos x="connsiteX1" y="connsiteY1"/>
+              </a:cxn>
+              <a:cxn ang="0">
+                <a:pos x="connsiteX2" y="connsiteY2"/>
+              </a:cxn>
+              <a:cxn ang="0">
+                <a:pos x="connsiteX3" y="connsiteY3"/>
+              </a:cxn>
+              <a:cxn ang="0">
+                <a:pos x="connsiteX4" y="connsiteY4"/>
+              </a:cxn>
+              <a:cxn ang="0">
+                <a:pos x="connsiteX5" y="connsiteY5"/>
+              </a:cxn>
+              <a:cxn ang="0">
+                <a:pos x="connsiteX6" y="connsiteY6"/>
+              </a:cxn>
+              <a:cxn ang="0">
+                <a:pos x="connsiteX7" y="connsiteY7"/>
+              </a:cxn>
+            </a:cxnLst>
+            <a:rect l="l" t="t" r="r" b="b"/>
+            <a:pathLst>
+              <a:path w="1723697" h="651641">
+                <a:moveTo>
+                  <a:pt x="0" y="651641"/>
+                </a:moveTo>
+                <a:cubicBezTo>
+                  <a:pt x="63938" y="649889"/>
+                  <a:pt x="127876" y="648138"/>
+                  <a:pt x="231228" y="557048"/>
+                </a:cubicBezTo>
+                <a:cubicBezTo>
+                  <a:pt x="334580" y="465958"/>
+                  <a:pt x="518510" y="197944"/>
+                  <a:pt x="620110" y="105103"/>
+                </a:cubicBezTo>
+                <a:cubicBezTo>
+                  <a:pt x="721710" y="12262"/>
+                  <a:pt x="763752" y="0"/>
+                  <a:pt x="840828" y="0"/>
+                </a:cubicBezTo>
+                <a:cubicBezTo>
+                  <a:pt x="917904" y="0"/>
+                  <a:pt x="980966" y="14013"/>
+                  <a:pt x="1082566" y="105103"/>
+                </a:cubicBezTo>
+                <a:cubicBezTo>
+                  <a:pt x="1184166" y="196193"/>
+                  <a:pt x="1343573" y="458952"/>
+                  <a:pt x="1450428" y="546538"/>
+                </a:cubicBezTo>
+                <a:cubicBezTo>
+                  <a:pt x="1557283" y="634124"/>
+                  <a:pt x="1723697" y="630620"/>
+                  <a:pt x="1723697" y="630620"/>
+                </a:cubicBezTo>
+                <a:lnTo>
+                  <a:pt x="1723697" y="630620"/>
+                </a:lnTo>
+              </a:path>
+            </a:pathLst>
+          </a:custGeom>
+          <a:noFill/>
+          <a:ln w="38100">
+            <a:solidFill>
+              <a:srgbClr val="C00000"/>
+            </a:solidFill>
+          </a:ln>
+        </p:spPr>
+        <p:style>
+          <a:lnRef idx="2">
+            <a:schemeClr val="accent1">
+              <a:shade val="50000"/>
+            </a:schemeClr>
+          </a:lnRef>
+          <a:fillRef idx="1">
+            <a:schemeClr val="accent1"/>
+          </a:fillRef>
+          <a:effectRef idx="0">
+            <a:schemeClr val="accent1"/>
+          </a:effectRef>
+          <a:fontRef idx="minor">
+            <a:schemeClr val="lt1"/>
+          </a:fontRef>
+        </p:style>
+        <p:txBody>
+          <a:bodyPr rtlCol="0" anchor="ctr"/>
+          <a:lstStyle/>
+          <a:p>
+            <a:pPr algn="ctr"/>
+            <a:endParaRPr lang="en-GB"/>
+          </a:p>
+        </p:txBody>
+      </p:sp>
+      <p:sp>
+        <p:nvSpPr>
+          <p:cNvPr id="10" name="Freeform: Shape 9">
+            <a:extLst>
+              <a:ext uri="{FF2B5EF4-FFF2-40B4-BE49-F238E27FC236}">
+                <a16:creationId xmlns:a16="http://schemas.microsoft.com/office/drawing/2014/main" id="{B8473570-5016-9B1A-4B60-4F8F90C50CBC}"/>
+              </a:ext>
+            </a:extLst>
+          </p:cNvPr>
+          <p:cNvSpPr/>
+          <p:nvPr/>
+        </p:nvSpPr>
+        <p:spPr>
+          <a:xfrm>
+            <a:off x="3802967" y="4489335"/>
+            <a:ext cx="1723697" cy="651641"/>
+          </a:xfrm>
+          <a:custGeom>
+            <a:avLst/>
+            <a:gdLst>
+              <a:gd name="connsiteX0" fmla="*/ 0 w 1723697"/>
+              <a:gd name="connsiteY0" fmla="*/ 651641 h 651641"/>
+              <a:gd name="connsiteX1" fmla="*/ 231228 w 1723697"/>
+              <a:gd name="connsiteY1" fmla="*/ 557048 h 651641"/>
+              <a:gd name="connsiteX2" fmla="*/ 620110 w 1723697"/>
+              <a:gd name="connsiteY2" fmla="*/ 105103 h 651641"/>
+              <a:gd name="connsiteX3" fmla="*/ 840828 w 1723697"/>
+              <a:gd name="connsiteY3" fmla="*/ 0 h 651641"/>
+              <a:gd name="connsiteX4" fmla="*/ 1082566 w 1723697"/>
+              <a:gd name="connsiteY4" fmla="*/ 105103 h 651641"/>
+              <a:gd name="connsiteX5" fmla="*/ 1450428 w 1723697"/>
+              <a:gd name="connsiteY5" fmla="*/ 546538 h 651641"/>
+              <a:gd name="connsiteX6" fmla="*/ 1723697 w 1723697"/>
+              <a:gd name="connsiteY6" fmla="*/ 630620 h 651641"/>
+              <a:gd name="connsiteX7" fmla="*/ 1723697 w 1723697"/>
+              <a:gd name="connsiteY7" fmla="*/ 630620 h 651641"/>
+            </a:gdLst>
+            <a:ahLst/>
+            <a:cxnLst>
+              <a:cxn ang="0">
+                <a:pos x="connsiteX0" y="connsiteY0"/>
+              </a:cxn>
+              <a:cxn ang="0">
+                <a:pos x="connsiteX1" y="connsiteY1"/>
+              </a:cxn>
+              <a:cxn ang="0">
+                <a:pos x="connsiteX2" y="connsiteY2"/>
+              </a:cxn>
+              <a:cxn ang="0">
+                <a:pos x="connsiteX3" y="connsiteY3"/>
+              </a:cxn>
+              <a:cxn ang="0">
+                <a:pos x="connsiteX4" y="connsiteY4"/>
+              </a:cxn>
+              <a:cxn ang="0">
+                <a:pos x="connsiteX5" y="connsiteY5"/>
+              </a:cxn>
+              <a:cxn ang="0">
+                <a:pos x="connsiteX6" y="connsiteY6"/>
+              </a:cxn>
+              <a:cxn ang="0">
+                <a:pos x="connsiteX7" y="connsiteY7"/>
+              </a:cxn>
+            </a:cxnLst>
+            <a:rect l="l" t="t" r="r" b="b"/>
+            <a:pathLst>
+              <a:path w="1723697" h="651641">
+                <a:moveTo>
+                  <a:pt x="0" y="651641"/>
+                </a:moveTo>
+                <a:cubicBezTo>
+                  <a:pt x="63938" y="649889"/>
+                  <a:pt x="127876" y="648138"/>
+                  <a:pt x="231228" y="557048"/>
+                </a:cubicBezTo>
+                <a:cubicBezTo>
+                  <a:pt x="334580" y="465958"/>
+                  <a:pt x="518510" y="197944"/>
+                  <a:pt x="620110" y="105103"/>
+                </a:cubicBezTo>
+                <a:cubicBezTo>
+                  <a:pt x="721710" y="12262"/>
+                  <a:pt x="763752" y="0"/>
+                  <a:pt x="840828" y="0"/>
+                </a:cubicBezTo>
+                <a:cubicBezTo>
+                  <a:pt x="917904" y="0"/>
+                  <a:pt x="980966" y="14013"/>
+                  <a:pt x="1082566" y="105103"/>
+                </a:cubicBezTo>
+                <a:cubicBezTo>
+                  <a:pt x="1184166" y="196193"/>
+                  <a:pt x="1343573" y="458952"/>
+                  <a:pt x="1450428" y="546538"/>
+                </a:cubicBezTo>
+                <a:cubicBezTo>
+                  <a:pt x="1557283" y="634124"/>
+                  <a:pt x="1723697" y="630620"/>
+                  <a:pt x="1723697" y="630620"/>
+                </a:cubicBezTo>
+                <a:lnTo>
+                  <a:pt x="1723697" y="630620"/>
+                </a:lnTo>
+              </a:path>
+            </a:pathLst>
+          </a:custGeom>
+          <a:noFill/>
+          <a:ln w="38100">
+            <a:solidFill>
+              <a:srgbClr val="C00000"/>
+            </a:solidFill>
+          </a:ln>
+        </p:spPr>
+        <p:style>
+          <a:lnRef idx="2">
+            <a:schemeClr val="accent1">
+              <a:shade val="50000"/>
+            </a:schemeClr>
+          </a:lnRef>
+          <a:fillRef idx="1">
+            <a:schemeClr val="accent1"/>
+          </a:fillRef>
+          <a:effectRef idx="0">
+            <a:schemeClr val="accent1"/>
+          </a:effectRef>
+          <a:fontRef idx="minor">
+            <a:schemeClr val="lt1"/>
+          </a:fontRef>
+        </p:style>
+        <p:txBody>
+          <a:bodyPr rtlCol="0" anchor="ctr"/>
+          <a:lstStyle/>
+          <a:p>
+            <a:pPr algn="ctr"/>
+            <a:endParaRPr lang="en-GB"/>
           </a:p>
         </p:txBody>
       </p:sp>

</xml_diff>

<commit_message>
small improvements in figures chapter 14
</commit_message>
<xml_diff>
--- a/Figures/Chapter_14/drawings/Fig14.X_storage_theory.pptx
+++ b/Figures/Chapter_14/drawings/Fig14.X_storage_theory.pptx
@@ -5,6 +5,9 @@
     <p:sldMasterId id="2147483648" r:id="rId1"/>
     <p:sldMasterId id="2147483660" r:id="rId2"/>
   </p:sldMasterIdLst>
+  <p:notesMasterIdLst>
+    <p:notesMasterId r:id="rId5"/>
+  </p:notesMasterIdLst>
   <p:sldIdLst>
     <p:sldId id="834" r:id="rId3"/>
     <p:sldId id="835" r:id="rId4"/>
@@ -114,6 +117,356 @@
 </p:presentation>
 </file>
 
+<file path=ppt/notesMasters/notesMaster1.xml><?xml version="1.0" encoding="utf-8"?>
+<p:notesMaster xmlns:a="http://schemas.openxmlformats.org/drawingml/2006/main" xmlns:r="http://schemas.openxmlformats.org/officeDocument/2006/relationships" xmlns:p="http://schemas.openxmlformats.org/presentationml/2006/main">
+  <p:cSld>
+    <p:bg>
+      <p:bgRef idx="1001">
+        <a:schemeClr val="bg1"/>
+      </p:bgRef>
+    </p:bg>
+    <p:spTree>
+      <p:nvGrpSpPr>
+        <p:cNvPr id="1" name=""/>
+        <p:cNvGrpSpPr/>
+        <p:nvPr/>
+      </p:nvGrpSpPr>
+      <p:grpSpPr>
+        <a:xfrm>
+          <a:off x="0" y="0"/>
+          <a:ext cx="0" cy="0"/>
+          <a:chOff x="0" y="0"/>
+          <a:chExt cx="0" cy="0"/>
+        </a:xfrm>
+      </p:grpSpPr>
+      <p:sp>
+        <p:nvSpPr>
+          <p:cNvPr id="2" name="Header Placeholder 1"/>
+          <p:cNvSpPr>
+            <a:spLocks noGrp="1"/>
+          </p:cNvSpPr>
+          <p:nvPr>
+            <p:ph type="hdr" sz="quarter"/>
+          </p:nvPr>
+        </p:nvSpPr>
+        <p:spPr>
+          <a:xfrm>
+            <a:off x="0" y="0"/>
+            <a:ext cx="2971800" cy="458788"/>
+          </a:xfrm>
+          <a:prstGeom prst="rect">
+            <a:avLst/>
+          </a:prstGeom>
+        </p:spPr>
+        <p:txBody>
+          <a:bodyPr vert="horz" lIns="91440" tIns="45720" rIns="91440" bIns="45720" rtlCol="0"/>
+          <a:lstStyle>
+            <a:lvl1pPr algn="l">
+              <a:defRPr sz="1200"/>
+            </a:lvl1pPr>
+          </a:lstStyle>
+          <a:p>
+            <a:endParaRPr lang="en-GB"/>
+          </a:p>
+        </p:txBody>
+      </p:sp>
+      <p:sp>
+        <p:nvSpPr>
+          <p:cNvPr id="3" name="Date Placeholder 2"/>
+          <p:cNvSpPr>
+            <a:spLocks noGrp="1"/>
+          </p:cNvSpPr>
+          <p:nvPr>
+            <p:ph type="dt" idx="1"/>
+          </p:nvPr>
+        </p:nvSpPr>
+        <p:spPr>
+          <a:xfrm>
+            <a:off x="3884613" y="0"/>
+            <a:ext cx="2971800" cy="458788"/>
+          </a:xfrm>
+          <a:prstGeom prst="rect">
+            <a:avLst/>
+          </a:prstGeom>
+        </p:spPr>
+        <p:txBody>
+          <a:bodyPr vert="horz" lIns="91440" tIns="45720" rIns="91440" bIns="45720" rtlCol="0"/>
+          <a:lstStyle>
+            <a:lvl1pPr algn="r">
+              <a:defRPr sz="1200"/>
+            </a:lvl1pPr>
+          </a:lstStyle>
+          <a:p>
+            <a:fld id="{C4BA57E6-E106-43CF-B05D-8E4EECDB39D3}" type="datetimeFigureOut">
+              <a:rPr lang="en-GB" smtClean="0"/>
+              <a:t>25/08/2023</a:t>
+            </a:fld>
+            <a:endParaRPr lang="en-GB"/>
+          </a:p>
+        </p:txBody>
+      </p:sp>
+      <p:sp>
+        <p:nvSpPr>
+          <p:cNvPr id="4" name="Slide Image Placeholder 3"/>
+          <p:cNvSpPr>
+            <a:spLocks noGrp="1" noRot="1" noChangeAspect="1"/>
+          </p:cNvSpPr>
+          <p:nvPr>
+            <p:ph type="sldImg" idx="2"/>
+          </p:nvPr>
+        </p:nvSpPr>
+        <p:spPr>
+          <a:xfrm>
+            <a:off x="685800" y="1143000"/>
+            <a:ext cx="5486400" cy="3086100"/>
+          </a:xfrm>
+          <a:prstGeom prst="rect">
+            <a:avLst/>
+          </a:prstGeom>
+          <a:noFill/>
+          <a:ln w="12700">
+            <a:solidFill>
+              <a:prstClr val="black"/>
+            </a:solidFill>
+          </a:ln>
+        </p:spPr>
+        <p:txBody>
+          <a:bodyPr vert="horz" lIns="91440" tIns="45720" rIns="91440" bIns="45720" rtlCol="0" anchor="ctr"/>
+          <a:lstStyle/>
+          <a:p>
+            <a:endParaRPr lang="en-GB"/>
+          </a:p>
+        </p:txBody>
+      </p:sp>
+      <p:sp>
+        <p:nvSpPr>
+          <p:cNvPr id="5" name="Notes Placeholder 4"/>
+          <p:cNvSpPr>
+            <a:spLocks noGrp="1"/>
+          </p:cNvSpPr>
+          <p:nvPr>
+            <p:ph type="body" sz="quarter" idx="3"/>
+          </p:nvPr>
+        </p:nvSpPr>
+        <p:spPr>
+          <a:xfrm>
+            <a:off x="685800" y="4400550"/>
+            <a:ext cx="5486400" cy="3600450"/>
+          </a:xfrm>
+          <a:prstGeom prst="rect">
+            <a:avLst/>
+          </a:prstGeom>
+        </p:spPr>
+        <p:txBody>
+          <a:bodyPr vert="horz" lIns="91440" tIns="45720" rIns="91440" bIns="45720" rtlCol="0"/>
+          <a:lstStyle/>
+          <a:p>
+            <a:pPr lvl="0"/>
+            <a:r>
+              <a:rPr lang="en-US"/>
+              <a:t>Click to edit Master text styles</a:t>
+            </a:r>
+          </a:p>
+          <a:p>
+            <a:pPr lvl="1"/>
+            <a:r>
+              <a:rPr lang="en-US"/>
+              <a:t>Second level</a:t>
+            </a:r>
+          </a:p>
+          <a:p>
+            <a:pPr lvl="2"/>
+            <a:r>
+              <a:rPr lang="en-US"/>
+              <a:t>Third level</a:t>
+            </a:r>
+          </a:p>
+          <a:p>
+            <a:pPr lvl="3"/>
+            <a:r>
+              <a:rPr lang="en-US"/>
+              <a:t>Fourth level</a:t>
+            </a:r>
+          </a:p>
+          <a:p>
+            <a:pPr lvl="4"/>
+            <a:r>
+              <a:rPr lang="en-US"/>
+              <a:t>Fifth level</a:t>
+            </a:r>
+            <a:endParaRPr lang="en-GB"/>
+          </a:p>
+        </p:txBody>
+      </p:sp>
+      <p:sp>
+        <p:nvSpPr>
+          <p:cNvPr id="6" name="Footer Placeholder 5"/>
+          <p:cNvSpPr>
+            <a:spLocks noGrp="1"/>
+          </p:cNvSpPr>
+          <p:nvPr>
+            <p:ph type="ftr" sz="quarter" idx="4"/>
+          </p:nvPr>
+        </p:nvSpPr>
+        <p:spPr>
+          <a:xfrm>
+            <a:off x="0" y="8685213"/>
+            <a:ext cx="2971800" cy="458787"/>
+          </a:xfrm>
+          <a:prstGeom prst="rect">
+            <a:avLst/>
+          </a:prstGeom>
+        </p:spPr>
+        <p:txBody>
+          <a:bodyPr vert="horz" lIns="91440" tIns="45720" rIns="91440" bIns="45720" rtlCol="0" anchor="b"/>
+          <a:lstStyle>
+            <a:lvl1pPr algn="l">
+              <a:defRPr sz="1200"/>
+            </a:lvl1pPr>
+          </a:lstStyle>
+          <a:p>
+            <a:endParaRPr lang="en-GB"/>
+          </a:p>
+        </p:txBody>
+      </p:sp>
+      <p:sp>
+        <p:nvSpPr>
+          <p:cNvPr id="7" name="Slide Number Placeholder 6"/>
+          <p:cNvSpPr>
+            <a:spLocks noGrp="1"/>
+          </p:cNvSpPr>
+          <p:nvPr>
+            <p:ph type="sldNum" sz="quarter" idx="5"/>
+          </p:nvPr>
+        </p:nvSpPr>
+        <p:spPr>
+          <a:xfrm>
+            <a:off x="3884613" y="8685213"/>
+            <a:ext cx="2971800" cy="458787"/>
+          </a:xfrm>
+          <a:prstGeom prst="rect">
+            <a:avLst/>
+          </a:prstGeom>
+        </p:spPr>
+        <p:txBody>
+          <a:bodyPr vert="horz" lIns="91440" tIns="45720" rIns="91440" bIns="45720" rtlCol="0" anchor="b"/>
+          <a:lstStyle>
+            <a:lvl1pPr algn="r">
+              <a:defRPr sz="1200"/>
+            </a:lvl1pPr>
+          </a:lstStyle>
+          <a:p>
+            <a:fld id="{E640A19E-B7E0-43F5-898A-232A041D9252}" type="slidenum">
+              <a:rPr lang="en-GB" smtClean="0"/>
+              <a:t>‹#›</a:t>
+            </a:fld>
+            <a:endParaRPr lang="en-GB"/>
+          </a:p>
+        </p:txBody>
+      </p:sp>
+    </p:spTree>
+    <p:extLst>
+      <p:ext uri="{BB962C8B-B14F-4D97-AF65-F5344CB8AC3E}">
+        <p14:creationId xmlns:p14="http://schemas.microsoft.com/office/powerpoint/2010/main" val="1952734452"/>
+      </p:ext>
+    </p:extLst>
+  </p:cSld>
+  <p:clrMap bg1="lt1" tx1="dk1" bg2="lt2" tx2="dk2" accent1="accent1" accent2="accent2" accent3="accent3" accent4="accent4" accent5="accent5" accent6="accent6" hlink="hlink" folHlink="folHlink"/>
+  <p:notesStyle>
+    <a:lvl1pPr marL="0" algn="l" defTabSz="914400" rtl="0" eaLnBrk="1" latinLnBrk="0" hangingPunct="1">
+      <a:defRPr sz="1200" kern="1200">
+        <a:solidFill>
+          <a:schemeClr val="tx1"/>
+        </a:solidFill>
+        <a:latin typeface="+mn-lt"/>
+        <a:ea typeface="+mn-ea"/>
+        <a:cs typeface="+mn-cs"/>
+      </a:defRPr>
+    </a:lvl1pPr>
+    <a:lvl2pPr marL="457200" algn="l" defTabSz="914400" rtl="0" eaLnBrk="1" latinLnBrk="0" hangingPunct="1">
+      <a:defRPr sz="1200" kern="1200">
+        <a:solidFill>
+          <a:schemeClr val="tx1"/>
+        </a:solidFill>
+        <a:latin typeface="+mn-lt"/>
+        <a:ea typeface="+mn-ea"/>
+        <a:cs typeface="+mn-cs"/>
+      </a:defRPr>
+    </a:lvl2pPr>
+    <a:lvl3pPr marL="914400" algn="l" defTabSz="914400" rtl="0" eaLnBrk="1" latinLnBrk="0" hangingPunct="1">
+      <a:defRPr sz="1200" kern="1200">
+        <a:solidFill>
+          <a:schemeClr val="tx1"/>
+        </a:solidFill>
+        <a:latin typeface="+mn-lt"/>
+        <a:ea typeface="+mn-ea"/>
+        <a:cs typeface="+mn-cs"/>
+      </a:defRPr>
+    </a:lvl3pPr>
+    <a:lvl4pPr marL="1371600" algn="l" defTabSz="914400" rtl="0" eaLnBrk="1" latinLnBrk="0" hangingPunct="1">
+      <a:defRPr sz="1200" kern="1200">
+        <a:solidFill>
+          <a:schemeClr val="tx1"/>
+        </a:solidFill>
+        <a:latin typeface="+mn-lt"/>
+        <a:ea typeface="+mn-ea"/>
+        <a:cs typeface="+mn-cs"/>
+      </a:defRPr>
+    </a:lvl4pPr>
+    <a:lvl5pPr marL="1828800" algn="l" defTabSz="914400" rtl="0" eaLnBrk="1" latinLnBrk="0" hangingPunct="1">
+      <a:defRPr sz="1200" kern="1200">
+        <a:solidFill>
+          <a:schemeClr val="tx1"/>
+        </a:solidFill>
+        <a:latin typeface="+mn-lt"/>
+        <a:ea typeface="+mn-ea"/>
+        <a:cs typeface="+mn-cs"/>
+      </a:defRPr>
+    </a:lvl5pPr>
+    <a:lvl6pPr marL="2286000" algn="l" defTabSz="914400" rtl="0" eaLnBrk="1" latinLnBrk="0" hangingPunct="1">
+      <a:defRPr sz="1200" kern="1200">
+        <a:solidFill>
+          <a:schemeClr val="tx1"/>
+        </a:solidFill>
+        <a:latin typeface="+mn-lt"/>
+        <a:ea typeface="+mn-ea"/>
+        <a:cs typeface="+mn-cs"/>
+      </a:defRPr>
+    </a:lvl6pPr>
+    <a:lvl7pPr marL="2743200" algn="l" defTabSz="914400" rtl="0" eaLnBrk="1" latinLnBrk="0" hangingPunct="1">
+      <a:defRPr sz="1200" kern="1200">
+        <a:solidFill>
+          <a:schemeClr val="tx1"/>
+        </a:solidFill>
+        <a:latin typeface="+mn-lt"/>
+        <a:ea typeface="+mn-ea"/>
+        <a:cs typeface="+mn-cs"/>
+      </a:defRPr>
+    </a:lvl7pPr>
+    <a:lvl8pPr marL="3200400" algn="l" defTabSz="914400" rtl="0" eaLnBrk="1" latinLnBrk="0" hangingPunct="1">
+      <a:defRPr sz="1200" kern="1200">
+        <a:solidFill>
+          <a:schemeClr val="tx1"/>
+        </a:solidFill>
+        <a:latin typeface="+mn-lt"/>
+        <a:ea typeface="+mn-ea"/>
+        <a:cs typeface="+mn-cs"/>
+      </a:defRPr>
+    </a:lvl8pPr>
+    <a:lvl9pPr marL="3657600" algn="l" defTabSz="914400" rtl="0" eaLnBrk="1" latinLnBrk="0" hangingPunct="1">
+      <a:defRPr sz="1200" kern="1200">
+        <a:solidFill>
+          <a:schemeClr val="tx1"/>
+        </a:solidFill>
+        <a:latin typeface="+mn-lt"/>
+        <a:ea typeface="+mn-ea"/>
+        <a:cs typeface="+mn-cs"/>
+      </a:defRPr>
+    </a:lvl9pPr>
+  </p:notesStyle>
+</p:notesMaster>
+</file>
+
 <file path=ppt/slideLayouts/slideLayout1.xml><?xml version="1.0" encoding="utf-8"?>
 <p:sldLayout xmlns:a="http://schemas.openxmlformats.org/drawingml/2006/main" xmlns:r="http://schemas.openxmlformats.org/officeDocument/2006/relationships" xmlns:p="http://schemas.openxmlformats.org/presentationml/2006/main" type="title" preserve="1">
   <p:cSld name="Title Slide">
@@ -263,7 +616,7 @@
           <a:p>
             <a:fld id="{8B1A925D-6802-4F82-B3A4-43BDB522D203}" type="datetimeFigureOut">
               <a:rPr lang="en-GB" smtClean="0"/>
-              <a:t>02/06/2023</a:t>
+              <a:t>25/08/2023</a:t>
             </a:fld>
             <a:endParaRPr lang="en-GB"/>
           </a:p>
@@ -463,7 +816,7 @@
           <a:p>
             <a:fld id="{8B1A925D-6802-4F82-B3A4-43BDB522D203}" type="datetimeFigureOut">
               <a:rPr lang="en-GB" smtClean="0"/>
-              <a:t>02/06/2023</a:t>
+              <a:t>25/08/2023</a:t>
             </a:fld>
             <a:endParaRPr lang="en-GB"/>
           </a:p>
@@ -673,7 +1026,7 @@
           <a:p>
             <a:fld id="{8B1A925D-6802-4F82-B3A4-43BDB522D203}" type="datetimeFigureOut">
               <a:rPr lang="en-GB" smtClean="0"/>
-              <a:t>02/06/2023</a:t>
+              <a:t>25/08/2023</a:t>
             </a:fld>
             <a:endParaRPr lang="en-GB"/>
           </a:p>
@@ -1128,7 +1481,7 @@
             <a:fld id="{78417F83-4CBA-48F2-BAD0-783AE3701E32}" type="datetimeFigureOut">
               <a:rPr lang="en-GB" smtClean="0"/>
               <a:pPr/>
-              <a:t>02/06/2023</a:t>
+              <a:t>25/08/2023</a:t>
             </a:fld>
             <a:r>
               <a:rPr lang="en-GB" dirty="0"/>
@@ -1586,7 +1939,7 @@
             <a:fld id="{78417F83-4CBA-48F2-BAD0-783AE3701E32}" type="datetimeFigureOut">
               <a:rPr lang="en-GB" smtClean="0"/>
               <a:pPr/>
-              <a:t>02/06/2023</a:t>
+              <a:t>25/08/2023</a:t>
             </a:fld>
             <a:r>
               <a:rPr lang="en-GB" dirty="0"/>
@@ -2250,7 +2603,7 @@
             <a:fld id="{78417F83-4CBA-48F2-BAD0-783AE3701E32}" type="datetimeFigureOut">
               <a:rPr lang="en-GB" smtClean="0"/>
               <a:pPr/>
-              <a:t>02/06/2023</a:t>
+              <a:t>25/08/2023</a:t>
             </a:fld>
             <a:r>
               <a:rPr lang="en-GB" dirty="0"/>
@@ -2596,7 +2949,7 @@
             <a:fld id="{78417F83-4CBA-48F2-BAD0-783AE3701E32}" type="datetimeFigureOut">
               <a:rPr lang="en-GB" smtClean="0"/>
               <a:pPr/>
-              <a:t>02/06/2023</a:t>
+              <a:t>25/08/2023</a:t>
             </a:fld>
             <a:r>
               <a:rPr lang="en-GB" dirty="0"/>
@@ -2974,7 +3327,7 @@
             <a:fld id="{78417F83-4CBA-48F2-BAD0-783AE3701E32}" type="datetimeFigureOut">
               <a:rPr lang="en-GB" smtClean="0"/>
               <a:pPr/>
-              <a:t>02/06/2023</a:t>
+              <a:t>25/08/2023</a:t>
             </a:fld>
             <a:r>
               <a:rPr lang="en-GB" dirty="0"/>
@@ -3401,7 +3754,7 @@
             <a:fld id="{78417F83-4CBA-48F2-BAD0-783AE3701E32}" type="datetimeFigureOut">
               <a:rPr lang="en-GB" smtClean="0"/>
               <a:pPr/>
-              <a:t>02/06/2023</a:t>
+              <a:t>25/08/2023</a:t>
             </a:fld>
             <a:r>
               <a:rPr lang="en-GB" dirty="0"/>
@@ -3841,7 +4194,7 @@
             <a:fld id="{78417F83-4CBA-48F2-BAD0-783AE3701E32}" type="datetimeFigureOut">
               <a:rPr lang="en-GB" smtClean="0"/>
               <a:pPr/>
-              <a:t>02/06/2023</a:t>
+              <a:t>25/08/2023</a:t>
             </a:fld>
             <a:r>
               <a:rPr lang="en-GB" dirty="0"/>
@@ -4009,7 +4362,7 @@
             <a:fld id="{78417F83-4CBA-48F2-BAD0-783AE3701E32}" type="datetimeFigureOut">
               <a:rPr lang="en-GB" smtClean="0"/>
               <a:pPr/>
-              <a:t>02/06/2023</a:t>
+              <a:t>25/08/2023</a:t>
             </a:fld>
             <a:r>
               <a:rPr lang="en-GB" dirty="0"/>
@@ -4177,7 +4530,7 @@
           <a:p>
             <a:fld id="{8B1A925D-6802-4F82-B3A4-43BDB522D203}" type="datetimeFigureOut">
               <a:rPr lang="en-GB" smtClean="0"/>
-              <a:t>02/06/2023</a:t>
+              <a:t>25/08/2023</a:t>
             </a:fld>
             <a:endParaRPr lang="en-GB"/>
           </a:p>
@@ -4390,7 +4743,7 @@
             <a:fld id="{78417F83-4CBA-48F2-BAD0-783AE3701E32}" type="datetimeFigureOut">
               <a:rPr lang="en-GB" smtClean="0"/>
               <a:pPr/>
-              <a:t>02/06/2023</a:t>
+              <a:t>25/08/2023</a:t>
             </a:fld>
             <a:r>
               <a:rPr lang="en-GB" dirty="0"/>
@@ -4621,7 +4974,7 @@
             <a:fld id="{78417F83-4CBA-48F2-BAD0-783AE3701E32}" type="datetimeFigureOut">
               <a:rPr lang="en-GB" smtClean="0"/>
               <a:pPr/>
-              <a:t>02/06/2023</a:t>
+              <a:t>25/08/2023</a:t>
             </a:fld>
             <a:r>
               <a:rPr lang="en-GB" dirty="0"/>
@@ -4862,7 +5215,7 @@
             <a:fld id="{78417F83-4CBA-48F2-BAD0-783AE3701E32}" type="datetimeFigureOut">
               <a:rPr lang="en-GB" smtClean="0"/>
               <a:pPr/>
-              <a:t>02/06/2023</a:t>
+              <a:t>25/08/2023</a:t>
             </a:fld>
             <a:r>
               <a:rPr lang="en-GB" dirty="0"/>
@@ -5032,7 +5385,7 @@
             <a:fld id="{78417F83-4CBA-48F2-BAD0-783AE3701E32}" type="datetimeFigureOut">
               <a:rPr lang="en-GB" smtClean="0"/>
               <a:pPr/>
-              <a:t>02/06/2023</a:t>
+              <a:t>25/08/2023</a:t>
             </a:fld>
             <a:r>
               <a:rPr lang="en-GB" dirty="0"/>
@@ -5206,7 +5559,7 @@
             <a:fld id="{78417F83-4CBA-48F2-BAD0-783AE3701E32}" type="datetimeFigureOut">
               <a:rPr lang="en-GB" smtClean="0"/>
               <a:pPr/>
-              <a:t>02/06/2023</a:t>
+              <a:t>25/08/2023</a:t>
             </a:fld>
             <a:r>
               <a:rPr lang="en-GB" dirty="0"/>
@@ -5543,7 +5896,7 @@
             <a:fld id="{78417F83-4CBA-48F2-BAD0-783AE3701E32}" type="datetimeFigureOut">
               <a:rPr lang="en-GB" smtClean="0"/>
               <a:pPr/>
-              <a:t>02/06/2023</a:t>
+              <a:t>25/08/2023</a:t>
             </a:fld>
             <a:r>
               <a:rPr lang="en-GB" dirty="0"/>
@@ -5714,7 +6067,7 @@
             <a:fld id="{78417F83-4CBA-48F2-BAD0-783AE3701E32}" type="datetimeFigureOut">
               <a:rPr lang="en-GB" smtClean="0"/>
               <a:pPr/>
-              <a:t>02/06/2023</a:t>
+              <a:t>25/08/2023</a:t>
             </a:fld>
             <a:r>
               <a:rPr lang="en-GB" dirty="0"/>
@@ -5910,7 +6263,7 @@
             <a:fld id="{78417F83-4CBA-48F2-BAD0-783AE3701E32}" type="datetimeFigureOut">
               <a:rPr lang="en-GB" smtClean="0"/>
               <a:pPr/>
-              <a:t>02/06/2023</a:t>
+              <a:t>25/08/2023</a:t>
             </a:fld>
             <a:r>
               <a:rPr lang="en-GB" dirty="0"/>
@@ -6084,7 +6437,7 @@
             <a:fld id="{78417F83-4CBA-48F2-BAD0-783AE3701E32}" type="datetimeFigureOut">
               <a:rPr lang="en-GB" smtClean="0"/>
               <a:pPr/>
-              <a:t>02/06/2023</a:t>
+              <a:t>25/08/2023</a:t>
             </a:fld>
             <a:r>
               <a:rPr lang="en-GB" dirty="0"/>
@@ -6243,7 +6596,7 @@
             <a:fld id="{78417F83-4CBA-48F2-BAD0-783AE3701E32}" type="datetimeFigureOut">
               <a:rPr lang="en-GB" smtClean="0"/>
               <a:pPr/>
-              <a:t>02/06/2023</a:t>
+              <a:t>25/08/2023</a:t>
             </a:fld>
             <a:r>
               <a:rPr lang="en-GB" dirty="0"/>
@@ -6527,7 +6880,7 @@
           <a:p>
             <a:fld id="{8B1A925D-6802-4F82-B3A4-43BDB522D203}" type="datetimeFigureOut">
               <a:rPr lang="en-GB" smtClean="0"/>
-              <a:t>02/06/2023</a:t>
+              <a:t>25/08/2023</a:t>
             </a:fld>
             <a:endParaRPr lang="en-GB"/>
           </a:p>
@@ -7408,7 +7761,7 @@
             <a:fld id="{78417F83-4CBA-48F2-BAD0-783AE3701E32}" type="datetimeFigureOut">
               <a:rPr lang="en-GB" smtClean="0"/>
               <a:pPr/>
-              <a:t>02/06/2023</a:t>
+              <a:t>25/08/2023</a:t>
             </a:fld>
             <a:r>
               <a:rPr lang="en-GB" dirty="0"/>
@@ -7683,7 +8036,7 @@
             <a:fld id="{78417F83-4CBA-48F2-BAD0-783AE3701E32}" type="datetimeFigureOut">
               <a:rPr lang="en-GB" smtClean="0"/>
               <a:pPr/>
-              <a:t>02/06/2023</a:t>
+              <a:t>25/08/2023</a:t>
             </a:fld>
             <a:r>
               <a:rPr lang="en-GB" dirty="0"/>
@@ -8888,7 +9241,7 @@
           <a:p>
             <a:fld id="{8B1A925D-6802-4F82-B3A4-43BDB522D203}" type="datetimeFigureOut">
               <a:rPr lang="en-GB" smtClean="0"/>
-              <a:t>02/06/2023</a:t>
+              <a:t>25/08/2023</a:t>
             </a:fld>
             <a:endParaRPr lang="en-GB"/>
           </a:p>
@@ -9303,7 +9656,7 @@
           <a:p>
             <a:fld id="{8B1A925D-6802-4F82-B3A4-43BDB522D203}" type="datetimeFigureOut">
               <a:rPr lang="en-GB" smtClean="0"/>
-              <a:t>02/06/2023</a:t>
+              <a:t>25/08/2023</a:t>
             </a:fld>
             <a:endParaRPr lang="en-GB"/>
           </a:p>
@@ -9445,7 +9798,7 @@
           <a:p>
             <a:fld id="{8B1A925D-6802-4F82-B3A4-43BDB522D203}" type="datetimeFigureOut">
               <a:rPr lang="en-GB" smtClean="0"/>
-              <a:t>02/06/2023</a:t>
+              <a:t>25/08/2023</a:t>
             </a:fld>
             <a:endParaRPr lang="en-GB"/>
           </a:p>
@@ -9558,7 +9911,7 @@
           <a:p>
             <a:fld id="{8B1A925D-6802-4F82-B3A4-43BDB522D203}" type="datetimeFigureOut">
               <a:rPr lang="en-GB" smtClean="0"/>
-              <a:t>02/06/2023</a:t>
+              <a:t>25/08/2023</a:t>
             </a:fld>
             <a:endParaRPr lang="en-GB"/>
           </a:p>
@@ -9871,7 +10224,7 @@
           <a:p>
             <a:fld id="{8B1A925D-6802-4F82-B3A4-43BDB522D203}" type="datetimeFigureOut">
               <a:rPr lang="en-GB" smtClean="0"/>
-              <a:t>02/06/2023</a:t>
+              <a:t>25/08/2023</a:t>
             </a:fld>
             <a:endParaRPr lang="en-GB"/>
           </a:p>
@@ -10160,7 +10513,7 @@
           <a:p>
             <a:fld id="{8B1A925D-6802-4F82-B3A4-43BDB522D203}" type="datetimeFigureOut">
               <a:rPr lang="en-GB" smtClean="0"/>
-              <a:t>02/06/2023</a:t>
+              <a:t>25/08/2023</a:t>
             </a:fld>
             <a:endParaRPr lang="en-GB"/>
           </a:p>
@@ -10403,7 +10756,7 @@
           <a:p>
             <a:fld id="{8B1A925D-6802-4F82-B3A4-43BDB522D203}" type="datetimeFigureOut">
               <a:rPr lang="en-GB" smtClean="0"/>
-              <a:t>02/06/2023</a:t>
+              <a:t>25/08/2023</a:t>
             </a:fld>
             <a:endParaRPr lang="en-GB"/>
           </a:p>
@@ -11169,7 +11522,7 @@
             <a:fld id="{78417F83-4CBA-48F2-BAD0-783AE3701E32}" type="datetimeFigureOut">
               <a:rPr lang="en-GB" smtClean="0"/>
               <a:pPr/>
-              <a:t>02/06/2023</a:t>
+              <a:t>25/08/2023</a:t>
             </a:fld>
             <a:r>
               <a:rPr lang="en-GB"/>
@@ -12100,10 +12453,10 @@
         </p:nvGrpSpPr>
         <p:grpSpPr>
           <a:xfrm>
-            <a:off x="36613" y="2045229"/>
-            <a:ext cx="7432293" cy="3877064"/>
-            <a:chOff x="98443" y="1660805"/>
-            <a:chExt cx="9428848" cy="5656627"/>
+            <a:off x="25570" y="2045229"/>
+            <a:ext cx="7443336" cy="3877064"/>
+            <a:chOff x="84433" y="1660805"/>
+            <a:chExt cx="9442858" cy="5656627"/>
           </a:xfrm>
         </p:grpSpPr>
         <p:sp>
@@ -12120,8 +12473,8 @@
           </p:nvSpPr>
           <p:spPr>
             <a:xfrm rot="16200000">
-              <a:off x="-453136" y="2333531"/>
-              <a:ext cx="1508715" cy="390456"/>
+              <a:off x="-474391" y="2294058"/>
+              <a:ext cx="1508714" cy="390456"/>
             </a:xfrm>
             <a:prstGeom prst="rect">
               <a:avLst/>
@@ -12895,7 +13248,7 @@
           </p:nvSpPr>
           <p:spPr>
             <a:xfrm rot="16200000">
-              <a:off x="-610332" y="3674088"/>
+              <a:off x="-632702" y="3620295"/>
               <a:ext cx="1824726" cy="390456"/>
             </a:xfrm>
             <a:prstGeom prst="rect">
@@ -13103,7 +13456,7 @@
           </p:nvSpPr>
           <p:spPr>
             <a:xfrm rot="16200000">
-              <a:off x="-743334" y="5418199"/>
+              <a:off x="-752689" y="5418199"/>
               <a:ext cx="2074009" cy="390456"/>
             </a:xfrm>
             <a:prstGeom prst="rect">
@@ -13223,8 +13576,8 @@
           </p:nvCxnSpPr>
           <p:spPr>
             <a:xfrm>
-              <a:off x="7200293" y="5345249"/>
-              <a:ext cx="0" cy="864000"/>
+              <a:off x="7200293" y="5119305"/>
+              <a:ext cx="0" cy="1089944"/>
             </a:xfrm>
             <a:prstGeom prst="line">
               <a:avLst/>
@@ -14032,8 +14385,8 @@
           </p:nvSpPr>
           <p:spPr>
             <a:xfrm>
-              <a:off x="2981003" y="4815792"/>
-              <a:ext cx="3435275" cy="493950"/>
+              <a:off x="2981001" y="4723639"/>
+              <a:ext cx="3435276" cy="493949"/>
             </a:xfrm>
             <a:prstGeom prst="rect">
               <a:avLst/>
@@ -14132,7 +14485,7 @@
                             <m:ctrlPr>
                               <a:rPr lang="en-GB" sz="1600" i="1" smtClean="0">
                                 <a:solidFill>
-                                  <a:srgbClr val="64A4D9"/>
+                                  <a:srgbClr val="4472C4"/>
                                 </a:solidFill>
                                 <a:latin typeface="Cambria Math" panose="02040503050406030204" pitchFamily="18" charset="0"/>
                                 <a:ea typeface="Calibri" panose="020F0502020204030204" pitchFamily="34" charset="0"/>
@@ -14144,7 +14497,7 @@
                             <m:r>
                               <a:rPr lang="en-GB" sz="1600" b="0" i="1" smtClean="0">
                                 <a:solidFill>
-                                  <a:srgbClr val="64A4D9"/>
+                                  <a:srgbClr val="4472C4"/>
                                 </a:solidFill>
                                 <a:latin typeface="Cambria Math" panose="02040503050406030204" pitchFamily="18" charset="0"/>
                                 <a:ea typeface="Calibri" panose="020F0502020204030204" pitchFamily="34" charset="0"/>
@@ -14157,7 +14510,7 @@
                             <m:r>
                               <a:rPr lang="en-GB" sz="1600" b="0" i="1" smtClean="0">
                                 <a:solidFill>
-                                  <a:srgbClr val="64A4D9"/>
+                                  <a:srgbClr val="4472C4"/>
                                 </a:solidFill>
                                 <a:latin typeface="Cambria Math" panose="02040503050406030204" pitchFamily="18" charset="0"/>
                                 <a:ea typeface="Calibri" panose="020F0502020204030204" pitchFamily="34" charset="0"/>
@@ -14170,7 +14523,7 @@
                             <m:r>
                               <a:rPr lang="en-GB" sz="1600" b="0" i="1" smtClean="0">
                                 <a:solidFill>
-                                  <a:srgbClr val="64A4D9"/>
+                                  <a:srgbClr val="4472C4"/>
                                 </a:solidFill>
                                 <a:latin typeface="Cambria Math" panose="02040503050406030204" pitchFamily="18" charset="0"/>
                                 <a:ea typeface="Calibri" panose="020F0502020204030204" pitchFamily="34" charset="0"/>
@@ -14183,7 +14536,7 @@
                         <m:r>
                           <a:rPr lang="en-GB" sz="1600" i="1">
                             <a:solidFill>
-                              <a:srgbClr val="64A4D9"/>
+                              <a:srgbClr val="4472C4"/>
                             </a:solidFill>
                             <a:latin typeface="Cambria Math" panose="02040503050406030204" pitchFamily="18" charset="0"/>
                             <a:ea typeface="Calibri" panose="020F0502020204030204" pitchFamily="34" charset="0"/>
@@ -14194,7 +14547,7 @@
                         <m:r>
                           <a:rPr lang="en-GB" sz="1600" i="1">
                             <a:solidFill>
-                              <a:srgbClr val="64A4D9"/>
+                              <a:srgbClr val="4472C4"/>
                             </a:solidFill>
                             <a:latin typeface="Cambria Math" panose="02040503050406030204" pitchFamily="18" charset="0"/>
                             <a:ea typeface="Calibri" panose="020F0502020204030204" pitchFamily="34" charset="0"/>
@@ -14205,7 +14558,7 @@
                         <m:r>
                           <a:rPr lang="en-GB" sz="1600" i="1">
                             <a:solidFill>
-                              <a:srgbClr val="64A4D9"/>
+                              <a:srgbClr val="4472C4"/>
                             </a:solidFill>
                             <a:latin typeface="Cambria Math" panose="02040503050406030204" pitchFamily="18" charset="0"/>
                             <a:ea typeface="Calibri" panose="020F0502020204030204" pitchFamily="34" charset="0"/>
@@ -14216,7 +14569,7 @@
                         <m:r>
                           <a:rPr lang="en-GB" sz="1600" i="1">
                             <a:solidFill>
-                              <a:srgbClr val="64A4D9"/>
+                              <a:srgbClr val="4472C4"/>
                             </a:solidFill>
                             <a:latin typeface="Cambria Math" panose="02040503050406030204" pitchFamily="18" charset="0"/>
                             <a:ea typeface="Calibri" panose="020F0502020204030204" pitchFamily="34" charset="0"/>
@@ -14227,7 +14580,7 @@
                         <m:r>
                           <a:rPr lang="en-GB" sz="1600" i="1">
                             <a:solidFill>
-                              <a:srgbClr val="64A4D9"/>
+                              <a:srgbClr val="4472C4"/>
                             </a:solidFill>
                             <a:latin typeface="Cambria Math" panose="02040503050406030204" pitchFamily="18" charset="0"/>
                             <a:ea typeface="Calibri" panose="020F0502020204030204" pitchFamily="34" charset="0"/>
@@ -14238,7 +14591,7 @@
                         <m:r>
                           <a:rPr lang="en-GB" sz="1600" i="1">
                             <a:solidFill>
-                              <a:srgbClr val="64A4D9"/>
+                              <a:srgbClr val="4472C4"/>
                             </a:solidFill>
                             <a:latin typeface="Cambria Math" panose="02040503050406030204" pitchFamily="18" charset="0"/>
                             <a:ea typeface="Calibri" panose="020F0502020204030204" pitchFamily="34" charset="0"/>
@@ -14249,7 +14602,7 @@
                         <m:r>
                           <a:rPr lang="en-GB" sz="1600" i="1">
                             <a:solidFill>
-                              <a:srgbClr val="64A4D9"/>
+                              <a:srgbClr val="4472C4"/>
                             </a:solidFill>
                             <a:latin typeface="Cambria Math" panose="02040503050406030204" pitchFamily="18" charset="0"/>
                             <a:ea typeface="Calibri" panose="020F0502020204030204" pitchFamily="34" charset="0"/>
@@ -14262,7 +14615,7 @@
                             <m:ctrlPr>
                               <a:rPr lang="en-GB" sz="1600" i="1">
                                 <a:solidFill>
-                                  <a:srgbClr val="64A4D9"/>
+                                  <a:srgbClr val="4472C4"/>
                                 </a:solidFill>
                                 <a:latin typeface="Cambria Math" panose="02040503050406030204" pitchFamily="18" charset="0"/>
                                 <a:cs typeface="Times New Roman" panose="02020603050405020304" pitchFamily="18" charset="0"/>
@@ -14273,7 +14626,7 @@
                             <m:r>
                               <a:rPr lang="en-GB" sz="1600" i="1">
                                 <a:solidFill>
-                                  <a:srgbClr val="64A4D9"/>
+                                  <a:srgbClr val="4472C4"/>
                                 </a:solidFill>
                                 <a:latin typeface="Cambria Math" panose="02040503050406030204" pitchFamily="18" charset="0"/>
                                 <a:cs typeface="Times New Roman" panose="02020603050405020304" pitchFamily="18" charset="0"/>
@@ -14286,7 +14639,7 @@
                               </m:rPr>
                               <a:rPr lang="el-GR" sz="1600" i="1">
                                 <a:solidFill>
-                                  <a:srgbClr val="64A4D9"/>
+                                  <a:srgbClr val="4472C4"/>
                                 </a:solidFill>
                                 <a:latin typeface="Cambria Math" panose="02040503050406030204" pitchFamily="18" charset="0"/>
                                 <a:cs typeface="Times New Roman" panose="02020603050405020304" pitchFamily="18" charset="0"/>
@@ -14298,7 +14651,7 @@
                             <m:r>
                               <a:rPr lang="en-GB" sz="1600" i="1">
                                 <a:solidFill>
-                                  <a:srgbClr val="64A4D9"/>
+                                  <a:srgbClr val="4472C4"/>
                                 </a:solidFill>
                                 <a:latin typeface="Cambria Math" panose="02040503050406030204" pitchFamily="18" charset="0"/>
                                 <a:cs typeface="Times New Roman" panose="02020603050405020304" pitchFamily="18" charset="0"/>
@@ -14310,7 +14663,7 @@
                         <m:r>
                           <a:rPr lang="en-GB" sz="1600" i="1">
                             <a:solidFill>
-                              <a:srgbClr val="64A4D9"/>
+                              <a:srgbClr val="4472C4"/>
                             </a:solidFill>
                             <a:latin typeface="Cambria Math" panose="02040503050406030204" pitchFamily="18" charset="0"/>
                             <a:ea typeface="Calibri" panose="020F0502020204030204" pitchFamily="34" charset="0"/>
@@ -14321,7 +14674,7 @@
                         <m:r>
                           <a:rPr lang="en-GB" sz="1600" i="1">
                             <a:solidFill>
-                              <a:srgbClr val="64A4D9"/>
+                              <a:srgbClr val="4472C4"/>
                             </a:solidFill>
                             <a:latin typeface="Cambria Math" panose="02040503050406030204" pitchFamily="18" charset="0"/>
                             <a:ea typeface="Calibri" panose="020F0502020204030204" pitchFamily="34" charset="0"/>
@@ -14587,7 +14940,7 @@
             <a:noFill/>
             <a:ln w="38100" cap="flat" cmpd="sng" algn="ctr">
               <a:solidFill>
-                <a:srgbClr val="64A4D9"/>
+                <a:srgbClr val="4472C4"/>
               </a:solidFill>
               <a:prstDash val="solid"/>
               <a:miter lim="800000"/>
@@ -14809,7 +15162,7 @@
             <a:noFill/>
             <a:ln w="38100" cap="flat" cmpd="sng" algn="ctr">
               <a:solidFill>
-                <a:srgbClr val="64A4D9"/>
+                <a:srgbClr val="4472C4"/>
               </a:solidFill>
               <a:prstDash val="solid"/>
               <a:miter lim="800000"/>
@@ -15031,7 +15384,7 @@
             <a:noFill/>
             <a:ln w="38100" cap="flat" cmpd="sng" algn="ctr">
               <a:solidFill>
-                <a:srgbClr val="64A4D9"/>
+                <a:srgbClr val="4472C4"/>
               </a:solidFill>
               <a:prstDash val="solid"/>
               <a:miter lim="800000"/>
@@ -16079,9 +16432,9 @@
         <p:grpSpPr>
           <a:xfrm>
             <a:off x="14209" y="2036494"/>
-            <a:ext cx="7426342" cy="3877063"/>
+            <a:ext cx="6987151" cy="3859489"/>
             <a:chOff x="105994" y="1660805"/>
-            <a:chExt cx="9421297" cy="5656627"/>
+            <a:chExt cx="8864125" cy="5630986"/>
           </a:xfrm>
         </p:grpSpPr>
         <p:sp>
@@ -16417,8 +16770,8 @@
           </p:nvCxnSpPr>
           <p:spPr>
             <a:xfrm>
-              <a:off x="473048" y="4950627"/>
-              <a:ext cx="0" cy="1260000"/>
+              <a:off x="473047" y="5182639"/>
+              <a:ext cx="0" cy="1259999"/>
             </a:xfrm>
             <a:prstGeom prst="line">
               <a:avLst/>
@@ -16435,49 +16788,6 @@
             <a:effectLst/>
           </p:spPr>
         </p:cxnSp>
-        <p:sp>
-          <p:nvSpPr>
-            <p:cNvPr id="61" name="TextBox 60">
-              <a:extLst>
-                <a:ext uri="{FF2B5EF4-FFF2-40B4-BE49-F238E27FC236}">
-                  <a16:creationId xmlns:a16="http://schemas.microsoft.com/office/drawing/2014/main" id="{4F5EADA1-1A6F-485B-A16F-1A4399D7969A}"/>
-                </a:ext>
-              </a:extLst>
-            </p:cNvPr>
-            <p:cNvSpPr txBox="1"/>
-            <p:nvPr/>
-          </p:nvSpPr>
-          <p:spPr>
-            <a:xfrm>
-              <a:off x="7257221" y="5016277"/>
-              <a:ext cx="1712898" cy="1212423"/>
-            </a:xfrm>
-            <a:prstGeom prst="rect">
-              <a:avLst/>
-            </a:prstGeom>
-            <a:noFill/>
-          </p:spPr>
-          <p:txBody>
-            <a:bodyPr wrap="square" rtlCol="0">
-              <a:spAutoFit/>
-            </a:bodyPr>
-            <a:lstStyle/>
-            <a:p>
-              <a:r>
-                <a:rPr lang="en-GB" sz="1600" dirty="0">
-                  <a:solidFill>
-                    <a:prstClr val="white">
-                      <a:lumMod val="50000"/>
-                    </a:prstClr>
-                  </a:solidFill>
-                  <a:latin typeface="Arial" panose="020B0604020202020204" pitchFamily="34" charset="0"/>
-                  <a:cs typeface="Arial" panose="020B0604020202020204" pitchFamily="34" charset="0"/>
-                </a:rPr>
-                <a:t>storage energy capacity</a:t>
-              </a:r>
-            </a:p>
-          </p:txBody>
-        </p:sp>
         <p:cxnSp>
           <p:nvCxnSpPr>
             <p:cNvPr id="62" name="Straight Connector 61">
@@ -16494,7 +16804,7 @@
           </p:nvCxnSpPr>
           <p:spPr>
             <a:xfrm>
-              <a:off x="7200293" y="5345249"/>
+              <a:off x="7240641" y="5414852"/>
               <a:ext cx="0" cy="864000"/>
             </a:xfrm>
             <a:prstGeom prst="line">
@@ -16529,7 +16839,7 @@
           </p:nvSpPr>
           <p:spPr>
             <a:xfrm>
-              <a:off x="7649448" y="6190590"/>
+              <a:off x="7649449" y="6422936"/>
               <a:ext cx="369332" cy="538855"/>
             </a:xfrm>
             <a:prstGeom prst="rect">
@@ -16557,42 +16867,6 @@
         </p:sp>
         <p:cxnSp>
           <p:nvCxnSpPr>
-            <p:cNvPr id="65" name="Straight Connector 64">
-              <a:extLst>
-                <a:ext uri="{FF2B5EF4-FFF2-40B4-BE49-F238E27FC236}">
-                  <a16:creationId xmlns:a16="http://schemas.microsoft.com/office/drawing/2014/main" id="{BF834811-5CCE-43C7-B24F-370072283EDC}"/>
-                </a:ext>
-              </a:extLst>
-            </p:cNvPr>
-            <p:cNvCxnSpPr>
-              <a:cxnSpLocks/>
-            </p:cNvCxnSpPr>
-            <p:nvPr/>
-          </p:nvCxnSpPr>
-          <p:spPr>
-            <a:xfrm>
-              <a:off x="2679586" y="3301190"/>
-              <a:ext cx="0" cy="2880000"/>
-            </a:xfrm>
-            <a:prstGeom prst="line">
-              <a:avLst/>
-            </a:prstGeom>
-            <a:noFill/>
-            <a:ln w="25400" cap="flat" cmpd="sng" algn="ctr">
-              <a:solidFill>
-                <a:sysClr val="window" lastClr="FFFFFF">
-                  <a:lumMod val="65000"/>
-                </a:sysClr>
-              </a:solidFill>
-              <a:prstDash val="dash"/>
-              <a:miter lim="800000"/>
-              <a:headEnd type="none"/>
-            </a:ln>
-            <a:effectLst/>
-          </p:spPr>
-        </p:cxnSp>
-        <p:cxnSp>
-          <p:nvCxnSpPr>
             <p:cNvPr id="66" name="Straight Connector 65">
               <a:extLst>
                 <a:ext uri="{FF2B5EF4-FFF2-40B4-BE49-F238E27FC236}">
@@ -16608,7 +16882,7 @@
           <p:spPr>
             <a:xfrm>
               <a:off x="4703913" y="3301190"/>
-              <a:ext cx="0" cy="2880001"/>
+              <a:ext cx="0" cy="3151436"/>
             </a:xfrm>
             <a:prstGeom prst="line">
               <a:avLst/>
@@ -16643,44 +16917,8 @@
           </p:nvCxnSpPr>
           <p:spPr>
             <a:xfrm>
-              <a:off x="1552124" y="3432181"/>
-              <a:ext cx="0" cy="2880000"/>
-            </a:xfrm>
-            <a:prstGeom prst="line">
-              <a:avLst/>
-            </a:prstGeom>
-            <a:noFill/>
-            <a:ln w="25400" cap="flat" cmpd="sng" algn="ctr">
-              <a:solidFill>
-                <a:sysClr val="window" lastClr="FFFFFF">
-                  <a:lumMod val="65000"/>
-                </a:sysClr>
-              </a:solidFill>
-              <a:prstDash val="dash"/>
-              <a:miter lim="800000"/>
-              <a:headEnd type="none"/>
-            </a:ln>
-            <a:effectLst/>
-          </p:spPr>
-        </p:cxnSp>
-        <p:cxnSp>
-          <p:nvCxnSpPr>
-            <p:cNvPr id="68" name="Straight Connector 67">
-              <a:extLst>
-                <a:ext uri="{FF2B5EF4-FFF2-40B4-BE49-F238E27FC236}">
-                  <a16:creationId xmlns:a16="http://schemas.microsoft.com/office/drawing/2014/main" id="{4F986413-5720-4307-B47D-F7C6142F77E2}"/>
-                </a:ext>
-              </a:extLst>
-            </p:cNvPr>
-            <p:cNvCxnSpPr>
-              <a:cxnSpLocks/>
-            </p:cNvCxnSpPr>
-            <p:nvPr/>
-          </p:nvCxnSpPr>
-          <p:spPr>
-            <a:xfrm>
-              <a:off x="3649064" y="3276774"/>
-              <a:ext cx="0" cy="2880001"/>
+              <a:off x="1552124" y="3337855"/>
+              <a:ext cx="0" cy="3151436"/>
             </a:xfrm>
             <a:prstGeom prst="line">
               <a:avLst/>
@@ -16715,8 +16953,8 @@
           </p:nvCxnSpPr>
           <p:spPr>
             <a:xfrm>
-              <a:off x="5754391" y="3301190"/>
-              <a:ext cx="0" cy="2880001"/>
+              <a:off x="5723843" y="3301190"/>
+              <a:ext cx="0" cy="3151436"/>
             </a:xfrm>
             <a:prstGeom prst="line">
               <a:avLst/>
@@ -16781,52 +17019,6 @@
             </a:p>
           </p:txBody>
         </p:sp>
-        <p:sp>
-          <p:nvSpPr>
-            <p:cNvPr id="73" name="Rectangle 72">
-              <a:extLst>
-                <a:ext uri="{FF2B5EF4-FFF2-40B4-BE49-F238E27FC236}">
-                  <a16:creationId xmlns:a16="http://schemas.microsoft.com/office/drawing/2014/main" id="{5875E058-74D9-44AB-9569-CCE63189752D}"/>
-                </a:ext>
-              </a:extLst>
-            </p:cNvPr>
-            <p:cNvSpPr/>
-            <p:nvPr/>
-          </p:nvSpPr>
-          <p:spPr>
-            <a:xfrm>
-              <a:off x="4518646" y="6242126"/>
-              <a:ext cx="5008645" cy="1075306"/>
-            </a:xfrm>
-            <a:prstGeom prst="rect">
-              <a:avLst/>
-            </a:prstGeom>
-            <a:solidFill>
-              <a:sysClr val="window" lastClr="FFFFFF"/>
-            </a:solidFill>
-            <a:ln w="12700" cap="flat" cmpd="sng" algn="ctr">
-              <a:noFill/>
-              <a:prstDash val="solid"/>
-              <a:miter lim="800000"/>
-            </a:ln>
-            <a:effectLst/>
-          </p:spPr>
-          <p:txBody>
-            <a:bodyPr rtlCol="0" anchor="ctr"/>
-            <a:lstStyle/>
-            <a:p>
-              <a:pPr algn="ctr">
-                <a:defRPr/>
-              </a:pPr>
-              <a:endParaRPr lang="en-GB" kern="0">
-                <a:solidFill>
-                  <a:prstClr val="white"/>
-                </a:solidFill>
-                <a:latin typeface="Calibri" panose="020F0502020204030204"/>
-              </a:endParaRPr>
-            </a:p>
-          </p:txBody>
-        </p:sp>
         <p:cxnSp>
           <p:nvCxnSpPr>
             <p:cNvPr id="74" name="Straight Connector 73">
@@ -16843,8 +17035,8 @@
           </p:nvCxnSpPr>
           <p:spPr>
             <a:xfrm flipH="1">
-              <a:off x="439809" y="6359834"/>
-              <a:ext cx="1080000" cy="0"/>
+              <a:off x="405054" y="6603452"/>
+              <a:ext cx="1080001" cy="0"/>
             </a:xfrm>
             <a:prstGeom prst="line">
               <a:avLst/>
@@ -16878,7 +17070,7 @@
           </p:nvSpPr>
           <p:spPr>
             <a:xfrm>
-              <a:off x="697981" y="6403508"/>
+              <a:off x="604223" y="6683850"/>
               <a:ext cx="821829" cy="415367"/>
             </a:xfrm>
             <a:prstGeom prst="rect">
@@ -16912,47 +17104,6 @@
             </a:p>
           </p:txBody>
         </p:sp>
-        <p:sp>
-          <p:nvSpPr>
-            <p:cNvPr id="76" name="TextBox 75">
-              <a:extLst>
-                <a:ext uri="{FF2B5EF4-FFF2-40B4-BE49-F238E27FC236}">
-                  <a16:creationId xmlns:a16="http://schemas.microsoft.com/office/drawing/2014/main" id="{12556A72-79F8-4278-892A-599439A84EBB}"/>
-                </a:ext>
-              </a:extLst>
-            </p:cNvPr>
-            <p:cNvSpPr txBox="1"/>
-            <p:nvPr/>
-          </p:nvSpPr>
-          <p:spPr>
-            <a:xfrm>
-              <a:off x="7656823" y="6209896"/>
-              <a:ext cx="369332" cy="493950"/>
-            </a:xfrm>
-            <a:prstGeom prst="rect">
-              <a:avLst/>
-            </a:prstGeom>
-            <a:noFill/>
-          </p:spPr>
-          <p:txBody>
-            <a:bodyPr wrap="square" rtlCol="0">
-              <a:spAutoFit/>
-            </a:bodyPr>
-            <a:lstStyle/>
-            <a:p>
-              <a:r>
-                <a:rPr lang="en-GB" sz="1600" dirty="0">
-                  <a:solidFill>
-                    <a:prstClr val="black"/>
-                  </a:solidFill>
-                  <a:latin typeface="Arial" panose="020B0604020202020204" pitchFamily="34" charset="0"/>
-                  <a:cs typeface="Arial" panose="020B0604020202020204" pitchFamily="34" charset="0"/>
-                </a:rPr>
-                <a:t>t</a:t>
-              </a:r>
-            </a:p>
-          </p:txBody>
-        </p:sp>
         <p:cxnSp>
           <p:nvCxnSpPr>
             <p:cNvPr id="77" name="Straight Connector 76">
@@ -16969,7 +17120,7 @@
           </p:nvCxnSpPr>
           <p:spPr>
             <a:xfrm flipH="1">
-              <a:off x="458780" y="6228700"/>
+              <a:off x="458780" y="6460717"/>
               <a:ext cx="7560000" cy="0"/>
             </a:xfrm>
             <a:prstGeom prst="line">
@@ -17176,7 +17327,7 @@
           </p:nvSpPr>
           <p:spPr>
             <a:xfrm>
-              <a:off x="2799621" y="4350179"/>
+              <a:off x="2583279" y="4877901"/>
               <a:ext cx="3435275" cy="493950"/>
             </a:xfrm>
             <a:prstGeom prst="rect">
@@ -17203,6 +17354,121 @@
             </a:p>
           </p:txBody>
         </p:sp>
+        <p:sp>
+          <p:nvSpPr>
+            <p:cNvPr id="61" name="TextBox 60">
+              <a:extLst>
+                <a:ext uri="{FF2B5EF4-FFF2-40B4-BE49-F238E27FC236}">
+                  <a16:creationId xmlns:a16="http://schemas.microsoft.com/office/drawing/2014/main" id="{4F5EADA1-1A6F-485B-A16F-1A4399D7969A}"/>
+                </a:ext>
+              </a:extLst>
+            </p:cNvPr>
+            <p:cNvSpPr txBox="1"/>
+            <p:nvPr/>
+          </p:nvSpPr>
+          <p:spPr>
+            <a:xfrm>
+              <a:off x="7257221" y="5213485"/>
+              <a:ext cx="1712898" cy="1212423"/>
+            </a:xfrm>
+            <a:prstGeom prst="rect">
+              <a:avLst/>
+            </a:prstGeom>
+            <a:noFill/>
+          </p:spPr>
+          <p:txBody>
+            <a:bodyPr wrap="square" rtlCol="0">
+              <a:spAutoFit/>
+            </a:bodyPr>
+            <a:lstStyle/>
+            <a:p>
+              <a:r>
+                <a:rPr lang="en-GB" sz="1600" dirty="0">
+                  <a:solidFill>
+                    <a:prstClr val="white">
+                      <a:lumMod val="50000"/>
+                    </a:prstClr>
+                  </a:solidFill>
+                  <a:latin typeface="Arial" panose="020B0604020202020204" pitchFamily="34" charset="0"/>
+                  <a:cs typeface="Arial" panose="020B0604020202020204" pitchFamily="34" charset="0"/>
+                </a:rPr>
+                <a:t>storage energy capacity</a:t>
+              </a:r>
+            </a:p>
+          </p:txBody>
+        </p:sp>
+        <p:cxnSp>
+          <p:nvCxnSpPr>
+            <p:cNvPr id="68" name="Straight Connector 67">
+              <a:extLst>
+                <a:ext uri="{FF2B5EF4-FFF2-40B4-BE49-F238E27FC236}">
+                  <a16:creationId xmlns:a16="http://schemas.microsoft.com/office/drawing/2014/main" id="{4F986413-5720-4307-B47D-F7C6142F77E2}"/>
+                </a:ext>
+              </a:extLst>
+            </p:cNvPr>
+            <p:cNvCxnSpPr>
+              <a:cxnSpLocks/>
+            </p:cNvCxnSpPr>
+            <p:nvPr/>
+          </p:nvCxnSpPr>
+          <p:spPr>
+            <a:xfrm>
+              <a:off x="3649064" y="3276774"/>
+              <a:ext cx="0" cy="3151436"/>
+            </a:xfrm>
+            <a:prstGeom prst="line">
+              <a:avLst/>
+            </a:prstGeom>
+            <a:noFill/>
+            <a:ln w="25400" cap="flat" cmpd="sng" algn="ctr">
+              <a:solidFill>
+                <a:sysClr val="window" lastClr="FFFFFF">
+                  <a:lumMod val="65000"/>
+                </a:sysClr>
+              </a:solidFill>
+              <a:prstDash val="dash"/>
+              <a:miter lim="800000"/>
+              <a:headEnd type="none"/>
+            </a:ln>
+            <a:effectLst/>
+          </p:spPr>
+        </p:cxnSp>
+        <p:cxnSp>
+          <p:nvCxnSpPr>
+            <p:cNvPr id="65" name="Straight Connector 64">
+              <a:extLst>
+                <a:ext uri="{FF2B5EF4-FFF2-40B4-BE49-F238E27FC236}">
+                  <a16:creationId xmlns:a16="http://schemas.microsoft.com/office/drawing/2014/main" id="{BF834811-5CCE-43C7-B24F-370072283EDC}"/>
+                </a:ext>
+              </a:extLst>
+            </p:cNvPr>
+            <p:cNvCxnSpPr>
+              <a:cxnSpLocks/>
+            </p:cNvCxnSpPr>
+            <p:nvPr/>
+          </p:nvCxnSpPr>
+          <p:spPr>
+            <a:xfrm>
+              <a:off x="2679586" y="3301190"/>
+              <a:ext cx="0" cy="3151436"/>
+            </a:xfrm>
+            <a:prstGeom prst="line">
+              <a:avLst/>
+            </a:prstGeom>
+            <a:noFill/>
+            <a:ln w="25400" cap="flat" cmpd="sng" algn="ctr">
+              <a:solidFill>
+                <a:sysClr val="window" lastClr="FFFFFF">
+                  <a:lumMod val="65000"/>
+                </a:sysClr>
+              </a:solidFill>
+              <a:prstDash val="dash"/>
+              <a:miter lim="800000"/>
+              <a:headEnd type="none"/>
+            </a:ln>
+            <a:effectLst/>
+          </p:spPr>
+        </p:cxnSp>
       </p:grpSp>
       <p:grpSp>
         <p:nvGrpSpPr>
@@ -18861,7 +19127,7 @@
         </p:nvSpPr>
         <p:spPr>
           <a:xfrm>
-            <a:off x="311888" y="4486883"/>
+            <a:off x="311888" y="4637963"/>
             <a:ext cx="1672856" cy="673452"/>
           </a:xfrm>
           <a:custGeom>
@@ -19001,7 +19267,7 @@
         </p:nvSpPr>
         <p:spPr>
           <a:xfrm>
-            <a:off x="1987341" y="4482196"/>
+            <a:off x="1987341" y="4633276"/>
             <a:ext cx="1672856" cy="673452"/>
           </a:xfrm>
           <a:custGeom>
@@ -19141,7 +19407,7 @@
         </p:nvSpPr>
         <p:spPr>
           <a:xfrm>
-            <a:off x="3655253" y="4470880"/>
+            <a:off x="3655253" y="4621960"/>
             <a:ext cx="1672856" cy="673452"/>
           </a:xfrm>
           <a:custGeom>
@@ -19281,7 +19547,7 @@
         </p:nvSpPr>
         <p:spPr>
           <a:xfrm rot="16200000">
-            <a:off x="-547159" y="4600475"/>
+            <a:off x="-586914" y="4751555"/>
             <a:ext cx="1421530" cy="307777"/>
           </a:xfrm>
           <a:prstGeom prst="rect">
@@ -20052,4 +20318,299 @@
     </a:ext>
   </a:extLst>
 </a:theme>
+</file>
+
+<file path=ppt/theme/theme3.xml><?xml version="1.0" encoding="utf-8"?>
+<a:theme xmlns:a="http://schemas.openxmlformats.org/drawingml/2006/main" name="Office Theme">
+  <a:themeElements>
+    <a:clrScheme name="Office">
+      <a:dk1>
+        <a:sysClr val="windowText" lastClr="000000"/>
+      </a:dk1>
+      <a:lt1>
+        <a:sysClr val="window" lastClr="FFFFFF"/>
+      </a:lt1>
+      <a:dk2>
+        <a:srgbClr val="44546A"/>
+      </a:dk2>
+      <a:lt2>
+        <a:srgbClr val="E7E6E6"/>
+      </a:lt2>
+      <a:accent1>
+        <a:srgbClr val="4472C4"/>
+      </a:accent1>
+      <a:accent2>
+        <a:srgbClr val="ED7D31"/>
+      </a:accent2>
+      <a:accent3>
+        <a:srgbClr val="A5A5A5"/>
+      </a:accent3>
+      <a:accent4>
+        <a:srgbClr val="FFC000"/>
+      </a:accent4>
+      <a:accent5>
+        <a:srgbClr val="5B9BD5"/>
+      </a:accent5>
+      <a:accent6>
+        <a:srgbClr val="70AD47"/>
+      </a:accent6>
+      <a:hlink>
+        <a:srgbClr val="0563C1"/>
+      </a:hlink>
+      <a:folHlink>
+        <a:srgbClr val="954F72"/>
+      </a:folHlink>
+    </a:clrScheme>
+    <a:fontScheme name="Office">
+      <a:majorFont>
+        <a:latin typeface="Calibri Light" panose="020F0302020204030204"/>
+        <a:ea typeface=""/>
+        <a:cs typeface=""/>
+        <a:font script="Jpan" typeface="游ゴシック Light"/>
+        <a:font script="Hang" typeface="맑은 고딕"/>
+        <a:font script="Hans" typeface="等线 Light"/>
+        <a:font script="Hant" typeface="新細明體"/>
+        <a:font script="Arab" typeface="Times New Roman"/>
+        <a:font script="Hebr" typeface="Times New Roman"/>
+        <a:font script="Thai" typeface="Angsana New"/>
+        <a:font script="Ethi" typeface="Nyala"/>
+        <a:font script="Beng" typeface="Vrinda"/>
+        <a:font script="Gujr" typeface="Shruti"/>
+        <a:font script="Khmr" typeface="MoolBoran"/>
+        <a:font script="Knda" typeface="Tunga"/>
+        <a:font script="Guru" typeface="Raavi"/>
+        <a:font script="Cans" typeface="Euphemia"/>
+        <a:font script="Cher" typeface="Plantagenet Cherokee"/>
+        <a:font script="Yiii" typeface="Microsoft Yi Baiti"/>
+        <a:font script="Tibt" typeface="Microsoft Himalaya"/>
+        <a:font script="Thaa" typeface="MV Boli"/>
+        <a:font script="Deva" typeface="Mangal"/>
+        <a:font script="Telu" typeface="Gautami"/>
+        <a:font script="Taml" typeface="Latha"/>
+        <a:font script="Syrc" typeface="Estrangelo Edessa"/>
+        <a:font script="Orya" typeface="Kalinga"/>
+        <a:font script="Mlym" typeface="Kartika"/>
+        <a:font script="Laoo" typeface="DokChampa"/>
+        <a:font script="Sinh" typeface="Iskoola Pota"/>
+        <a:font script="Mong" typeface="Mongolian Baiti"/>
+        <a:font script="Viet" typeface="Times New Roman"/>
+        <a:font script="Uigh" typeface="Microsoft Uighur"/>
+        <a:font script="Geor" typeface="Sylfaen"/>
+        <a:font script="Armn" typeface="Arial"/>
+        <a:font script="Bugi" typeface="Leelawadee UI"/>
+        <a:font script="Bopo" typeface="Microsoft JhengHei"/>
+        <a:font script="Java" typeface="Javanese Text"/>
+        <a:font script="Lisu" typeface="Segoe UI"/>
+        <a:font script="Mymr" typeface="Myanmar Text"/>
+        <a:font script="Nkoo" typeface="Ebrima"/>
+        <a:font script="Olck" typeface="Nirmala UI"/>
+        <a:font script="Osma" typeface="Ebrima"/>
+        <a:font script="Phag" typeface="Phagspa"/>
+        <a:font script="Syrn" typeface="Estrangelo Edessa"/>
+        <a:font script="Syrj" typeface="Estrangelo Edessa"/>
+        <a:font script="Syre" typeface="Estrangelo Edessa"/>
+        <a:font script="Sora" typeface="Nirmala UI"/>
+        <a:font script="Tale" typeface="Microsoft Tai Le"/>
+        <a:font script="Talu" typeface="Microsoft New Tai Lue"/>
+        <a:font script="Tfng" typeface="Ebrima"/>
+      </a:majorFont>
+      <a:minorFont>
+        <a:latin typeface="Calibri" panose="020F0502020204030204"/>
+        <a:ea typeface=""/>
+        <a:cs typeface=""/>
+        <a:font script="Jpan" typeface="游ゴシック"/>
+        <a:font script="Hang" typeface="맑은 고딕"/>
+        <a:font script="Hans" typeface="等线"/>
+        <a:font script="Hant" typeface="新細明體"/>
+        <a:font script="Arab" typeface="Arial"/>
+        <a:font script="Hebr" typeface="Arial"/>
+        <a:font script="Thai" typeface="Cordia New"/>
+        <a:font script="Ethi" typeface="Nyala"/>
+        <a:font script="Beng" typeface="Vrinda"/>
+        <a:font script="Gujr" typeface="Shruti"/>
+        <a:font script="Khmr" typeface="DaunPenh"/>
+        <a:font script="Knda" typeface="Tunga"/>
+        <a:font script="Guru" typeface="Raavi"/>
+        <a:font script="Cans" typeface="Euphemia"/>
+        <a:font script="Cher" typeface="Plantagenet Cherokee"/>
+        <a:font script="Yiii" typeface="Microsoft Yi Baiti"/>
+        <a:font script="Tibt" typeface="Microsoft Himalaya"/>
+        <a:font script="Thaa" typeface="MV Boli"/>
+        <a:font script="Deva" typeface="Mangal"/>
+        <a:font script="Telu" typeface="Gautami"/>
+        <a:font script="Taml" typeface="Latha"/>
+        <a:font script="Syrc" typeface="Estrangelo Edessa"/>
+        <a:font script="Orya" typeface="Kalinga"/>
+        <a:font script="Mlym" typeface="Kartika"/>
+        <a:font script="Laoo" typeface="DokChampa"/>
+        <a:font script="Sinh" typeface="Iskoola Pota"/>
+        <a:font script="Mong" typeface="Mongolian Baiti"/>
+        <a:font script="Viet" typeface="Arial"/>
+        <a:font script="Uigh" typeface="Microsoft Uighur"/>
+        <a:font script="Geor" typeface="Sylfaen"/>
+        <a:font script="Armn" typeface="Arial"/>
+        <a:font script="Bugi" typeface="Leelawadee UI"/>
+        <a:font script="Bopo" typeface="Microsoft JhengHei"/>
+        <a:font script="Java" typeface="Javanese Text"/>
+        <a:font script="Lisu" typeface="Segoe UI"/>
+        <a:font script="Mymr" typeface="Myanmar Text"/>
+        <a:font script="Nkoo" typeface="Ebrima"/>
+        <a:font script="Olck" typeface="Nirmala UI"/>
+        <a:font script="Osma" typeface="Ebrima"/>
+        <a:font script="Phag" typeface="Phagspa"/>
+        <a:font script="Syrn" typeface="Estrangelo Edessa"/>
+        <a:font script="Syrj" typeface="Estrangelo Edessa"/>
+        <a:font script="Syre" typeface="Estrangelo Edessa"/>
+        <a:font script="Sora" typeface="Nirmala UI"/>
+        <a:font script="Tale" typeface="Microsoft Tai Le"/>
+        <a:font script="Talu" typeface="Microsoft New Tai Lue"/>
+        <a:font script="Tfng" typeface="Ebrima"/>
+      </a:minorFont>
+    </a:fontScheme>
+    <a:fmtScheme name="Office">
+      <a:fillStyleLst>
+        <a:solidFill>
+          <a:schemeClr val="phClr"/>
+        </a:solidFill>
+        <a:gradFill rotWithShape="1">
+          <a:gsLst>
+            <a:gs pos="0">
+              <a:schemeClr val="phClr">
+                <a:lumMod val="110000"/>
+                <a:satMod val="105000"/>
+                <a:tint val="67000"/>
+              </a:schemeClr>
+            </a:gs>
+            <a:gs pos="50000">
+              <a:schemeClr val="phClr">
+                <a:lumMod val="105000"/>
+                <a:satMod val="103000"/>
+                <a:tint val="73000"/>
+              </a:schemeClr>
+            </a:gs>
+            <a:gs pos="100000">
+              <a:schemeClr val="phClr">
+                <a:lumMod val="105000"/>
+                <a:satMod val="109000"/>
+                <a:tint val="81000"/>
+              </a:schemeClr>
+            </a:gs>
+          </a:gsLst>
+          <a:lin ang="5400000" scaled="0"/>
+        </a:gradFill>
+        <a:gradFill rotWithShape="1">
+          <a:gsLst>
+            <a:gs pos="0">
+              <a:schemeClr val="phClr">
+                <a:satMod val="103000"/>
+                <a:lumMod val="102000"/>
+                <a:tint val="94000"/>
+              </a:schemeClr>
+            </a:gs>
+            <a:gs pos="50000">
+              <a:schemeClr val="phClr">
+                <a:satMod val="110000"/>
+                <a:lumMod val="100000"/>
+                <a:shade val="100000"/>
+              </a:schemeClr>
+            </a:gs>
+            <a:gs pos="100000">
+              <a:schemeClr val="phClr">
+                <a:lumMod val="99000"/>
+                <a:satMod val="120000"/>
+                <a:shade val="78000"/>
+              </a:schemeClr>
+            </a:gs>
+          </a:gsLst>
+          <a:lin ang="5400000" scaled="0"/>
+        </a:gradFill>
+      </a:fillStyleLst>
+      <a:lnStyleLst>
+        <a:ln w="6350" cap="flat" cmpd="sng" algn="ctr">
+          <a:solidFill>
+            <a:schemeClr val="phClr"/>
+          </a:solidFill>
+          <a:prstDash val="solid"/>
+          <a:miter lim="800000"/>
+        </a:ln>
+        <a:ln w="12700" cap="flat" cmpd="sng" algn="ctr">
+          <a:solidFill>
+            <a:schemeClr val="phClr"/>
+          </a:solidFill>
+          <a:prstDash val="solid"/>
+          <a:miter lim="800000"/>
+        </a:ln>
+        <a:ln w="19050" cap="flat" cmpd="sng" algn="ctr">
+          <a:solidFill>
+            <a:schemeClr val="phClr"/>
+          </a:solidFill>
+          <a:prstDash val="solid"/>
+          <a:miter lim="800000"/>
+        </a:ln>
+      </a:lnStyleLst>
+      <a:effectStyleLst>
+        <a:effectStyle>
+          <a:effectLst/>
+        </a:effectStyle>
+        <a:effectStyle>
+          <a:effectLst/>
+        </a:effectStyle>
+        <a:effectStyle>
+          <a:effectLst>
+            <a:outerShdw blurRad="57150" dist="19050" dir="5400000" algn="ctr" rotWithShape="0">
+              <a:srgbClr val="000000">
+                <a:alpha val="63000"/>
+              </a:srgbClr>
+            </a:outerShdw>
+          </a:effectLst>
+        </a:effectStyle>
+      </a:effectStyleLst>
+      <a:bgFillStyleLst>
+        <a:solidFill>
+          <a:schemeClr val="phClr"/>
+        </a:solidFill>
+        <a:solidFill>
+          <a:schemeClr val="phClr">
+            <a:tint val="95000"/>
+            <a:satMod val="170000"/>
+          </a:schemeClr>
+        </a:solidFill>
+        <a:gradFill rotWithShape="1">
+          <a:gsLst>
+            <a:gs pos="0">
+              <a:schemeClr val="phClr">
+                <a:tint val="93000"/>
+                <a:satMod val="150000"/>
+                <a:shade val="98000"/>
+                <a:lumMod val="102000"/>
+              </a:schemeClr>
+            </a:gs>
+            <a:gs pos="50000">
+              <a:schemeClr val="phClr">
+                <a:tint val="98000"/>
+                <a:satMod val="130000"/>
+                <a:shade val="90000"/>
+                <a:lumMod val="103000"/>
+              </a:schemeClr>
+            </a:gs>
+            <a:gs pos="100000">
+              <a:schemeClr val="phClr">
+                <a:shade val="63000"/>
+                <a:satMod val="120000"/>
+              </a:schemeClr>
+            </a:gs>
+          </a:gsLst>
+          <a:lin ang="5400000" scaled="0"/>
+        </a:gradFill>
+      </a:bgFillStyleLst>
+    </a:fmtScheme>
+  </a:themeElements>
+  <a:objectDefaults/>
+  <a:extraClrSchemeLst/>
+  <a:extLst>
+    <a:ext uri="{05A4C25C-085E-4340-85A3-A5531E510DB2}">
+      <thm15:themeFamily xmlns:thm15="http://schemas.microsoft.com/office/thememl/2012/main" name="Office Theme" id="{62F939B6-93AF-4DB8-9C6B-D6C7DFDC589F}" vid="{4A3C46E8-61CC-4603-A589-7422A47A8E4A}"/>
+    </a:ext>
+  </a:extLst>
+</a:theme>
 </file>
</xml_diff>

<commit_message>
increase resolution figures chapter 14
</commit_message>
<xml_diff>
--- a/Figures/Chapter_14/drawings/Fig14.X_storage_theory.pptx
+++ b/Figures/Chapter_14/drawings/Fig14.X_storage_theory.pptx
@@ -199,7 +199,7 @@
           <a:p>
             <a:fld id="{C4BA57E6-E106-43CF-B05D-8E4EECDB39D3}" type="datetimeFigureOut">
               <a:rPr lang="en-GB" smtClean="0"/>
-              <a:t>25/08/2023</a:t>
+              <a:t>31/08/2023</a:t>
             </a:fld>
             <a:endParaRPr lang="en-GB"/>
           </a:p>
@@ -616,7 +616,7 @@
           <a:p>
             <a:fld id="{8B1A925D-6802-4F82-B3A4-43BDB522D203}" type="datetimeFigureOut">
               <a:rPr lang="en-GB" smtClean="0"/>
-              <a:t>25/08/2023</a:t>
+              <a:t>31/08/2023</a:t>
             </a:fld>
             <a:endParaRPr lang="en-GB"/>
           </a:p>
@@ -816,7 +816,7 @@
           <a:p>
             <a:fld id="{8B1A925D-6802-4F82-B3A4-43BDB522D203}" type="datetimeFigureOut">
               <a:rPr lang="en-GB" smtClean="0"/>
-              <a:t>25/08/2023</a:t>
+              <a:t>31/08/2023</a:t>
             </a:fld>
             <a:endParaRPr lang="en-GB"/>
           </a:p>
@@ -1026,7 +1026,7 @@
           <a:p>
             <a:fld id="{8B1A925D-6802-4F82-B3A4-43BDB522D203}" type="datetimeFigureOut">
               <a:rPr lang="en-GB" smtClean="0"/>
-              <a:t>25/08/2023</a:t>
+              <a:t>31/08/2023</a:t>
             </a:fld>
             <a:endParaRPr lang="en-GB"/>
           </a:p>
@@ -1481,7 +1481,7 @@
             <a:fld id="{78417F83-4CBA-48F2-BAD0-783AE3701E32}" type="datetimeFigureOut">
               <a:rPr lang="en-GB" smtClean="0"/>
               <a:pPr/>
-              <a:t>25/08/2023</a:t>
+              <a:t>31/08/2023</a:t>
             </a:fld>
             <a:r>
               <a:rPr lang="en-GB" dirty="0"/>
@@ -1939,7 +1939,7 @@
             <a:fld id="{78417F83-4CBA-48F2-BAD0-783AE3701E32}" type="datetimeFigureOut">
               <a:rPr lang="en-GB" smtClean="0"/>
               <a:pPr/>
-              <a:t>25/08/2023</a:t>
+              <a:t>31/08/2023</a:t>
             </a:fld>
             <a:r>
               <a:rPr lang="en-GB" dirty="0"/>
@@ -2603,7 +2603,7 @@
             <a:fld id="{78417F83-4CBA-48F2-BAD0-783AE3701E32}" type="datetimeFigureOut">
               <a:rPr lang="en-GB" smtClean="0"/>
               <a:pPr/>
-              <a:t>25/08/2023</a:t>
+              <a:t>31/08/2023</a:t>
             </a:fld>
             <a:r>
               <a:rPr lang="en-GB" dirty="0"/>
@@ -2949,7 +2949,7 @@
             <a:fld id="{78417F83-4CBA-48F2-BAD0-783AE3701E32}" type="datetimeFigureOut">
               <a:rPr lang="en-GB" smtClean="0"/>
               <a:pPr/>
-              <a:t>25/08/2023</a:t>
+              <a:t>31/08/2023</a:t>
             </a:fld>
             <a:r>
               <a:rPr lang="en-GB" dirty="0"/>
@@ -3327,7 +3327,7 @@
             <a:fld id="{78417F83-4CBA-48F2-BAD0-783AE3701E32}" type="datetimeFigureOut">
               <a:rPr lang="en-GB" smtClean="0"/>
               <a:pPr/>
-              <a:t>25/08/2023</a:t>
+              <a:t>31/08/2023</a:t>
             </a:fld>
             <a:r>
               <a:rPr lang="en-GB" dirty="0"/>
@@ -3754,7 +3754,7 @@
             <a:fld id="{78417F83-4CBA-48F2-BAD0-783AE3701E32}" type="datetimeFigureOut">
               <a:rPr lang="en-GB" smtClean="0"/>
               <a:pPr/>
-              <a:t>25/08/2023</a:t>
+              <a:t>31/08/2023</a:t>
             </a:fld>
             <a:r>
               <a:rPr lang="en-GB" dirty="0"/>
@@ -4194,7 +4194,7 @@
             <a:fld id="{78417F83-4CBA-48F2-BAD0-783AE3701E32}" type="datetimeFigureOut">
               <a:rPr lang="en-GB" smtClean="0"/>
               <a:pPr/>
-              <a:t>25/08/2023</a:t>
+              <a:t>31/08/2023</a:t>
             </a:fld>
             <a:r>
               <a:rPr lang="en-GB" dirty="0"/>
@@ -4362,7 +4362,7 @@
             <a:fld id="{78417F83-4CBA-48F2-BAD0-783AE3701E32}" type="datetimeFigureOut">
               <a:rPr lang="en-GB" smtClean="0"/>
               <a:pPr/>
-              <a:t>25/08/2023</a:t>
+              <a:t>31/08/2023</a:t>
             </a:fld>
             <a:r>
               <a:rPr lang="en-GB" dirty="0"/>
@@ -4530,7 +4530,7 @@
           <a:p>
             <a:fld id="{8B1A925D-6802-4F82-B3A4-43BDB522D203}" type="datetimeFigureOut">
               <a:rPr lang="en-GB" smtClean="0"/>
-              <a:t>25/08/2023</a:t>
+              <a:t>31/08/2023</a:t>
             </a:fld>
             <a:endParaRPr lang="en-GB"/>
           </a:p>
@@ -4743,7 +4743,7 @@
             <a:fld id="{78417F83-4CBA-48F2-BAD0-783AE3701E32}" type="datetimeFigureOut">
               <a:rPr lang="en-GB" smtClean="0"/>
               <a:pPr/>
-              <a:t>25/08/2023</a:t>
+              <a:t>31/08/2023</a:t>
             </a:fld>
             <a:r>
               <a:rPr lang="en-GB" dirty="0"/>
@@ -4974,7 +4974,7 @@
             <a:fld id="{78417F83-4CBA-48F2-BAD0-783AE3701E32}" type="datetimeFigureOut">
               <a:rPr lang="en-GB" smtClean="0"/>
               <a:pPr/>
-              <a:t>25/08/2023</a:t>
+              <a:t>31/08/2023</a:t>
             </a:fld>
             <a:r>
               <a:rPr lang="en-GB" dirty="0"/>
@@ -5215,7 +5215,7 @@
             <a:fld id="{78417F83-4CBA-48F2-BAD0-783AE3701E32}" type="datetimeFigureOut">
               <a:rPr lang="en-GB" smtClean="0"/>
               <a:pPr/>
-              <a:t>25/08/2023</a:t>
+              <a:t>31/08/2023</a:t>
             </a:fld>
             <a:r>
               <a:rPr lang="en-GB" dirty="0"/>
@@ -5385,7 +5385,7 @@
             <a:fld id="{78417F83-4CBA-48F2-BAD0-783AE3701E32}" type="datetimeFigureOut">
               <a:rPr lang="en-GB" smtClean="0"/>
               <a:pPr/>
-              <a:t>25/08/2023</a:t>
+              <a:t>31/08/2023</a:t>
             </a:fld>
             <a:r>
               <a:rPr lang="en-GB" dirty="0"/>
@@ -5559,7 +5559,7 @@
             <a:fld id="{78417F83-4CBA-48F2-BAD0-783AE3701E32}" type="datetimeFigureOut">
               <a:rPr lang="en-GB" smtClean="0"/>
               <a:pPr/>
-              <a:t>25/08/2023</a:t>
+              <a:t>31/08/2023</a:t>
             </a:fld>
             <a:r>
               <a:rPr lang="en-GB" dirty="0"/>
@@ -5896,7 +5896,7 @@
             <a:fld id="{78417F83-4CBA-48F2-BAD0-783AE3701E32}" type="datetimeFigureOut">
               <a:rPr lang="en-GB" smtClean="0"/>
               <a:pPr/>
-              <a:t>25/08/2023</a:t>
+              <a:t>31/08/2023</a:t>
             </a:fld>
             <a:r>
               <a:rPr lang="en-GB" dirty="0"/>
@@ -6067,7 +6067,7 @@
             <a:fld id="{78417F83-4CBA-48F2-BAD0-783AE3701E32}" type="datetimeFigureOut">
               <a:rPr lang="en-GB" smtClean="0"/>
               <a:pPr/>
-              <a:t>25/08/2023</a:t>
+              <a:t>31/08/2023</a:t>
             </a:fld>
             <a:r>
               <a:rPr lang="en-GB" dirty="0"/>
@@ -6263,7 +6263,7 @@
             <a:fld id="{78417F83-4CBA-48F2-BAD0-783AE3701E32}" type="datetimeFigureOut">
               <a:rPr lang="en-GB" smtClean="0"/>
               <a:pPr/>
-              <a:t>25/08/2023</a:t>
+              <a:t>31/08/2023</a:t>
             </a:fld>
             <a:r>
               <a:rPr lang="en-GB" dirty="0"/>
@@ -6437,7 +6437,7 @@
             <a:fld id="{78417F83-4CBA-48F2-BAD0-783AE3701E32}" type="datetimeFigureOut">
               <a:rPr lang="en-GB" smtClean="0"/>
               <a:pPr/>
-              <a:t>25/08/2023</a:t>
+              <a:t>31/08/2023</a:t>
             </a:fld>
             <a:r>
               <a:rPr lang="en-GB" dirty="0"/>
@@ -6596,7 +6596,7 @@
             <a:fld id="{78417F83-4CBA-48F2-BAD0-783AE3701E32}" type="datetimeFigureOut">
               <a:rPr lang="en-GB" smtClean="0"/>
               <a:pPr/>
-              <a:t>25/08/2023</a:t>
+              <a:t>31/08/2023</a:t>
             </a:fld>
             <a:r>
               <a:rPr lang="en-GB" dirty="0"/>
@@ -6880,7 +6880,7 @@
           <a:p>
             <a:fld id="{8B1A925D-6802-4F82-B3A4-43BDB522D203}" type="datetimeFigureOut">
               <a:rPr lang="en-GB" smtClean="0"/>
-              <a:t>25/08/2023</a:t>
+              <a:t>31/08/2023</a:t>
             </a:fld>
             <a:endParaRPr lang="en-GB"/>
           </a:p>
@@ -7761,7 +7761,7 @@
             <a:fld id="{78417F83-4CBA-48F2-BAD0-783AE3701E32}" type="datetimeFigureOut">
               <a:rPr lang="en-GB" smtClean="0"/>
               <a:pPr/>
-              <a:t>25/08/2023</a:t>
+              <a:t>31/08/2023</a:t>
             </a:fld>
             <a:r>
               <a:rPr lang="en-GB" dirty="0"/>
@@ -8036,7 +8036,7 @@
             <a:fld id="{78417F83-4CBA-48F2-BAD0-783AE3701E32}" type="datetimeFigureOut">
               <a:rPr lang="en-GB" smtClean="0"/>
               <a:pPr/>
-              <a:t>25/08/2023</a:t>
+              <a:t>31/08/2023</a:t>
             </a:fld>
             <a:r>
               <a:rPr lang="en-GB" dirty="0"/>
@@ -9241,7 +9241,7 @@
           <a:p>
             <a:fld id="{8B1A925D-6802-4F82-B3A4-43BDB522D203}" type="datetimeFigureOut">
               <a:rPr lang="en-GB" smtClean="0"/>
-              <a:t>25/08/2023</a:t>
+              <a:t>31/08/2023</a:t>
             </a:fld>
             <a:endParaRPr lang="en-GB"/>
           </a:p>
@@ -9656,7 +9656,7 @@
           <a:p>
             <a:fld id="{8B1A925D-6802-4F82-B3A4-43BDB522D203}" type="datetimeFigureOut">
               <a:rPr lang="en-GB" smtClean="0"/>
-              <a:t>25/08/2023</a:t>
+              <a:t>31/08/2023</a:t>
             </a:fld>
             <a:endParaRPr lang="en-GB"/>
           </a:p>
@@ -9798,7 +9798,7 @@
           <a:p>
             <a:fld id="{8B1A925D-6802-4F82-B3A4-43BDB522D203}" type="datetimeFigureOut">
               <a:rPr lang="en-GB" smtClean="0"/>
-              <a:t>25/08/2023</a:t>
+              <a:t>31/08/2023</a:t>
             </a:fld>
             <a:endParaRPr lang="en-GB"/>
           </a:p>
@@ -9911,7 +9911,7 @@
           <a:p>
             <a:fld id="{8B1A925D-6802-4F82-B3A4-43BDB522D203}" type="datetimeFigureOut">
               <a:rPr lang="en-GB" smtClean="0"/>
-              <a:t>25/08/2023</a:t>
+              <a:t>31/08/2023</a:t>
             </a:fld>
             <a:endParaRPr lang="en-GB"/>
           </a:p>
@@ -10224,7 +10224,7 @@
           <a:p>
             <a:fld id="{8B1A925D-6802-4F82-B3A4-43BDB522D203}" type="datetimeFigureOut">
               <a:rPr lang="en-GB" smtClean="0"/>
-              <a:t>25/08/2023</a:t>
+              <a:t>31/08/2023</a:t>
             </a:fld>
             <a:endParaRPr lang="en-GB"/>
           </a:p>
@@ -10513,7 +10513,7 @@
           <a:p>
             <a:fld id="{8B1A925D-6802-4F82-B3A4-43BDB522D203}" type="datetimeFigureOut">
               <a:rPr lang="en-GB" smtClean="0"/>
-              <a:t>25/08/2023</a:t>
+              <a:t>31/08/2023</a:t>
             </a:fld>
             <a:endParaRPr lang="en-GB"/>
           </a:p>
@@ -10756,7 +10756,7 @@
           <a:p>
             <a:fld id="{8B1A925D-6802-4F82-B3A4-43BDB522D203}" type="datetimeFigureOut">
               <a:rPr lang="en-GB" smtClean="0"/>
-              <a:t>25/08/2023</a:t>
+              <a:t>31/08/2023</a:t>
             </a:fld>
             <a:endParaRPr lang="en-GB"/>
           </a:p>
@@ -11522,7 +11522,7 @@
             <a:fld id="{78417F83-4CBA-48F2-BAD0-783AE3701E32}" type="datetimeFigureOut">
               <a:rPr lang="en-GB" smtClean="0"/>
               <a:pPr/>
-              <a:t>25/08/2023</a:t>
+              <a:t>31/08/2023</a:t>
             </a:fld>
             <a:r>
               <a:rPr lang="en-GB"/>

</xml_diff>